<commit_message>
Updates to code and sheets
</commit_message>
<xml_diff>
--- a/MatthewTuck_Honours/plots/image preparation for honours.pptx
+++ b/MatthewTuck_Honours/plots/image preparation for honours.pptx
@@ -6,6 +6,13 @@
   </p:sldMasterIdLst>
   <p:sldIdLst>
     <p:sldId id="256" r:id="rId2"/>
+    <p:sldId id="257" r:id="rId3"/>
+    <p:sldId id="258" r:id="rId4"/>
+    <p:sldId id="259" r:id="rId5"/>
+    <p:sldId id="260" r:id="rId6"/>
+    <p:sldId id="261" r:id="rId7"/>
+    <p:sldId id="262" r:id="rId8"/>
+    <p:sldId id="263" r:id="rId9"/>
   </p:sldIdLst>
   <p:sldSz cx="12192000" cy="6858000"/>
   <p:notesSz cx="6858000" cy="9144000"/>
@@ -104,32 +111,566 @@
       </a:defRPr>
     </a:lvl9pPr>
   </p:defaultTextStyle>
+  <p:extLst>
+    <p:ext uri="{EFAFB233-063F-42B5-8137-9DF3F51BA10A}">
+      <p15:sldGuideLst xmlns:p15="http://schemas.microsoft.com/office/powerpoint/2012/main"/>
+    </p:ext>
+  </p:extLst>
 </p:presentation>
+</file>
+
+<file path=ppt/revisionInfo.xml><?xml version="1.0" encoding="utf-8"?>
+<p1510:revInfo xmlns:a="http://schemas.openxmlformats.org/drawingml/2006/main" xmlns:r="http://schemas.openxmlformats.org/officeDocument/2006/relationships" xmlns:p1510="http://schemas.microsoft.com/office/powerpoint/2015/10/main">
+  <p1510:revLst>
+    <p1510:client id="{AB2E6281-4804-4057-99C2-E96F36FD68F9}" v="174" dt="2025-02-22T18:40:52.340"/>
+  </p1510:revLst>
+</p1510:revInfo>
 </file>
 
 <file path=ppt/changesInfos/changesInfo1.xml><?xml version="1.0" encoding="utf-8"?>
 <pc:chgInfo xmlns:a="http://schemas.openxmlformats.org/drawingml/2006/main" xmlns:r="http://schemas.openxmlformats.org/officeDocument/2006/relationships" xmlns:ac="http://schemas.microsoft.com/office/drawing/2013/main/command" xmlns:pc="http://schemas.microsoft.com/office/powerpoint/2013/main/command">
   <pc:docChgLst>
     <pc:chgData name="Matthew Tuck" userId="292c67f149de0640" providerId="LiveId" clId="{AB2E6281-4804-4057-99C2-E96F36FD68F9}"/>
-    <pc:docChg chg="modSld">
-      <pc:chgData name="Matthew Tuck" userId="292c67f149de0640" providerId="LiveId" clId="{AB2E6281-4804-4057-99C2-E96F36FD68F9}" dt="2025-02-07T21:37:37.096" v="0" actId="1076"/>
+    <pc:docChg chg="undo custSel addSld modSld sldOrd">
+      <pc:chgData name="Matthew Tuck" userId="292c67f149de0640" providerId="LiveId" clId="{AB2E6281-4804-4057-99C2-E96F36FD68F9}" dt="2025-02-22T18:40:58.774" v="741" actId="478"/>
       <pc:docMkLst>
         <pc:docMk/>
       </pc:docMkLst>
-      <pc:sldChg chg="modSp mod">
-        <pc:chgData name="Matthew Tuck" userId="292c67f149de0640" providerId="LiveId" clId="{AB2E6281-4804-4057-99C2-E96F36FD68F9}" dt="2025-02-07T21:37:37.096" v="0" actId="1076"/>
+      <pc:sldChg chg="addSp delSp modSp mod">
+        <pc:chgData name="Matthew Tuck" userId="292c67f149de0640" providerId="LiveId" clId="{AB2E6281-4804-4057-99C2-E96F36FD68F9}" dt="2025-02-21T21:05:46.831" v="557" actId="1076"/>
         <pc:sldMkLst>
           <pc:docMk/>
           <pc:sldMk cId="2389168500" sldId="256"/>
         </pc:sldMkLst>
-        <pc:grpChg chg="mod">
-          <ac:chgData name="Matthew Tuck" userId="292c67f149de0640" providerId="LiveId" clId="{AB2E6281-4804-4057-99C2-E96F36FD68F9}" dt="2025-02-07T21:37:37.096" v="0" actId="1076"/>
+        <pc:spChg chg="add mod topLvl">
+          <ac:chgData name="Matthew Tuck" userId="292c67f149de0640" providerId="LiveId" clId="{AB2E6281-4804-4057-99C2-E96F36FD68F9}" dt="2025-02-21T21:05:16.203" v="553" actId="164"/>
+          <ac:spMkLst>
+            <pc:docMk/>
+            <pc:sldMk cId="2389168500" sldId="256"/>
+            <ac:spMk id="2" creationId="{53588E85-51C2-BC0D-6933-D5629282428B}"/>
+          </ac:spMkLst>
+        </pc:spChg>
+        <pc:spChg chg="add mod topLvl">
+          <ac:chgData name="Matthew Tuck" userId="292c67f149de0640" providerId="LiveId" clId="{AB2E6281-4804-4057-99C2-E96F36FD68F9}" dt="2025-02-21T21:05:16.203" v="553" actId="164"/>
+          <ac:spMkLst>
+            <pc:docMk/>
+            <pc:sldMk cId="2389168500" sldId="256"/>
+            <ac:spMk id="3" creationId="{51E7DBA6-F2E3-2B10-D591-44D447113820}"/>
+          </ac:spMkLst>
+        </pc:spChg>
+        <pc:spChg chg="add del mod">
+          <ac:chgData name="Matthew Tuck" userId="292c67f149de0640" providerId="LiveId" clId="{AB2E6281-4804-4057-99C2-E96F36FD68F9}" dt="2025-02-21T20:32:16.622" v="459" actId="478"/>
+          <ac:spMkLst>
+            <pc:docMk/>
+            <pc:sldMk cId="2389168500" sldId="256"/>
+            <ac:spMk id="4" creationId="{9CC9ACDA-5246-80D9-C173-8BAF456EEA17}"/>
+          </ac:spMkLst>
+        </pc:spChg>
+        <pc:spChg chg="add del mod ord topLvl">
+          <ac:chgData name="Matthew Tuck" userId="292c67f149de0640" providerId="LiveId" clId="{AB2E6281-4804-4057-99C2-E96F36FD68F9}" dt="2025-02-21T20:41:38.014" v="518" actId="478"/>
+          <ac:spMkLst>
+            <pc:docMk/>
+            <pc:sldMk cId="2389168500" sldId="256"/>
+            <ac:spMk id="9" creationId="{D2B9D71F-8A82-B6A0-E484-7DAAAF6A8675}"/>
+          </ac:spMkLst>
+        </pc:spChg>
+        <pc:spChg chg="add mod ord topLvl">
+          <ac:chgData name="Matthew Tuck" userId="292c67f149de0640" providerId="LiveId" clId="{AB2E6281-4804-4057-99C2-E96F36FD68F9}" dt="2025-02-21T21:05:38.276" v="556" actId="164"/>
+          <ac:spMkLst>
+            <pc:docMk/>
+            <pc:sldMk cId="2389168500" sldId="256"/>
+            <ac:spMk id="16" creationId="{C0A6CDF0-0E0D-40C5-A3BB-95AF09B8D3EF}"/>
+          </ac:spMkLst>
+        </pc:spChg>
+        <pc:grpChg chg="add mod topLvl">
+          <ac:chgData name="Matthew Tuck" userId="292c67f149de0640" providerId="LiveId" clId="{AB2E6281-4804-4057-99C2-E96F36FD68F9}" dt="2025-02-21T21:05:16.203" v="553" actId="164"/>
+          <ac:grpSpMkLst>
+            <pc:docMk/>
+            <pc:sldMk cId="2389168500" sldId="256"/>
+            <ac:grpSpMk id="6" creationId="{784A3045-DD24-4D0B-E53D-87BAECD7EB6C}"/>
+          </ac:grpSpMkLst>
+        </pc:grpChg>
+        <pc:grpChg chg="add del mod topLvl">
+          <ac:chgData name="Matthew Tuck" userId="292c67f149de0640" providerId="LiveId" clId="{AB2E6281-4804-4057-99C2-E96F36FD68F9}" dt="2025-02-21T20:41:33.588" v="517" actId="478"/>
           <ac:grpSpMkLst>
             <pc:docMk/>
             <pc:sldMk cId="2389168500" sldId="256"/>
             <ac:grpSpMk id="8" creationId="{45F3CB1E-5A67-1363-8DF9-09AC03A3A895}"/>
           </ac:grpSpMkLst>
         </pc:grpChg>
+        <pc:grpChg chg="add del mod">
+          <ac:chgData name="Matthew Tuck" userId="292c67f149de0640" providerId="LiveId" clId="{AB2E6281-4804-4057-99C2-E96F36FD68F9}" dt="2025-02-21T20:41:38.014" v="518" actId="478"/>
+          <ac:grpSpMkLst>
+            <pc:docMk/>
+            <pc:sldMk cId="2389168500" sldId="256"/>
+            <ac:grpSpMk id="10" creationId="{AFF3FC92-DBE1-034C-93BD-F4C4852E0025}"/>
+          </ac:grpSpMkLst>
+        </pc:grpChg>
+        <pc:grpChg chg="add mod topLvl">
+          <ac:chgData name="Matthew Tuck" userId="292c67f149de0640" providerId="LiveId" clId="{AB2E6281-4804-4057-99C2-E96F36FD68F9}" dt="2025-02-21T21:05:21.109" v="554" actId="164"/>
+          <ac:grpSpMkLst>
+            <pc:docMk/>
+            <pc:sldMk cId="2389168500" sldId="256"/>
+            <ac:grpSpMk id="15" creationId="{E2936D85-599B-6B7F-D41E-F1A30859FDD2}"/>
+          </ac:grpSpMkLst>
+        </pc:grpChg>
+        <pc:grpChg chg="add del mod ord">
+          <ac:chgData name="Matthew Tuck" userId="292c67f149de0640" providerId="LiveId" clId="{AB2E6281-4804-4057-99C2-E96F36FD68F9}" dt="2025-02-21T21:04:08.299" v="548" actId="165"/>
+          <ac:grpSpMkLst>
+            <pc:docMk/>
+            <pc:sldMk cId="2389168500" sldId="256"/>
+            <ac:grpSpMk id="17" creationId="{A16E4921-8D0C-A180-8D71-5B5F3C74F9A1}"/>
+          </ac:grpSpMkLst>
+        </pc:grpChg>
+        <pc:grpChg chg="add mod">
+          <ac:chgData name="Matthew Tuck" userId="292c67f149de0640" providerId="LiveId" clId="{AB2E6281-4804-4057-99C2-E96F36FD68F9}" dt="2025-02-21T21:05:16.203" v="553" actId="164"/>
+          <ac:grpSpMkLst>
+            <pc:docMk/>
+            <pc:sldMk cId="2389168500" sldId="256"/>
+            <ac:grpSpMk id="20" creationId="{722BA668-6448-A06D-414B-5F26580CF36C}"/>
+          </ac:grpSpMkLst>
+        </pc:grpChg>
+        <pc:grpChg chg="add mod">
+          <ac:chgData name="Matthew Tuck" userId="292c67f149de0640" providerId="LiveId" clId="{AB2E6281-4804-4057-99C2-E96F36FD68F9}" dt="2025-02-21T21:05:38.276" v="556" actId="164"/>
+          <ac:grpSpMkLst>
+            <pc:docMk/>
+            <pc:sldMk cId="2389168500" sldId="256"/>
+            <ac:grpSpMk id="21" creationId="{DF511537-577C-5710-7B2A-26BC9D7C52E3}"/>
+          </ac:grpSpMkLst>
+        </pc:grpChg>
+        <pc:grpChg chg="add mod">
+          <ac:chgData name="Matthew Tuck" userId="292c67f149de0640" providerId="LiveId" clId="{AB2E6281-4804-4057-99C2-E96F36FD68F9}" dt="2025-02-21T21:05:46.831" v="557" actId="1076"/>
+          <ac:grpSpMkLst>
+            <pc:docMk/>
+            <pc:sldMk cId="2389168500" sldId="256"/>
+            <ac:grpSpMk id="22" creationId="{9B788C06-E1AA-B0EB-35C3-D87419595569}"/>
+          </ac:grpSpMkLst>
+        </pc:grpChg>
+        <pc:picChg chg="add del mod">
+          <ac:chgData name="Matthew Tuck" userId="292c67f149de0640" providerId="LiveId" clId="{AB2E6281-4804-4057-99C2-E96F36FD68F9}" dt="2025-02-21T20:41:33.588" v="517" actId="478"/>
+          <ac:picMkLst>
+            <pc:docMk/>
+            <pc:sldMk cId="2389168500" sldId="256"/>
+            <ac:picMk id="5" creationId="{73715FED-DDCE-0111-E646-37F70B39B34A}"/>
+          </ac:picMkLst>
+        </pc:picChg>
+        <pc:picChg chg="mod">
+          <ac:chgData name="Matthew Tuck" userId="292c67f149de0640" providerId="LiveId" clId="{AB2E6281-4804-4057-99C2-E96F36FD68F9}" dt="2025-02-21T21:05:16.203" v="553" actId="164"/>
+          <ac:picMkLst>
+            <pc:docMk/>
+            <pc:sldMk cId="2389168500" sldId="256"/>
+            <ac:picMk id="7" creationId="{024D7657-1386-3BF1-9E27-C379D592751A}"/>
+          </ac:picMkLst>
+        </pc:picChg>
+        <pc:picChg chg="add mod modCrop">
+          <ac:chgData name="Matthew Tuck" userId="292c67f149de0640" providerId="LiveId" clId="{AB2E6281-4804-4057-99C2-E96F36FD68F9}" dt="2025-02-21T21:05:16.203" v="553" actId="164"/>
+          <ac:picMkLst>
+            <pc:docMk/>
+            <pc:sldMk cId="2389168500" sldId="256"/>
+            <ac:picMk id="12" creationId="{A421572D-D995-4990-4FDA-5B53D073AAE5}"/>
+          </ac:picMkLst>
+        </pc:picChg>
+        <pc:picChg chg="add del mod ord">
+          <ac:chgData name="Matthew Tuck" userId="292c67f149de0640" providerId="LiveId" clId="{AB2E6281-4804-4057-99C2-E96F36FD68F9}" dt="2025-02-21T21:03:35.632" v="544" actId="478"/>
+          <ac:picMkLst>
+            <pc:docMk/>
+            <pc:sldMk cId="2389168500" sldId="256"/>
+            <ac:picMk id="14" creationId="{D135055D-0439-BA2D-751A-A339F64D914D}"/>
+          </ac:picMkLst>
+        </pc:picChg>
+        <pc:picChg chg="add mod ord modCrop">
+          <ac:chgData name="Matthew Tuck" userId="292c67f149de0640" providerId="LiveId" clId="{AB2E6281-4804-4057-99C2-E96F36FD68F9}" dt="2025-02-21T21:05:21.109" v="554" actId="164"/>
+          <ac:picMkLst>
+            <pc:docMk/>
+            <pc:sldMk cId="2389168500" sldId="256"/>
+            <ac:picMk id="19" creationId="{3D6978F0-5245-E9F0-25F4-6FFE028F01D0}"/>
+          </ac:picMkLst>
+        </pc:picChg>
+      </pc:sldChg>
+      <pc:sldChg chg="addSp delSp modSp new mod">
+        <pc:chgData name="Matthew Tuck" userId="292c67f149de0640" providerId="LiveId" clId="{AB2E6281-4804-4057-99C2-E96F36FD68F9}" dt="2025-02-21T22:14:00.965" v="578" actId="164"/>
+        <pc:sldMkLst>
+          <pc:docMk/>
+          <pc:sldMk cId="1425793214" sldId="257"/>
+        </pc:sldMkLst>
+        <pc:grpChg chg="add del mod">
+          <ac:chgData name="Matthew Tuck" userId="292c67f149de0640" providerId="LiveId" clId="{AB2E6281-4804-4057-99C2-E96F36FD68F9}" dt="2025-02-21T22:10:30.621" v="558" actId="478"/>
+          <ac:grpSpMkLst>
+            <pc:docMk/>
+            <pc:sldMk cId="1425793214" sldId="257"/>
+            <ac:grpSpMk id="10" creationId="{F656F8EF-F715-6042-806A-6FDE35AD1BDD}"/>
+          </ac:grpSpMkLst>
+        </pc:grpChg>
+        <pc:grpChg chg="add mod">
+          <ac:chgData name="Matthew Tuck" userId="292c67f149de0640" providerId="LiveId" clId="{AB2E6281-4804-4057-99C2-E96F36FD68F9}" dt="2025-02-21T22:14:00.965" v="578" actId="164"/>
+          <ac:grpSpMkLst>
+            <pc:docMk/>
+            <pc:sldMk cId="1425793214" sldId="257"/>
+            <ac:grpSpMk id="11" creationId="{76610E68-7E06-449C-CC76-F475F053FA0B}"/>
+          </ac:grpSpMkLst>
+        </pc:grpChg>
+        <pc:picChg chg="add del mod">
+          <ac:chgData name="Matthew Tuck" userId="292c67f149de0640" providerId="LiveId" clId="{AB2E6281-4804-4057-99C2-E96F36FD68F9}" dt="2025-02-21T22:12:32.288" v="562" actId="478"/>
+          <ac:picMkLst>
+            <pc:docMk/>
+            <pc:sldMk cId="1425793214" sldId="257"/>
+            <ac:picMk id="3" creationId="{A77B1627-9382-C06A-FF2A-BF84989B9695}"/>
+          </ac:picMkLst>
+        </pc:picChg>
+        <pc:picChg chg="add mod modCrop">
+          <ac:chgData name="Matthew Tuck" userId="292c67f149de0640" providerId="LiveId" clId="{AB2E6281-4804-4057-99C2-E96F36FD68F9}" dt="2025-02-21T22:14:00.965" v="578" actId="164"/>
+          <ac:picMkLst>
+            <pc:docMk/>
+            <pc:sldMk cId="1425793214" sldId="257"/>
+            <ac:picMk id="6" creationId="{65034353-7F6C-94FB-94A6-B2D97E7B9891}"/>
+          </ac:picMkLst>
+        </pc:picChg>
+        <pc:picChg chg="add mod modCrop">
+          <ac:chgData name="Matthew Tuck" userId="292c67f149de0640" providerId="LiveId" clId="{AB2E6281-4804-4057-99C2-E96F36FD68F9}" dt="2025-02-21T22:14:00.965" v="578" actId="164"/>
+          <ac:picMkLst>
+            <pc:docMk/>
+            <pc:sldMk cId="1425793214" sldId="257"/>
+            <ac:picMk id="7" creationId="{14817CAB-66B4-D7B3-D660-0C218E77F344}"/>
+          </ac:picMkLst>
+        </pc:picChg>
+        <pc:picChg chg="add mod modCrop">
+          <ac:chgData name="Matthew Tuck" userId="292c67f149de0640" providerId="LiveId" clId="{AB2E6281-4804-4057-99C2-E96F36FD68F9}" dt="2025-02-21T22:14:00.965" v="578" actId="164"/>
+          <ac:picMkLst>
+            <pc:docMk/>
+            <pc:sldMk cId="1425793214" sldId="257"/>
+            <ac:picMk id="8" creationId="{E1A83E9B-E85A-8FEE-075E-3490188BEBE4}"/>
+          </ac:picMkLst>
+        </pc:picChg>
+      </pc:sldChg>
+      <pc:sldChg chg="addSp delSp modSp new mod">
+        <pc:chgData name="Matthew Tuck" userId="292c67f149de0640" providerId="LiveId" clId="{AB2E6281-4804-4057-99C2-E96F36FD68F9}" dt="2025-02-20T20:42:16.388" v="455" actId="478"/>
+        <pc:sldMkLst>
+          <pc:docMk/>
+          <pc:sldMk cId="142822564" sldId="258"/>
+        </pc:sldMkLst>
+        <pc:picChg chg="add mod">
+          <ac:chgData name="Matthew Tuck" userId="292c67f149de0640" providerId="LiveId" clId="{AB2E6281-4804-4057-99C2-E96F36FD68F9}" dt="2025-02-20T20:42:14.661" v="454" actId="1076"/>
+          <ac:picMkLst>
+            <pc:docMk/>
+            <pc:sldMk cId="142822564" sldId="258"/>
+            <ac:picMk id="10" creationId="{09FD113B-8D14-A100-5988-EBBC754DD16A}"/>
+          </ac:picMkLst>
+        </pc:picChg>
+      </pc:sldChg>
+      <pc:sldChg chg="addSp delSp modSp new mod ord">
+        <pc:chgData name="Matthew Tuck" userId="292c67f149de0640" providerId="LiveId" clId="{AB2E6281-4804-4057-99C2-E96F36FD68F9}" dt="2025-02-19T07:12:59.770" v="375" actId="164"/>
+        <pc:sldMkLst>
+          <pc:docMk/>
+          <pc:sldMk cId="3644617857" sldId="259"/>
+        </pc:sldMkLst>
+        <pc:grpChg chg="add mod">
+          <ac:chgData name="Matthew Tuck" userId="292c67f149de0640" providerId="LiveId" clId="{AB2E6281-4804-4057-99C2-E96F36FD68F9}" dt="2025-02-19T07:12:59.770" v="375" actId="164"/>
+          <ac:grpSpMkLst>
+            <pc:docMk/>
+            <pc:sldMk cId="3644617857" sldId="259"/>
+            <ac:grpSpMk id="5" creationId="{A2373E63-1431-C970-D989-5A88D4A86958}"/>
+          </ac:grpSpMkLst>
+        </pc:grpChg>
+        <pc:picChg chg="add mod modCrop">
+          <ac:chgData name="Matthew Tuck" userId="292c67f149de0640" providerId="LiveId" clId="{AB2E6281-4804-4057-99C2-E96F36FD68F9}" dt="2025-02-19T07:12:59.770" v="375" actId="164"/>
+          <ac:picMkLst>
+            <pc:docMk/>
+            <pc:sldMk cId="3644617857" sldId="259"/>
+            <ac:picMk id="3" creationId="{4452796D-399A-CCC5-93B2-DFEE2E396468}"/>
+          </ac:picMkLst>
+        </pc:picChg>
+        <pc:picChg chg="add mod modCrop">
+          <ac:chgData name="Matthew Tuck" userId="292c67f149de0640" providerId="LiveId" clId="{AB2E6281-4804-4057-99C2-E96F36FD68F9}" dt="2025-02-19T07:12:59.770" v="375" actId="164"/>
+          <ac:picMkLst>
+            <pc:docMk/>
+            <pc:sldMk cId="3644617857" sldId="259"/>
+            <ac:picMk id="4" creationId="{1E557525-031E-A12B-9100-AB97148968C2}"/>
+          </ac:picMkLst>
+        </pc:picChg>
+      </pc:sldChg>
+      <pc:sldChg chg="addSp delSp modSp new mod">
+        <pc:chgData name="Matthew Tuck" userId="292c67f149de0640" providerId="LiveId" clId="{AB2E6281-4804-4057-99C2-E96F36FD68F9}" dt="2025-02-18T00:05:08.179" v="126" actId="1076"/>
+        <pc:sldMkLst>
+          <pc:docMk/>
+          <pc:sldMk cId="776127107" sldId="260"/>
+        </pc:sldMkLst>
+        <pc:picChg chg="add mod">
+          <ac:chgData name="Matthew Tuck" userId="292c67f149de0640" providerId="LiveId" clId="{AB2E6281-4804-4057-99C2-E96F36FD68F9}" dt="2025-02-18T00:05:08.179" v="126" actId="1076"/>
+          <ac:picMkLst>
+            <pc:docMk/>
+            <pc:sldMk cId="776127107" sldId="260"/>
+            <ac:picMk id="10" creationId="{B60B9C24-D9ED-6246-505F-3054A2C8B955}"/>
+          </ac:picMkLst>
+        </pc:picChg>
+      </pc:sldChg>
+      <pc:sldChg chg="addSp delSp modSp new mod">
+        <pc:chgData name="Matthew Tuck" userId="292c67f149de0640" providerId="LiveId" clId="{AB2E6281-4804-4057-99C2-E96F36FD68F9}" dt="2025-02-22T18:40:58.774" v="741" actId="478"/>
+        <pc:sldMkLst>
+          <pc:docMk/>
+          <pc:sldMk cId="2830423783" sldId="261"/>
+        </pc:sldMkLst>
+        <pc:spChg chg="add del mod">
+          <ac:chgData name="Matthew Tuck" userId="292c67f149de0640" providerId="LiveId" clId="{AB2E6281-4804-4057-99C2-E96F36FD68F9}" dt="2025-02-22T18:40:58.774" v="741" actId="478"/>
+          <ac:spMkLst>
+            <pc:docMk/>
+            <pc:sldMk cId="2830423783" sldId="261"/>
+            <ac:spMk id="8" creationId="{9EB36AFD-B771-F828-4318-53E469C11A47}"/>
+          </ac:spMkLst>
+        </pc:spChg>
+        <pc:grpChg chg="add mod">
+          <ac:chgData name="Matthew Tuck" userId="292c67f149de0640" providerId="LiveId" clId="{AB2E6281-4804-4057-99C2-E96F36FD68F9}" dt="2025-02-22T18:37:28.417" v="738" actId="164"/>
+          <ac:grpSpMkLst>
+            <pc:docMk/>
+            <pc:sldMk cId="2830423783" sldId="261"/>
+            <ac:grpSpMk id="7" creationId="{096B1D4B-FF7D-5E0A-C0C5-B5E4D3848CD9}"/>
+          </ac:grpSpMkLst>
+        </pc:grpChg>
+        <pc:grpChg chg="add del mod">
+          <ac:chgData name="Matthew Tuck" userId="292c67f149de0640" providerId="LiveId" clId="{AB2E6281-4804-4057-99C2-E96F36FD68F9}" dt="2025-02-22T18:35:23.564" v="717" actId="478"/>
+          <ac:grpSpMkLst>
+            <pc:docMk/>
+            <pc:sldMk cId="2830423783" sldId="261"/>
+            <ac:grpSpMk id="31" creationId="{CD712030-F784-FD51-0F4B-35CB01AFC15F}"/>
+          </ac:grpSpMkLst>
+        </pc:grpChg>
+        <pc:picChg chg="add mod modCrop">
+          <ac:chgData name="Matthew Tuck" userId="292c67f149de0640" providerId="LiveId" clId="{AB2E6281-4804-4057-99C2-E96F36FD68F9}" dt="2025-02-22T18:37:28.417" v="738" actId="164"/>
+          <ac:picMkLst>
+            <pc:docMk/>
+            <pc:sldMk cId="2830423783" sldId="261"/>
+            <ac:picMk id="3" creationId="{9BDEE49D-E3AD-E56E-07F8-997759D50B81}"/>
+          </ac:picMkLst>
+        </pc:picChg>
+        <pc:picChg chg="add mod">
+          <ac:chgData name="Matthew Tuck" userId="292c67f149de0640" providerId="LiveId" clId="{AB2E6281-4804-4057-99C2-E96F36FD68F9}" dt="2025-02-22T18:37:28.417" v="738" actId="164"/>
+          <ac:picMkLst>
+            <pc:docMk/>
+            <pc:sldMk cId="2830423783" sldId="261"/>
+            <ac:picMk id="5" creationId="{5125FB7B-CF25-DFCD-8C37-5B6B60B18B43}"/>
+          </ac:picMkLst>
+        </pc:picChg>
+        <pc:picChg chg="add mod modCrop">
+          <ac:chgData name="Matthew Tuck" userId="292c67f149de0640" providerId="LiveId" clId="{AB2E6281-4804-4057-99C2-E96F36FD68F9}" dt="2025-02-22T18:37:28.417" v="738" actId="164"/>
+          <ac:picMkLst>
+            <pc:docMk/>
+            <pc:sldMk cId="2830423783" sldId="261"/>
+            <ac:picMk id="6" creationId="{306A13BA-3C1F-9234-F87F-518D68AA8AB8}"/>
+          </ac:picMkLst>
+        </pc:picChg>
+      </pc:sldChg>
+      <pc:sldChg chg="addSp delSp modSp new mod">
+        <pc:chgData name="Matthew Tuck" userId="292c67f149de0640" providerId="LiveId" clId="{AB2E6281-4804-4057-99C2-E96F36FD68F9}" dt="2025-02-22T17:18:47.881" v="716" actId="164"/>
+        <pc:sldMkLst>
+          <pc:docMk/>
+          <pc:sldMk cId="3795613774" sldId="262"/>
+        </pc:sldMkLst>
+        <pc:spChg chg="add mod">
+          <ac:chgData name="Matthew Tuck" userId="292c67f149de0640" providerId="LiveId" clId="{AB2E6281-4804-4057-99C2-E96F36FD68F9}" dt="2025-02-22T17:17:41.021" v="709" actId="1076"/>
+          <ac:spMkLst>
+            <pc:docMk/>
+            <pc:sldMk cId="3795613774" sldId="262"/>
+            <ac:spMk id="6" creationId="{687D9B0E-AC76-43F7-0857-3BE53FFFDBAC}"/>
+          </ac:spMkLst>
+        </pc:spChg>
+        <pc:spChg chg="del mod">
+          <ac:chgData name="Matthew Tuck" userId="292c67f149de0640" providerId="LiveId" clId="{AB2E6281-4804-4057-99C2-E96F36FD68F9}" dt="2025-02-22T17:17:11.709" v="691" actId="478"/>
+          <ac:spMkLst>
+            <pc:docMk/>
+            <pc:sldMk cId="3795613774" sldId="262"/>
+            <ac:spMk id="7" creationId="{25F5C2B4-E217-1BAC-A558-182F225D58DD}"/>
+          </ac:spMkLst>
+        </pc:spChg>
+        <pc:spChg chg="mod">
+          <ac:chgData name="Matthew Tuck" userId="292c67f149de0640" providerId="LiveId" clId="{AB2E6281-4804-4057-99C2-E96F36FD68F9}" dt="2025-02-22T17:18:37.901" v="715" actId="1076"/>
+          <ac:spMkLst>
+            <pc:docMk/>
+            <pc:sldMk cId="3795613774" sldId="262"/>
+            <ac:spMk id="8" creationId="{869983BB-BB3D-4E23-6071-C20E2D0FC985}"/>
+          </ac:spMkLst>
+        </pc:spChg>
+        <pc:spChg chg="add del mod">
+          <ac:chgData name="Matthew Tuck" userId="292c67f149de0640" providerId="LiveId" clId="{AB2E6281-4804-4057-99C2-E96F36FD68F9}" dt="2025-02-22T17:16:53.499" v="687" actId="478"/>
+          <ac:spMkLst>
+            <pc:docMk/>
+            <pc:sldMk cId="3795613774" sldId="262"/>
+            <ac:spMk id="9" creationId="{5BC836D0-930A-0832-0B9D-1C5A71502423}"/>
+          </ac:spMkLst>
+        </pc:spChg>
+        <pc:spChg chg="add mod">
+          <ac:chgData name="Matthew Tuck" userId="292c67f149de0640" providerId="LiveId" clId="{AB2E6281-4804-4057-99C2-E96F36FD68F9}" dt="2025-02-22T17:16:03.540" v="681" actId="255"/>
+          <ac:spMkLst>
+            <pc:docMk/>
+            <pc:sldMk cId="3795613774" sldId="262"/>
+            <ac:spMk id="10" creationId="{3F0D060B-3D42-DC8C-7C86-23F40725FDE2}"/>
+          </ac:spMkLst>
+        </pc:spChg>
+        <pc:spChg chg="del mod">
+          <ac:chgData name="Matthew Tuck" userId="292c67f149de0640" providerId="LiveId" clId="{AB2E6281-4804-4057-99C2-E96F36FD68F9}" dt="2025-02-22T17:17:16.250" v="692" actId="478"/>
+          <ac:spMkLst>
+            <pc:docMk/>
+            <pc:sldMk cId="3795613774" sldId="262"/>
+            <ac:spMk id="11" creationId="{4D43A66B-A39A-522D-444F-BD1C4270BEF9}"/>
+          </ac:spMkLst>
+        </pc:spChg>
+        <pc:spChg chg="add del mod">
+          <ac:chgData name="Matthew Tuck" userId="292c67f149de0640" providerId="LiveId" clId="{AB2E6281-4804-4057-99C2-E96F36FD68F9}" dt="2025-02-22T17:16:58.625" v="688" actId="478"/>
+          <ac:spMkLst>
+            <pc:docMk/>
+            <pc:sldMk cId="3795613774" sldId="262"/>
+            <ac:spMk id="12" creationId="{06575918-4A5F-D3E4-A594-24914BAAA96B}"/>
+          </ac:spMkLst>
+        </pc:spChg>
+        <pc:spChg chg="mod">
+          <ac:chgData name="Matthew Tuck" userId="292c67f149de0640" providerId="LiveId" clId="{AB2E6281-4804-4057-99C2-E96F36FD68F9}" dt="2025-02-22T17:16:28.088" v="682"/>
+          <ac:spMkLst>
+            <pc:docMk/>
+            <pc:sldMk cId="3795613774" sldId="262"/>
+            <ac:spMk id="14" creationId="{73E64907-2A63-100C-A7DC-4DABC17B8AF4}"/>
+          </ac:spMkLst>
+        </pc:spChg>
+        <pc:grpChg chg="add mod">
+          <ac:chgData name="Matthew Tuck" userId="292c67f149de0640" providerId="LiveId" clId="{AB2E6281-4804-4057-99C2-E96F36FD68F9}" dt="2025-02-22T17:18:47.881" v="716" actId="164"/>
+          <ac:grpSpMkLst>
+            <pc:docMk/>
+            <pc:sldMk cId="3795613774" sldId="262"/>
+            <ac:grpSpMk id="2" creationId="{57014079-8C6B-DF5B-5220-C97EFEF39B88}"/>
+          </ac:grpSpMkLst>
+        </pc:grpChg>
+        <pc:grpChg chg="mod">
+          <ac:chgData name="Matthew Tuck" userId="292c67f149de0640" providerId="LiveId" clId="{AB2E6281-4804-4057-99C2-E96F36FD68F9}" dt="2025-02-22T17:16:28.088" v="682"/>
+          <ac:grpSpMkLst>
+            <pc:docMk/>
+            <pc:sldMk cId="3795613774" sldId="262"/>
+            <ac:grpSpMk id="5" creationId="{34CD3BE2-3011-DD5C-4629-7A013C532416}"/>
+          </ac:grpSpMkLst>
+        </pc:grpChg>
+        <pc:grpChg chg="add mod">
+          <ac:chgData name="Matthew Tuck" userId="292c67f149de0640" providerId="LiveId" clId="{AB2E6281-4804-4057-99C2-E96F36FD68F9}" dt="2025-02-19T07:23:07.476" v="407" actId="164"/>
+          <ac:grpSpMkLst>
+            <pc:docMk/>
+            <pc:sldMk cId="3795613774" sldId="262"/>
+            <ac:grpSpMk id="13" creationId="{A6120170-CA4C-63BE-7372-3070ED21747D}"/>
+          </ac:grpSpMkLst>
+        </pc:grpChg>
+        <pc:grpChg chg="add mod">
+          <ac:chgData name="Matthew Tuck" userId="292c67f149de0640" providerId="LiveId" clId="{AB2E6281-4804-4057-99C2-E96F36FD68F9}" dt="2025-02-22T17:18:47.881" v="716" actId="164"/>
+          <ac:grpSpMkLst>
+            <pc:docMk/>
+            <pc:sldMk cId="3795613774" sldId="262"/>
+            <ac:grpSpMk id="15" creationId="{FD6A2E26-2E21-9DB8-D0FB-591A5605D15A}"/>
+          </ac:grpSpMkLst>
+        </pc:grpChg>
+        <pc:grpChg chg="add mod">
+          <ac:chgData name="Matthew Tuck" userId="292c67f149de0640" providerId="LiveId" clId="{AB2E6281-4804-4057-99C2-E96F36FD68F9}" dt="2025-02-22T17:18:47.881" v="716" actId="164"/>
+          <ac:grpSpMkLst>
+            <pc:docMk/>
+            <pc:sldMk cId="3795613774" sldId="262"/>
+            <ac:grpSpMk id="20" creationId="{43BEE5C5-EC88-031C-7171-149399CEF928}"/>
+          </ac:grpSpMkLst>
+        </pc:grpChg>
+        <pc:picChg chg="mod">
+          <ac:chgData name="Matthew Tuck" userId="292c67f149de0640" providerId="LiveId" clId="{AB2E6281-4804-4057-99C2-E96F36FD68F9}" dt="2025-02-22T17:16:28.088" v="682"/>
+          <ac:picMkLst>
+            <pc:docMk/>
+            <pc:sldMk cId="3795613774" sldId="262"/>
+            <ac:picMk id="3" creationId="{10C6EFCA-B1BB-F921-31E8-A1D27DF1095F}"/>
+          </ac:picMkLst>
+        </pc:picChg>
+        <pc:picChg chg="del mod">
+          <ac:chgData name="Matthew Tuck" userId="292c67f149de0640" providerId="LiveId" clId="{AB2E6281-4804-4057-99C2-E96F36FD68F9}" dt="2025-02-22T17:17:08.046" v="690" actId="478"/>
+          <ac:picMkLst>
+            <pc:docMk/>
+            <pc:sldMk cId="3795613774" sldId="262"/>
+            <ac:picMk id="4" creationId="{97AF3CFE-0BE1-80BA-5BFB-84F8BEC73170}"/>
+          </ac:picMkLst>
+        </pc:picChg>
+        <pc:picChg chg="add del mod ord">
+          <ac:chgData name="Matthew Tuck" userId="292c67f149de0640" providerId="LiveId" clId="{AB2E6281-4804-4057-99C2-E96F36FD68F9}" dt="2025-02-22T17:16:48.324" v="685" actId="478"/>
+          <ac:picMkLst>
+            <pc:docMk/>
+            <pc:sldMk cId="3795613774" sldId="262"/>
+            <ac:picMk id="17" creationId="{801F4385-B5ED-36B1-E5F7-6D60E34712DA}"/>
+          </ac:picMkLst>
+        </pc:picChg>
+        <pc:picChg chg="add mod ord">
+          <ac:chgData name="Matthew Tuck" userId="292c67f149de0640" providerId="LiveId" clId="{AB2E6281-4804-4057-99C2-E96F36FD68F9}" dt="2025-02-19T07:23:07.476" v="407" actId="164"/>
+          <ac:picMkLst>
+            <pc:docMk/>
+            <pc:sldMk cId="3795613774" sldId="262"/>
+            <ac:picMk id="19" creationId="{FEA61C3B-4816-25CE-FC2F-984AA99D3ABA}"/>
+          </ac:picMkLst>
+        </pc:picChg>
+      </pc:sldChg>
+      <pc:sldChg chg="addSp delSp modSp new mod">
+        <pc:chgData name="Matthew Tuck" userId="292c67f149de0640" providerId="LiveId" clId="{AB2E6281-4804-4057-99C2-E96F36FD68F9}" dt="2025-02-22T17:14:29.158" v="675" actId="164"/>
+        <pc:sldMkLst>
+          <pc:docMk/>
+          <pc:sldMk cId="708817653" sldId="263"/>
+        </pc:sldMkLst>
+        <pc:spChg chg="add del mod">
+          <ac:chgData name="Matthew Tuck" userId="292c67f149de0640" providerId="LiveId" clId="{AB2E6281-4804-4057-99C2-E96F36FD68F9}" dt="2025-02-22T16:45:03.056" v="605" actId="478"/>
+          <ac:spMkLst>
+            <pc:docMk/>
+            <pc:sldMk cId="708817653" sldId="263"/>
+            <ac:spMk id="4" creationId="{FF8C61F6-4238-B6A7-5615-06DFC49D0F52}"/>
+          </ac:spMkLst>
+        </pc:spChg>
+        <pc:spChg chg="add del">
+          <ac:chgData name="Matthew Tuck" userId="292c67f149de0640" providerId="LiveId" clId="{AB2E6281-4804-4057-99C2-E96F36FD68F9}" dt="2025-02-22T16:46:08.733" v="607" actId="478"/>
+          <ac:spMkLst>
+            <pc:docMk/>
+            <pc:sldMk cId="708817653" sldId="263"/>
+            <ac:spMk id="5" creationId="{A2E5AFF2-4026-E724-EC11-09AC274B3EF8}"/>
+          </ac:spMkLst>
+        </pc:spChg>
+        <pc:spChg chg="add del mod">
+          <ac:chgData name="Matthew Tuck" userId="292c67f149de0640" providerId="LiveId" clId="{AB2E6281-4804-4057-99C2-E96F36FD68F9}" dt="2025-02-22T16:55:05.891" v="650" actId="478"/>
+          <ac:spMkLst>
+            <pc:docMk/>
+            <pc:sldMk cId="708817653" sldId="263"/>
+            <ac:spMk id="6" creationId="{79395956-541F-35E9-3C3D-43569CCF22B0}"/>
+          </ac:spMkLst>
+        </pc:spChg>
+        <pc:spChg chg="add mod">
+          <ac:chgData name="Matthew Tuck" userId="292c67f149de0640" providerId="LiveId" clId="{AB2E6281-4804-4057-99C2-E96F36FD68F9}" dt="2025-02-22T17:13:33.408" v="667" actId="164"/>
+          <ac:spMkLst>
+            <pc:docMk/>
+            <pc:sldMk cId="708817653" sldId="263"/>
+            <ac:spMk id="7" creationId="{E0E921C2-3B6C-059D-30B7-532E2C5D1A4B}"/>
+          </ac:spMkLst>
+        </pc:spChg>
+        <pc:spChg chg="add mod">
+          <ac:chgData name="Matthew Tuck" userId="292c67f149de0640" providerId="LiveId" clId="{AB2E6281-4804-4057-99C2-E96F36FD68F9}" dt="2025-02-22T17:14:29.158" v="675" actId="164"/>
+          <ac:spMkLst>
+            <pc:docMk/>
+            <pc:sldMk cId="708817653" sldId="263"/>
+            <ac:spMk id="9" creationId="{9EDC704A-4B74-1D52-2C35-B3C188B23E2B}"/>
+          </ac:spMkLst>
+        </pc:spChg>
+        <pc:grpChg chg="add mod">
+          <ac:chgData name="Matthew Tuck" userId="292c67f149de0640" providerId="LiveId" clId="{AB2E6281-4804-4057-99C2-E96F36FD68F9}" dt="2025-02-22T17:14:29.158" v="675" actId="164"/>
+          <ac:grpSpMkLst>
+            <pc:docMk/>
+            <pc:sldMk cId="708817653" sldId="263"/>
+            <ac:grpSpMk id="8" creationId="{4B096DDE-6996-3CF8-F55C-03A8708B9AF8}"/>
+          </ac:grpSpMkLst>
+        </pc:grpChg>
+        <pc:grpChg chg="add mod">
+          <ac:chgData name="Matthew Tuck" userId="292c67f149de0640" providerId="LiveId" clId="{AB2E6281-4804-4057-99C2-E96F36FD68F9}" dt="2025-02-22T17:14:29.158" v="675" actId="164"/>
+          <ac:grpSpMkLst>
+            <pc:docMk/>
+            <pc:sldMk cId="708817653" sldId="263"/>
+            <ac:grpSpMk id="10" creationId="{33CC3CEF-79EE-33D6-DD7A-0D4B9B779CC5}"/>
+          </ac:grpSpMkLst>
+        </pc:grpChg>
+        <pc:picChg chg="add mod">
+          <ac:chgData name="Matthew Tuck" userId="292c67f149de0640" providerId="LiveId" clId="{AB2E6281-4804-4057-99C2-E96F36FD68F9}" dt="2025-02-22T17:13:33.408" v="667" actId="164"/>
+          <ac:picMkLst>
+            <pc:docMk/>
+            <pc:sldMk cId="708817653" sldId="263"/>
+            <ac:picMk id="3" creationId="{A347563D-9FC3-4054-7D5F-6AD821AF5F06}"/>
+          </ac:picMkLst>
+        </pc:picChg>
       </pc:sldChg>
     </pc:docChg>
   </pc:docChgLst>
@@ -285,7 +826,7 @@
           <a:p>
             <a:fld id="{636EB128-D63D-478F-A8AE-19C70145D55B}" type="datetimeFigureOut">
               <a:rPr lang="en-CA" smtClean="0"/>
-              <a:t>2025-02-07</a:t>
+              <a:t>2025-02-21</a:t>
             </a:fld>
             <a:endParaRPr lang="en-CA"/>
           </a:p>
@@ -485,7 +1026,7 @@
           <a:p>
             <a:fld id="{636EB128-D63D-478F-A8AE-19C70145D55B}" type="datetimeFigureOut">
               <a:rPr lang="en-CA" smtClean="0"/>
-              <a:t>2025-02-07</a:t>
+              <a:t>2025-02-21</a:t>
             </a:fld>
             <a:endParaRPr lang="en-CA"/>
           </a:p>
@@ -695,7 +1236,7 @@
           <a:p>
             <a:fld id="{636EB128-D63D-478F-A8AE-19C70145D55B}" type="datetimeFigureOut">
               <a:rPr lang="en-CA" smtClean="0"/>
-              <a:t>2025-02-07</a:t>
+              <a:t>2025-02-21</a:t>
             </a:fld>
             <a:endParaRPr lang="en-CA"/>
           </a:p>
@@ -895,7 +1436,7 @@
           <a:p>
             <a:fld id="{636EB128-D63D-478F-A8AE-19C70145D55B}" type="datetimeFigureOut">
               <a:rPr lang="en-CA" smtClean="0"/>
-              <a:t>2025-02-07</a:t>
+              <a:t>2025-02-21</a:t>
             </a:fld>
             <a:endParaRPr lang="en-CA"/>
           </a:p>
@@ -1171,7 +1712,7 @@
           <a:p>
             <a:fld id="{636EB128-D63D-478F-A8AE-19C70145D55B}" type="datetimeFigureOut">
               <a:rPr lang="en-CA" smtClean="0"/>
-              <a:t>2025-02-07</a:t>
+              <a:t>2025-02-21</a:t>
             </a:fld>
             <a:endParaRPr lang="en-CA"/>
           </a:p>
@@ -1439,7 +1980,7 @@
           <a:p>
             <a:fld id="{636EB128-D63D-478F-A8AE-19C70145D55B}" type="datetimeFigureOut">
               <a:rPr lang="en-CA" smtClean="0"/>
-              <a:t>2025-02-07</a:t>
+              <a:t>2025-02-21</a:t>
             </a:fld>
             <a:endParaRPr lang="en-CA"/>
           </a:p>
@@ -1854,7 +2395,7 @@
           <a:p>
             <a:fld id="{636EB128-D63D-478F-A8AE-19C70145D55B}" type="datetimeFigureOut">
               <a:rPr lang="en-CA" smtClean="0"/>
-              <a:t>2025-02-07</a:t>
+              <a:t>2025-02-21</a:t>
             </a:fld>
             <a:endParaRPr lang="en-CA"/>
           </a:p>
@@ -1996,7 +2537,7 @@
           <a:p>
             <a:fld id="{636EB128-D63D-478F-A8AE-19C70145D55B}" type="datetimeFigureOut">
               <a:rPr lang="en-CA" smtClean="0"/>
-              <a:t>2025-02-07</a:t>
+              <a:t>2025-02-21</a:t>
             </a:fld>
             <a:endParaRPr lang="en-CA"/>
           </a:p>
@@ -2109,7 +2650,7 @@
           <a:p>
             <a:fld id="{636EB128-D63D-478F-A8AE-19C70145D55B}" type="datetimeFigureOut">
               <a:rPr lang="en-CA" smtClean="0"/>
-              <a:t>2025-02-07</a:t>
+              <a:t>2025-02-21</a:t>
             </a:fld>
             <a:endParaRPr lang="en-CA"/>
           </a:p>
@@ -2422,7 +2963,7 @@
           <a:p>
             <a:fld id="{636EB128-D63D-478F-A8AE-19C70145D55B}" type="datetimeFigureOut">
               <a:rPr lang="en-CA" smtClean="0"/>
-              <a:t>2025-02-07</a:t>
+              <a:t>2025-02-21</a:t>
             </a:fld>
             <a:endParaRPr lang="en-CA"/>
           </a:p>
@@ -2711,7 +3252,7 @@
           <a:p>
             <a:fld id="{636EB128-D63D-478F-A8AE-19C70145D55B}" type="datetimeFigureOut">
               <a:rPr lang="en-CA" smtClean="0"/>
-              <a:t>2025-02-07</a:t>
+              <a:t>2025-02-21</a:t>
             </a:fld>
             <a:endParaRPr lang="en-CA"/>
           </a:p>
@@ -2954,7 +3495,7 @@
           <a:p>
             <a:fld id="{636EB128-D63D-478F-A8AE-19C70145D55B}" type="datetimeFigureOut">
               <a:rPr lang="en-CA" smtClean="0"/>
-              <a:t>2025-02-07</a:t>
+              <a:t>2025-02-21</a:t>
             </a:fld>
             <a:endParaRPr lang="en-CA"/>
           </a:p>
@@ -3373,10 +3914,10 @@
       </p:grpSpPr>
       <p:grpSp>
         <p:nvGrpSpPr>
-          <p:cNvPr id="8" name="Group 7">
-            <a:extLst>
-              <a:ext uri="{FF2B5EF4-FFF2-40B4-BE49-F238E27FC236}">
-                <a16:creationId xmlns:a16="http://schemas.microsoft.com/office/drawing/2014/main" id="{45F3CB1E-5A67-1363-8DF9-09AC03A3A895}"/>
+          <p:cNvPr id="22" name="Group 21">
+            <a:extLst>
+              <a:ext uri="{FF2B5EF4-FFF2-40B4-BE49-F238E27FC236}">
+                <a16:creationId xmlns:a16="http://schemas.microsoft.com/office/drawing/2014/main" id="{9B788C06-E1AA-B0EB-35C3-D87419595569}"/>
               </a:ext>
             </a:extLst>
           </p:cNvPr>
@@ -3385,18 +3926,396 @@
         </p:nvGrpSpPr>
         <p:grpSpPr>
           <a:xfrm>
-            <a:off x="2982686" y="846165"/>
-            <a:ext cx="5606144" cy="4403670"/>
-            <a:chOff x="3276600" y="1227165"/>
-            <a:chExt cx="5606144" cy="4403670"/>
+            <a:off x="2419108" y="535329"/>
+            <a:ext cx="7639292" cy="5787341"/>
+            <a:chOff x="2511706" y="578734"/>
+            <a:chExt cx="7639292" cy="5787341"/>
+          </a:xfrm>
+        </p:grpSpPr>
+        <p:sp>
+          <p:nvSpPr>
+            <p:cNvPr id="16" name="Rectangle 15">
+              <a:extLst>
+                <a:ext uri="{FF2B5EF4-FFF2-40B4-BE49-F238E27FC236}">
+                  <a16:creationId xmlns:a16="http://schemas.microsoft.com/office/drawing/2014/main" id="{C0A6CDF0-0E0D-40C5-A3BB-95AF09B8D3EF}"/>
+                </a:ext>
+              </a:extLst>
+            </p:cNvPr>
+            <p:cNvSpPr/>
+            <p:nvPr/>
+          </p:nvSpPr>
+          <p:spPr>
+            <a:xfrm>
+              <a:off x="2511706" y="578734"/>
+              <a:ext cx="7329724" cy="5787341"/>
+            </a:xfrm>
+            <a:prstGeom prst="rect">
+              <a:avLst/>
+            </a:prstGeom>
+            <a:solidFill>
+              <a:schemeClr val="bg1"/>
+            </a:solidFill>
+            <a:ln>
+              <a:solidFill>
+                <a:schemeClr val="tx1"/>
+              </a:solidFill>
+            </a:ln>
+          </p:spPr>
+          <p:style>
+            <a:lnRef idx="2">
+              <a:schemeClr val="accent1">
+                <a:shade val="15000"/>
+              </a:schemeClr>
+            </a:lnRef>
+            <a:fillRef idx="1">
+              <a:schemeClr val="accent1"/>
+            </a:fillRef>
+            <a:effectRef idx="0">
+              <a:schemeClr val="accent1"/>
+            </a:effectRef>
+            <a:fontRef idx="minor">
+              <a:schemeClr val="lt1"/>
+            </a:fontRef>
+          </p:style>
+          <p:txBody>
+            <a:bodyPr rtlCol="0" anchor="ctr"/>
+            <a:lstStyle/>
+            <a:p>
+              <a:pPr algn="ctr"/>
+              <a:endParaRPr lang="en-CA"/>
+            </a:p>
+          </p:txBody>
+        </p:sp>
+        <p:grpSp>
+          <p:nvGrpSpPr>
+            <p:cNvPr id="21" name="Group 20">
+              <a:extLst>
+                <a:ext uri="{FF2B5EF4-FFF2-40B4-BE49-F238E27FC236}">
+                  <a16:creationId xmlns:a16="http://schemas.microsoft.com/office/drawing/2014/main" id="{DF511537-577C-5710-7B2A-26BC9D7C52E3}"/>
+                </a:ext>
+              </a:extLst>
+            </p:cNvPr>
+            <p:cNvGrpSpPr/>
+            <p:nvPr/>
+          </p:nvGrpSpPr>
+          <p:grpSpPr>
+            <a:xfrm>
+              <a:off x="2649186" y="704457"/>
+              <a:ext cx="7501812" cy="5534298"/>
+              <a:chOff x="2626036" y="723050"/>
+              <a:chExt cx="7501812" cy="5534298"/>
+            </a:xfrm>
+          </p:grpSpPr>
+          <p:pic>
+            <p:nvPicPr>
+              <p:cNvPr id="19" name="Picture 18" descr="A map of the united states&#10;&#10;AI-generated content may be incorrect.">
+                <a:extLst>
+                  <a:ext uri="{FF2B5EF4-FFF2-40B4-BE49-F238E27FC236}">
+                    <a16:creationId xmlns:a16="http://schemas.microsoft.com/office/drawing/2014/main" id="{3D6978F0-5245-E9F0-25F4-6FFE028F01D0}"/>
+                  </a:ext>
+                </a:extLst>
+              </p:cNvPr>
+              <p:cNvPicPr>
+                <a:picLocks noChangeAspect="1"/>
+              </p:cNvPicPr>
+              <p:nvPr/>
+            </p:nvPicPr>
+            <p:blipFill>
+              <a:blip r:embed="rId2">
+                <a:extLst>
+                  <a:ext uri="{28A0092B-C50C-407E-A947-70E740481C1C}">
+                    <a14:useLocalDpi xmlns:a14="http://schemas.microsoft.com/office/drawing/2010/main" val="0"/>
+                  </a:ext>
+                </a:extLst>
+              </a:blip>
+              <a:srcRect l="10808" r="10808"/>
+              <a:stretch/>
+            </p:blipFill>
+            <p:spPr>
+              <a:xfrm>
+                <a:off x="2858947" y="861627"/>
+                <a:ext cx="6821347" cy="5053555"/>
+              </a:xfrm>
+              <a:prstGeom prst="rect">
+                <a:avLst/>
+              </a:prstGeom>
+            </p:spPr>
+          </p:pic>
+          <p:grpSp>
+            <p:nvGrpSpPr>
+              <p:cNvPr id="15" name="Group 14">
+                <a:extLst>
+                  <a:ext uri="{FF2B5EF4-FFF2-40B4-BE49-F238E27FC236}">
+                    <a16:creationId xmlns:a16="http://schemas.microsoft.com/office/drawing/2014/main" id="{E2936D85-599B-6B7F-D41E-F1A30859FDD2}"/>
+                  </a:ext>
+                </a:extLst>
+              </p:cNvPr>
+              <p:cNvGrpSpPr/>
+              <p:nvPr/>
+            </p:nvGrpSpPr>
+            <p:grpSpPr>
+              <a:xfrm>
+                <a:off x="2626036" y="723050"/>
+                <a:ext cx="7501812" cy="5534298"/>
+                <a:chOff x="2613352" y="706888"/>
+                <a:chExt cx="6669543" cy="4914458"/>
+              </a:xfrm>
+            </p:grpSpPr>
+            <p:grpSp>
+              <p:nvGrpSpPr>
+                <p:cNvPr id="6" name="Group 5">
+                  <a:extLst>
+                    <a:ext uri="{FF2B5EF4-FFF2-40B4-BE49-F238E27FC236}">
+                      <a16:creationId xmlns:a16="http://schemas.microsoft.com/office/drawing/2014/main" id="{784A3045-DD24-4D0B-E53D-87BAECD7EB6C}"/>
+                    </a:ext>
+                  </a:extLst>
+                </p:cNvPr>
+                <p:cNvGrpSpPr/>
+                <p:nvPr/>
+              </p:nvGrpSpPr>
+              <p:grpSpPr>
+                <a:xfrm>
+                  <a:off x="2613352" y="706888"/>
+                  <a:ext cx="6669543" cy="4914458"/>
+                  <a:chOff x="2613352" y="706888"/>
+                  <a:chExt cx="6669543" cy="4914458"/>
+                </a:xfrm>
+              </p:grpSpPr>
+              <p:pic>
+                <p:nvPicPr>
+                  <p:cNvPr id="7" name="Picture 6" descr="A map with a red square&#10;&#10;Description automatically generated">
+                    <a:extLst>
+                      <a:ext uri="{FF2B5EF4-FFF2-40B4-BE49-F238E27FC236}">
+                        <a16:creationId xmlns:a16="http://schemas.microsoft.com/office/drawing/2014/main" id="{024D7657-1386-3BF1-9E27-C379D592751A}"/>
+                      </a:ext>
+                    </a:extLst>
+                  </p:cNvPr>
+                  <p:cNvPicPr>
+                    <a:picLocks noChangeAspect="1"/>
+                  </p:cNvPicPr>
+                  <p:nvPr/>
+                </p:nvPicPr>
+                <p:blipFill>
+                  <a:blip r:embed="rId3">
+                    <a:extLst>
+                      <a:ext uri="{28A0092B-C50C-407E-A947-70E740481C1C}">
+                        <a14:useLocalDpi xmlns:a14="http://schemas.microsoft.com/office/drawing/2010/main" val="0"/>
+                      </a:ext>
+                    </a:extLst>
+                  </a:blip>
+                  <a:srcRect l="28083" t="1356" r="27431" b="1494"/>
+                  <a:stretch/>
+                </p:blipFill>
+                <p:spPr>
+                  <a:xfrm>
+                    <a:off x="6836229" y="925285"/>
+                    <a:ext cx="1643743" cy="1741215"/>
+                  </a:xfrm>
+                  <a:prstGeom prst="rect">
+                    <a:avLst/>
+                  </a:prstGeom>
+                  <a:ln>
+                    <a:noFill/>
+                  </a:ln>
+                </p:spPr>
+              </p:pic>
+              <p:sp>
+                <p:nvSpPr>
+                  <p:cNvPr id="2" name="TextBox 1">
+                    <a:extLst>
+                      <a:ext uri="{FF2B5EF4-FFF2-40B4-BE49-F238E27FC236}">
+                        <a16:creationId xmlns:a16="http://schemas.microsoft.com/office/drawing/2014/main" id="{53588E85-51C2-BC0D-6933-D5629282428B}"/>
+                      </a:ext>
+                    </a:extLst>
+                  </p:cNvPr>
+                  <p:cNvSpPr txBox="1"/>
+                  <p:nvPr/>
+                </p:nvSpPr>
+                <p:spPr>
+                  <a:xfrm>
+                    <a:off x="2613352" y="5252014"/>
+                    <a:ext cx="6669543" cy="369332"/>
+                  </a:xfrm>
+                  <a:prstGeom prst="rect">
+                    <a:avLst/>
+                  </a:prstGeom>
+                  <a:noFill/>
+                  <a:ln>
+                    <a:noFill/>
+                  </a:ln>
+                </p:spPr>
+                <p:txBody>
+                  <a:bodyPr wrap="square" rtlCol="0">
+                    <a:spAutoFit/>
+                  </a:bodyPr>
+                  <a:lstStyle/>
+                  <a:p>
+                    <a:pPr algn="ctr"/>
+                    <a:r>
+                      <a:rPr lang="en-CA" dirty="0"/>
+                      <a:t>   Longitude</a:t>
+                    </a:r>
+                  </a:p>
+                </p:txBody>
+              </p:sp>
+              <p:sp>
+                <p:nvSpPr>
+                  <p:cNvPr id="3" name="TextBox 2">
+                    <a:extLst>
+                      <a:ext uri="{FF2B5EF4-FFF2-40B4-BE49-F238E27FC236}">
+                        <a16:creationId xmlns:a16="http://schemas.microsoft.com/office/drawing/2014/main" id="{51E7DBA6-F2E3-2B10-D591-44D447113820}"/>
+                      </a:ext>
+                    </a:extLst>
+                  </p:cNvPr>
+                  <p:cNvSpPr txBox="1"/>
+                  <p:nvPr/>
+                </p:nvSpPr>
+                <p:spPr>
+                  <a:xfrm rot="16200000">
+                    <a:off x="420942" y="2899298"/>
+                    <a:ext cx="4754152" cy="369332"/>
+                  </a:xfrm>
+                  <a:prstGeom prst="rect">
+                    <a:avLst/>
+                  </a:prstGeom>
+                  <a:noFill/>
+                  <a:ln>
+                    <a:noFill/>
+                  </a:ln>
+                </p:spPr>
+                <p:txBody>
+                  <a:bodyPr wrap="square" rtlCol="0">
+                    <a:spAutoFit/>
+                  </a:bodyPr>
+                  <a:lstStyle/>
+                  <a:p>
+                    <a:pPr algn="ctr"/>
+                    <a:r>
+                      <a:rPr lang="en-CA" dirty="0"/>
+                      <a:t>Latitude</a:t>
+                    </a:r>
+                  </a:p>
+                </p:txBody>
+              </p:sp>
+            </p:grpSp>
+            <p:pic>
+              <p:nvPicPr>
+                <p:cNvPr id="12" name="Picture 11" descr="A blue and white map&#10;&#10;AI-generated content may be incorrect.">
+                  <a:extLst>
+                    <a:ext uri="{FF2B5EF4-FFF2-40B4-BE49-F238E27FC236}">
+                      <a16:creationId xmlns:a16="http://schemas.microsoft.com/office/drawing/2014/main" id="{A421572D-D995-4990-4FDA-5B53D073AAE5}"/>
+                    </a:ext>
+                  </a:extLst>
+                </p:cNvPr>
+                <p:cNvPicPr>
+                  <a:picLocks noChangeAspect="1"/>
+                </p:cNvPicPr>
+                <p:nvPr/>
+              </p:nvPicPr>
+              <p:blipFill>
+                <a:blip r:embed="rId4">
+                  <a:extLst>
+                    <a:ext uri="{BEBA8EAE-BF5A-486C-A8C5-ECC9F3942E4B}">
+                      <a14:imgProps xmlns:a14="http://schemas.microsoft.com/office/drawing/2010/main">
+                        <a14:imgLayer r:embed="rId5">
+                          <a14:imgEffect>
+                            <a14:backgroundRemoval t="7946" b="85757" l="38425" r="65632">
+                              <a14:foregroundMark x1="39021" y1="5697" x2="57041" y2="13493"/>
+                              <a14:foregroundMark x1="57041" y1="13493" x2="63126" y2="90255"/>
+                              <a14:foregroundMark x1="63126" y1="90255" x2="51432" y2="89955"/>
+                              <a14:foregroundMark x1="51432" y1="89955" x2="60382" y2="86357"/>
+                              <a14:foregroundMark x1="60382" y1="86357" x2="65155" y2="71064"/>
+                              <a14:foregroundMark x1="65155" y1="71064" x2="61456" y2="83358"/>
+                              <a14:foregroundMark x1="61456" y1="83358" x2="52506" y2="87256"/>
+                              <a14:foregroundMark x1="52506" y1="87256" x2="45227" y2="75412"/>
+                              <a14:foregroundMark x1="45227" y1="75412" x2="36158" y2="33133"/>
+                              <a14:foregroundMark x1="36158" y1="33133" x2="38425" y2="7946"/>
+                              <a14:foregroundMark x1="38425" y1="7946" x2="39141" y2="8696"/>
+                            </a14:backgroundRemoval>
+                          </a14:imgEffect>
+                        </a14:imgLayer>
+                      </a14:imgProps>
+                    </a:ext>
+                    <a:ext uri="{28A0092B-C50C-407E-A947-70E740481C1C}">
+                      <a14:useLocalDpi xmlns:a14="http://schemas.microsoft.com/office/drawing/2010/main" val="0"/>
+                    </a:ext>
+                  </a:extLst>
+                </a:blip>
+                <a:srcRect l="35410" t="5217" r="30929" b="5285"/>
+                <a:stretch/>
+              </p:blipFill>
+              <p:spPr>
+                <a:xfrm rot="19653429">
+                  <a:off x="4594715" y="1560074"/>
+                  <a:ext cx="1755999" cy="3565194"/>
+                </a:xfrm>
+                <a:prstGeom prst="rect">
+                  <a:avLst/>
+                </a:prstGeom>
+                <a:ln>
+                  <a:noFill/>
+                </a:ln>
+              </p:spPr>
+            </p:pic>
+          </p:grpSp>
+        </p:grpSp>
+      </p:grpSp>
+    </p:spTree>
+    <p:extLst>
+      <p:ext uri="{BB962C8B-B14F-4D97-AF65-F5344CB8AC3E}">
+        <p14:creationId xmlns:p14="http://schemas.microsoft.com/office/powerpoint/2010/main" val="2389168500"/>
+      </p:ext>
+    </p:extLst>
+  </p:cSld>
+  <p:clrMapOvr>
+    <a:masterClrMapping/>
+  </p:clrMapOvr>
+</p:sld>
+</file>
+
+<file path=ppt/slides/slide2.xml><?xml version="1.0" encoding="utf-8"?>
+<p:sld xmlns:a="http://schemas.openxmlformats.org/drawingml/2006/main" xmlns:r="http://schemas.openxmlformats.org/officeDocument/2006/relationships" xmlns:p="http://schemas.openxmlformats.org/presentationml/2006/main">
+  <p:cSld>
+    <p:spTree>
+      <p:nvGrpSpPr>
+        <p:cNvPr id="1" name=""/>
+        <p:cNvGrpSpPr/>
+        <p:nvPr/>
+      </p:nvGrpSpPr>
+      <p:grpSpPr>
+        <a:xfrm>
+          <a:off x="0" y="0"/>
+          <a:ext cx="0" cy="0"/>
+          <a:chOff x="0" y="0"/>
+          <a:chExt cx="0" cy="0"/>
+        </a:xfrm>
+      </p:grpSpPr>
+      <p:grpSp>
+        <p:nvGrpSpPr>
+          <p:cNvPr id="11" name="Group 10">
+            <a:extLst>
+              <a:ext uri="{FF2B5EF4-FFF2-40B4-BE49-F238E27FC236}">
+                <a16:creationId xmlns:a16="http://schemas.microsoft.com/office/drawing/2014/main" id="{76610E68-7E06-449C-CC76-F475F053FA0B}"/>
+              </a:ext>
+            </a:extLst>
+          </p:cNvPr>
+          <p:cNvGrpSpPr/>
+          <p:nvPr/>
+        </p:nvGrpSpPr>
+        <p:grpSpPr>
+          <a:xfrm>
+            <a:off x="358815" y="118600"/>
+            <a:ext cx="10187484" cy="6739400"/>
+            <a:chOff x="358815" y="118600"/>
+            <a:chExt cx="10187484" cy="6739400"/>
           </a:xfrm>
         </p:grpSpPr>
         <p:pic>
           <p:nvPicPr>
-            <p:cNvPr id="5" name="Picture 4" descr="A map of the united states&#10;&#10;Description automatically generated">
+            <p:cNvPr id="6" name="Picture 5" descr="A comparison of different species&#10;&#10;AI-generated content may be incorrect.">
               <a:extLst>
                 <a:ext uri="{FF2B5EF4-FFF2-40B4-BE49-F238E27FC236}">
-                  <a16:creationId xmlns:a16="http://schemas.microsoft.com/office/drawing/2014/main" id="{73715FED-DDCE-0111-E646-37F70B39B34A}"/>
+                  <a16:creationId xmlns:a16="http://schemas.microsoft.com/office/drawing/2014/main" id="{65034353-7F6C-94FB-94A6-B2D97E7B9891}"/>
                 </a:ext>
               </a:extLst>
             </p:cNvPr>
@@ -3413,13 +4332,13 @@
                 </a:ext>
               </a:extLst>
             </a:blip>
-            <a:srcRect l="18943" r="19304"/>
+            <a:srcRect l="-188" r="67990"/>
             <a:stretch/>
           </p:blipFill>
           <p:spPr>
             <a:xfrm>
-              <a:off x="3276600" y="1227165"/>
-              <a:ext cx="5606144" cy="4403670"/>
+              <a:off x="358815" y="118600"/>
+              <a:ext cx="3680750" cy="6620799"/>
             </a:xfrm>
             <a:prstGeom prst="rect">
               <a:avLst/>
@@ -3428,10 +4347,419 @@
         </p:pic>
         <p:pic>
           <p:nvPicPr>
-            <p:cNvPr id="7" name="Picture 6" descr="A map with a red square&#10;&#10;Description automatically generated">
+            <p:cNvPr id="7" name="Picture 6" descr="A comparison of different species&#10;&#10;AI-generated content may be incorrect.">
               <a:extLst>
                 <a:ext uri="{FF2B5EF4-FFF2-40B4-BE49-F238E27FC236}">
-                  <a16:creationId xmlns:a16="http://schemas.microsoft.com/office/drawing/2014/main" id="{024D7657-1386-3BF1-9E27-C379D592751A}"/>
+                  <a16:creationId xmlns:a16="http://schemas.microsoft.com/office/drawing/2014/main" id="{14817CAB-66B4-D7B3-D660-0C218E77F344}"/>
+                </a:ext>
+              </a:extLst>
+            </p:cNvPr>
+            <p:cNvPicPr>
+              <a:picLocks noChangeAspect="1"/>
+            </p:cNvPicPr>
+            <p:nvPr/>
+          </p:nvPicPr>
+          <p:blipFill>
+            <a:blip r:embed="rId2">
+              <a:extLst>
+                <a:ext uri="{28A0092B-C50C-407E-A947-70E740481C1C}">
+                  <a14:useLocalDpi xmlns:a14="http://schemas.microsoft.com/office/drawing/2010/main" val="0"/>
+                </a:ext>
+              </a:extLst>
+            </a:blip>
+            <a:srcRect l="48666" r="20418"/>
+            <a:stretch/>
+          </p:blipFill>
+          <p:spPr>
+            <a:xfrm>
+              <a:off x="4186177" y="118600"/>
+              <a:ext cx="3534138" cy="6620799"/>
+            </a:xfrm>
+            <a:prstGeom prst="rect">
+              <a:avLst/>
+            </a:prstGeom>
+          </p:spPr>
+        </p:pic>
+        <p:pic>
+          <p:nvPicPr>
+            <p:cNvPr id="8" name="Picture 7" descr="A comparison of different species&#10;&#10;AI-generated content may be incorrect.">
+              <a:extLst>
+                <a:ext uri="{FF2B5EF4-FFF2-40B4-BE49-F238E27FC236}">
+                  <a16:creationId xmlns:a16="http://schemas.microsoft.com/office/drawing/2014/main" id="{E1A83E9B-E85A-8FEE-075E-3490188BEBE4}"/>
+                </a:ext>
+              </a:extLst>
+            </p:cNvPr>
+            <p:cNvPicPr>
+              <a:picLocks noChangeAspect="1"/>
+            </p:cNvPicPr>
+            <p:nvPr/>
+          </p:nvPicPr>
+          <p:blipFill>
+            <a:blip r:embed="rId2">
+              <a:extLst>
+                <a:ext uri="{28A0092B-C50C-407E-A947-70E740481C1C}">
+                  <a14:useLocalDpi xmlns:a14="http://schemas.microsoft.com/office/drawing/2010/main" val="0"/>
+                </a:ext>
+              </a:extLst>
+            </a:blip>
+            <a:srcRect l="79059"/>
+            <a:stretch/>
+          </p:blipFill>
+          <p:spPr>
+            <a:xfrm>
+              <a:off x="8152437" y="237201"/>
+              <a:ext cx="2393862" cy="6620799"/>
+            </a:xfrm>
+            <a:prstGeom prst="rect">
+              <a:avLst/>
+            </a:prstGeom>
+          </p:spPr>
+        </p:pic>
+      </p:grpSp>
+    </p:spTree>
+    <p:extLst>
+      <p:ext uri="{BB962C8B-B14F-4D97-AF65-F5344CB8AC3E}">
+        <p14:creationId xmlns:p14="http://schemas.microsoft.com/office/powerpoint/2010/main" val="1425793214"/>
+      </p:ext>
+    </p:extLst>
+  </p:cSld>
+  <p:clrMapOvr>
+    <a:masterClrMapping/>
+  </p:clrMapOvr>
+</p:sld>
+</file>
+
+<file path=ppt/slides/slide3.xml><?xml version="1.0" encoding="utf-8"?>
+<p:sld xmlns:a="http://schemas.openxmlformats.org/drawingml/2006/main" xmlns:r="http://schemas.openxmlformats.org/officeDocument/2006/relationships" xmlns:p="http://schemas.openxmlformats.org/presentationml/2006/main">
+  <p:cSld>
+    <p:spTree>
+      <p:nvGrpSpPr>
+        <p:cNvPr id="1" name=""/>
+        <p:cNvGrpSpPr/>
+        <p:nvPr/>
+      </p:nvGrpSpPr>
+      <p:grpSpPr>
+        <a:xfrm>
+          <a:off x="0" y="0"/>
+          <a:ext cx="0" cy="0"/>
+          <a:chOff x="0" y="0"/>
+          <a:chExt cx="0" cy="0"/>
+        </a:xfrm>
+      </p:grpSpPr>
+      <p:pic>
+        <p:nvPicPr>
+          <p:cNvPr id="10" name="Picture 9" descr="A graph of different species&#10;&#10;AI-generated content may be incorrect.">
+            <a:extLst>
+              <a:ext uri="{FF2B5EF4-FFF2-40B4-BE49-F238E27FC236}">
+                <a16:creationId xmlns:a16="http://schemas.microsoft.com/office/drawing/2014/main" id="{09FD113B-8D14-A100-5988-EBBC754DD16A}"/>
+              </a:ext>
+            </a:extLst>
+          </p:cNvPr>
+          <p:cNvPicPr>
+            <a:picLocks noChangeAspect="1"/>
+          </p:cNvPicPr>
+          <p:nvPr/>
+        </p:nvPicPr>
+        <p:blipFill>
+          <a:blip r:embed="rId2">
+            <a:extLst>
+              <a:ext uri="{28A0092B-C50C-407E-A947-70E740481C1C}">
+                <a14:useLocalDpi xmlns:a14="http://schemas.microsoft.com/office/drawing/2010/main" val="0"/>
+              </a:ext>
+            </a:extLst>
+          </a:blip>
+          <a:stretch>
+            <a:fillRect/>
+          </a:stretch>
+        </p:blipFill>
+        <p:spPr>
+          <a:xfrm>
+            <a:off x="1347326" y="81023"/>
+            <a:ext cx="5538806" cy="6858000"/>
+          </a:xfrm>
+          <a:prstGeom prst="rect">
+            <a:avLst/>
+          </a:prstGeom>
+        </p:spPr>
+      </p:pic>
+    </p:spTree>
+    <p:extLst>
+      <p:ext uri="{BB962C8B-B14F-4D97-AF65-F5344CB8AC3E}">
+        <p14:creationId xmlns:p14="http://schemas.microsoft.com/office/powerpoint/2010/main" val="142822564"/>
+      </p:ext>
+    </p:extLst>
+  </p:cSld>
+  <p:clrMapOvr>
+    <a:masterClrMapping/>
+  </p:clrMapOvr>
+</p:sld>
+</file>
+
+<file path=ppt/slides/slide4.xml><?xml version="1.0" encoding="utf-8"?>
+<p:sld xmlns:a="http://schemas.openxmlformats.org/drawingml/2006/main" xmlns:r="http://schemas.openxmlformats.org/officeDocument/2006/relationships" xmlns:p="http://schemas.openxmlformats.org/presentationml/2006/main">
+  <p:cSld>
+    <p:spTree>
+      <p:nvGrpSpPr>
+        <p:cNvPr id="1" name=""/>
+        <p:cNvGrpSpPr/>
+        <p:nvPr/>
+      </p:nvGrpSpPr>
+      <p:grpSpPr>
+        <a:xfrm>
+          <a:off x="0" y="0"/>
+          <a:ext cx="0" cy="0"/>
+          <a:chOff x="0" y="0"/>
+          <a:chExt cx="0" cy="0"/>
+        </a:xfrm>
+      </p:grpSpPr>
+      <p:grpSp>
+        <p:nvGrpSpPr>
+          <p:cNvPr id="5" name="Group 4">
+            <a:extLst>
+              <a:ext uri="{FF2B5EF4-FFF2-40B4-BE49-F238E27FC236}">
+                <a16:creationId xmlns:a16="http://schemas.microsoft.com/office/drawing/2014/main" id="{A2373E63-1431-C970-D989-5A88D4A86958}"/>
+              </a:ext>
+            </a:extLst>
+          </p:cNvPr>
+          <p:cNvGrpSpPr/>
+          <p:nvPr/>
+        </p:nvGrpSpPr>
+        <p:grpSpPr>
+          <a:xfrm>
+            <a:off x="3810000" y="0"/>
+            <a:ext cx="2310245" cy="6695953"/>
+            <a:chOff x="3810000" y="0"/>
+            <a:chExt cx="2310245" cy="6695953"/>
+          </a:xfrm>
+        </p:grpSpPr>
+        <p:pic>
+          <p:nvPicPr>
+            <p:cNvPr id="3" name="Picture 2" descr="A graph of different sizes of dots&#10;&#10;AI-generated content may be incorrect.">
+              <a:extLst>
+                <a:ext uri="{FF2B5EF4-FFF2-40B4-BE49-F238E27FC236}">
+                  <a16:creationId xmlns:a16="http://schemas.microsoft.com/office/drawing/2014/main" id="{4452796D-399A-CCC5-93B2-DFEE2E396468}"/>
+                </a:ext>
+              </a:extLst>
+            </p:cNvPr>
+            <p:cNvPicPr>
+              <a:picLocks noChangeAspect="1"/>
+            </p:cNvPicPr>
+            <p:nvPr/>
+          </p:nvPicPr>
+          <p:blipFill>
+            <a:blip r:embed="rId2">
+              <a:extLst>
+                <a:ext uri="{28A0092B-C50C-407E-A947-70E740481C1C}">
+                  <a14:useLocalDpi xmlns:a14="http://schemas.microsoft.com/office/drawing/2010/main" val="0"/>
+                </a:ext>
+              </a:extLst>
+            </a:blip>
+            <a:srcRect r="38523"/>
+            <a:stretch/>
+          </p:blipFill>
+          <p:spPr>
+            <a:xfrm>
+              <a:off x="3810000" y="0"/>
+              <a:ext cx="2310245" cy="5636871"/>
+            </a:xfrm>
+            <a:prstGeom prst="rect">
+              <a:avLst/>
+            </a:prstGeom>
+          </p:spPr>
+        </p:pic>
+        <p:pic>
+          <p:nvPicPr>
+            <p:cNvPr id="4" name="Picture 3" descr="A graph of different sizes of dots&#10;&#10;AI-generated content may be incorrect.">
+              <a:extLst>
+                <a:ext uri="{FF2B5EF4-FFF2-40B4-BE49-F238E27FC236}">
+                  <a16:creationId xmlns:a16="http://schemas.microsoft.com/office/drawing/2014/main" id="{1E557525-031E-A12B-9100-AB97148968C2}"/>
+                </a:ext>
+              </a:extLst>
+            </p:cNvPr>
+            <p:cNvPicPr>
+              <a:picLocks noChangeAspect="1"/>
+            </p:cNvPicPr>
+            <p:nvPr/>
+          </p:nvPicPr>
+          <p:blipFill>
+            <a:blip r:embed="rId2">
+              <a:extLst>
+                <a:ext uri="{28A0092B-C50C-407E-A947-70E740481C1C}">
+                  <a14:useLocalDpi xmlns:a14="http://schemas.microsoft.com/office/drawing/2010/main" val="0"/>
+                </a:ext>
+              </a:extLst>
+            </a:blip>
+            <a:srcRect l="61942" t="43813" r="336" b="45682"/>
+            <a:stretch/>
+          </p:blipFill>
+          <p:spPr>
+            <a:xfrm>
+              <a:off x="3834245" y="5741042"/>
+              <a:ext cx="2286000" cy="954911"/>
+            </a:xfrm>
+            <a:prstGeom prst="rect">
+              <a:avLst/>
+            </a:prstGeom>
+          </p:spPr>
+        </p:pic>
+      </p:grpSp>
+    </p:spTree>
+    <p:extLst>
+      <p:ext uri="{BB962C8B-B14F-4D97-AF65-F5344CB8AC3E}">
+        <p14:creationId xmlns:p14="http://schemas.microsoft.com/office/powerpoint/2010/main" val="3644617857"/>
+      </p:ext>
+    </p:extLst>
+  </p:cSld>
+  <p:clrMapOvr>
+    <a:masterClrMapping/>
+  </p:clrMapOvr>
+</p:sld>
+</file>
+
+<file path=ppt/slides/slide5.xml><?xml version="1.0" encoding="utf-8"?>
+<p:sld xmlns:a="http://schemas.openxmlformats.org/drawingml/2006/main" xmlns:r="http://schemas.openxmlformats.org/officeDocument/2006/relationships" xmlns:p="http://schemas.openxmlformats.org/presentationml/2006/main">
+  <p:cSld>
+    <p:spTree>
+      <p:nvGrpSpPr>
+        <p:cNvPr id="1" name=""/>
+        <p:cNvGrpSpPr/>
+        <p:nvPr/>
+      </p:nvGrpSpPr>
+      <p:grpSpPr>
+        <a:xfrm>
+          <a:off x="0" y="0"/>
+          <a:ext cx="0" cy="0"/>
+          <a:chOff x="0" y="0"/>
+          <a:chExt cx="0" cy="0"/>
+        </a:xfrm>
+      </p:grpSpPr>
+      <p:pic>
+        <p:nvPicPr>
+          <p:cNvPr id="10" name="Picture 9" descr="A graph of different colors&#10;&#10;AI-generated content may be incorrect.">
+            <a:extLst>
+              <a:ext uri="{FF2B5EF4-FFF2-40B4-BE49-F238E27FC236}">
+                <a16:creationId xmlns:a16="http://schemas.microsoft.com/office/drawing/2014/main" id="{B60B9C24-D9ED-6246-505F-3054A2C8B955}"/>
+              </a:ext>
+            </a:extLst>
+          </p:cNvPr>
+          <p:cNvPicPr>
+            <a:picLocks noChangeAspect="1"/>
+          </p:cNvPicPr>
+          <p:nvPr/>
+        </p:nvPicPr>
+        <p:blipFill>
+          <a:blip r:embed="rId2">
+            <a:extLst>
+              <a:ext uri="{28A0092B-C50C-407E-A947-70E740481C1C}">
+                <a14:useLocalDpi xmlns:a14="http://schemas.microsoft.com/office/drawing/2010/main" val="0"/>
+              </a:ext>
+            </a:extLst>
+          </a:blip>
+          <a:stretch>
+            <a:fillRect/>
+          </a:stretch>
+        </p:blipFill>
+        <p:spPr>
+          <a:xfrm>
+            <a:off x="1096735" y="0"/>
+            <a:ext cx="10287000" cy="6858000"/>
+          </a:xfrm>
+          <a:prstGeom prst="rect">
+            <a:avLst/>
+          </a:prstGeom>
+        </p:spPr>
+      </p:pic>
+    </p:spTree>
+    <p:extLst>
+      <p:ext uri="{BB962C8B-B14F-4D97-AF65-F5344CB8AC3E}">
+        <p14:creationId xmlns:p14="http://schemas.microsoft.com/office/powerpoint/2010/main" val="776127107"/>
+      </p:ext>
+    </p:extLst>
+  </p:cSld>
+  <p:clrMapOvr>
+    <a:masterClrMapping/>
+  </p:clrMapOvr>
+</p:sld>
+</file>
+
+<file path=ppt/slides/slide6.xml><?xml version="1.0" encoding="utf-8"?>
+<p:sld xmlns:a="http://schemas.openxmlformats.org/drawingml/2006/main" xmlns:r="http://schemas.openxmlformats.org/officeDocument/2006/relationships" xmlns:p="http://schemas.openxmlformats.org/presentationml/2006/main">
+  <p:cSld>
+    <p:spTree>
+      <p:nvGrpSpPr>
+        <p:cNvPr id="1" name=""/>
+        <p:cNvGrpSpPr/>
+        <p:nvPr/>
+      </p:nvGrpSpPr>
+      <p:grpSpPr>
+        <a:xfrm>
+          <a:off x="0" y="0"/>
+          <a:ext cx="0" cy="0"/>
+          <a:chOff x="0" y="0"/>
+          <a:chExt cx="0" cy="0"/>
+        </a:xfrm>
+      </p:grpSpPr>
+      <p:grpSp>
+        <p:nvGrpSpPr>
+          <p:cNvPr id="7" name="Group 6">
+            <a:extLst>
+              <a:ext uri="{FF2B5EF4-FFF2-40B4-BE49-F238E27FC236}">
+                <a16:creationId xmlns:a16="http://schemas.microsoft.com/office/drawing/2014/main" id="{096B1D4B-FF7D-5E0A-C0C5-B5E4D3848CD9}"/>
+              </a:ext>
+            </a:extLst>
+          </p:cNvPr>
+          <p:cNvGrpSpPr/>
+          <p:nvPr/>
+        </p:nvGrpSpPr>
+        <p:grpSpPr>
+          <a:xfrm>
+            <a:off x="1435739" y="781291"/>
+            <a:ext cx="10643406" cy="5295418"/>
+            <a:chOff x="1435739" y="781291"/>
+            <a:chExt cx="10643406" cy="5295418"/>
+          </a:xfrm>
+        </p:grpSpPr>
+        <p:pic>
+          <p:nvPicPr>
+            <p:cNvPr id="3" name="Picture 2" descr="A group of different colored squares&#10;&#10;AI-generated content may be incorrect.">
+              <a:extLst>
+                <a:ext uri="{FF2B5EF4-FFF2-40B4-BE49-F238E27FC236}">
+                  <a16:creationId xmlns:a16="http://schemas.microsoft.com/office/drawing/2014/main" id="{9BDEE49D-E3AD-E56E-07F8-997759D50B81}"/>
+                </a:ext>
+              </a:extLst>
+            </p:cNvPr>
+            <p:cNvPicPr>
+              <a:picLocks noChangeAspect="1"/>
+            </p:cNvPicPr>
+            <p:nvPr/>
+          </p:nvPicPr>
+          <p:blipFill>
+            <a:blip r:embed="rId2">
+              <a:extLst>
+                <a:ext uri="{28A0092B-C50C-407E-A947-70E740481C1C}">
+                  <a14:useLocalDpi xmlns:a14="http://schemas.microsoft.com/office/drawing/2010/main" val="0"/>
+                </a:ext>
+              </a:extLst>
+            </a:blip>
+            <a:srcRect r="49636"/>
+            <a:stretch/>
+          </p:blipFill>
+          <p:spPr>
+            <a:xfrm>
+              <a:off x="4513161" y="781291"/>
+              <a:ext cx="3733798" cy="5295418"/>
+            </a:xfrm>
+            <a:prstGeom prst="rect">
+              <a:avLst/>
+            </a:prstGeom>
+          </p:spPr>
+        </p:pic>
+        <p:pic>
+          <p:nvPicPr>
+            <p:cNvPr id="5" name="Picture 4" descr="A graph of different species&#10;&#10;AI-generated content may be incorrect.">
+              <a:extLst>
+                <a:ext uri="{FF2B5EF4-FFF2-40B4-BE49-F238E27FC236}">
+                  <a16:creationId xmlns:a16="http://schemas.microsoft.com/office/drawing/2014/main" id="{5125FB7B-CF25-DFCD-8C37-5B6B60B18B43}"/>
                 </a:ext>
               </a:extLst>
             </p:cNvPr>
@@ -3448,29 +4776,1050 @@
                 </a:ext>
               </a:extLst>
             </a:blip>
-            <a:srcRect l="28083" t="1356" r="27431" b="1494"/>
+            <a:stretch>
+              <a:fillRect/>
+            </a:stretch>
+          </p:blipFill>
+          <p:spPr>
+            <a:xfrm>
+              <a:off x="1435739" y="781291"/>
+              <a:ext cx="2647709" cy="5295418"/>
+            </a:xfrm>
+            <a:prstGeom prst="rect">
+              <a:avLst/>
+            </a:prstGeom>
+          </p:spPr>
+        </p:pic>
+        <p:pic>
+          <p:nvPicPr>
+            <p:cNvPr id="6" name="Picture 5" descr="A group of different colored squares&#10;&#10;AI-generated content may be incorrect.">
+              <a:extLst>
+                <a:ext uri="{FF2B5EF4-FFF2-40B4-BE49-F238E27FC236}">
+                  <a16:creationId xmlns:a16="http://schemas.microsoft.com/office/drawing/2014/main" id="{306A13BA-3C1F-9234-F87F-518D68AA8AB8}"/>
+                </a:ext>
+              </a:extLst>
+            </p:cNvPr>
+            <p:cNvPicPr>
+              <a:picLocks noChangeAspect="1"/>
+            </p:cNvPicPr>
+            <p:nvPr/>
+          </p:nvPicPr>
+          <p:blipFill>
+            <a:blip r:embed="rId2">
+              <a:extLst>
+                <a:ext uri="{28A0092B-C50C-407E-A947-70E740481C1C}">
+                  <a14:useLocalDpi xmlns:a14="http://schemas.microsoft.com/office/drawing/2010/main" val="0"/>
+                </a:ext>
+              </a:extLst>
+            </a:blip>
+            <a:srcRect l="49636"/>
             <a:stretch/>
           </p:blipFill>
           <p:spPr>
             <a:xfrm>
-              <a:off x="7130143" y="1306285"/>
-              <a:ext cx="1643743" cy="1741215"/>
+              <a:off x="8345347" y="781291"/>
+              <a:ext cx="3733798" cy="5295418"/>
             </a:xfrm>
             <a:prstGeom prst="rect">
               <a:avLst/>
             </a:prstGeom>
-            <a:ln>
-              <a:solidFill>
-                <a:schemeClr val="tx1"/>
-              </a:solidFill>
-            </a:ln>
           </p:spPr>
         </p:pic>
       </p:grpSp>
     </p:spTree>
     <p:extLst>
       <p:ext uri="{BB962C8B-B14F-4D97-AF65-F5344CB8AC3E}">
-        <p14:creationId xmlns:p14="http://schemas.microsoft.com/office/powerpoint/2010/main" val="2389168500"/>
+        <p14:creationId xmlns:p14="http://schemas.microsoft.com/office/powerpoint/2010/main" val="2830423783"/>
+      </p:ext>
+    </p:extLst>
+  </p:cSld>
+  <p:clrMapOvr>
+    <a:masterClrMapping/>
+  </p:clrMapOvr>
+</p:sld>
+</file>
+
+<file path=ppt/slides/slide7.xml><?xml version="1.0" encoding="utf-8"?>
+<p:sld xmlns:a="http://schemas.openxmlformats.org/drawingml/2006/main" xmlns:r="http://schemas.openxmlformats.org/officeDocument/2006/relationships" xmlns:p="http://schemas.openxmlformats.org/presentationml/2006/main">
+  <p:cSld>
+    <p:spTree>
+      <p:nvGrpSpPr>
+        <p:cNvPr id="1" name=""/>
+        <p:cNvGrpSpPr/>
+        <p:nvPr/>
+      </p:nvGrpSpPr>
+      <p:grpSpPr>
+        <a:xfrm>
+          <a:off x="0" y="0"/>
+          <a:ext cx="0" cy="0"/>
+          <a:chOff x="0" y="0"/>
+          <a:chExt cx="0" cy="0"/>
+        </a:xfrm>
+      </p:grpSpPr>
+      <p:grpSp>
+        <p:nvGrpSpPr>
+          <p:cNvPr id="15" name="Group 14">
+            <a:extLst>
+              <a:ext uri="{FF2B5EF4-FFF2-40B4-BE49-F238E27FC236}">
+                <a16:creationId xmlns:a16="http://schemas.microsoft.com/office/drawing/2014/main" id="{FD6A2E26-2E21-9DB8-D0FB-591A5605D15A}"/>
+              </a:ext>
+            </a:extLst>
+          </p:cNvPr>
+          <p:cNvGrpSpPr/>
+          <p:nvPr/>
+        </p:nvGrpSpPr>
+        <p:grpSpPr>
+          <a:xfrm>
+            <a:off x="370389" y="164258"/>
+            <a:ext cx="11821611" cy="3477854"/>
+            <a:chOff x="370389" y="164258"/>
+            <a:chExt cx="11821611" cy="3477854"/>
+          </a:xfrm>
+        </p:grpSpPr>
+        <p:grpSp>
+          <p:nvGrpSpPr>
+            <p:cNvPr id="20" name="Group 19">
+              <a:extLst>
+                <a:ext uri="{FF2B5EF4-FFF2-40B4-BE49-F238E27FC236}">
+                  <a16:creationId xmlns:a16="http://schemas.microsoft.com/office/drawing/2014/main" id="{43BEE5C5-EC88-031C-7171-149399CEF928}"/>
+                </a:ext>
+              </a:extLst>
+            </p:cNvPr>
+            <p:cNvGrpSpPr/>
+            <p:nvPr/>
+          </p:nvGrpSpPr>
+          <p:grpSpPr>
+            <a:xfrm>
+              <a:off x="370389" y="207814"/>
+              <a:ext cx="5468292" cy="3434298"/>
+              <a:chOff x="3321933" y="-74406"/>
+              <a:chExt cx="5468292" cy="3434298"/>
+            </a:xfrm>
+          </p:grpSpPr>
+          <p:pic>
+            <p:nvPicPr>
+              <p:cNvPr id="19" name="Picture 18" descr="A graph of a function&#10;&#10;AI-generated content may be incorrect.">
+                <a:extLst>
+                  <a:ext uri="{FF2B5EF4-FFF2-40B4-BE49-F238E27FC236}">
+                    <a16:creationId xmlns:a16="http://schemas.microsoft.com/office/drawing/2014/main" id="{FEA61C3B-4816-25CE-FC2F-984AA99D3ABA}"/>
+                  </a:ext>
+                </a:extLst>
+              </p:cNvPr>
+              <p:cNvPicPr>
+                <a:picLocks noChangeAspect="1"/>
+              </p:cNvPicPr>
+              <p:nvPr/>
+            </p:nvPicPr>
+            <p:blipFill>
+              <a:blip r:embed="rId2">
+                <a:extLst>
+                  <a:ext uri="{28A0092B-C50C-407E-A947-70E740481C1C}">
+                    <a14:useLocalDpi xmlns:a14="http://schemas.microsoft.com/office/drawing/2010/main" val="0"/>
+                  </a:ext>
+                </a:extLst>
+              </a:blip>
+              <a:stretch>
+                <a:fillRect/>
+              </a:stretch>
+            </p:blipFill>
+            <p:spPr>
+              <a:xfrm>
+                <a:off x="3657598" y="66704"/>
+                <a:ext cx="5132627" cy="3293188"/>
+              </a:xfrm>
+              <a:prstGeom prst="rect">
+                <a:avLst/>
+              </a:prstGeom>
+            </p:spPr>
+          </p:pic>
+          <p:grpSp>
+            <p:nvGrpSpPr>
+              <p:cNvPr id="13" name="Group 12">
+                <a:extLst>
+                  <a:ext uri="{FF2B5EF4-FFF2-40B4-BE49-F238E27FC236}">
+                    <a16:creationId xmlns:a16="http://schemas.microsoft.com/office/drawing/2014/main" id="{A6120170-CA4C-63BE-7372-3070ED21747D}"/>
+                  </a:ext>
+                </a:extLst>
+              </p:cNvPr>
+              <p:cNvGrpSpPr/>
+              <p:nvPr/>
+            </p:nvGrpSpPr>
+            <p:grpSpPr>
+              <a:xfrm>
+                <a:off x="3321933" y="-74406"/>
+                <a:ext cx="2799142" cy="981468"/>
+                <a:chOff x="3321933" y="-74406"/>
+                <a:chExt cx="2799142" cy="981468"/>
+              </a:xfrm>
+            </p:grpSpPr>
+            <p:sp>
+              <p:nvSpPr>
+                <p:cNvPr id="6" name="TextBox 5">
+                  <a:extLst>
+                    <a:ext uri="{FF2B5EF4-FFF2-40B4-BE49-F238E27FC236}">
+                      <a16:creationId xmlns:a16="http://schemas.microsoft.com/office/drawing/2014/main" id="{687D9B0E-AC76-43F7-0857-3BE53FFFDBAC}"/>
+                    </a:ext>
+                  </a:extLst>
+                </p:cNvPr>
+                <p:cNvSpPr txBox="1"/>
+                <p:nvPr/>
+              </p:nvSpPr>
+              <p:spPr>
+                <a:xfrm>
+                  <a:off x="4411880" y="260731"/>
+                  <a:ext cx="1709195" cy="646331"/>
+                </a:xfrm>
+                <a:prstGeom prst="rect">
+                  <a:avLst/>
+                </a:prstGeom>
+                <a:noFill/>
+              </p:spPr>
+              <p:txBody>
+                <a:bodyPr wrap="square" rtlCol="0">
+                  <a:spAutoFit/>
+                </a:bodyPr>
+                <a:lstStyle/>
+                <a:p>
+                  <a:r>
+                    <a:rPr lang="en-CA" sz="1200" dirty="0">
+                      <a:latin typeface="Arial" panose="020B0604020202020204" pitchFamily="34" charset="0"/>
+                      <a:cs typeface="Arial" panose="020B0604020202020204" pitchFamily="34" charset="0"/>
+                    </a:rPr>
+                    <a:t>Mean = 0.729412</a:t>
+                  </a:r>
+                </a:p>
+                <a:p>
+                  <a:r>
+                    <a:rPr lang="en-CA" sz="1200" dirty="0">
+                      <a:solidFill>
+                        <a:srgbClr val="0000FF"/>
+                      </a:solidFill>
+                      <a:latin typeface="Arial" panose="020B0604020202020204" pitchFamily="34" charset="0"/>
+                      <a:cs typeface="Arial" panose="020B0604020202020204" pitchFamily="34" charset="0"/>
+                    </a:rPr>
+                    <a:t>OPB = 0.7567851</a:t>
+                  </a:r>
+                </a:p>
+                <a:p>
+                  <a:r>
+                    <a:rPr lang="en-CA" sz="1200" dirty="0">
+                      <a:solidFill>
+                        <a:srgbClr val="0000FF"/>
+                      </a:solidFill>
+                      <a:latin typeface="Arial" panose="020B0604020202020204" pitchFamily="34" charset="0"/>
+                      <a:cs typeface="Arial" panose="020B0604020202020204" pitchFamily="34" charset="0"/>
+                    </a:rPr>
+                    <a:t>SES = 0.6312469 </a:t>
+                  </a:r>
+                </a:p>
+              </p:txBody>
+            </p:sp>
+            <p:sp>
+              <p:nvSpPr>
+                <p:cNvPr id="10" name="TextBox 9">
+                  <a:extLst>
+                    <a:ext uri="{FF2B5EF4-FFF2-40B4-BE49-F238E27FC236}">
+                      <a16:creationId xmlns:a16="http://schemas.microsoft.com/office/drawing/2014/main" id="{3F0D060B-3D42-DC8C-7C86-23F40725FDE2}"/>
+                    </a:ext>
+                  </a:extLst>
+                </p:cNvPr>
+                <p:cNvSpPr txBox="1"/>
+                <p:nvPr/>
+              </p:nvSpPr>
+              <p:spPr>
+                <a:xfrm>
+                  <a:off x="3321933" y="-74406"/>
+                  <a:ext cx="335666" cy="461665"/>
+                </a:xfrm>
+                <a:prstGeom prst="rect">
+                  <a:avLst/>
+                </a:prstGeom>
+                <a:noFill/>
+              </p:spPr>
+              <p:txBody>
+                <a:bodyPr wrap="square" rtlCol="0">
+                  <a:spAutoFit/>
+                </a:bodyPr>
+                <a:lstStyle/>
+                <a:p>
+                  <a:r>
+                    <a:rPr lang="en-CA" sz="2400" dirty="0">
+                      <a:latin typeface="Arial" panose="020B0604020202020204" pitchFamily="34" charset="0"/>
+                      <a:cs typeface="Arial" panose="020B0604020202020204" pitchFamily="34" charset="0"/>
+                    </a:rPr>
+                    <a:t>b</a:t>
+                  </a:r>
+                </a:p>
+              </p:txBody>
+            </p:sp>
+          </p:grpSp>
+        </p:grpSp>
+        <p:grpSp>
+          <p:nvGrpSpPr>
+            <p:cNvPr id="2" name="Group 1">
+              <a:extLst>
+                <a:ext uri="{FF2B5EF4-FFF2-40B4-BE49-F238E27FC236}">
+                  <a16:creationId xmlns:a16="http://schemas.microsoft.com/office/drawing/2014/main" id="{57014079-8C6B-DF5B-5220-C97EFEF39B88}"/>
+                </a:ext>
+              </a:extLst>
+            </p:cNvPr>
+            <p:cNvGrpSpPr/>
+            <p:nvPr/>
+          </p:nvGrpSpPr>
+          <p:grpSpPr>
+            <a:xfrm>
+              <a:off x="6353321" y="164258"/>
+              <a:ext cx="5838679" cy="3477854"/>
+              <a:chOff x="3321933" y="3359892"/>
+              <a:chExt cx="5838679" cy="3477854"/>
+            </a:xfrm>
+          </p:grpSpPr>
+          <p:pic>
+            <p:nvPicPr>
+              <p:cNvPr id="3" name="Picture 2" descr="A graph of a function&#10;&#10;AI-generated content may be incorrect.">
+                <a:extLst>
+                  <a:ext uri="{FF2B5EF4-FFF2-40B4-BE49-F238E27FC236}">
+                    <a16:creationId xmlns:a16="http://schemas.microsoft.com/office/drawing/2014/main" id="{10C6EFCA-B1BB-F921-31E8-A1D27DF1095F}"/>
+                  </a:ext>
+                </a:extLst>
+              </p:cNvPr>
+              <p:cNvPicPr>
+                <a:picLocks noChangeAspect="1"/>
+              </p:cNvPicPr>
+              <p:nvPr/>
+            </p:nvPicPr>
+            <p:blipFill>
+              <a:blip r:embed="rId3">
+                <a:extLst>
+                  <a:ext uri="{28A0092B-C50C-407E-A947-70E740481C1C}">
+                    <a14:useLocalDpi xmlns:a14="http://schemas.microsoft.com/office/drawing/2010/main" val="0"/>
+                  </a:ext>
+                </a:extLst>
+              </a:blip>
+              <a:stretch>
+                <a:fillRect/>
+              </a:stretch>
+            </p:blipFill>
+            <p:spPr>
+              <a:xfrm>
+                <a:off x="3657599" y="3544558"/>
+                <a:ext cx="5132626" cy="3293188"/>
+              </a:xfrm>
+              <a:prstGeom prst="rect">
+                <a:avLst/>
+              </a:prstGeom>
+            </p:spPr>
+          </p:pic>
+          <p:grpSp>
+            <p:nvGrpSpPr>
+              <p:cNvPr id="5" name="Group 4">
+                <a:extLst>
+                  <a:ext uri="{FF2B5EF4-FFF2-40B4-BE49-F238E27FC236}">
+                    <a16:creationId xmlns:a16="http://schemas.microsoft.com/office/drawing/2014/main" id="{34CD3BE2-3011-DD5C-4629-7A013C532416}"/>
+                  </a:ext>
+                </a:extLst>
+              </p:cNvPr>
+              <p:cNvGrpSpPr/>
+              <p:nvPr/>
+            </p:nvGrpSpPr>
+            <p:grpSpPr>
+              <a:xfrm>
+                <a:off x="3321933" y="3359892"/>
+                <a:ext cx="5838679" cy="1025024"/>
+                <a:chOff x="3321933" y="3359892"/>
+                <a:chExt cx="5838679" cy="1025024"/>
+              </a:xfrm>
+            </p:grpSpPr>
+            <p:sp>
+              <p:nvSpPr>
+                <p:cNvPr id="8" name="TextBox 7">
+                  <a:extLst>
+                    <a:ext uri="{FF2B5EF4-FFF2-40B4-BE49-F238E27FC236}">
+                      <a16:creationId xmlns:a16="http://schemas.microsoft.com/office/drawing/2014/main" id="{869983BB-BB3D-4E23-6071-C20E2D0FC985}"/>
+                    </a:ext>
+                  </a:extLst>
+                </p:cNvPr>
+                <p:cNvSpPr txBox="1"/>
+                <p:nvPr/>
+              </p:nvSpPr>
+              <p:spPr>
+                <a:xfrm>
+                  <a:off x="7155078" y="3738585"/>
+                  <a:ext cx="2005534" cy="646331"/>
+                </a:xfrm>
+                <a:prstGeom prst="rect">
+                  <a:avLst/>
+                </a:prstGeom>
+                <a:noFill/>
+              </p:spPr>
+              <p:txBody>
+                <a:bodyPr wrap="square" rtlCol="0">
+                  <a:spAutoFit/>
+                </a:bodyPr>
+                <a:lstStyle/>
+                <a:p>
+                  <a:r>
+                    <a:rPr lang="en-CA" sz="1200" dirty="0">
+                      <a:latin typeface="Arial" panose="020B0604020202020204" pitchFamily="34" charset="0"/>
+                      <a:cs typeface="Arial" panose="020B0604020202020204" pitchFamily="34" charset="0"/>
+                    </a:rPr>
+                    <a:t>Mean = 1.23351</a:t>
+                  </a:r>
+                </a:p>
+                <a:p>
+                  <a:r>
+                    <a:rPr lang="en-CA" sz="1200" dirty="0">
+                      <a:solidFill>
+                        <a:srgbClr val="0000FF"/>
+                      </a:solidFill>
+                      <a:latin typeface="Arial" panose="020B0604020202020204" pitchFamily="34" charset="0"/>
+                      <a:cs typeface="Arial" panose="020B0604020202020204" pitchFamily="34" charset="0"/>
+                    </a:rPr>
+                    <a:t>OPB = 1.190476</a:t>
+                  </a:r>
+                </a:p>
+                <a:p>
+                  <a:r>
+                    <a:rPr lang="en-CA" sz="1200" dirty="0">
+                      <a:solidFill>
+                        <a:srgbClr val="0000FF"/>
+                      </a:solidFill>
+                      <a:latin typeface="Arial" panose="020B0604020202020204" pitchFamily="34" charset="0"/>
+                      <a:cs typeface="Arial" panose="020B0604020202020204" pitchFamily="34" charset="0"/>
+                    </a:rPr>
+                    <a:t>SES = -0.3916008 </a:t>
+                  </a:r>
+                </a:p>
+              </p:txBody>
+            </p:sp>
+            <p:sp>
+              <p:nvSpPr>
+                <p:cNvPr id="14" name="TextBox 13">
+                  <a:extLst>
+                    <a:ext uri="{FF2B5EF4-FFF2-40B4-BE49-F238E27FC236}">
+                      <a16:creationId xmlns:a16="http://schemas.microsoft.com/office/drawing/2014/main" id="{73E64907-2A63-100C-A7DC-4DABC17B8AF4}"/>
+                    </a:ext>
+                  </a:extLst>
+                </p:cNvPr>
+                <p:cNvSpPr txBox="1"/>
+                <p:nvPr/>
+              </p:nvSpPr>
+              <p:spPr>
+                <a:xfrm>
+                  <a:off x="3321933" y="3359892"/>
+                  <a:ext cx="335666" cy="461665"/>
+                </a:xfrm>
+                <a:prstGeom prst="rect">
+                  <a:avLst/>
+                </a:prstGeom>
+                <a:noFill/>
+              </p:spPr>
+              <p:txBody>
+                <a:bodyPr wrap="square" rtlCol="0">
+                  <a:spAutoFit/>
+                </a:bodyPr>
+                <a:lstStyle/>
+                <a:p>
+                  <a:r>
+                    <a:rPr lang="en-CA" sz="2400" dirty="0">
+                      <a:latin typeface="Arial" panose="020B0604020202020204" pitchFamily="34" charset="0"/>
+                      <a:cs typeface="Arial" panose="020B0604020202020204" pitchFamily="34" charset="0"/>
+                    </a:rPr>
+                    <a:t>c</a:t>
+                  </a:r>
+                </a:p>
+              </p:txBody>
+            </p:sp>
+          </p:grpSp>
+        </p:grpSp>
+      </p:grpSp>
+    </p:spTree>
+    <p:extLst>
+      <p:ext uri="{BB962C8B-B14F-4D97-AF65-F5344CB8AC3E}">
+        <p14:creationId xmlns:p14="http://schemas.microsoft.com/office/powerpoint/2010/main" val="3795613774"/>
+      </p:ext>
+    </p:extLst>
+  </p:cSld>
+  <p:clrMapOvr>
+    <a:masterClrMapping/>
+  </p:clrMapOvr>
+</p:sld>
+</file>
+
+<file path=ppt/slides/slide8.xml><?xml version="1.0" encoding="utf-8"?>
+<p:sld xmlns:a="http://schemas.openxmlformats.org/drawingml/2006/main" xmlns:r="http://schemas.openxmlformats.org/officeDocument/2006/relationships" xmlns:p="http://schemas.openxmlformats.org/presentationml/2006/main">
+  <p:cSld>
+    <p:spTree>
+      <p:nvGrpSpPr>
+        <p:cNvPr id="1" name=""/>
+        <p:cNvGrpSpPr/>
+        <p:nvPr/>
+      </p:nvGrpSpPr>
+      <p:grpSpPr>
+        <a:xfrm>
+          <a:off x="0" y="0"/>
+          <a:ext cx="0" cy="0"/>
+          <a:chOff x="0" y="0"/>
+          <a:chExt cx="0" cy="0"/>
+        </a:xfrm>
+      </p:grpSpPr>
+      <p:grpSp>
+        <p:nvGrpSpPr>
+          <p:cNvPr id="10" name="Group 9">
+            <a:extLst>
+              <a:ext uri="{FF2B5EF4-FFF2-40B4-BE49-F238E27FC236}">
+                <a16:creationId xmlns:a16="http://schemas.microsoft.com/office/drawing/2014/main" id="{33CC3CEF-79EE-33D6-DD7A-0D4B9B779CC5}"/>
+              </a:ext>
+            </a:extLst>
+          </p:cNvPr>
+          <p:cNvGrpSpPr/>
+          <p:nvPr/>
+        </p:nvGrpSpPr>
+        <p:grpSpPr>
+          <a:xfrm>
+            <a:off x="2789499" y="185856"/>
+            <a:ext cx="7092406" cy="6458013"/>
+            <a:chOff x="2789499" y="185856"/>
+            <a:chExt cx="7092406" cy="6458013"/>
+          </a:xfrm>
+        </p:grpSpPr>
+        <p:grpSp>
+          <p:nvGrpSpPr>
+            <p:cNvPr id="8" name="Group 7">
+              <a:extLst>
+                <a:ext uri="{FF2B5EF4-FFF2-40B4-BE49-F238E27FC236}">
+                  <a16:creationId xmlns:a16="http://schemas.microsoft.com/office/drawing/2014/main" id="{4B096DDE-6996-3CF8-F55C-03A8708B9AF8}"/>
+                </a:ext>
+              </a:extLst>
+            </p:cNvPr>
+            <p:cNvGrpSpPr/>
+            <p:nvPr/>
+          </p:nvGrpSpPr>
+          <p:grpSpPr>
+            <a:xfrm>
+              <a:off x="2858947" y="289367"/>
+              <a:ext cx="7022958" cy="6354502"/>
+              <a:chOff x="2310095" y="0"/>
+              <a:chExt cx="7571810" cy="6858000"/>
+            </a:xfrm>
+          </p:grpSpPr>
+          <p:pic>
+            <p:nvPicPr>
+              <p:cNvPr id="3" name="Picture 2" descr="A chart with blue and orange dots&#10;&#10;AI-generated content may be incorrect.">
+                <a:extLst>
+                  <a:ext uri="{FF2B5EF4-FFF2-40B4-BE49-F238E27FC236}">
+                    <a16:creationId xmlns:a16="http://schemas.microsoft.com/office/drawing/2014/main" id="{A347563D-9FC3-4054-7D5F-6AD821AF5F06}"/>
+                  </a:ext>
+                </a:extLst>
+              </p:cNvPr>
+              <p:cNvPicPr>
+                <a:picLocks noChangeAspect="1"/>
+              </p:cNvPicPr>
+              <p:nvPr/>
+            </p:nvPicPr>
+            <p:blipFill>
+              <a:blip r:embed="rId2">
+                <a:extLst>
+                  <a:ext uri="{28A0092B-C50C-407E-A947-70E740481C1C}">
+                    <a14:useLocalDpi xmlns:a14="http://schemas.microsoft.com/office/drawing/2010/main" val="0"/>
+                  </a:ext>
+                </a:extLst>
+              </a:blip>
+              <a:stretch>
+                <a:fillRect/>
+              </a:stretch>
+            </p:blipFill>
+            <p:spPr>
+              <a:xfrm>
+                <a:off x="2310095" y="0"/>
+                <a:ext cx="7571810" cy="6858000"/>
+              </a:xfrm>
+              <a:prstGeom prst="rect">
+                <a:avLst/>
+              </a:prstGeom>
+            </p:spPr>
+          </p:pic>
+          <p:sp>
+            <p:nvSpPr>
+              <p:cNvPr id="7" name="Freeform: Shape 6">
+                <a:extLst>
+                  <a:ext uri="{FF2B5EF4-FFF2-40B4-BE49-F238E27FC236}">
+                    <a16:creationId xmlns:a16="http://schemas.microsoft.com/office/drawing/2014/main" id="{E0E921C2-3B6C-059D-30B7-532E2C5D1A4B}"/>
+                  </a:ext>
+                </a:extLst>
+              </p:cNvPr>
+              <p:cNvSpPr/>
+              <p:nvPr/>
+            </p:nvSpPr>
+            <p:spPr>
+              <a:xfrm>
+                <a:off x="3657600" y="1134319"/>
+                <a:ext cx="4838218" cy="3680749"/>
+              </a:xfrm>
+              <a:custGeom>
+                <a:avLst/>
+                <a:gdLst>
+                  <a:gd name="connsiteX0" fmla="*/ 694481 w 5000263"/>
+                  <a:gd name="connsiteY0" fmla="*/ 3970117 h 3970117"/>
+                  <a:gd name="connsiteX1" fmla="*/ 1689904 w 5000263"/>
+                  <a:gd name="connsiteY1" fmla="*/ 3055717 h 3970117"/>
+                  <a:gd name="connsiteX2" fmla="*/ 3078866 w 5000263"/>
+                  <a:gd name="connsiteY2" fmla="*/ 2095018 h 3970117"/>
+                  <a:gd name="connsiteX3" fmla="*/ 4629873 w 5000263"/>
+                  <a:gd name="connsiteY3" fmla="*/ 2025570 h 3970117"/>
+                  <a:gd name="connsiteX4" fmla="*/ 5000263 w 5000263"/>
+                  <a:gd name="connsiteY4" fmla="*/ 1585732 h 3970117"/>
+                  <a:gd name="connsiteX5" fmla="*/ 4653023 w 5000263"/>
+                  <a:gd name="connsiteY5" fmla="*/ 902825 h 3970117"/>
+                  <a:gd name="connsiteX6" fmla="*/ 4282633 w 5000263"/>
+                  <a:gd name="connsiteY6" fmla="*/ 150471 h 3970117"/>
+                  <a:gd name="connsiteX7" fmla="*/ 3356658 w 5000263"/>
+                  <a:gd name="connsiteY7" fmla="*/ 0 h 3970117"/>
+                  <a:gd name="connsiteX8" fmla="*/ 104172 w 5000263"/>
+                  <a:gd name="connsiteY8" fmla="*/ 185195 h 3970117"/>
+                  <a:gd name="connsiteX9" fmla="*/ 0 w 5000263"/>
+                  <a:gd name="connsiteY9" fmla="*/ 3368233 h 3970117"/>
+                  <a:gd name="connsiteX10" fmla="*/ 694481 w 5000263"/>
+                  <a:gd name="connsiteY10" fmla="*/ 3970117 h 3970117"/>
+                  <a:gd name="connsiteX0" fmla="*/ 659757 w 5000263"/>
+                  <a:gd name="connsiteY0" fmla="*/ 3831220 h 3831220"/>
+                  <a:gd name="connsiteX1" fmla="*/ 1689904 w 5000263"/>
+                  <a:gd name="connsiteY1" fmla="*/ 3055717 h 3831220"/>
+                  <a:gd name="connsiteX2" fmla="*/ 3078866 w 5000263"/>
+                  <a:gd name="connsiteY2" fmla="*/ 2095018 h 3831220"/>
+                  <a:gd name="connsiteX3" fmla="*/ 4629873 w 5000263"/>
+                  <a:gd name="connsiteY3" fmla="*/ 2025570 h 3831220"/>
+                  <a:gd name="connsiteX4" fmla="*/ 5000263 w 5000263"/>
+                  <a:gd name="connsiteY4" fmla="*/ 1585732 h 3831220"/>
+                  <a:gd name="connsiteX5" fmla="*/ 4653023 w 5000263"/>
+                  <a:gd name="connsiteY5" fmla="*/ 902825 h 3831220"/>
+                  <a:gd name="connsiteX6" fmla="*/ 4282633 w 5000263"/>
+                  <a:gd name="connsiteY6" fmla="*/ 150471 h 3831220"/>
+                  <a:gd name="connsiteX7" fmla="*/ 3356658 w 5000263"/>
+                  <a:gd name="connsiteY7" fmla="*/ 0 h 3831220"/>
+                  <a:gd name="connsiteX8" fmla="*/ 104172 w 5000263"/>
+                  <a:gd name="connsiteY8" fmla="*/ 185195 h 3831220"/>
+                  <a:gd name="connsiteX9" fmla="*/ 0 w 5000263"/>
+                  <a:gd name="connsiteY9" fmla="*/ 3368233 h 3831220"/>
+                  <a:gd name="connsiteX10" fmla="*/ 659757 w 5000263"/>
+                  <a:gd name="connsiteY10" fmla="*/ 3831220 h 3831220"/>
+                  <a:gd name="connsiteX0" fmla="*/ 659757 w 5000263"/>
+                  <a:gd name="connsiteY0" fmla="*/ 3831220 h 3831220"/>
+                  <a:gd name="connsiteX1" fmla="*/ 1551008 w 5000263"/>
+                  <a:gd name="connsiteY1" fmla="*/ 2974694 h 3831220"/>
+                  <a:gd name="connsiteX2" fmla="*/ 3078866 w 5000263"/>
+                  <a:gd name="connsiteY2" fmla="*/ 2095018 h 3831220"/>
+                  <a:gd name="connsiteX3" fmla="*/ 4629873 w 5000263"/>
+                  <a:gd name="connsiteY3" fmla="*/ 2025570 h 3831220"/>
+                  <a:gd name="connsiteX4" fmla="*/ 5000263 w 5000263"/>
+                  <a:gd name="connsiteY4" fmla="*/ 1585732 h 3831220"/>
+                  <a:gd name="connsiteX5" fmla="*/ 4653023 w 5000263"/>
+                  <a:gd name="connsiteY5" fmla="*/ 902825 h 3831220"/>
+                  <a:gd name="connsiteX6" fmla="*/ 4282633 w 5000263"/>
+                  <a:gd name="connsiteY6" fmla="*/ 150471 h 3831220"/>
+                  <a:gd name="connsiteX7" fmla="*/ 3356658 w 5000263"/>
+                  <a:gd name="connsiteY7" fmla="*/ 0 h 3831220"/>
+                  <a:gd name="connsiteX8" fmla="*/ 104172 w 5000263"/>
+                  <a:gd name="connsiteY8" fmla="*/ 185195 h 3831220"/>
+                  <a:gd name="connsiteX9" fmla="*/ 0 w 5000263"/>
+                  <a:gd name="connsiteY9" fmla="*/ 3368233 h 3831220"/>
+                  <a:gd name="connsiteX10" fmla="*/ 659757 w 5000263"/>
+                  <a:gd name="connsiteY10" fmla="*/ 3831220 h 3831220"/>
+                  <a:gd name="connsiteX0" fmla="*/ 659757 w 5000263"/>
+                  <a:gd name="connsiteY0" fmla="*/ 3831220 h 3831220"/>
+                  <a:gd name="connsiteX1" fmla="*/ 1551008 w 5000263"/>
+                  <a:gd name="connsiteY1" fmla="*/ 2974694 h 3831220"/>
+                  <a:gd name="connsiteX2" fmla="*/ 2997843 w 5000263"/>
+                  <a:gd name="connsiteY2" fmla="*/ 1979271 h 3831220"/>
+                  <a:gd name="connsiteX3" fmla="*/ 4629873 w 5000263"/>
+                  <a:gd name="connsiteY3" fmla="*/ 2025570 h 3831220"/>
+                  <a:gd name="connsiteX4" fmla="*/ 5000263 w 5000263"/>
+                  <a:gd name="connsiteY4" fmla="*/ 1585732 h 3831220"/>
+                  <a:gd name="connsiteX5" fmla="*/ 4653023 w 5000263"/>
+                  <a:gd name="connsiteY5" fmla="*/ 902825 h 3831220"/>
+                  <a:gd name="connsiteX6" fmla="*/ 4282633 w 5000263"/>
+                  <a:gd name="connsiteY6" fmla="*/ 150471 h 3831220"/>
+                  <a:gd name="connsiteX7" fmla="*/ 3356658 w 5000263"/>
+                  <a:gd name="connsiteY7" fmla="*/ 0 h 3831220"/>
+                  <a:gd name="connsiteX8" fmla="*/ 104172 w 5000263"/>
+                  <a:gd name="connsiteY8" fmla="*/ 185195 h 3831220"/>
+                  <a:gd name="connsiteX9" fmla="*/ 0 w 5000263"/>
+                  <a:gd name="connsiteY9" fmla="*/ 3368233 h 3831220"/>
+                  <a:gd name="connsiteX10" fmla="*/ 659757 w 5000263"/>
+                  <a:gd name="connsiteY10" fmla="*/ 3831220 h 3831220"/>
+                  <a:gd name="connsiteX0" fmla="*/ 659757 w 5000263"/>
+                  <a:gd name="connsiteY0" fmla="*/ 3831220 h 3831220"/>
+                  <a:gd name="connsiteX1" fmla="*/ 1551008 w 5000263"/>
+                  <a:gd name="connsiteY1" fmla="*/ 2974694 h 3831220"/>
+                  <a:gd name="connsiteX2" fmla="*/ 2997843 w 5000263"/>
+                  <a:gd name="connsiteY2" fmla="*/ 1979271 h 3831220"/>
+                  <a:gd name="connsiteX3" fmla="*/ 4595149 w 5000263"/>
+                  <a:gd name="connsiteY3" fmla="*/ 1909823 h 3831220"/>
+                  <a:gd name="connsiteX4" fmla="*/ 5000263 w 5000263"/>
+                  <a:gd name="connsiteY4" fmla="*/ 1585732 h 3831220"/>
+                  <a:gd name="connsiteX5" fmla="*/ 4653023 w 5000263"/>
+                  <a:gd name="connsiteY5" fmla="*/ 902825 h 3831220"/>
+                  <a:gd name="connsiteX6" fmla="*/ 4282633 w 5000263"/>
+                  <a:gd name="connsiteY6" fmla="*/ 150471 h 3831220"/>
+                  <a:gd name="connsiteX7" fmla="*/ 3356658 w 5000263"/>
+                  <a:gd name="connsiteY7" fmla="*/ 0 h 3831220"/>
+                  <a:gd name="connsiteX8" fmla="*/ 104172 w 5000263"/>
+                  <a:gd name="connsiteY8" fmla="*/ 185195 h 3831220"/>
+                  <a:gd name="connsiteX9" fmla="*/ 0 w 5000263"/>
+                  <a:gd name="connsiteY9" fmla="*/ 3368233 h 3831220"/>
+                  <a:gd name="connsiteX10" fmla="*/ 659757 w 5000263"/>
+                  <a:gd name="connsiteY10" fmla="*/ 3831220 h 3831220"/>
+                  <a:gd name="connsiteX0" fmla="*/ 659757 w 5000263"/>
+                  <a:gd name="connsiteY0" fmla="*/ 3831220 h 3831220"/>
+                  <a:gd name="connsiteX1" fmla="*/ 1551008 w 5000263"/>
+                  <a:gd name="connsiteY1" fmla="*/ 2974694 h 3831220"/>
+                  <a:gd name="connsiteX2" fmla="*/ 2997843 w 5000263"/>
+                  <a:gd name="connsiteY2" fmla="*/ 1979271 h 3831220"/>
+                  <a:gd name="connsiteX3" fmla="*/ 4537275 w 5000263"/>
+                  <a:gd name="connsiteY3" fmla="*/ 1909823 h 3831220"/>
+                  <a:gd name="connsiteX4" fmla="*/ 5000263 w 5000263"/>
+                  <a:gd name="connsiteY4" fmla="*/ 1585732 h 3831220"/>
+                  <a:gd name="connsiteX5" fmla="*/ 4653023 w 5000263"/>
+                  <a:gd name="connsiteY5" fmla="*/ 902825 h 3831220"/>
+                  <a:gd name="connsiteX6" fmla="*/ 4282633 w 5000263"/>
+                  <a:gd name="connsiteY6" fmla="*/ 150471 h 3831220"/>
+                  <a:gd name="connsiteX7" fmla="*/ 3356658 w 5000263"/>
+                  <a:gd name="connsiteY7" fmla="*/ 0 h 3831220"/>
+                  <a:gd name="connsiteX8" fmla="*/ 104172 w 5000263"/>
+                  <a:gd name="connsiteY8" fmla="*/ 185195 h 3831220"/>
+                  <a:gd name="connsiteX9" fmla="*/ 0 w 5000263"/>
+                  <a:gd name="connsiteY9" fmla="*/ 3368233 h 3831220"/>
+                  <a:gd name="connsiteX10" fmla="*/ 659757 w 5000263"/>
+                  <a:gd name="connsiteY10" fmla="*/ 3831220 h 3831220"/>
+                  <a:gd name="connsiteX0" fmla="*/ 659757 w 5000263"/>
+                  <a:gd name="connsiteY0" fmla="*/ 3831220 h 3831220"/>
+                  <a:gd name="connsiteX1" fmla="*/ 1551008 w 5000263"/>
+                  <a:gd name="connsiteY1" fmla="*/ 2974694 h 3831220"/>
+                  <a:gd name="connsiteX2" fmla="*/ 2997843 w 5000263"/>
+                  <a:gd name="connsiteY2" fmla="*/ 1979271 h 3831220"/>
+                  <a:gd name="connsiteX3" fmla="*/ 4560424 w 5000263"/>
+                  <a:gd name="connsiteY3" fmla="*/ 1875099 h 3831220"/>
+                  <a:gd name="connsiteX4" fmla="*/ 5000263 w 5000263"/>
+                  <a:gd name="connsiteY4" fmla="*/ 1585732 h 3831220"/>
+                  <a:gd name="connsiteX5" fmla="*/ 4653023 w 5000263"/>
+                  <a:gd name="connsiteY5" fmla="*/ 902825 h 3831220"/>
+                  <a:gd name="connsiteX6" fmla="*/ 4282633 w 5000263"/>
+                  <a:gd name="connsiteY6" fmla="*/ 150471 h 3831220"/>
+                  <a:gd name="connsiteX7" fmla="*/ 3356658 w 5000263"/>
+                  <a:gd name="connsiteY7" fmla="*/ 0 h 3831220"/>
+                  <a:gd name="connsiteX8" fmla="*/ 104172 w 5000263"/>
+                  <a:gd name="connsiteY8" fmla="*/ 185195 h 3831220"/>
+                  <a:gd name="connsiteX9" fmla="*/ 0 w 5000263"/>
+                  <a:gd name="connsiteY9" fmla="*/ 3368233 h 3831220"/>
+                  <a:gd name="connsiteX10" fmla="*/ 659757 w 5000263"/>
+                  <a:gd name="connsiteY10" fmla="*/ 3831220 h 3831220"/>
+                  <a:gd name="connsiteX0" fmla="*/ 659757 w 4838218"/>
+                  <a:gd name="connsiteY0" fmla="*/ 3831220 h 3831220"/>
+                  <a:gd name="connsiteX1" fmla="*/ 1551008 w 4838218"/>
+                  <a:gd name="connsiteY1" fmla="*/ 2974694 h 3831220"/>
+                  <a:gd name="connsiteX2" fmla="*/ 2997843 w 4838218"/>
+                  <a:gd name="connsiteY2" fmla="*/ 1979271 h 3831220"/>
+                  <a:gd name="connsiteX3" fmla="*/ 4560424 w 4838218"/>
+                  <a:gd name="connsiteY3" fmla="*/ 1875099 h 3831220"/>
+                  <a:gd name="connsiteX4" fmla="*/ 4838218 w 4838218"/>
+                  <a:gd name="connsiteY4" fmla="*/ 1574158 h 3831220"/>
+                  <a:gd name="connsiteX5" fmla="*/ 4653023 w 4838218"/>
+                  <a:gd name="connsiteY5" fmla="*/ 902825 h 3831220"/>
+                  <a:gd name="connsiteX6" fmla="*/ 4282633 w 4838218"/>
+                  <a:gd name="connsiteY6" fmla="*/ 150471 h 3831220"/>
+                  <a:gd name="connsiteX7" fmla="*/ 3356658 w 4838218"/>
+                  <a:gd name="connsiteY7" fmla="*/ 0 h 3831220"/>
+                  <a:gd name="connsiteX8" fmla="*/ 104172 w 4838218"/>
+                  <a:gd name="connsiteY8" fmla="*/ 185195 h 3831220"/>
+                  <a:gd name="connsiteX9" fmla="*/ 0 w 4838218"/>
+                  <a:gd name="connsiteY9" fmla="*/ 3368233 h 3831220"/>
+                  <a:gd name="connsiteX10" fmla="*/ 659757 w 4838218"/>
+                  <a:gd name="connsiteY10" fmla="*/ 3831220 h 3831220"/>
+                  <a:gd name="connsiteX0" fmla="*/ 659757 w 4838218"/>
+                  <a:gd name="connsiteY0" fmla="*/ 3831220 h 3831220"/>
+                  <a:gd name="connsiteX1" fmla="*/ 1551008 w 4838218"/>
+                  <a:gd name="connsiteY1" fmla="*/ 2974694 h 3831220"/>
+                  <a:gd name="connsiteX2" fmla="*/ 2997843 w 4838218"/>
+                  <a:gd name="connsiteY2" fmla="*/ 1979271 h 3831220"/>
+                  <a:gd name="connsiteX3" fmla="*/ 4560424 w 4838218"/>
+                  <a:gd name="connsiteY3" fmla="*/ 1875099 h 3831220"/>
+                  <a:gd name="connsiteX4" fmla="*/ 4838218 w 4838218"/>
+                  <a:gd name="connsiteY4" fmla="*/ 1585732 h 3831220"/>
+                  <a:gd name="connsiteX5" fmla="*/ 4653023 w 4838218"/>
+                  <a:gd name="connsiteY5" fmla="*/ 902825 h 3831220"/>
+                  <a:gd name="connsiteX6" fmla="*/ 4282633 w 4838218"/>
+                  <a:gd name="connsiteY6" fmla="*/ 150471 h 3831220"/>
+                  <a:gd name="connsiteX7" fmla="*/ 3356658 w 4838218"/>
+                  <a:gd name="connsiteY7" fmla="*/ 0 h 3831220"/>
+                  <a:gd name="connsiteX8" fmla="*/ 104172 w 4838218"/>
+                  <a:gd name="connsiteY8" fmla="*/ 185195 h 3831220"/>
+                  <a:gd name="connsiteX9" fmla="*/ 0 w 4838218"/>
+                  <a:gd name="connsiteY9" fmla="*/ 3368233 h 3831220"/>
+                  <a:gd name="connsiteX10" fmla="*/ 659757 w 4838218"/>
+                  <a:gd name="connsiteY10" fmla="*/ 3831220 h 3831220"/>
+                  <a:gd name="connsiteX0" fmla="*/ 659757 w 4838218"/>
+                  <a:gd name="connsiteY0" fmla="*/ 3831220 h 3831220"/>
+                  <a:gd name="connsiteX1" fmla="*/ 1551008 w 4838218"/>
+                  <a:gd name="connsiteY1" fmla="*/ 2974694 h 3831220"/>
+                  <a:gd name="connsiteX2" fmla="*/ 2997843 w 4838218"/>
+                  <a:gd name="connsiteY2" fmla="*/ 1979271 h 3831220"/>
+                  <a:gd name="connsiteX3" fmla="*/ 4560424 w 4838218"/>
+                  <a:gd name="connsiteY3" fmla="*/ 1875099 h 3831220"/>
+                  <a:gd name="connsiteX4" fmla="*/ 4838218 w 4838218"/>
+                  <a:gd name="connsiteY4" fmla="*/ 1585732 h 3831220"/>
+                  <a:gd name="connsiteX5" fmla="*/ 4537276 w 4838218"/>
+                  <a:gd name="connsiteY5" fmla="*/ 1053296 h 3831220"/>
+                  <a:gd name="connsiteX6" fmla="*/ 4282633 w 4838218"/>
+                  <a:gd name="connsiteY6" fmla="*/ 150471 h 3831220"/>
+                  <a:gd name="connsiteX7" fmla="*/ 3356658 w 4838218"/>
+                  <a:gd name="connsiteY7" fmla="*/ 0 h 3831220"/>
+                  <a:gd name="connsiteX8" fmla="*/ 104172 w 4838218"/>
+                  <a:gd name="connsiteY8" fmla="*/ 185195 h 3831220"/>
+                  <a:gd name="connsiteX9" fmla="*/ 0 w 4838218"/>
+                  <a:gd name="connsiteY9" fmla="*/ 3368233 h 3831220"/>
+                  <a:gd name="connsiteX10" fmla="*/ 659757 w 4838218"/>
+                  <a:gd name="connsiteY10" fmla="*/ 3831220 h 3831220"/>
+                  <a:gd name="connsiteX0" fmla="*/ 659757 w 4838218"/>
+                  <a:gd name="connsiteY0" fmla="*/ 3831220 h 3831220"/>
+                  <a:gd name="connsiteX1" fmla="*/ 1551008 w 4838218"/>
+                  <a:gd name="connsiteY1" fmla="*/ 2974694 h 3831220"/>
+                  <a:gd name="connsiteX2" fmla="*/ 2997843 w 4838218"/>
+                  <a:gd name="connsiteY2" fmla="*/ 1979271 h 3831220"/>
+                  <a:gd name="connsiteX3" fmla="*/ 4560424 w 4838218"/>
+                  <a:gd name="connsiteY3" fmla="*/ 1875099 h 3831220"/>
+                  <a:gd name="connsiteX4" fmla="*/ 4838218 w 4838218"/>
+                  <a:gd name="connsiteY4" fmla="*/ 1585732 h 3831220"/>
+                  <a:gd name="connsiteX5" fmla="*/ 4560425 w 4838218"/>
+                  <a:gd name="connsiteY5" fmla="*/ 1030147 h 3831220"/>
+                  <a:gd name="connsiteX6" fmla="*/ 4282633 w 4838218"/>
+                  <a:gd name="connsiteY6" fmla="*/ 150471 h 3831220"/>
+                  <a:gd name="connsiteX7" fmla="*/ 3356658 w 4838218"/>
+                  <a:gd name="connsiteY7" fmla="*/ 0 h 3831220"/>
+                  <a:gd name="connsiteX8" fmla="*/ 104172 w 4838218"/>
+                  <a:gd name="connsiteY8" fmla="*/ 185195 h 3831220"/>
+                  <a:gd name="connsiteX9" fmla="*/ 0 w 4838218"/>
+                  <a:gd name="connsiteY9" fmla="*/ 3368233 h 3831220"/>
+                  <a:gd name="connsiteX10" fmla="*/ 659757 w 4838218"/>
+                  <a:gd name="connsiteY10" fmla="*/ 3831220 h 3831220"/>
+                  <a:gd name="connsiteX0" fmla="*/ 659757 w 4838218"/>
+                  <a:gd name="connsiteY0" fmla="*/ 3831220 h 3831220"/>
+                  <a:gd name="connsiteX1" fmla="*/ 1551008 w 4838218"/>
+                  <a:gd name="connsiteY1" fmla="*/ 2974694 h 3831220"/>
+                  <a:gd name="connsiteX2" fmla="*/ 2997843 w 4838218"/>
+                  <a:gd name="connsiteY2" fmla="*/ 1979271 h 3831220"/>
+                  <a:gd name="connsiteX3" fmla="*/ 4560424 w 4838218"/>
+                  <a:gd name="connsiteY3" fmla="*/ 1875099 h 3831220"/>
+                  <a:gd name="connsiteX4" fmla="*/ 4838218 w 4838218"/>
+                  <a:gd name="connsiteY4" fmla="*/ 1585732 h 3831220"/>
+                  <a:gd name="connsiteX5" fmla="*/ 4560425 w 4838218"/>
+                  <a:gd name="connsiteY5" fmla="*/ 1030147 h 3831220"/>
+                  <a:gd name="connsiteX6" fmla="*/ 4213184 w 4838218"/>
+                  <a:gd name="connsiteY6" fmla="*/ 277792 h 3831220"/>
+                  <a:gd name="connsiteX7" fmla="*/ 3356658 w 4838218"/>
+                  <a:gd name="connsiteY7" fmla="*/ 0 h 3831220"/>
+                  <a:gd name="connsiteX8" fmla="*/ 104172 w 4838218"/>
+                  <a:gd name="connsiteY8" fmla="*/ 185195 h 3831220"/>
+                  <a:gd name="connsiteX9" fmla="*/ 0 w 4838218"/>
+                  <a:gd name="connsiteY9" fmla="*/ 3368233 h 3831220"/>
+                  <a:gd name="connsiteX10" fmla="*/ 659757 w 4838218"/>
+                  <a:gd name="connsiteY10" fmla="*/ 3831220 h 3831220"/>
+                  <a:gd name="connsiteX0" fmla="*/ 659757 w 4838218"/>
+                  <a:gd name="connsiteY0" fmla="*/ 3680749 h 3680749"/>
+                  <a:gd name="connsiteX1" fmla="*/ 1551008 w 4838218"/>
+                  <a:gd name="connsiteY1" fmla="*/ 2824223 h 3680749"/>
+                  <a:gd name="connsiteX2" fmla="*/ 2997843 w 4838218"/>
+                  <a:gd name="connsiteY2" fmla="*/ 1828800 h 3680749"/>
+                  <a:gd name="connsiteX3" fmla="*/ 4560424 w 4838218"/>
+                  <a:gd name="connsiteY3" fmla="*/ 1724628 h 3680749"/>
+                  <a:gd name="connsiteX4" fmla="*/ 4838218 w 4838218"/>
+                  <a:gd name="connsiteY4" fmla="*/ 1435261 h 3680749"/>
+                  <a:gd name="connsiteX5" fmla="*/ 4560425 w 4838218"/>
+                  <a:gd name="connsiteY5" fmla="*/ 879676 h 3680749"/>
+                  <a:gd name="connsiteX6" fmla="*/ 4213184 w 4838218"/>
+                  <a:gd name="connsiteY6" fmla="*/ 127321 h 3680749"/>
+                  <a:gd name="connsiteX7" fmla="*/ 3391382 w 4838218"/>
+                  <a:gd name="connsiteY7" fmla="*/ 0 h 3680749"/>
+                  <a:gd name="connsiteX8" fmla="*/ 104172 w 4838218"/>
+                  <a:gd name="connsiteY8" fmla="*/ 34724 h 3680749"/>
+                  <a:gd name="connsiteX9" fmla="*/ 0 w 4838218"/>
+                  <a:gd name="connsiteY9" fmla="*/ 3217762 h 3680749"/>
+                  <a:gd name="connsiteX10" fmla="*/ 659757 w 4838218"/>
+                  <a:gd name="connsiteY10" fmla="*/ 3680749 h 3680749"/>
+                  <a:gd name="connsiteX0" fmla="*/ 659757 w 4838218"/>
+                  <a:gd name="connsiteY0" fmla="*/ 3680749 h 3680749"/>
+                  <a:gd name="connsiteX1" fmla="*/ 1551008 w 4838218"/>
+                  <a:gd name="connsiteY1" fmla="*/ 2824223 h 3680749"/>
+                  <a:gd name="connsiteX2" fmla="*/ 2997843 w 4838218"/>
+                  <a:gd name="connsiteY2" fmla="*/ 1828800 h 3680749"/>
+                  <a:gd name="connsiteX3" fmla="*/ 4560424 w 4838218"/>
+                  <a:gd name="connsiteY3" fmla="*/ 1724628 h 3680749"/>
+                  <a:gd name="connsiteX4" fmla="*/ 4838218 w 4838218"/>
+                  <a:gd name="connsiteY4" fmla="*/ 1435261 h 3680749"/>
+                  <a:gd name="connsiteX5" fmla="*/ 4560425 w 4838218"/>
+                  <a:gd name="connsiteY5" fmla="*/ 879676 h 3680749"/>
+                  <a:gd name="connsiteX6" fmla="*/ 4213184 w 4838218"/>
+                  <a:gd name="connsiteY6" fmla="*/ 127321 h 3680749"/>
+                  <a:gd name="connsiteX7" fmla="*/ 3391382 w 4838218"/>
+                  <a:gd name="connsiteY7" fmla="*/ 0 h 3680749"/>
+                  <a:gd name="connsiteX8" fmla="*/ 150471 w 4838218"/>
+                  <a:gd name="connsiteY8" fmla="*/ 138896 h 3680749"/>
+                  <a:gd name="connsiteX9" fmla="*/ 0 w 4838218"/>
+                  <a:gd name="connsiteY9" fmla="*/ 3217762 h 3680749"/>
+                  <a:gd name="connsiteX10" fmla="*/ 659757 w 4838218"/>
+                  <a:gd name="connsiteY10" fmla="*/ 3680749 h 3680749"/>
+                </a:gdLst>
+                <a:ahLst/>
+                <a:cxnLst>
+                  <a:cxn ang="0">
+                    <a:pos x="connsiteX0" y="connsiteY0"/>
+                  </a:cxn>
+                  <a:cxn ang="0">
+                    <a:pos x="connsiteX1" y="connsiteY1"/>
+                  </a:cxn>
+                  <a:cxn ang="0">
+                    <a:pos x="connsiteX2" y="connsiteY2"/>
+                  </a:cxn>
+                  <a:cxn ang="0">
+                    <a:pos x="connsiteX3" y="connsiteY3"/>
+                  </a:cxn>
+                  <a:cxn ang="0">
+                    <a:pos x="connsiteX4" y="connsiteY4"/>
+                  </a:cxn>
+                  <a:cxn ang="0">
+                    <a:pos x="connsiteX5" y="connsiteY5"/>
+                  </a:cxn>
+                  <a:cxn ang="0">
+                    <a:pos x="connsiteX6" y="connsiteY6"/>
+                  </a:cxn>
+                  <a:cxn ang="0">
+                    <a:pos x="connsiteX7" y="connsiteY7"/>
+                  </a:cxn>
+                  <a:cxn ang="0">
+                    <a:pos x="connsiteX8" y="connsiteY8"/>
+                  </a:cxn>
+                  <a:cxn ang="0">
+                    <a:pos x="connsiteX9" y="connsiteY9"/>
+                  </a:cxn>
+                  <a:cxn ang="0">
+                    <a:pos x="connsiteX10" y="connsiteY10"/>
+                  </a:cxn>
+                </a:cxnLst>
+                <a:rect l="l" t="t" r="r" b="b"/>
+                <a:pathLst>
+                  <a:path w="4838218" h="3680749">
+                    <a:moveTo>
+                      <a:pt x="659757" y="3680749"/>
+                    </a:moveTo>
+                    <a:lnTo>
+                      <a:pt x="1551008" y="2824223"/>
+                    </a:lnTo>
+                    <a:lnTo>
+                      <a:pt x="2997843" y="1828800"/>
+                    </a:lnTo>
+                    <a:lnTo>
+                      <a:pt x="4560424" y="1724628"/>
+                    </a:lnTo>
+                    <a:lnTo>
+                      <a:pt x="4838218" y="1435261"/>
+                    </a:lnTo>
+                    <a:lnTo>
+                      <a:pt x="4560425" y="879676"/>
+                    </a:lnTo>
+                    <a:lnTo>
+                      <a:pt x="4213184" y="127321"/>
+                    </a:lnTo>
+                    <a:lnTo>
+                      <a:pt x="3391382" y="0"/>
+                    </a:lnTo>
+                    <a:lnTo>
+                      <a:pt x="150471" y="138896"/>
+                    </a:lnTo>
+                    <a:lnTo>
+                      <a:pt x="0" y="3217762"/>
+                    </a:lnTo>
+                    <a:lnTo>
+                      <a:pt x="659757" y="3680749"/>
+                    </a:lnTo>
+                    <a:close/>
+                  </a:path>
+                </a:pathLst>
+              </a:custGeom>
+              <a:noFill/>
+              <a:ln>
+                <a:solidFill>
+                  <a:srgbClr val="0000FF"/>
+                </a:solidFill>
+              </a:ln>
+            </p:spPr>
+            <p:style>
+              <a:lnRef idx="2">
+                <a:schemeClr val="accent1">
+                  <a:shade val="15000"/>
+                </a:schemeClr>
+              </a:lnRef>
+              <a:fillRef idx="1">
+                <a:schemeClr val="accent1"/>
+              </a:fillRef>
+              <a:effectRef idx="0">
+                <a:schemeClr val="accent1"/>
+              </a:effectRef>
+              <a:fontRef idx="minor">
+                <a:schemeClr val="lt1"/>
+              </a:fontRef>
+            </p:style>
+            <p:txBody>
+              <a:bodyPr rtlCol="0" anchor="ctr"/>
+              <a:lstStyle/>
+              <a:p>
+                <a:pPr algn="ctr"/>
+                <a:endParaRPr lang="en-CA"/>
+              </a:p>
+            </p:txBody>
+          </p:sp>
+        </p:grpSp>
+        <p:sp>
+          <p:nvSpPr>
+            <p:cNvPr id="9" name="TextBox 8">
+              <a:extLst>
+                <a:ext uri="{FF2B5EF4-FFF2-40B4-BE49-F238E27FC236}">
+                  <a16:creationId xmlns:a16="http://schemas.microsoft.com/office/drawing/2014/main" id="{9EDC704A-4B74-1D52-2C35-B3C188B23E2B}"/>
+                </a:ext>
+              </a:extLst>
+            </p:cNvPr>
+            <p:cNvSpPr txBox="1"/>
+            <p:nvPr/>
+          </p:nvSpPr>
+          <p:spPr>
+            <a:xfrm>
+              <a:off x="2789499" y="185856"/>
+              <a:ext cx="393539" cy="461665"/>
+            </a:xfrm>
+            <a:prstGeom prst="rect">
+              <a:avLst/>
+            </a:prstGeom>
+            <a:noFill/>
+          </p:spPr>
+          <p:txBody>
+            <a:bodyPr wrap="square" rtlCol="0">
+              <a:spAutoFit/>
+            </a:bodyPr>
+            <a:lstStyle/>
+            <a:p>
+              <a:r>
+                <a:rPr lang="en-CA" sz="2400" dirty="0">
+                  <a:latin typeface="Arial" panose="020B0604020202020204" pitchFamily="34" charset="0"/>
+                  <a:cs typeface="Arial" panose="020B0604020202020204" pitchFamily="34" charset="0"/>
+                </a:rPr>
+                <a:t>a</a:t>
+              </a:r>
+            </a:p>
+          </p:txBody>
+        </p:sp>
+      </p:grpSp>
+    </p:spTree>
+    <p:extLst>
+      <p:ext uri="{BB962C8B-B14F-4D97-AF65-F5344CB8AC3E}">
+        <p14:creationId xmlns:p14="http://schemas.microsoft.com/office/powerpoint/2010/main" val="708817653"/>
       </p:ext>
     </p:extLst>
   </p:cSld>

</xml_diff>

<commit_message>
Updates to R and spread
</commit_message>
<xml_diff>
--- a/MatthewTuck_Honours/plots/image preparation for honours.pptx
+++ b/MatthewTuck_Honours/plots/image preparation for honours.pptx
@@ -7,12 +7,13 @@
   <p:sldIdLst>
     <p:sldId id="256" r:id="rId2"/>
     <p:sldId id="257" r:id="rId3"/>
-    <p:sldId id="258" r:id="rId4"/>
-    <p:sldId id="259" r:id="rId5"/>
-    <p:sldId id="260" r:id="rId6"/>
-    <p:sldId id="261" r:id="rId7"/>
+    <p:sldId id="265" r:id="rId4"/>
+    <p:sldId id="258" r:id="rId5"/>
+    <p:sldId id="259" r:id="rId6"/>
+    <p:sldId id="264" r:id="rId7"/>
     <p:sldId id="262" r:id="rId8"/>
-    <p:sldId id="263" r:id="rId9"/>
+    <p:sldId id="260" r:id="rId9"/>
+    <p:sldId id="261" r:id="rId10"/>
   </p:sldIdLst>
   <p:sldSz cx="12192000" cy="6858000"/>
   <p:notesSz cx="6858000" cy="9144000"/>
@@ -122,13 +123,356 @@
 <file path=ppt/revisionInfo.xml><?xml version="1.0" encoding="utf-8"?>
 <p1510:revInfo xmlns:a="http://schemas.openxmlformats.org/drawingml/2006/main" xmlns:r="http://schemas.openxmlformats.org/officeDocument/2006/relationships" xmlns:p1510="http://schemas.microsoft.com/office/powerpoint/2015/10/main">
   <p1510:revLst>
-    <p1510:client id="{AB2E6281-4804-4057-99C2-E96F36FD68F9}" v="174" dt="2025-02-22T18:40:52.340"/>
+    <p1510:client id="{E167AA45-092C-45FF-8040-58DA1B5E40F4}" v="38" dt="2025-03-18T19:45:11.005"/>
   </p1510:revLst>
 </p1510:revInfo>
 </file>
 
 <file path=ppt/changesInfos/changesInfo1.xml><?xml version="1.0" encoding="utf-8"?>
 <pc:chgInfo xmlns:a="http://schemas.openxmlformats.org/drawingml/2006/main" xmlns:r="http://schemas.openxmlformats.org/officeDocument/2006/relationships" xmlns:ac="http://schemas.microsoft.com/office/drawing/2013/main/command" xmlns:pc="http://schemas.microsoft.com/office/powerpoint/2013/main/command">
+  <pc:docChgLst>
+    <pc:chgData name="Matthew Tuck" userId="292c67f149de0640" providerId="LiveId" clId="{E167AA45-092C-45FF-8040-58DA1B5E40F4}"/>
+    <pc:docChg chg="custSel addSld delSld modSld sldOrd">
+      <pc:chgData name="Matthew Tuck" userId="292c67f149de0640" providerId="LiveId" clId="{E167AA45-092C-45FF-8040-58DA1B5E40F4}" dt="2025-03-22T21:56:18.790" v="467" actId="207"/>
+      <pc:docMkLst>
+        <pc:docMk/>
+      </pc:docMkLst>
+      <pc:sldChg chg="modSp mod">
+        <pc:chgData name="Matthew Tuck" userId="292c67f149de0640" providerId="LiveId" clId="{E167AA45-092C-45FF-8040-58DA1B5E40F4}" dt="2025-03-22T21:56:18.790" v="467" actId="207"/>
+        <pc:sldMkLst>
+          <pc:docMk/>
+          <pc:sldMk cId="2389168500" sldId="256"/>
+        </pc:sldMkLst>
+        <pc:spChg chg="mod">
+          <ac:chgData name="Matthew Tuck" userId="292c67f149de0640" providerId="LiveId" clId="{E167AA45-092C-45FF-8040-58DA1B5E40F4}" dt="2025-03-22T21:56:18.790" v="467" actId="207"/>
+          <ac:spMkLst>
+            <pc:docMk/>
+            <pc:sldMk cId="2389168500" sldId="256"/>
+            <ac:spMk id="2" creationId="{53588E85-51C2-BC0D-6933-D5629282428B}"/>
+          </ac:spMkLst>
+        </pc:spChg>
+        <pc:spChg chg="mod">
+          <ac:chgData name="Matthew Tuck" userId="292c67f149de0640" providerId="LiveId" clId="{E167AA45-092C-45FF-8040-58DA1B5E40F4}" dt="2025-03-22T21:56:11.056" v="466" actId="207"/>
+          <ac:spMkLst>
+            <pc:docMk/>
+            <pc:sldMk cId="2389168500" sldId="256"/>
+            <ac:spMk id="3" creationId="{51E7DBA6-F2E3-2B10-D591-44D447113820}"/>
+          </ac:spMkLst>
+        </pc:spChg>
+        <pc:grpChg chg="mod">
+          <ac:chgData name="Matthew Tuck" userId="292c67f149de0640" providerId="LiveId" clId="{E167AA45-092C-45FF-8040-58DA1B5E40F4}" dt="2025-03-22T21:55:53.677" v="465" actId="14100"/>
+          <ac:grpSpMkLst>
+            <pc:docMk/>
+            <pc:sldMk cId="2389168500" sldId="256"/>
+            <ac:grpSpMk id="22" creationId="{9B788C06-E1AA-B0EB-35C3-D87419595569}"/>
+          </ac:grpSpMkLst>
+        </pc:grpChg>
+      </pc:sldChg>
+      <pc:sldChg chg="addSp delSp modSp mod">
+        <pc:chgData name="Matthew Tuck" userId="292c67f149de0640" providerId="LiveId" clId="{E167AA45-092C-45FF-8040-58DA1B5E40F4}" dt="2025-03-17T04:20:17.264" v="58" actId="1076"/>
+        <pc:sldMkLst>
+          <pc:docMk/>
+          <pc:sldMk cId="1425793214" sldId="257"/>
+        </pc:sldMkLst>
+        <pc:grpChg chg="add mod">
+          <ac:chgData name="Matthew Tuck" userId="292c67f149de0640" providerId="LiveId" clId="{E167AA45-092C-45FF-8040-58DA1B5E40F4}" dt="2025-03-17T04:20:17.264" v="58" actId="1076"/>
+          <ac:grpSpMkLst>
+            <pc:docMk/>
+            <pc:sldMk cId="1425793214" sldId="257"/>
+            <ac:grpSpMk id="12" creationId="{FD8A2F96-DE04-3ABB-1F2D-678C993328B3}"/>
+          </ac:grpSpMkLst>
+        </pc:grpChg>
+        <pc:picChg chg="add mod modCrop">
+          <ac:chgData name="Matthew Tuck" userId="292c67f149de0640" providerId="LiveId" clId="{E167AA45-092C-45FF-8040-58DA1B5E40F4}" dt="2025-03-17T04:20:06.648" v="56" actId="164"/>
+          <ac:picMkLst>
+            <pc:docMk/>
+            <pc:sldMk cId="1425793214" sldId="257"/>
+            <ac:picMk id="5" creationId="{47130567-AE6B-2F90-553D-F6A39C881D2E}"/>
+          </ac:picMkLst>
+        </pc:picChg>
+        <pc:picChg chg="add mod modCrop">
+          <ac:chgData name="Matthew Tuck" userId="292c67f149de0640" providerId="LiveId" clId="{E167AA45-092C-45FF-8040-58DA1B5E40F4}" dt="2025-03-17T04:20:06.648" v="56" actId="164"/>
+          <ac:picMkLst>
+            <pc:docMk/>
+            <pc:sldMk cId="1425793214" sldId="257"/>
+            <ac:picMk id="9" creationId="{1844B638-8D99-ADBF-C775-CBCE83BCFA0D}"/>
+          </ac:picMkLst>
+        </pc:picChg>
+        <pc:picChg chg="add mod modCrop">
+          <ac:chgData name="Matthew Tuck" userId="292c67f149de0640" providerId="LiveId" clId="{E167AA45-092C-45FF-8040-58DA1B5E40F4}" dt="2025-03-17T04:20:06.648" v="56" actId="164"/>
+          <ac:picMkLst>
+            <pc:docMk/>
+            <pc:sldMk cId="1425793214" sldId="257"/>
+            <ac:picMk id="10" creationId="{011F2306-33E6-8C9C-8F88-47A957AB5341}"/>
+          </ac:picMkLst>
+        </pc:picChg>
+      </pc:sldChg>
+      <pc:sldChg chg="addSp delSp modSp mod">
+        <pc:chgData name="Matthew Tuck" userId="292c67f149de0640" providerId="LiveId" clId="{E167AA45-092C-45FF-8040-58DA1B5E40F4}" dt="2025-03-17T04:27:13.183" v="62" actId="962"/>
+        <pc:sldMkLst>
+          <pc:docMk/>
+          <pc:sldMk cId="142822564" sldId="258"/>
+        </pc:sldMkLst>
+        <pc:picChg chg="add mod">
+          <ac:chgData name="Matthew Tuck" userId="292c67f149de0640" providerId="LiveId" clId="{E167AA45-092C-45FF-8040-58DA1B5E40F4}" dt="2025-03-17T04:27:13.183" v="62" actId="962"/>
+          <ac:picMkLst>
+            <pc:docMk/>
+            <pc:sldMk cId="142822564" sldId="258"/>
+            <ac:picMk id="7" creationId="{EA60B3F1-8FA7-DF3C-A51F-F7EE50FC8115}"/>
+          </ac:picMkLst>
+        </pc:picChg>
+      </pc:sldChg>
+      <pc:sldChg chg="addSp delSp modSp mod">
+        <pc:chgData name="Matthew Tuck" userId="292c67f149de0640" providerId="LiveId" clId="{E167AA45-092C-45FF-8040-58DA1B5E40F4}" dt="2025-03-17T04:15:04.898" v="23" actId="208"/>
+        <pc:sldMkLst>
+          <pc:docMk/>
+          <pc:sldMk cId="3644617857" sldId="259"/>
+        </pc:sldMkLst>
+        <pc:spChg chg="add mod ord">
+          <ac:chgData name="Matthew Tuck" userId="292c67f149de0640" providerId="LiveId" clId="{E167AA45-092C-45FF-8040-58DA1B5E40F4}" dt="2025-03-17T04:15:04.898" v="23" actId="208"/>
+          <ac:spMkLst>
+            <pc:docMk/>
+            <pc:sldMk cId="3644617857" sldId="259"/>
+            <ac:spMk id="7" creationId="{F8A126B7-C8F4-7883-95D4-77D1A92D0644}"/>
+          </ac:spMkLst>
+        </pc:spChg>
+        <pc:grpChg chg="add mod">
+          <ac:chgData name="Matthew Tuck" userId="292c67f149de0640" providerId="LiveId" clId="{E167AA45-092C-45FF-8040-58DA1B5E40F4}" dt="2025-03-17T04:14:57.721" v="22" actId="164"/>
+          <ac:grpSpMkLst>
+            <pc:docMk/>
+            <pc:sldMk cId="3644617857" sldId="259"/>
+            <ac:grpSpMk id="8" creationId="{E42935AF-814B-CA2B-1F13-864D4FC80763}"/>
+          </ac:grpSpMkLst>
+        </pc:grpChg>
+        <pc:picChg chg="add mod">
+          <ac:chgData name="Matthew Tuck" userId="292c67f149de0640" providerId="LiveId" clId="{E167AA45-092C-45FF-8040-58DA1B5E40F4}" dt="2025-03-17T04:14:57.721" v="22" actId="164"/>
+          <ac:picMkLst>
+            <pc:docMk/>
+            <pc:sldMk cId="3644617857" sldId="259"/>
+            <ac:picMk id="6" creationId="{8F92E740-8EB6-DCBB-7990-7D6D6AD8B409}"/>
+          </ac:picMkLst>
+        </pc:picChg>
+      </pc:sldChg>
+      <pc:sldChg chg="addSp delSp modSp mod">
+        <pc:chgData name="Matthew Tuck" userId="292c67f149de0640" providerId="LiveId" clId="{E167AA45-092C-45FF-8040-58DA1B5E40F4}" dt="2025-03-18T19:39:36.022" v="384" actId="164"/>
+        <pc:sldMkLst>
+          <pc:docMk/>
+          <pc:sldMk cId="776127107" sldId="260"/>
+        </pc:sldMkLst>
+        <pc:spChg chg="add mod">
+          <ac:chgData name="Matthew Tuck" userId="292c67f149de0640" providerId="LiveId" clId="{E167AA45-092C-45FF-8040-58DA1B5E40F4}" dt="2025-03-18T19:39:36.022" v="384" actId="164"/>
+          <ac:spMkLst>
+            <pc:docMk/>
+            <pc:sldMk cId="776127107" sldId="260"/>
+            <ac:spMk id="6" creationId="{EA2D299F-FD3B-5E1C-5ECC-FDF2EE59FEA2}"/>
+          </ac:spMkLst>
+        </pc:spChg>
+        <pc:spChg chg="add mod">
+          <ac:chgData name="Matthew Tuck" userId="292c67f149de0640" providerId="LiveId" clId="{E167AA45-092C-45FF-8040-58DA1B5E40F4}" dt="2025-03-18T19:39:36.022" v="384" actId="164"/>
+          <ac:spMkLst>
+            <pc:docMk/>
+            <pc:sldMk cId="776127107" sldId="260"/>
+            <ac:spMk id="7" creationId="{3082F1ED-7617-5208-DD28-40871F92E2D4}"/>
+          </ac:spMkLst>
+        </pc:spChg>
+        <pc:spChg chg="add mod">
+          <ac:chgData name="Matthew Tuck" userId="292c67f149de0640" providerId="LiveId" clId="{E167AA45-092C-45FF-8040-58DA1B5E40F4}" dt="2025-03-18T19:39:36.022" v="384" actId="164"/>
+          <ac:spMkLst>
+            <pc:docMk/>
+            <pc:sldMk cId="776127107" sldId="260"/>
+            <ac:spMk id="8" creationId="{92B2D775-A4B0-378E-CD4B-B38A84D83AFC}"/>
+          </ac:spMkLst>
+        </pc:spChg>
+        <pc:grpChg chg="add mod">
+          <ac:chgData name="Matthew Tuck" userId="292c67f149de0640" providerId="LiveId" clId="{E167AA45-092C-45FF-8040-58DA1B5E40F4}" dt="2025-03-18T19:39:36.022" v="384" actId="164"/>
+          <ac:grpSpMkLst>
+            <pc:docMk/>
+            <pc:sldMk cId="776127107" sldId="260"/>
+            <ac:grpSpMk id="11" creationId="{D5CB7D9A-D73B-D8A8-5595-181DB38D8815}"/>
+          </ac:grpSpMkLst>
+        </pc:grpChg>
+        <pc:picChg chg="add mod">
+          <ac:chgData name="Matthew Tuck" userId="292c67f149de0640" providerId="LiveId" clId="{E167AA45-092C-45FF-8040-58DA1B5E40F4}" dt="2025-03-18T19:39:36.022" v="384" actId="164"/>
+          <ac:picMkLst>
+            <pc:docMk/>
+            <pc:sldMk cId="776127107" sldId="260"/>
+            <ac:picMk id="5" creationId="{056BC902-BD00-7CDF-E710-2DCE0C1F0D89}"/>
+          </ac:picMkLst>
+        </pc:picChg>
+      </pc:sldChg>
+      <pc:sldChg chg="addSp delSp modSp mod">
+        <pc:chgData name="Matthew Tuck" userId="292c67f149de0640" providerId="LiveId" clId="{E167AA45-092C-45FF-8040-58DA1B5E40F4}" dt="2025-03-18T19:48:10.977" v="464" actId="14100"/>
+        <pc:sldMkLst>
+          <pc:docMk/>
+          <pc:sldMk cId="2830423783" sldId="261"/>
+        </pc:sldMkLst>
+        <pc:spChg chg="add mod">
+          <ac:chgData name="Matthew Tuck" userId="292c67f149de0640" providerId="LiveId" clId="{E167AA45-092C-45FF-8040-58DA1B5E40F4}" dt="2025-03-18T19:48:04.753" v="463" actId="14100"/>
+          <ac:spMkLst>
+            <pc:docMk/>
+            <pc:sldMk cId="2830423783" sldId="261"/>
+            <ac:spMk id="12" creationId="{534EFD49-6A21-15B3-853A-BB6FC3B2EA6D}"/>
+          </ac:spMkLst>
+        </pc:spChg>
+        <pc:spChg chg="add mod">
+          <ac:chgData name="Matthew Tuck" userId="292c67f149de0640" providerId="LiveId" clId="{E167AA45-092C-45FF-8040-58DA1B5E40F4}" dt="2025-03-18T19:48:10.977" v="464" actId="14100"/>
+          <ac:spMkLst>
+            <pc:docMk/>
+            <pc:sldMk cId="2830423783" sldId="261"/>
+            <ac:spMk id="13" creationId="{DC71BD2D-35AF-B859-07C5-9F408BC8EA4E}"/>
+          </ac:spMkLst>
+        </pc:spChg>
+        <pc:grpChg chg="add mod">
+          <ac:chgData name="Matthew Tuck" userId="292c67f149de0640" providerId="LiveId" clId="{E167AA45-092C-45FF-8040-58DA1B5E40F4}" dt="2025-03-18T19:45:11.005" v="391" actId="164"/>
+          <ac:grpSpMkLst>
+            <pc:docMk/>
+            <pc:sldMk cId="2830423783" sldId="261"/>
+            <ac:grpSpMk id="11" creationId="{569C9B2A-5888-18C4-4110-35F506F17DD5}"/>
+          </ac:grpSpMkLst>
+        </pc:grpChg>
+        <pc:grpChg chg="add mod">
+          <ac:chgData name="Matthew Tuck" userId="292c67f149de0640" providerId="LiveId" clId="{E167AA45-092C-45FF-8040-58DA1B5E40F4}" dt="2025-03-18T19:47:40.087" v="458" actId="14100"/>
+          <ac:grpSpMkLst>
+            <pc:docMk/>
+            <pc:sldMk cId="2830423783" sldId="261"/>
+            <ac:grpSpMk id="14" creationId="{644EEAB0-FD62-F29B-E989-5E3AF00A02CD}"/>
+          </ac:grpSpMkLst>
+        </pc:grpChg>
+        <pc:picChg chg="add mod modCrop">
+          <ac:chgData name="Matthew Tuck" userId="292c67f149de0640" providerId="LiveId" clId="{E167AA45-092C-45FF-8040-58DA1B5E40F4}" dt="2025-03-17T04:37:03.338" v="133" actId="164"/>
+          <ac:picMkLst>
+            <pc:docMk/>
+            <pc:sldMk cId="2830423783" sldId="261"/>
+            <ac:picMk id="9" creationId="{19A74E5F-9A75-E3F9-4C32-1D309EBEBE47}"/>
+          </ac:picMkLst>
+        </pc:picChg>
+        <pc:picChg chg="add mod modCrop">
+          <ac:chgData name="Matthew Tuck" userId="292c67f149de0640" providerId="LiveId" clId="{E167AA45-092C-45FF-8040-58DA1B5E40F4}" dt="2025-03-17T04:37:03.338" v="133" actId="164"/>
+          <ac:picMkLst>
+            <pc:docMk/>
+            <pc:sldMk cId="2830423783" sldId="261"/>
+            <ac:picMk id="10" creationId="{70838E99-00D4-D272-0E54-46E6E3570A5E}"/>
+          </ac:picMkLst>
+        </pc:picChg>
+      </pc:sldChg>
+      <pc:sldChg chg="addSp delSp modSp mod ord">
+        <pc:chgData name="Matthew Tuck" userId="292c67f149de0640" providerId="LiveId" clId="{E167AA45-092C-45FF-8040-58DA1B5E40F4}" dt="2025-03-18T19:19:05.696" v="313" actId="14100"/>
+        <pc:sldMkLst>
+          <pc:docMk/>
+          <pc:sldMk cId="3795613774" sldId="262"/>
+        </pc:sldMkLst>
+        <pc:spChg chg="mod ord topLvl">
+          <ac:chgData name="Matthew Tuck" userId="292c67f149de0640" providerId="LiveId" clId="{E167AA45-092C-45FF-8040-58DA1B5E40F4}" dt="2025-03-18T19:18:41.077" v="310" actId="164"/>
+          <ac:spMkLst>
+            <pc:docMk/>
+            <pc:sldMk cId="3795613774" sldId="262"/>
+            <ac:spMk id="6" creationId="{687D9B0E-AC76-43F7-0857-3BE53FFFDBAC}"/>
+          </ac:spMkLst>
+        </pc:spChg>
+        <pc:spChg chg="mod topLvl">
+          <ac:chgData name="Matthew Tuck" userId="292c67f149de0640" providerId="LiveId" clId="{E167AA45-092C-45FF-8040-58DA1B5E40F4}" dt="2025-03-18T19:18:53.713" v="311" actId="164"/>
+          <ac:spMkLst>
+            <pc:docMk/>
+            <pc:sldMk cId="3795613774" sldId="262"/>
+            <ac:spMk id="8" creationId="{869983BB-BB3D-4E23-6071-C20E2D0FC985}"/>
+          </ac:spMkLst>
+        </pc:spChg>
+        <pc:grpChg chg="add mod">
+          <ac:chgData name="Matthew Tuck" userId="292c67f149de0640" providerId="LiveId" clId="{E167AA45-092C-45FF-8040-58DA1B5E40F4}" dt="2025-03-18T19:18:41.077" v="310" actId="164"/>
+          <ac:grpSpMkLst>
+            <pc:docMk/>
+            <pc:sldMk cId="3795613774" sldId="262"/>
+            <ac:grpSpMk id="18" creationId="{4360D933-3006-9CD4-905F-8A17916FF21C}"/>
+          </ac:grpSpMkLst>
+        </pc:grpChg>
+        <pc:grpChg chg="add mod">
+          <ac:chgData name="Matthew Tuck" userId="292c67f149de0640" providerId="LiveId" clId="{E167AA45-092C-45FF-8040-58DA1B5E40F4}" dt="2025-03-18T19:19:05.696" v="313" actId="14100"/>
+          <ac:grpSpMkLst>
+            <pc:docMk/>
+            <pc:sldMk cId="3795613774" sldId="262"/>
+            <ac:grpSpMk id="21" creationId="{4A424CCA-4AB7-E505-B29A-1C780C38A1F1}"/>
+          </ac:grpSpMkLst>
+        </pc:grpChg>
+        <pc:picChg chg="add mod ord topLvl">
+          <ac:chgData name="Matthew Tuck" userId="292c67f149de0640" providerId="LiveId" clId="{E167AA45-092C-45FF-8040-58DA1B5E40F4}" dt="2025-03-18T19:18:41.077" v="310" actId="164"/>
+          <ac:picMkLst>
+            <pc:docMk/>
+            <pc:sldMk cId="3795613774" sldId="262"/>
+            <ac:picMk id="7" creationId="{A4CEB8E1-45D7-7219-06D5-F83A6BD6EE85}"/>
+          </ac:picMkLst>
+        </pc:picChg>
+        <pc:picChg chg="add mod ord topLvl">
+          <ac:chgData name="Matthew Tuck" userId="292c67f149de0640" providerId="LiveId" clId="{E167AA45-092C-45FF-8040-58DA1B5E40F4}" dt="2025-03-18T19:18:53.713" v="311" actId="164"/>
+          <ac:picMkLst>
+            <pc:docMk/>
+            <pc:sldMk cId="3795613774" sldId="262"/>
+            <ac:picMk id="16" creationId="{35E80455-37C9-50C2-7041-FDF1CFB9F3C6}"/>
+          </ac:picMkLst>
+        </pc:picChg>
+      </pc:sldChg>
+      <pc:sldChg chg="del">
+        <pc:chgData name="Matthew Tuck" userId="292c67f149de0640" providerId="LiveId" clId="{E167AA45-092C-45FF-8040-58DA1B5E40F4}" dt="2025-03-17T04:54:33.850" v="302" actId="47"/>
+        <pc:sldMkLst>
+          <pc:docMk/>
+          <pc:sldMk cId="708817653" sldId="263"/>
+        </pc:sldMkLst>
+      </pc:sldChg>
+      <pc:sldChg chg="addSp delSp modSp new mod">
+        <pc:chgData name="Matthew Tuck" userId="292c67f149de0640" providerId="LiveId" clId="{E167AA45-092C-45FF-8040-58DA1B5E40F4}" dt="2025-03-17T04:16:41.376" v="36" actId="164"/>
+        <pc:sldMkLst>
+          <pc:docMk/>
+          <pc:sldMk cId="3750861245" sldId="264"/>
+        </pc:sldMkLst>
+        <pc:spChg chg="add mod ord">
+          <ac:chgData name="Matthew Tuck" userId="292c67f149de0640" providerId="LiveId" clId="{E167AA45-092C-45FF-8040-58DA1B5E40F4}" dt="2025-03-17T04:16:41.376" v="36" actId="164"/>
+          <ac:spMkLst>
+            <pc:docMk/>
+            <pc:sldMk cId="3750861245" sldId="264"/>
+            <ac:spMk id="6" creationId="{AB0BD85C-2701-5EA9-C651-68DE253ACB1F}"/>
+          </ac:spMkLst>
+        </pc:spChg>
+        <pc:grpChg chg="add mod">
+          <ac:chgData name="Matthew Tuck" userId="292c67f149de0640" providerId="LiveId" clId="{E167AA45-092C-45FF-8040-58DA1B5E40F4}" dt="2025-03-17T04:16:41.376" v="36" actId="164"/>
+          <ac:grpSpMkLst>
+            <pc:docMk/>
+            <pc:sldMk cId="3750861245" sldId="264"/>
+            <ac:grpSpMk id="7" creationId="{159EC7D8-475F-24CE-0A86-3B7D43789B8B}"/>
+          </ac:grpSpMkLst>
+        </pc:grpChg>
+        <pc:picChg chg="add mod">
+          <ac:chgData name="Matthew Tuck" userId="292c67f149de0640" providerId="LiveId" clId="{E167AA45-092C-45FF-8040-58DA1B5E40F4}" dt="2025-03-17T04:16:41.376" v="36" actId="164"/>
+          <ac:picMkLst>
+            <pc:docMk/>
+            <pc:sldMk cId="3750861245" sldId="264"/>
+            <ac:picMk id="5" creationId="{645C4C66-B417-4D81-9EED-4F281E66DFBD}"/>
+          </ac:picMkLst>
+        </pc:picChg>
+      </pc:sldChg>
+      <pc:sldChg chg="addSp delSp modSp new mod">
+        <pc:chgData name="Matthew Tuck" userId="292c67f149de0640" providerId="LiveId" clId="{E167AA45-092C-45FF-8040-58DA1B5E40F4}" dt="2025-03-17T04:33:39.782" v="118" actId="20577"/>
+        <pc:sldMkLst>
+          <pc:docMk/>
+          <pc:sldMk cId="868884251" sldId="265"/>
+        </pc:sldMkLst>
+        <pc:spChg chg="add mod">
+          <ac:chgData name="Matthew Tuck" userId="292c67f149de0640" providerId="LiveId" clId="{E167AA45-092C-45FF-8040-58DA1B5E40F4}" dt="2025-03-17T04:33:39.782" v="118" actId="20577"/>
+          <ac:spMkLst>
+            <pc:docMk/>
+            <pc:sldMk cId="868884251" sldId="265"/>
+            <ac:spMk id="6" creationId="{5806FD46-1CC7-9155-FCBD-FAB0327EE67B}"/>
+          </ac:spMkLst>
+        </pc:spChg>
+        <pc:picChg chg="add mod">
+          <ac:chgData name="Matthew Tuck" userId="292c67f149de0640" providerId="LiveId" clId="{E167AA45-092C-45FF-8040-58DA1B5E40F4}" dt="2025-03-17T04:28:37.515" v="68" actId="962"/>
+          <ac:picMkLst>
+            <pc:docMk/>
+            <pc:sldMk cId="868884251" sldId="265"/>
+            <ac:picMk id="5" creationId="{751FD9FD-E410-198F-DAC8-A5607844CC0F}"/>
+          </ac:picMkLst>
+        </pc:picChg>
+      </pc:sldChg>
+    </pc:docChg>
+  </pc:docChgLst>
   <pc:docChgLst>
     <pc:chgData name="Matthew Tuck" userId="292c67f149de0640" providerId="LiveId" clId="{AB2E6281-4804-4057-99C2-E96F36FD68F9}"/>
     <pc:docChg chg="undo custSel addSld modSld sldOrd">
@@ -158,22 +502,6 @@
             <ac:spMk id="3" creationId="{51E7DBA6-F2E3-2B10-D591-44D447113820}"/>
           </ac:spMkLst>
         </pc:spChg>
-        <pc:spChg chg="add del mod">
-          <ac:chgData name="Matthew Tuck" userId="292c67f149de0640" providerId="LiveId" clId="{AB2E6281-4804-4057-99C2-E96F36FD68F9}" dt="2025-02-21T20:32:16.622" v="459" actId="478"/>
-          <ac:spMkLst>
-            <pc:docMk/>
-            <pc:sldMk cId="2389168500" sldId="256"/>
-            <ac:spMk id="4" creationId="{9CC9ACDA-5246-80D9-C173-8BAF456EEA17}"/>
-          </ac:spMkLst>
-        </pc:spChg>
-        <pc:spChg chg="add del mod ord topLvl">
-          <ac:chgData name="Matthew Tuck" userId="292c67f149de0640" providerId="LiveId" clId="{AB2E6281-4804-4057-99C2-E96F36FD68F9}" dt="2025-02-21T20:41:38.014" v="518" actId="478"/>
-          <ac:spMkLst>
-            <pc:docMk/>
-            <pc:sldMk cId="2389168500" sldId="256"/>
-            <ac:spMk id="9" creationId="{D2B9D71F-8A82-B6A0-E484-7DAAAF6A8675}"/>
-          </ac:spMkLst>
-        </pc:spChg>
         <pc:spChg chg="add mod ord topLvl">
           <ac:chgData name="Matthew Tuck" userId="292c67f149de0640" providerId="LiveId" clId="{AB2E6281-4804-4057-99C2-E96F36FD68F9}" dt="2025-02-21T21:05:38.276" v="556" actId="164"/>
           <ac:spMkLst>
@@ -190,44 +518,12 @@
             <ac:grpSpMk id="6" creationId="{784A3045-DD24-4D0B-E53D-87BAECD7EB6C}"/>
           </ac:grpSpMkLst>
         </pc:grpChg>
-        <pc:grpChg chg="add del mod topLvl">
-          <ac:chgData name="Matthew Tuck" userId="292c67f149de0640" providerId="LiveId" clId="{AB2E6281-4804-4057-99C2-E96F36FD68F9}" dt="2025-02-21T20:41:33.588" v="517" actId="478"/>
-          <ac:grpSpMkLst>
-            <pc:docMk/>
-            <pc:sldMk cId="2389168500" sldId="256"/>
-            <ac:grpSpMk id="8" creationId="{45F3CB1E-5A67-1363-8DF9-09AC03A3A895}"/>
-          </ac:grpSpMkLst>
-        </pc:grpChg>
-        <pc:grpChg chg="add del mod">
-          <ac:chgData name="Matthew Tuck" userId="292c67f149de0640" providerId="LiveId" clId="{AB2E6281-4804-4057-99C2-E96F36FD68F9}" dt="2025-02-21T20:41:38.014" v="518" actId="478"/>
-          <ac:grpSpMkLst>
-            <pc:docMk/>
-            <pc:sldMk cId="2389168500" sldId="256"/>
-            <ac:grpSpMk id="10" creationId="{AFF3FC92-DBE1-034C-93BD-F4C4852E0025}"/>
-          </ac:grpSpMkLst>
-        </pc:grpChg>
         <pc:grpChg chg="add mod topLvl">
           <ac:chgData name="Matthew Tuck" userId="292c67f149de0640" providerId="LiveId" clId="{AB2E6281-4804-4057-99C2-E96F36FD68F9}" dt="2025-02-21T21:05:21.109" v="554" actId="164"/>
           <ac:grpSpMkLst>
             <pc:docMk/>
             <pc:sldMk cId="2389168500" sldId="256"/>
             <ac:grpSpMk id="15" creationId="{E2936D85-599B-6B7F-D41E-F1A30859FDD2}"/>
-          </ac:grpSpMkLst>
-        </pc:grpChg>
-        <pc:grpChg chg="add del mod ord">
-          <ac:chgData name="Matthew Tuck" userId="292c67f149de0640" providerId="LiveId" clId="{AB2E6281-4804-4057-99C2-E96F36FD68F9}" dt="2025-02-21T21:04:08.299" v="548" actId="165"/>
-          <ac:grpSpMkLst>
-            <pc:docMk/>
-            <pc:sldMk cId="2389168500" sldId="256"/>
-            <ac:grpSpMk id="17" creationId="{A16E4921-8D0C-A180-8D71-5B5F3C74F9A1}"/>
-          </ac:grpSpMkLst>
-        </pc:grpChg>
-        <pc:grpChg chg="add mod">
-          <ac:chgData name="Matthew Tuck" userId="292c67f149de0640" providerId="LiveId" clId="{AB2E6281-4804-4057-99C2-E96F36FD68F9}" dt="2025-02-21T21:05:16.203" v="553" actId="164"/>
-          <ac:grpSpMkLst>
-            <pc:docMk/>
-            <pc:sldMk cId="2389168500" sldId="256"/>
-            <ac:grpSpMk id="20" creationId="{722BA668-6448-A06D-414B-5F26580CF36C}"/>
           </ac:grpSpMkLst>
         </pc:grpChg>
         <pc:grpChg chg="add mod">
@@ -246,14 +542,6 @@
             <ac:grpSpMk id="22" creationId="{9B788C06-E1AA-B0EB-35C3-D87419595569}"/>
           </ac:grpSpMkLst>
         </pc:grpChg>
-        <pc:picChg chg="add del mod">
-          <ac:chgData name="Matthew Tuck" userId="292c67f149de0640" providerId="LiveId" clId="{AB2E6281-4804-4057-99C2-E96F36FD68F9}" dt="2025-02-21T20:41:33.588" v="517" actId="478"/>
-          <ac:picMkLst>
-            <pc:docMk/>
-            <pc:sldMk cId="2389168500" sldId="256"/>
-            <ac:picMk id="5" creationId="{73715FED-DDCE-0111-E646-37F70B39B34A}"/>
-          </ac:picMkLst>
-        </pc:picChg>
         <pc:picChg chg="mod">
           <ac:chgData name="Matthew Tuck" userId="292c67f149de0640" providerId="LiveId" clId="{AB2E6281-4804-4057-99C2-E96F36FD68F9}" dt="2025-02-21T21:05:16.203" v="553" actId="164"/>
           <ac:picMkLst>
@@ -268,14 +556,6 @@
             <pc:docMk/>
             <pc:sldMk cId="2389168500" sldId="256"/>
             <ac:picMk id="12" creationId="{A421572D-D995-4990-4FDA-5B53D073AAE5}"/>
-          </ac:picMkLst>
-        </pc:picChg>
-        <pc:picChg chg="add del mod ord">
-          <ac:chgData name="Matthew Tuck" userId="292c67f149de0640" providerId="LiveId" clId="{AB2E6281-4804-4057-99C2-E96F36FD68F9}" dt="2025-02-21T21:03:35.632" v="544" actId="478"/>
-          <ac:picMkLst>
-            <pc:docMk/>
-            <pc:sldMk cId="2389168500" sldId="256"/>
-            <ac:picMk id="14" creationId="{D135055D-0439-BA2D-751A-A339F64D914D}"/>
           </ac:picMkLst>
         </pc:picChg>
         <pc:picChg chg="add mod ord modCrop">
@@ -293,54 +573,6 @@
           <pc:docMk/>
           <pc:sldMk cId="1425793214" sldId="257"/>
         </pc:sldMkLst>
-        <pc:grpChg chg="add del mod">
-          <ac:chgData name="Matthew Tuck" userId="292c67f149de0640" providerId="LiveId" clId="{AB2E6281-4804-4057-99C2-E96F36FD68F9}" dt="2025-02-21T22:10:30.621" v="558" actId="478"/>
-          <ac:grpSpMkLst>
-            <pc:docMk/>
-            <pc:sldMk cId="1425793214" sldId="257"/>
-            <ac:grpSpMk id="10" creationId="{F656F8EF-F715-6042-806A-6FDE35AD1BDD}"/>
-          </ac:grpSpMkLst>
-        </pc:grpChg>
-        <pc:grpChg chg="add mod">
-          <ac:chgData name="Matthew Tuck" userId="292c67f149de0640" providerId="LiveId" clId="{AB2E6281-4804-4057-99C2-E96F36FD68F9}" dt="2025-02-21T22:14:00.965" v="578" actId="164"/>
-          <ac:grpSpMkLst>
-            <pc:docMk/>
-            <pc:sldMk cId="1425793214" sldId="257"/>
-            <ac:grpSpMk id="11" creationId="{76610E68-7E06-449C-CC76-F475F053FA0B}"/>
-          </ac:grpSpMkLst>
-        </pc:grpChg>
-        <pc:picChg chg="add del mod">
-          <ac:chgData name="Matthew Tuck" userId="292c67f149de0640" providerId="LiveId" clId="{AB2E6281-4804-4057-99C2-E96F36FD68F9}" dt="2025-02-21T22:12:32.288" v="562" actId="478"/>
-          <ac:picMkLst>
-            <pc:docMk/>
-            <pc:sldMk cId="1425793214" sldId="257"/>
-            <ac:picMk id="3" creationId="{A77B1627-9382-C06A-FF2A-BF84989B9695}"/>
-          </ac:picMkLst>
-        </pc:picChg>
-        <pc:picChg chg="add mod modCrop">
-          <ac:chgData name="Matthew Tuck" userId="292c67f149de0640" providerId="LiveId" clId="{AB2E6281-4804-4057-99C2-E96F36FD68F9}" dt="2025-02-21T22:14:00.965" v="578" actId="164"/>
-          <ac:picMkLst>
-            <pc:docMk/>
-            <pc:sldMk cId="1425793214" sldId="257"/>
-            <ac:picMk id="6" creationId="{65034353-7F6C-94FB-94A6-B2D97E7B9891}"/>
-          </ac:picMkLst>
-        </pc:picChg>
-        <pc:picChg chg="add mod modCrop">
-          <ac:chgData name="Matthew Tuck" userId="292c67f149de0640" providerId="LiveId" clId="{AB2E6281-4804-4057-99C2-E96F36FD68F9}" dt="2025-02-21T22:14:00.965" v="578" actId="164"/>
-          <ac:picMkLst>
-            <pc:docMk/>
-            <pc:sldMk cId="1425793214" sldId="257"/>
-            <ac:picMk id="7" creationId="{14817CAB-66B4-D7B3-D660-0C218E77F344}"/>
-          </ac:picMkLst>
-        </pc:picChg>
-        <pc:picChg chg="add mod modCrop">
-          <ac:chgData name="Matthew Tuck" userId="292c67f149de0640" providerId="LiveId" clId="{AB2E6281-4804-4057-99C2-E96F36FD68F9}" dt="2025-02-21T22:14:00.965" v="578" actId="164"/>
-          <ac:picMkLst>
-            <pc:docMk/>
-            <pc:sldMk cId="1425793214" sldId="257"/>
-            <ac:picMk id="8" creationId="{E1A83E9B-E85A-8FEE-075E-3490188BEBE4}"/>
-          </ac:picMkLst>
-        </pc:picChg>
       </pc:sldChg>
       <pc:sldChg chg="addSp delSp modSp new mod">
         <pc:chgData name="Matthew Tuck" userId="292c67f149de0640" providerId="LiveId" clId="{AB2E6281-4804-4057-99C2-E96F36FD68F9}" dt="2025-02-20T20:42:16.388" v="455" actId="478"/>
@@ -348,14 +580,6 @@
           <pc:docMk/>
           <pc:sldMk cId="142822564" sldId="258"/>
         </pc:sldMkLst>
-        <pc:picChg chg="add mod">
-          <ac:chgData name="Matthew Tuck" userId="292c67f149de0640" providerId="LiveId" clId="{AB2E6281-4804-4057-99C2-E96F36FD68F9}" dt="2025-02-20T20:42:14.661" v="454" actId="1076"/>
-          <ac:picMkLst>
-            <pc:docMk/>
-            <pc:sldMk cId="142822564" sldId="258"/>
-            <ac:picMk id="10" creationId="{09FD113B-8D14-A100-5988-EBBC754DD16A}"/>
-          </ac:picMkLst>
-        </pc:picChg>
       </pc:sldChg>
       <pc:sldChg chg="addSp delSp modSp new mod ord">
         <pc:chgData name="Matthew Tuck" userId="292c67f149de0640" providerId="LiveId" clId="{AB2E6281-4804-4057-99C2-E96F36FD68F9}" dt="2025-02-19T07:12:59.770" v="375" actId="164"/>
@@ -363,30 +587,6 @@
           <pc:docMk/>
           <pc:sldMk cId="3644617857" sldId="259"/>
         </pc:sldMkLst>
-        <pc:grpChg chg="add mod">
-          <ac:chgData name="Matthew Tuck" userId="292c67f149de0640" providerId="LiveId" clId="{AB2E6281-4804-4057-99C2-E96F36FD68F9}" dt="2025-02-19T07:12:59.770" v="375" actId="164"/>
-          <ac:grpSpMkLst>
-            <pc:docMk/>
-            <pc:sldMk cId="3644617857" sldId="259"/>
-            <ac:grpSpMk id="5" creationId="{A2373E63-1431-C970-D989-5A88D4A86958}"/>
-          </ac:grpSpMkLst>
-        </pc:grpChg>
-        <pc:picChg chg="add mod modCrop">
-          <ac:chgData name="Matthew Tuck" userId="292c67f149de0640" providerId="LiveId" clId="{AB2E6281-4804-4057-99C2-E96F36FD68F9}" dt="2025-02-19T07:12:59.770" v="375" actId="164"/>
-          <ac:picMkLst>
-            <pc:docMk/>
-            <pc:sldMk cId="3644617857" sldId="259"/>
-            <ac:picMk id="3" creationId="{4452796D-399A-CCC5-93B2-DFEE2E396468}"/>
-          </ac:picMkLst>
-        </pc:picChg>
-        <pc:picChg chg="add mod modCrop">
-          <ac:chgData name="Matthew Tuck" userId="292c67f149de0640" providerId="LiveId" clId="{AB2E6281-4804-4057-99C2-E96F36FD68F9}" dt="2025-02-19T07:12:59.770" v="375" actId="164"/>
-          <ac:picMkLst>
-            <pc:docMk/>
-            <pc:sldMk cId="3644617857" sldId="259"/>
-            <ac:picMk id="4" creationId="{1E557525-031E-A12B-9100-AB97148968C2}"/>
-          </ac:picMkLst>
-        </pc:picChg>
       </pc:sldChg>
       <pc:sldChg chg="addSp delSp modSp new mod">
         <pc:chgData name="Matthew Tuck" userId="292c67f149de0640" providerId="LiveId" clId="{AB2E6281-4804-4057-99C2-E96F36FD68F9}" dt="2025-02-18T00:05:08.179" v="126" actId="1076"/>
@@ -394,14 +594,6 @@
           <pc:docMk/>
           <pc:sldMk cId="776127107" sldId="260"/>
         </pc:sldMkLst>
-        <pc:picChg chg="add mod">
-          <ac:chgData name="Matthew Tuck" userId="292c67f149de0640" providerId="LiveId" clId="{AB2E6281-4804-4057-99C2-E96F36FD68F9}" dt="2025-02-18T00:05:08.179" v="126" actId="1076"/>
-          <ac:picMkLst>
-            <pc:docMk/>
-            <pc:sldMk cId="776127107" sldId="260"/>
-            <ac:picMk id="10" creationId="{B60B9C24-D9ED-6246-505F-3054A2C8B955}"/>
-          </ac:picMkLst>
-        </pc:picChg>
       </pc:sldChg>
       <pc:sldChg chg="addSp delSp modSp new mod">
         <pc:chgData name="Matthew Tuck" userId="292c67f149de0640" providerId="LiveId" clId="{AB2E6281-4804-4057-99C2-E96F36FD68F9}" dt="2025-02-22T18:40:58.774" v="741" actId="478"/>
@@ -409,54 +601,6 @@
           <pc:docMk/>
           <pc:sldMk cId="2830423783" sldId="261"/>
         </pc:sldMkLst>
-        <pc:spChg chg="add del mod">
-          <ac:chgData name="Matthew Tuck" userId="292c67f149de0640" providerId="LiveId" clId="{AB2E6281-4804-4057-99C2-E96F36FD68F9}" dt="2025-02-22T18:40:58.774" v="741" actId="478"/>
-          <ac:spMkLst>
-            <pc:docMk/>
-            <pc:sldMk cId="2830423783" sldId="261"/>
-            <ac:spMk id="8" creationId="{9EB36AFD-B771-F828-4318-53E469C11A47}"/>
-          </ac:spMkLst>
-        </pc:spChg>
-        <pc:grpChg chg="add mod">
-          <ac:chgData name="Matthew Tuck" userId="292c67f149de0640" providerId="LiveId" clId="{AB2E6281-4804-4057-99C2-E96F36FD68F9}" dt="2025-02-22T18:37:28.417" v="738" actId="164"/>
-          <ac:grpSpMkLst>
-            <pc:docMk/>
-            <pc:sldMk cId="2830423783" sldId="261"/>
-            <ac:grpSpMk id="7" creationId="{096B1D4B-FF7D-5E0A-C0C5-B5E4D3848CD9}"/>
-          </ac:grpSpMkLst>
-        </pc:grpChg>
-        <pc:grpChg chg="add del mod">
-          <ac:chgData name="Matthew Tuck" userId="292c67f149de0640" providerId="LiveId" clId="{AB2E6281-4804-4057-99C2-E96F36FD68F9}" dt="2025-02-22T18:35:23.564" v="717" actId="478"/>
-          <ac:grpSpMkLst>
-            <pc:docMk/>
-            <pc:sldMk cId="2830423783" sldId="261"/>
-            <ac:grpSpMk id="31" creationId="{CD712030-F784-FD51-0F4B-35CB01AFC15F}"/>
-          </ac:grpSpMkLst>
-        </pc:grpChg>
-        <pc:picChg chg="add mod modCrop">
-          <ac:chgData name="Matthew Tuck" userId="292c67f149de0640" providerId="LiveId" clId="{AB2E6281-4804-4057-99C2-E96F36FD68F9}" dt="2025-02-22T18:37:28.417" v="738" actId="164"/>
-          <ac:picMkLst>
-            <pc:docMk/>
-            <pc:sldMk cId="2830423783" sldId="261"/>
-            <ac:picMk id="3" creationId="{9BDEE49D-E3AD-E56E-07F8-997759D50B81}"/>
-          </ac:picMkLst>
-        </pc:picChg>
-        <pc:picChg chg="add mod">
-          <ac:chgData name="Matthew Tuck" userId="292c67f149de0640" providerId="LiveId" clId="{AB2E6281-4804-4057-99C2-E96F36FD68F9}" dt="2025-02-22T18:37:28.417" v="738" actId="164"/>
-          <ac:picMkLst>
-            <pc:docMk/>
-            <pc:sldMk cId="2830423783" sldId="261"/>
-            <ac:picMk id="5" creationId="{5125FB7B-CF25-DFCD-8C37-5B6B60B18B43}"/>
-          </ac:picMkLst>
-        </pc:picChg>
-        <pc:picChg chg="add mod modCrop">
-          <ac:chgData name="Matthew Tuck" userId="292c67f149de0640" providerId="LiveId" clId="{AB2E6281-4804-4057-99C2-E96F36FD68F9}" dt="2025-02-22T18:37:28.417" v="738" actId="164"/>
-          <ac:picMkLst>
-            <pc:docMk/>
-            <pc:sldMk cId="2830423783" sldId="261"/>
-            <ac:picMk id="6" creationId="{306A13BA-3C1F-9234-F87F-518D68AA8AB8}"/>
-          </ac:picMkLst>
-        </pc:picChg>
       </pc:sldChg>
       <pc:sldChg chg="addSp delSp modSp new mod">
         <pc:chgData name="Matthew Tuck" userId="292c67f149de0640" providerId="LiveId" clId="{AB2E6281-4804-4057-99C2-E96F36FD68F9}" dt="2025-02-22T17:18:47.881" v="716" actId="164"/>
@@ -472,14 +616,6 @@
             <ac:spMk id="6" creationId="{687D9B0E-AC76-43F7-0857-3BE53FFFDBAC}"/>
           </ac:spMkLst>
         </pc:spChg>
-        <pc:spChg chg="del mod">
-          <ac:chgData name="Matthew Tuck" userId="292c67f149de0640" providerId="LiveId" clId="{AB2E6281-4804-4057-99C2-E96F36FD68F9}" dt="2025-02-22T17:17:11.709" v="691" actId="478"/>
-          <ac:spMkLst>
-            <pc:docMk/>
-            <pc:sldMk cId="3795613774" sldId="262"/>
-            <ac:spMk id="7" creationId="{25F5C2B4-E217-1BAC-A558-182F225D58DD}"/>
-          </ac:spMkLst>
-        </pc:spChg>
         <pc:spChg chg="mod">
           <ac:chgData name="Matthew Tuck" userId="292c67f149de0640" providerId="LiveId" clId="{AB2E6281-4804-4057-99C2-E96F36FD68F9}" dt="2025-02-22T17:18:37.901" v="715" actId="1076"/>
           <ac:spMkLst>
@@ -488,118 +624,6 @@
             <ac:spMk id="8" creationId="{869983BB-BB3D-4E23-6071-C20E2D0FC985}"/>
           </ac:spMkLst>
         </pc:spChg>
-        <pc:spChg chg="add del mod">
-          <ac:chgData name="Matthew Tuck" userId="292c67f149de0640" providerId="LiveId" clId="{AB2E6281-4804-4057-99C2-E96F36FD68F9}" dt="2025-02-22T17:16:53.499" v="687" actId="478"/>
-          <ac:spMkLst>
-            <pc:docMk/>
-            <pc:sldMk cId="3795613774" sldId="262"/>
-            <ac:spMk id="9" creationId="{5BC836D0-930A-0832-0B9D-1C5A71502423}"/>
-          </ac:spMkLst>
-        </pc:spChg>
-        <pc:spChg chg="add mod">
-          <ac:chgData name="Matthew Tuck" userId="292c67f149de0640" providerId="LiveId" clId="{AB2E6281-4804-4057-99C2-E96F36FD68F9}" dt="2025-02-22T17:16:03.540" v="681" actId="255"/>
-          <ac:spMkLst>
-            <pc:docMk/>
-            <pc:sldMk cId="3795613774" sldId="262"/>
-            <ac:spMk id="10" creationId="{3F0D060B-3D42-DC8C-7C86-23F40725FDE2}"/>
-          </ac:spMkLst>
-        </pc:spChg>
-        <pc:spChg chg="del mod">
-          <ac:chgData name="Matthew Tuck" userId="292c67f149de0640" providerId="LiveId" clId="{AB2E6281-4804-4057-99C2-E96F36FD68F9}" dt="2025-02-22T17:17:16.250" v="692" actId="478"/>
-          <ac:spMkLst>
-            <pc:docMk/>
-            <pc:sldMk cId="3795613774" sldId="262"/>
-            <ac:spMk id="11" creationId="{4D43A66B-A39A-522D-444F-BD1C4270BEF9}"/>
-          </ac:spMkLst>
-        </pc:spChg>
-        <pc:spChg chg="add del mod">
-          <ac:chgData name="Matthew Tuck" userId="292c67f149de0640" providerId="LiveId" clId="{AB2E6281-4804-4057-99C2-E96F36FD68F9}" dt="2025-02-22T17:16:58.625" v="688" actId="478"/>
-          <ac:spMkLst>
-            <pc:docMk/>
-            <pc:sldMk cId="3795613774" sldId="262"/>
-            <ac:spMk id="12" creationId="{06575918-4A5F-D3E4-A594-24914BAAA96B}"/>
-          </ac:spMkLst>
-        </pc:spChg>
-        <pc:spChg chg="mod">
-          <ac:chgData name="Matthew Tuck" userId="292c67f149de0640" providerId="LiveId" clId="{AB2E6281-4804-4057-99C2-E96F36FD68F9}" dt="2025-02-22T17:16:28.088" v="682"/>
-          <ac:spMkLst>
-            <pc:docMk/>
-            <pc:sldMk cId="3795613774" sldId="262"/>
-            <ac:spMk id="14" creationId="{73E64907-2A63-100C-A7DC-4DABC17B8AF4}"/>
-          </ac:spMkLst>
-        </pc:spChg>
-        <pc:grpChg chg="add mod">
-          <ac:chgData name="Matthew Tuck" userId="292c67f149de0640" providerId="LiveId" clId="{AB2E6281-4804-4057-99C2-E96F36FD68F9}" dt="2025-02-22T17:18:47.881" v="716" actId="164"/>
-          <ac:grpSpMkLst>
-            <pc:docMk/>
-            <pc:sldMk cId="3795613774" sldId="262"/>
-            <ac:grpSpMk id="2" creationId="{57014079-8C6B-DF5B-5220-C97EFEF39B88}"/>
-          </ac:grpSpMkLst>
-        </pc:grpChg>
-        <pc:grpChg chg="mod">
-          <ac:chgData name="Matthew Tuck" userId="292c67f149de0640" providerId="LiveId" clId="{AB2E6281-4804-4057-99C2-E96F36FD68F9}" dt="2025-02-22T17:16:28.088" v="682"/>
-          <ac:grpSpMkLst>
-            <pc:docMk/>
-            <pc:sldMk cId="3795613774" sldId="262"/>
-            <ac:grpSpMk id="5" creationId="{34CD3BE2-3011-DD5C-4629-7A013C532416}"/>
-          </ac:grpSpMkLst>
-        </pc:grpChg>
-        <pc:grpChg chg="add mod">
-          <ac:chgData name="Matthew Tuck" userId="292c67f149de0640" providerId="LiveId" clId="{AB2E6281-4804-4057-99C2-E96F36FD68F9}" dt="2025-02-19T07:23:07.476" v="407" actId="164"/>
-          <ac:grpSpMkLst>
-            <pc:docMk/>
-            <pc:sldMk cId="3795613774" sldId="262"/>
-            <ac:grpSpMk id="13" creationId="{A6120170-CA4C-63BE-7372-3070ED21747D}"/>
-          </ac:grpSpMkLst>
-        </pc:grpChg>
-        <pc:grpChg chg="add mod">
-          <ac:chgData name="Matthew Tuck" userId="292c67f149de0640" providerId="LiveId" clId="{AB2E6281-4804-4057-99C2-E96F36FD68F9}" dt="2025-02-22T17:18:47.881" v="716" actId="164"/>
-          <ac:grpSpMkLst>
-            <pc:docMk/>
-            <pc:sldMk cId="3795613774" sldId="262"/>
-            <ac:grpSpMk id="15" creationId="{FD6A2E26-2E21-9DB8-D0FB-591A5605D15A}"/>
-          </ac:grpSpMkLst>
-        </pc:grpChg>
-        <pc:grpChg chg="add mod">
-          <ac:chgData name="Matthew Tuck" userId="292c67f149de0640" providerId="LiveId" clId="{AB2E6281-4804-4057-99C2-E96F36FD68F9}" dt="2025-02-22T17:18:47.881" v="716" actId="164"/>
-          <ac:grpSpMkLst>
-            <pc:docMk/>
-            <pc:sldMk cId="3795613774" sldId="262"/>
-            <ac:grpSpMk id="20" creationId="{43BEE5C5-EC88-031C-7171-149399CEF928}"/>
-          </ac:grpSpMkLst>
-        </pc:grpChg>
-        <pc:picChg chg="mod">
-          <ac:chgData name="Matthew Tuck" userId="292c67f149de0640" providerId="LiveId" clId="{AB2E6281-4804-4057-99C2-E96F36FD68F9}" dt="2025-02-22T17:16:28.088" v="682"/>
-          <ac:picMkLst>
-            <pc:docMk/>
-            <pc:sldMk cId="3795613774" sldId="262"/>
-            <ac:picMk id="3" creationId="{10C6EFCA-B1BB-F921-31E8-A1D27DF1095F}"/>
-          </ac:picMkLst>
-        </pc:picChg>
-        <pc:picChg chg="del mod">
-          <ac:chgData name="Matthew Tuck" userId="292c67f149de0640" providerId="LiveId" clId="{AB2E6281-4804-4057-99C2-E96F36FD68F9}" dt="2025-02-22T17:17:08.046" v="690" actId="478"/>
-          <ac:picMkLst>
-            <pc:docMk/>
-            <pc:sldMk cId="3795613774" sldId="262"/>
-            <ac:picMk id="4" creationId="{97AF3CFE-0BE1-80BA-5BFB-84F8BEC73170}"/>
-          </ac:picMkLst>
-        </pc:picChg>
-        <pc:picChg chg="add del mod ord">
-          <ac:chgData name="Matthew Tuck" userId="292c67f149de0640" providerId="LiveId" clId="{AB2E6281-4804-4057-99C2-E96F36FD68F9}" dt="2025-02-22T17:16:48.324" v="685" actId="478"/>
-          <ac:picMkLst>
-            <pc:docMk/>
-            <pc:sldMk cId="3795613774" sldId="262"/>
-            <ac:picMk id="17" creationId="{801F4385-B5ED-36B1-E5F7-6D60E34712DA}"/>
-          </ac:picMkLst>
-        </pc:picChg>
-        <pc:picChg chg="add mod ord">
-          <ac:chgData name="Matthew Tuck" userId="292c67f149de0640" providerId="LiveId" clId="{AB2E6281-4804-4057-99C2-E96F36FD68F9}" dt="2025-02-19T07:23:07.476" v="407" actId="164"/>
-          <ac:picMkLst>
-            <pc:docMk/>
-            <pc:sldMk cId="3795613774" sldId="262"/>
-            <ac:picMk id="19" creationId="{FEA61C3B-4816-25CE-FC2F-984AA99D3ABA}"/>
-          </ac:picMkLst>
-        </pc:picChg>
       </pc:sldChg>
       <pc:sldChg chg="addSp delSp modSp new mod">
         <pc:chgData name="Matthew Tuck" userId="292c67f149de0640" providerId="LiveId" clId="{AB2E6281-4804-4057-99C2-E96F36FD68F9}" dt="2025-02-22T17:14:29.158" v="675" actId="164"/>
@@ -607,70 +631,6 @@
           <pc:docMk/>
           <pc:sldMk cId="708817653" sldId="263"/>
         </pc:sldMkLst>
-        <pc:spChg chg="add del mod">
-          <ac:chgData name="Matthew Tuck" userId="292c67f149de0640" providerId="LiveId" clId="{AB2E6281-4804-4057-99C2-E96F36FD68F9}" dt="2025-02-22T16:45:03.056" v="605" actId="478"/>
-          <ac:spMkLst>
-            <pc:docMk/>
-            <pc:sldMk cId="708817653" sldId="263"/>
-            <ac:spMk id="4" creationId="{FF8C61F6-4238-B6A7-5615-06DFC49D0F52}"/>
-          </ac:spMkLst>
-        </pc:spChg>
-        <pc:spChg chg="add del">
-          <ac:chgData name="Matthew Tuck" userId="292c67f149de0640" providerId="LiveId" clId="{AB2E6281-4804-4057-99C2-E96F36FD68F9}" dt="2025-02-22T16:46:08.733" v="607" actId="478"/>
-          <ac:spMkLst>
-            <pc:docMk/>
-            <pc:sldMk cId="708817653" sldId="263"/>
-            <ac:spMk id="5" creationId="{A2E5AFF2-4026-E724-EC11-09AC274B3EF8}"/>
-          </ac:spMkLst>
-        </pc:spChg>
-        <pc:spChg chg="add del mod">
-          <ac:chgData name="Matthew Tuck" userId="292c67f149de0640" providerId="LiveId" clId="{AB2E6281-4804-4057-99C2-E96F36FD68F9}" dt="2025-02-22T16:55:05.891" v="650" actId="478"/>
-          <ac:spMkLst>
-            <pc:docMk/>
-            <pc:sldMk cId="708817653" sldId="263"/>
-            <ac:spMk id="6" creationId="{79395956-541F-35E9-3C3D-43569CCF22B0}"/>
-          </ac:spMkLst>
-        </pc:spChg>
-        <pc:spChg chg="add mod">
-          <ac:chgData name="Matthew Tuck" userId="292c67f149de0640" providerId="LiveId" clId="{AB2E6281-4804-4057-99C2-E96F36FD68F9}" dt="2025-02-22T17:13:33.408" v="667" actId="164"/>
-          <ac:spMkLst>
-            <pc:docMk/>
-            <pc:sldMk cId="708817653" sldId="263"/>
-            <ac:spMk id="7" creationId="{E0E921C2-3B6C-059D-30B7-532E2C5D1A4B}"/>
-          </ac:spMkLst>
-        </pc:spChg>
-        <pc:spChg chg="add mod">
-          <ac:chgData name="Matthew Tuck" userId="292c67f149de0640" providerId="LiveId" clId="{AB2E6281-4804-4057-99C2-E96F36FD68F9}" dt="2025-02-22T17:14:29.158" v="675" actId="164"/>
-          <ac:spMkLst>
-            <pc:docMk/>
-            <pc:sldMk cId="708817653" sldId="263"/>
-            <ac:spMk id="9" creationId="{9EDC704A-4B74-1D52-2C35-B3C188B23E2B}"/>
-          </ac:spMkLst>
-        </pc:spChg>
-        <pc:grpChg chg="add mod">
-          <ac:chgData name="Matthew Tuck" userId="292c67f149de0640" providerId="LiveId" clId="{AB2E6281-4804-4057-99C2-E96F36FD68F9}" dt="2025-02-22T17:14:29.158" v="675" actId="164"/>
-          <ac:grpSpMkLst>
-            <pc:docMk/>
-            <pc:sldMk cId="708817653" sldId="263"/>
-            <ac:grpSpMk id="8" creationId="{4B096DDE-6996-3CF8-F55C-03A8708B9AF8}"/>
-          </ac:grpSpMkLst>
-        </pc:grpChg>
-        <pc:grpChg chg="add mod">
-          <ac:chgData name="Matthew Tuck" userId="292c67f149de0640" providerId="LiveId" clId="{AB2E6281-4804-4057-99C2-E96F36FD68F9}" dt="2025-02-22T17:14:29.158" v="675" actId="164"/>
-          <ac:grpSpMkLst>
-            <pc:docMk/>
-            <pc:sldMk cId="708817653" sldId="263"/>
-            <ac:grpSpMk id="10" creationId="{33CC3CEF-79EE-33D6-DD7A-0D4B9B779CC5}"/>
-          </ac:grpSpMkLst>
-        </pc:grpChg>
-        <pc:picChg chg="add mod">
-          <ac:chgData name="Matthew Tuck" userId="292c67f149de0640" providerId="LiveId" clId="{AB2E6281-4804-4057-99C2-E96F36FD68F9}" dt="2025-02-22T17:13:33.408" v="667" actId="164"/>
-          <ac:picMkLst>
-            <pc:docMk/>
-            <pc:sldMk cId="708817653" sldId="263"/>
-            <ac:picMk id="3" creationId="{A347563D-9FC3-4054-7D5F-6AD821AF5F06}"/>
-          </ac:picMkLst>
-        </pc:picChg>
       </pc:sldChg>
     </pc:docChg>
   </pc:docChgLst>
@@ -826,7 +786,7 @@
           <a:p>
             <a:fld id="{636EB128-D63D-478F-A8AE-19C70145D55B}" type="datetimeFigureOut">
               <a:rPr lang="en-CA" smtClean="0"/>
-              <a:t>2025-02-21</a:t>
+              <a:t>2025-03-14</a:t>
             </a:fld>
             <a:endParaRPr lang="en-CA"/>
           </a:p>
@@ -1026,7 +986,7 @@
           <a:p>
             <a:fld id="{636EB128-D63D-478F-A8AE-19C70145D55B}" type="datetimeFigureOut">
               <a:rPr lang="en-CA" smtClean="0"/>
-              <a:t>2025-02-21</a:t>
+              <a:t>2025-03-14</a:t>
             </a:fld>
             <a:endParaRPr lang="en-CA"/>
           </a:p>
@@ -1236,7 +1196,7 @@
           <a:p>
             <a:fld id="{636EB128-D63D-478F-A8AE-19C70145D55B}" type="datetimeFigureOut">
               <a:rPr lang="en-CA" smtClean="0"/>
-              <a:t>2025-02-21</a:t>
+              <a:t>2025-03-14</a:t>
             </a:fld>
             <a:endParaRPr lang="en-CA"/>
           </a:p>
@@ -1436,7 +1396,7 @@
           <a:p>
             <a:fld id="{636EB128-D63D-478F-A8AE-19C70145D55B}" type="datetimeFigureOut">
               <a:rPr lang="en-CA" smtClean="0"/>
-              <a:t>2025-02-21</a:t>
+              <a:t>2025-03-14</a:t>
             </a:fld>
             <a:endParaRPr lang="en-CA"/>
           </a:p>
@@ -1712,7 +1672,7 @@
           <a:p>
             <a:fld id="{636EB128-D63D-478F-A8AE-19C70145D55B}" type="datetimeFigureOut">
               <a:rPr lang="en-CA" smtClean="0"/>
-              <a:t>2025-02-21</a:t>
+              <a:t>2025-03-14</a:t>
             </a:fld>
             <a:endParaRPr lang="en-CA"/>
           </a:p>
@@ -1980,7 +1940,7 @@
           <a:p>
             <a:fld id="{636EB128-D63D-478F-A8AE-19C70145D55B}" type="datetimeFigureOut">
               <a:rPr lang="en-CA" smtClean="0"/>
-              <a:t>2025-02-21</a:t>
+              <a:t>2025-03-14</a:t>
             </a:fld>
             <a:endParaRPr lang="en-CA"/>
           </a:p>
@@ -2395,7 +2355,7 @@
           <a:p>
             <a:fld id="{636EB128-D63D-478F-A8AE-19C70145D55B}" type="datetimeFigureOut">
               <a:rPr lang="en-CA" smtClean="0"/>
-              <a:t>2025-02-21</a:t>
+              <a:t>2025-03-14</a:t>
             </a:fld>
             <a:endParaRPr lang="en-CA"/>
           </a:p>
@@ -2537,7 +2497,7 @@
           <a:p>
             <a:fld id="{636EB128-D63D-478F-A8AE-19C70145D55B}" type="datetimeFigureOut">
               <a:rPr lang="en-CA" smtClean="0"/>
-              <a:t>2025-02-21</a:t>
+              <a:t>2025-03-14</a:t>
             </a:fld>
             <a:endParaRPr lang="en-CA"/>
           </a:p>
@@ -2650,7 +2610,7 @@
           <a:p>
             <a:fld id="{636EB128-D63D-478F-A8AE-19C70145D55B}" type="datetimeFigureOut">
               <a:rPr lang="en-CA" smtClean="0"/>
-              <a:t>2025-02-21</a:t>
+              <a:t>2025-03-14</a:t>
             </a:fld>
             <a:endParaRPr lang="en-CA"/>
           </a:p>
@@ -2963,7 +2923,7 @@
           <a:p>
             <a:fld id="{636EB128-D63D-478F-A8AE-19C70145D55B}" type="datetimeFigureOut">
               <a:rPr lang="en-CA" smtClean="0"/>
-              <a:t>2025-02-21</a:t>
+              <a:t>2025-03-14</a:t>
             </a:fld>
             <a:endParaRPr lang="en-CA"/>
           </a:p>
@@ -3252,7 +3212,7 @@
           <a:p>
             <a:fld id="{636EB128-D63D-478F-A8AE-19C70145D55B}" type="datetimeFigureOut">
               <a:rPr lang="en-CA" smtClean="0"/>
-              <a:t>2025-02-21</a:t>
+              <a:t>2025-03-14</a:t>
             </a:fld>
             <a:endParaRPr lang="en-CA"/>
           </a:p>
@@ -3495,7 +3455,7 @@
           <a:p>
             <a:fld id="{636EB128-D63D-478F-A8AE-19C70145D55B}" type="datetimeFigureOut">
               <a:rPr lang="en-CA" smtClean="0"/>
-              <a:t>2025-02-21</a:t>
+              <a:t>2025-03-14</a:t>
             </a:fld>
             <a:endParaRPr lang="en-CA"/>
           </a:p>
@@ -3926,10 +3886,10 @@
         </p:nvGrpSpPr>
         <p:grpSpPr>
           <a:xfrm>
-            <a:off x="2419108" y="535329"/>
-            <a:ext cx="7639292" cy="5787341"/>
+            <a:off x="5471160" y="2987040"/>
+            <a:ext cx="4587240" cy="3391860"/>
             <a:chOff x="2511706" y="578734"/>
-            <a:chExt cx="7639292" cy="5787341"/>
+            <a:chExt cx="7639292" cy="5884900"/>
           </a:xfrm>
         </p:grpSpPr>
         <p:sp>
@@ -4000,10 +3960,10 @@
           </p:nvGrpSpPr>
           <p:grpSpPr>
             <a:xfrm>
-              <a:off x="2649186" y="704457"/>
-              <a:ext cx="7501812" cy="5534298"/>
-              <a:chOff x="2626036" y="723050"/>
-              <a:chExt cx="7501812" cy="5534298"/>
+              <a:off x="2549366" y="704457"/>
+              <a:ext cx="7601632" cy="5759177"/>
+              <a:chOff x="2526216" y="723050"/>
+              <a:chExt cx="7601632" cy="5759177"/>
             </a:xfrm>
           </p:grpSpPr>
           <p:pic>
@@ -4055,10 +4015,10 @@
             </p:nvGrpSpPr>
             <p:grpSpPr>
               <a:xfrm>
-                <a:off x="2626036" y="723050"/>
-                <a:ext cx="7501812" cy="5534298"/>
-                <a:chOff x="2613352" y="706888"/>
-                <a:chExt cx="6669543" cy="4914458"/>
+                <a:off x="2526216" y="723050"/>
+                <a:ext cx="7601632" cy="5759177"/>
+                <a:chOff x="2524606" y="706888"/>
+                <a:chExt cx="6758289" cy="5114151"/>
               </a:xfrm>
             </p:grpSpPr>
             <p:grpSp>
@@ -4075,10 +4035,10 @@
               </p:nvGrpSpPr>
               <p:grpSpPr>
                 <a:xfrm>
-                  <a:off x="2613352" y="706888"/>
-                  <a:ext cx="6669543" cy="4914458"/>
-                  <a:chOff x="2613352" y="706888"/>
-                  <a:chExt cx="6669543" cy="4914458"/>
+                  <a:off x="2524606" y="706888"/>
+                  <a:ext cx="6758289" cy="5114151"/>
+                  <a:chOff x="2524606" y="706888"/>
+                  <a:chExt cx="6758289" cy="5114151"/>
                 </a:xfrm>
               </p:grpSpPr>
               <p:pic>
@@ -4134,7 +4094,7 @@
                 <p:spPr>
                   <a:xfrm>
                     <a:off x="2613352" y="5252014"/>
-                    <a:ext cx="6669543" cy="369332"/>
+                    <a:ext cx="6669543" cy="569025"/>
                   </a:xfrm>
                   <a:prstGeom prst="rect">
                     <a:avLst/>
@@ -4153,7 +4113,18 @@
                     <a:pPr algn="ctr"/>
                     <a:r>
                       <a:rPr lang="en-CA" dirty="0"/>
-                      <a:t>   Longitude</a:t>
+                      <a:t>   </a:t>
+                    </a:r>
+                    <a:r>
+                      <a:rPr lang="en-CA" dirty="0">
+                        <a:solidFill>
+                          <a:schemeClr val="tx1">
+                            <a:lumMod val="50000"/>
+                            <a:lumOff val="50000"/>
+                          </a:schemeClr>
+                        </a:solidFill>
+                      </a:rPr>
+                      <a:t>Longitude</a:t>
                     </a:r>
                   </a:p>
                 </p:txBody>
@@ -4172,8 +4143,8 @@
                 </p:nvSpPr>
                 <p:spPr>
                   <a:xfrm rot="16200000">
-                    <a:off x="420942" y="2899298"/>
-                    <a:ext cx="4754152" cy="369332"/>
+                    <a:off x="420942" y="2810552"/>
+                    <a:ext cx="4754153" cy="546825"/>
                   </a:xfrm>
                   <a:prstGeom prst="rect">
                     <a:avLst/>
@@ -4191,7 +4162,14 @@
                   <a:p>
                     <a:pPr algn="ctr"/>
                     <a:r>
-                      <a:rPr lang="en-CA" dirty="0"/>
+                      <a:rPr lang="en-CA" dirty="0">
+                        <a:solidFill>
+                          <a:schemeClr val="tx1">
+                            <a:lumMod val="50000"/>
+                            <a:lumOff val="50000"/>
+                          </a:schemeClr>
+                        </a:solidFill>
+                      </a:rPr>
                       <a:t>Latitude</a:t>
                     </a:r>
                   </a:p>
@@ -4292,10 +4270,10 @@
       </p:grpSpPr>
       <p:grpSp>
         <p:nvGrpSpPr>
-          <p:cNvPr id="11" name="Group 10">
-            <a:extLst>
-              <a:ext uri="{FF2B5EF4-FFF2-40B4-BE49-F238E27FC236}">
-                <a16:creationId xmlns:a16="http://schemas.microsoft.com/office/drawing/2014/main" id="{76610E68-7E06-449C-CC76-F475F053FA0B}"/>
+          <p:cNvPr id="12" name="Group 11">
+            <a:extLst>
+              <a:ext uri="{FF2B5EF4-FFF2-40B4-BE49-F238E27FC236}">
+                <a16:creationId xmlns:a16="http://schemas.microsoft.com/office/drawing/2014/main" id="{FD8A2F96-DE04-3ABB-1F2D-678C993328B3}"/>
               </a:ext>
             </a:extLst>
           </p:cNvPr>
@@ -4304,18 +4282,18 @@
         </p:nvGrpSpPr>
         <p:grpSpPr>
           <a:xfrm>
-            <a:off x="358815" y="118600"/>
-            <a:ext cx="10187484" cy="6739400"/>
-            <a:chOff x="358815" y="118600"/>
-            <a:chExt cx="10187484" cy="6739400"/>
+            <a:off x="201385" y="381000"/>
+            <a:ext cx="11789229" cy="6096000"/>
+            <a:chOff x="402771" y="381000"/>
+            <a:chExt cx="11789229" cy="6096000"/>
           </a:xfrm>
         </p:grpSpPr>
         <p:pic>
           <p:nvPicPr>
-            <p:cNvPr id="6" name="Picture 5" descr="A comparison of different species&#10;&#10;AI-generated content may be incorrect.">
+            <p:cNvPr id="5" name="Picture 4" descr="A comparison of different colored bars&#10;&#10;AI-generated content may be incorrect.">
               <a:extLst>
                 <a:ext uri="{FF2B5EF4-FFF2-40B4-BE49-F238E27FC236}">
-                  <a16:creationId xmlns:a16="http://schemas.microsoft.com/office/drawing/2014/main" id="{65034353-7F6C-94FB-94A6-B2D97E7B9891}"/>
+                  <a16:creationId xmlns:a16="http://schemas.microsoft.com/office/drawing/2014/main" id="{47130567-AE6B-2F90-553D-F6A39C881D2E}"/>
                 </a:ext>
               </a:extLst>
             </p:cNvPr>
@@ -4332,13 +4310,13 @@
                 </a:ext>
               </a:extLst>
             </a:blip>
-            <a:srcRect l="-188" r="67990"/>
+            <a:srcRect l="48929" r="12322"/>
             <a:stretch/>
           </p:blipFill>
           <p:spPr>
             <a:xfrm>
-              <a:off x="358815" y="118600"/>
-              <a:ext cx="3680750" cy="6620799"/>
+              <a:off x="5040085" y="381000"/>
+              <a:ext cx="4724401" cy="6096000"/>
             </a:xfrm>
             <a:prstGeom prst="rect">
               <a:avLst/>
@@ -4347,10 +4325,10 @@
         </p:pic>
         <p:pic>
           <p:nvPicPr>
-            <p:cNvPr id="7" name="Picture 6" descr="A comparison of different species&#10;&#10;AI-generated content may be incorrect.">
+            <p:cNvPr id="9" name="Picture 8" descr="A comparison of different colored bars&#10;&#10;AI-generated content may be incorrect.">
               <a:extLst>
                 <a:ext uri="{FF2B5EF4-FFF2-40B4-BE49-F238E27FC236}">
-                  <a16:creationId xmlns:a16="http://schemas.microsoft.com/office/drawing/2014/main" id="{14817CAB-66B4-D7B3-D660-0C218E77F344}"/>
+                  <a16:creationId xmlns:a16="http://schemas.microsoft.com/office/drawing/2014/main" id="{1844B638-8D99-ADBF-C775-CBCE83BCFA0D}"/>
                 </a:ext>
               </a:extLst>
             </p:cNvPr>
@@ -4367,13 +4345,13 @@
                 </a:ext>
               </a:extLst>
             </a:blip>
-            <a:srcRect l="48666" r="20418"/>
+            <a:srcRect r="61964"/>
             <a:stretch/>
           </p:blipFill>
           <p:spPr>
             <a:xfrm>
-              <a:off x="4186177" y="118600"/>
-              <a:ext cx="3534138" cy="6620799"/>
+              <a:off x="402771" y="381000"/>
+              <a:ext cx="4637314" cy="6096000"/>
             </a:xfrm>
             <a:prstGeom prst="rect">
               <a:avLst/>
@@ -4382,10 +4360,10 @@
         </p:pic>
         <p:pic>
           <p:nvPicPr>
-            <p:cNvPr id="8" name="Picture 7" descr="A comparison of different species&#10;&#10;AI-generated content may be incorrect.">
+            <p:cNvPr id="10" name="Picture 9" descr="A comparison of different colored bars&#10;&#10;AI-generated content may be incorrect.">
               <a:extLst>
                 <a:ext uri="{FF2B5EF4-FFF2-40B4-BE49-F238E27FC236}">
-                  <a16:creationId xmlns:a16="http://schemas.microsoft.com/office/drawing/2014/main" id="{E1A83E9B-E85A-8FEE-075E-3490188BEBE4}"/>
+                  <a16:creationId xmlns:a16="http://schemas.microsoft.com/office/drawing/2014/main" id="{011F2306-33E6-8C9C-8F88-47A957AB5341}"/>
                 </a:ext>
               </a:extLst>
             </p:cNvPr>
@@ -4402,13 +4380,13 @@
                 </a:ext>
               </a:extLst>
             </a:blip>
-            <a:srcRect l="79059"/>
+            <a:srcRect l="87411" t="13215" b="22142"/>
             <a:stretch/>
           </p:blipFill>
           <p:spPr>
             <a:xfrm>
-              <a:off x="8152437" y="237201"/>
-              <a:ext cx="2393862" cy="6620799"/>
+              <a:off x="9968309" y="381000"/>
+              <a:ext cx="2223691" cy="5709054"/>
             </a:xfrm>
             <a:prstGeom prst="rect">
               <a:avLst/>
@@ -4448,10 +4426,10 @@
       </p:grpSpPr>
       <p:pic>
         <p:nvPicPr>
-          <p:cNvPr id="10" name="Picture 9" descr="A graph of different species&#10;&#10;AI-generated content may be incorrect.">
-            <a:extLst>
-              <a:ext uri="{FF2B5EF4-FFF2-40B4-BE49-F238E27FC236}">
-                <a16:creationId xmlns:a16="http://schemas.microsoft.com/office/drawing/2014/main" id="{09FD113B-8D14-A100-5988-EBBC754DD16A}"/>
+          <p:cNvPr id="5" name="Picture 4" descr="A graph of a number of species&#10;&#10;AI-generated content may be incorrect.">
+            <a:extLst>
+              <a:ext uri="{FF2B5EF4-FFF2-40B4-BE49-F238E27FC236}">
+                <a16:creationId xmlns:a16="http://schemas.microsoft.com/office/drawing/2014/main" id="{751FD9FD-E410-198F-DAC8-A5607844CC0F}"/>
               </a:ext>
             </a:extLst>
           </p:cNvPr>
@@ -4474,18 +4452,80 @@
         </p:blipFill>
         <p:spPr>
           <a:xfrm>
-            <a:off x="1347326" y="81023"/>
-            <a:ext cx="5538806" cy="6858000"/>
+            <a:off x="2667000" y="0"/>
+            <a:ext cx="6858000" cy="6858000"/>
           </a:xfrm>
           <a:prstGeom prst="rect">
             <a:avLst/>
           </a:prstGeom>
         </p:spPr>
       </p:pic>
+      <p:sp>
+        <p:nvSpPr>
+          <p:cNvPr id="6" name="TextBox 5">
+            <a:extLst>
+              <a:ext uri="{FF2B5EF4-FFF2-40B4-BE49-F238E27FC236}">
+                <a16:creationId xmlns:a16="http://schemas.microsoft.com/office/drawing/2014/main" id="{5806FD46-1CC7-9155-FCBD-FAB0327EE67B}"/>
+              </a:ext>
+            </a:extLst>
+          </p:cNvPr>
+          <p:cNvSpPr txBox="1"/>
+          <p:nvPr/>
+        </p:nvSpPr>
+        <p:spPr>
+          <a:xfrm>
+            <a:off x="3842658" y="555171"/>
+            <a:ext cx="1807028" cy="923330"/>
+          </a:xfrm>
+          <a:prstGeom prst="rect">
+            <a:avLst/>
+          </a:prstGeom>
+          <a:noFill/>
+        </p:spPr>
+        <p:txBody>
+          <a:bodyPr wrap="square" rtlCol="0">
+            <a:spAutoFit/>
+          </a:bodyPr>
+          <a:lstStyle/>
+          <a:p>
+            <a:r>
+              <a:rPr lang="en-CA" dirty="0">
+                <a:latin typeface="Arial" panose="020B0604020202020204" pitchFamily="34" charset="0"/>
+                <a:cs typeface="Arial" panose="020B0604020202020204" pitchFamily="34" charset="0"/>
+              </a:rPr>
+              <a:t>Mean = 4.21 </a:t>
+            </a:r>
+          </a:p>
+          <a:p>
+            <a:r>
+              <a:rPr lang="en-CA" dirty="0">
+                <a:solidFill>
+                  <a:srgbClr val="0000FF"/>
+                </a:solidFill>
+                <a:latin typeface="Arial" panose="020B0604020202020204" pitchFamily="34" charset="0"/>
+                <a:cs typeface="Arial" panose="020B0604020202020204" pitchFamily="34" charset="0"/>
+              </a:rPr>
+              <a:t>OPB = 7.00 </a:t>
+            </a:r>
+          </a:p>
+          <a:p>
+            <a:r>
+              <a:rPr lang="en-CA" dirty="0">
+                <a:solidFill>
+                  <a:srgbClr val="0000FF"/>
+                </a:solidFill>
+                <a:latin typeface="Arial" panose="020B0604020202020204" pitchFamily="34" charset="0"/>
+                <a:cs typeface="Arial" panose="020B0604020202020204" pitchFamily="34" charset="0"/>
+              </a:rPr>
+              <a:t>SES = 1.74</a:t>
+            </a:r>
+          </a:p>
+        </p:txBody>
+      </p:sp>
     </p:spTree>
     <p:extLst>
       <p:ext uri="{BB962C8B-B14F-4D97-AF65-F5344CB8AC3E}">
-        <p14:creationId xmlns:p14="http://schemas.microsoft.com/office/powerpoint/2010/main" val="142822564"/>
+        <p14:creationId xmlns:p14="http://schemas.microsoft.com/office/powerpoint/2010/main" val="868884251"/>
       </p:ext>
     </p:extLst>
   </p:cSld>
@@ -4512,101 +4552,46 @@
           <a:chExt cx="0" cy="0"/>
         </a:xfrm>
       </p:grpSpPr>
-      <p:grpSp>
-        <p:nvGrpSpPr>
-          <p:cNvPr id="5" name="Group 4">
-            <a:extLst>
-              <a:ext uri="{FF2B5EF4-FFF2-40B4-BE49-F238E27FC236}">
-                <a16:creationId xmlns:a16="http://schemas.microsoft.com/office/drawing/2014/main" id="{A2373E63-1431-C970-D989-5A88D4A86958}"/>
-              </a:ext>
-            </a:extLst>
-          </p:cNvPr>
-          <p:cNvGrpSpPr/>
+      <p:pic>
+        <p:nvPicPr>
+          <p:cNvPr id="7" name="Picture 6" descr="A graph of different colored squares&#10;&#10;AI-generated content may be incorrect.">
+            <a:extLst>
+              <a:ext uri="{FF2B5EF4-FFF2-40B4-BE49-F238E27FC236}">
+                <a16:creationId xmlns:a16="http://schemas.microsoft.com/office/drawing/2014/main" id="{EA60B3F1-8FA7-DF3C-A51F-F7EE50FC8115}"/>
+              </a:ext>
+            </a:extLst>
+          </p:cNvPr>
+          <p:cNvPicPr>
+            <a:picLocks noChangeAspect="1"/>
+          </p:cNvPicPr>
           <p:nvPr/>
-        </p:nvGrpSpPr>
-        <p:grpSpPr>
+        </p:nvPicPr>
+        <p:blipFill>
+          <a:blip r:embed="rId2">
+            <a:extLst>
+              <a:ext uri="{28A0092B-C50C-407E-A947-70E740481C1C}">
+                <a14:useLocalDpi xmlns:a14="http://schemas.microsoft.com/office/drawing/2010/main" val="0"/>
+              </a:ext>
+            </a:extLst>
+          </a:blip>
+          <a:stretch>
+            <a:fillRect/>
+          </a:stretch>
+        </p:blipFill>
+        <p:spPr>
           <a:xfrm>
-            <a:off x="3810000" y="0"/>
-            <a:ext cx="2310245" cy="6695953"/>
-            <a:chOff x="3810000" y="0"/>
-            <a:chExt cx="2310245" cy="6695953"/>
+            <a:off x="3524250" y="0"/>
+            <a:ext cx="5143500" cy="6858000"/>
           </a:xfrm>
-        </p:grpSpPr>
-        <p:pic>
-          <p:nvPicPr>
-            <p:cNvPr id="3" name="Picture 2" descr="A graph of different sizes of dots&#10;&#10;AI-generated content may be incorrect.">
-              <a:extLst>
-                <a:ext uri="{FF2B5EF4-FFF2-40B4-BE49-F238E27FC236}">
-                  <a16:creationId xmlns:a16="http://schemas.microsoft.com/office/drawing/2014/main" id="{4452796D-399A-CCC5-93B2-DFEE2E396468}"/>
-                </a:ext>
-              </a:extLst>
-            </p:cNvPr>
-            <p:cNvPicPr>
-              <a:picLocks noChangeAspect="1"/>
-            </p:cNvPicPr>
-            <p:nvPr/>
-          </p:nvPicPr>
-          <p:blipFill>
-            <a:blip r:embed="rId2">
-              <a:extLst>
-                <a:ext uri="{28A0092B-C50C-407E-A947-70E740481C1C}">
-                  <a14:useLocalDpi xmlns:a14="http://schemas.microsoft.com/office/drawing/2010/main" val="0"/>
-                </a:ext>
-              </a:extLst>
-            </a:blip>
-            <a:srcRect r="38523"/>
-            <a:stretch/>
-          </p:blipFill>
-          <p:spPr>
-            <a:xfrm>
-              <a:off x="3810000" y="0"/>
-              <a:ext cx="2310245" cy="5636871"/>
-            </a:xfrm>
-            <a:prstGeom prst="rect">
-              <a:avLst/>
-            </a:prstGeom>
-          </p:spPr>
-        </p:pic>
-        <p:pic>
-          <p:nvPicPr>
-            <p:cNvPr id="4" name="Picture 3" descr="A graph of different sizes of dots&#10;&#10;AI-generated content may be incorrect.">
-              <a:extLst>
-                <a:ext uri="{FF2B5EF4-FFF2-40B4-BE49-F238E27FC236}">
-                  <a16:creationId xmlns:a16="http://schemas.microsoft.com/office/drawing/2014/main" id="{1E557525-031E-A12B-9100-AB97148968C2}"/>
-                </a:ext>
-              </a:extLst>
-            </p:cNvPr>
-            <p:cNvPicPr>
-              <a:picLocks noChangeAspect="1"/>
-            </p:cNvPicPr>
-            <p:nvPr/>
-          </p:nvPicPr>
-          <p:blipFill>
-            <a:blip r:embed="rId2">
-              <a:extLst>
-                <a:ext uri="{28A0092B-C50C-407E-A947-70E740481C1C}">
-                  <a14:useLocalDpi xmlns:a14="http://schemas.microsoft.com/office/drawing/2010/main" val="0"/>
-                </a:ext>
-              </a:extLst>
-            </a:blip>
-            <a:srcRect l="61942" t="43813" r="336" b="45682"/>
-            <a:stretch/>
-          </p:blipFill>
-          <p:spPr>
-            <a:xfrm>
-              <a:off x="3834245" y="5741042"/>
-              <a:ext cx="2286000" cy="954911"/>
-            </a:xfrm>
-            <a:prstGeom prst="rect">
-              <a:avLst/>
-            </a:prstGeom>
-          </p:spPr>
-        </p:pic>
-      </p:grpSp>
+          <a:prstGeom prst="rect">
+            <a:avLst/>
+          </a:prstGeom>
+        </p:spPr>
+      </p:pic>
     </p:spTree>
     <p:extLst>
       <p:ext uri="{BB962C8B-B14F-4D97-AF65-F5344CB8AC3E}">
-        <p14:creationId xmlns:p14="http://schemas.microsoft.com/office/powerpoint/2010/main" val="3644617857"/>
+        <p14:creationId xmlns:p14="http://schemas.microsoft.com/office/powerpoint/2010/main" val="142822564"/>
       </p:ext>
     </p:extLst>
   </p:cSld>
@@ -4633,46 +4618,121 @@
           <a:chExt cx="0" cy="0"/>
         </a:xfrm>
       </p:grpSpPr>
-      <p:pic>
-        <p:nvPicPr>
-          <p:cNvPr id="10" name="Picture 9" descr="A graph of different colors&#10;&#10;AI-generated content may be incorrect.">
-            <a:extLst>
-              <a:ext uri="{FF2B5EF4-FFF2-40B4-BE49-F238E27FC236}">
-                <a16:creationId xmlns:a16="http://schemas.microsoft.com/office/drawing/2014/main" id="{B60B9C24-D9ED-6246-505F-3054A2C8B955}"/>
-              </a:ext>
-            </a:extLst>
-          </p:cNvPr>
-          <p:cNvPicPr>
-            <a:picLocks noChangeAspect="1"/>
-          </p:cNvPicPr>
+      <p:grpSp>
+        <p:nvGrpSpPr>
+          <p:cNvPr id="8" name="Group 7">
+            <a:extLst>
+              <a:ext uri="{FF2B5EF4-FFF2-40B4-BE49-F238E27FC236}">
+                <a16:creationId xmlns:a16="http://schemas.microsoft.com/office/drawing/2014/main" id="{E42935AF-814B-CA2B-1F13-864D4FC80763}"/>
+              </a:ext>
+            </a:extLst>
+          </p:cNvPr>
+          <p:cNvGrpSpPr/>
           <p:nvPr/>
-        </p:nvPicPr>
-        <p:blipFill>
-          <a:blip r:embed="rId2">
-            <a:extLst>
-              <a:ext uri="{28A0092B-C50C-407E-A947-70E740481C1C}">
-                <a14:useLocalDpi xmlns:a14="http://schemas.microsoft.com/office/drawing/2010/main" val="0"/>
-              </a:ext>
-            </a:extLst>
-          </a:blip>
-          <a:stretch>
-            <a:fillRect/>
-          </a:stretch>
-        </p:blipFill>
-        <p:spPr>
+        </p:nvGrpSpPr>
+        <p:grpSpPr>
           <a:xfrm>
-            <a:off x="1096735" y="0"/>
-            <a:ext cx="10287000" cy="6858000"/>
+            <a:off x="2721429" y="87086"/>
+            <a:ext cx="6955971" cy="6662057"/>
+            <a:chOff x="2721429" y="87086"/>
+            <a:chExt cx="6955971" cy="6662057"/>
           </a:xfrm>
-          <a:prstGeom prst="rect">
-            <a:avLst/>
-          </a:prstGeom>
-        </p:spPr>
-      </p:pic>
+        </p:grpSpPr>
+        <p:sp>
+          <p:nvSpPr>
+            <p:cNvPr id="7" name="Rectangle 6">
+              <a:extLst>
+                <a:ext uri="{FF2B5EF4-FFF2-40B4-BE49-F238E27FC236}">
+                  <a16:creationId xmlns:a16="http://schemas.microsoft.com/office/drawing/2014/main" id="{F8A126B7-C8F4-7883-95D4-77D1A92D0644}"/>
+                </a:ext>
+              </a:extLst>
+            </p:cNvPr>
+            <p:cNvSpPr/>
+            <p:nvPr/>
+          </p:nvSpPr>
+          <p:spPr>
+            <a:xfrm>
+              <a:off x="2721429" y="87086"/>
+              <a:ext cx="6955971" cy="6662057"/>
+            </a:xfrm>
+            <a:prstGeom prst="rect">
+              <a:avLst/>
+            </a:prstGeom>
+            <a:solidFill>
+              <a:schemeClr val="bg1"/>
+            </a:solidFill>
+            <a:ln>
+              <a:solidFill>
+                <a:schemeClr val="bg1"/>
+              </a:solidFill>
+            </a:ln>
+          </p:spPr>
+          <p:style>
+            <a:lnRef idx="2">
+              <a:schemeClr val="accent1">
+                <a:shade val="15000"/>
+              </a:schemeClr>
+            </a:lnRef>
+            <a:fillRef idx="1">
+              <a:schemeClr val="accent1"/>
+            </a:fillRef>
+            <a:effectRef idx="0">
+              <a:schemeClr val="accent1"/>
+            </a:effectRef>
+            <a:fontRef idx="minor">
+              <a:schemeClr val="lt1"/>
+            </a:fontRef>
+          </p:style>
+          <p:txBody>
+            <a:bodyPr rtlCol="0" anchor="ctr"/>
+            <a:lstStyle/>
+            <a:p>
+              <a:pPr algn="ctr"/>
+              <a:endParaRPr lang="en-CA"/>
+            </a:p>
+          </p:txBody>
+        </p:sp>
+        <p:pic>
+          <p:nvPicPr>
+            <p:cNvPr id="6" name="Picture 5" descr="A black background with blue and orange dots&#10;&#10;AI-generated content may be incorrect.">
+              <a:extLst>
+                <a:ext uri="{FF2B5EF4-FFF2-40B4-BE49-F238E27FC236}">
+                  <a16:creationId xmlns:a16="http://schemas.microsoft.com/office/drawing/2014/main" id="{8F92E740-8EB6-DCBB-7990-7D6D6AD8B409}"/>
+                </a:ext>
+              </a:extLst>
+            </p:cNvPr>
+            <p:cNvPicPr>
+              <a:picLocks noChangeAspect="1"/>
+            </p:cNvPicPr>
+            <p:nvPr/>
+          </p:nvPicPr>
+          <p:blipFill>
+            <a:blip r:embed="rId2">
+              <a:extLst>
+                <a:ext uri="{28A0092B-C50C-407E-A947-70E740481C1C}">
+                  <a14:useLocalDpi xmlns:a14="http://schemas.microsoft.com/office/drawing/2010/main" val="0"/>
+                </a:ext>
+              </a:extLst>
+            </a:blip>
+            <a:stretch>
+              <a:fillRect/>
+            </a:stretch>
+          </p:blipFill>
+          <p:spPr>
+            <a:xfrm>
+              <a:off x="3026228" y="211690"/>
+              <a:ext cx="5919425" cy="6434619"/>
+            </a:xfrm>
+            <a:prstGeom prst="rect">
+              <a:avLst/>
+            </a:prstGeom>
+          </p:spPr>
+        </p:pic>
+      </p:grpSp>
     </p:spTree>
     <p:extLst>
       <p:ext uri="{BB962C8B-B14F-4D97-AF65-F5344CB8AC3E}">
-        <p14:creationId xmlns:p14="http://schemas.microsoft.com/office/powerpoint/2010/main" val="776127107"/>
+        <p14:creationId xmlns:p14="http://schemas.microsoft.com/office/powerpoint/2010/main" val="3644617857"/>
       </p:ext>
     </p:extLst>
   </p:cSld>
@@ -4704,7 +4764,7 @@
           <p:cNvPr id="7" name="Group 6">
             <a:extLst>
               <a:ext uri="{FF2B5EF4-FFF2-40B4-BE49-F238E27FC236}">
-                <a16:creationId xmlns:a16="http://schemas.microsoft.com/office/drawing/2014/main" id="{096B1D4B-FF7D-5E0A-C0C5-B5E4D3848CD9}"/>
+                <a16:creationId xmlns:a16="http://schemas.microsoft.com/office/drawing/2014/main" id="{159EC7D8-475F-24CE-0A86-3B7D43789B8B}"/>
               </a:ext>
             </a:extLst>
           </p:cNvPr>
@@ -4713,18 +4773,72 @@
         </p:nvGrpSpPr>
         <p:grpSpPr>
           <a:xfrm>
-            <a:off x="1435739" y="781291"/>
-            <a:ext cx="10643406" cy="5295418"/>
-            <a:chOff x="1435739" y="781291"/>
-            <a:chExt cx="10643406" cy="5295418"/>
+            <a:off x="0" y="250371"/>
+            <a:ext cx="12192000" cy="6193972"/>
+            <a:chOff x="0" y="250371"/>
+            <a:chExt cx="12192000" cy="6193972"/>
           </a:xfrm>
         </p:grpSpPr>
+        <p:sp>
+          <p:nvSpPr>
+            <p:cNvPr id="6" name="Rectangle 5">
+              <a:extLst>
+                <a:ext uri="{FF2B5EF4-FFF2-40B4-BE49-F238E27FC236}">
+                  <a16:creationId xmlns:a16="http://schemas.microsoft.com/office/drawing/2014/main" id="{AB0BD85C-2701-5EA9-C651-68DE253ACB1F}"/>
+                </a:ext>
+              </a:extLst>
+            </p:cNvPr>
+            <p:cNvSpPr/>
+            <p:nvPr/>
+          </p:nvSpPr>
+          <p:spPr>
+            <a:xfrm>
+              <a:off x="0" y="250371"/>
+              <a:ext cx="12192000" cy="6193972"/>
+            </a:xfrm>
+            <a:prstGeom prst="rect">
+              <a:avLst/>
+            </a:prstGeom>
+            <a:solidFill>
+              <a:schemeClr val="bg1"/>
+            </a:solidFill>
+            <a:ln>
+              <a:solidFill>
+                <a:schemeClr val="bg1"/>
+              </a:solidFill>
+            </a:ln>
+          </p:spPr>
+          <p:style>
+            <a:lnRef idx="2">
+              <a:schemeClr val="accent1">
+                <a:shade val="15000"/>
+              </a:schemeClr>
+            </a:lnRef>
+            <a:fillRef idx="1">
+              <a:schemeClr val="accent1"/>
+            </a:fillRef>
+            <a:effectRef idx="0">
+              <a:schemeClr val="accent1"/>
+            </a:effectRef>
+            <a:fontRef idx="minor">
+              <a:schemeClr val="lt1"/>
+            </a:fontRef>
+          </p:style>
+          <p:txBody>
+            <a:bodyPr rtlCol="0" anchor="ctr"/>
+            <a:lstStyle/>
+            <a:p>
+              <a:pPr algn="ctr"/>
+              <a:endParaRPr lang="en-CA"/>
+            </a:p>
+          </p:txBody>
+        </p:sp>
         <p:pic>
           <p:nvPicPr>
-            <p:cNvPr id="3" name="Picture 2" descr="A group of different colored squares&#10;&#10;AI-generated content may be incorrect.">
+            <p:cNvPr id="5" name="Picture 4" descr="A screenshot of a computer screen&#10;&#10;AI-generated content may be incorrect.">
               <a:extLst>
                 <a:ext uri="{FF2B5EF4-FFF2-40B4-BE49-F238E27FC236}">
-                  <a16:creationId xmlns:a16="http://schemas.microsoft.com/office/drawing/2014/main" id="{9BDEE49D-E3AD-E56E-07F8-997759D50B81}"/>
+                  <a16:creationId xmlns:a16="http://schemas.microsoft.com/office/drawing/2014/main" id="{645C4C66-B417-4D81-9EED-4F281E66DFBD}"/>
                 </a:ext>
               </a:extLst>
             </p:cNvPr>
@@ -4741,84 +4855,14 @@
                 </a:ext>
               </a:extLst>
             </a:blip>
-            <a:srcRect r="49636"/>
-            <a:stretch/>
-          </p:blipFill>
-          <p:spPr>
-            <a:xfrm>
-              <a:off x="4513161" y="781291"/>
-              <a:ext cx="3733798" cy="5295418"/>
-            </a:xfrm>
-            <a:prstGeom prst="rect">
-              <a:avLst/>
-            </a:prstGeom>
-          </p:spPr>
-        </p:pic>
-        <p:pic>
-          <p:nvPicPr>
-            <p:cNvPr id="5" name="Picture 4" descr="A graph of different species&#10;&#10;AI-generated content may be incorrect.">
-              <a:extLst>
-                <a:ext uri="{FF2B5EF4-FFF2-40B4-BE49-F238E27FC236}">
-                  <a16:creationId xmlns:a16="http://schemas.microsoft.com/office/drawing/2014/main" id="{5125FB7B-CF25-DFCD-8C37-5B6B60B18B43}"/>
-                </a:ext>
-              </a:extLst>
-            </p:cNvPr>
-            <p:cNvPicPr>
-              <a:picLocks noChangeAspect="1"/>
-            </p:cNvPicPr>
-            <p:nvPr/>
-          </p:nvPicPr>
-          <p:blipFill>
-            <a:blip r:embed="rId3">
-              <a:extLst>
-                <a:ext uri="{28A0092B-C50C-407E-A947-70E740481C1C}">
-                  <a14:useLocalDpi xmlns:a14="http://schemas.microsoft.com/office/drawing/2010/main" val="0"/>
-                </a:ext>
-              </a:extLst>
-            </a:blip>
             <a:stretch>
               <a:fillRect/>
             </a:stretch>
           </p:blipFill>
           <p:spPr>
             <a:xfrm>
-              <a:off x="1435739" y="781291"/>
-              <a:ext cx="2647709" cy="5295418"/>
-            </a:xfrm>
-            <a:prstGeom prst="rect">
-              <a:avLst/>
-            </a:prstGeom>
-          </p:spPr>
-        </p:pic>
-        <p:pic>
-          <p:nvPicPr>
-            <p:cNvPr id="6" name="Picture 5" descr="A group of different colored squares&#10;&#10;AI-generated content may be incorrect.">
-              <a:extLst>
-                <a:ext uri="{FF2B5EF4-FFF2-40B4-BE49-F238E27FC236}">
-                  <a16:creationId xmlns:a16="http://schemas.microsoft.com/office/drawing/2014/main" id="{306A13BA-3C1F-9234-F87F-518D68AA8AB8}"/>
-                </a:ext>
-              </a:extLst>
-            </p:cNvPr>
-            <p:cNvPicPr>
-              <a:picLocks noChangeAspect="1"/>
-            </p:cNvPicPr>
-            <p:nvPr/>
-          </p:nvPicPr>
-          <p:blipFill>
-            <a:blip r:embed="rId2">
-              <a:extLst>
-                <a:ext uri="{28A0092B-C50C-407E-A947-70E740481C1C}">
-                  <a14:useLocalDpi xmlns:a14="http://schemas.microsoft.com/office/drawing/2010/main" val="0"/>
-                </a:ext>
-              </a:extLst>
-            </a:blip>
-            <a:srcRect l="49636"/>
-            <a:stretch/>
-          </p:blipFill>
-          <p:spPr>
-            <a:xfrm>
-              <a:off x="8345347" y="781291"/>
-              <a:ext cx="3733798" cy="5295418"/>
+              <a:off x="217589" y="474915"/>
+              <a:ext cx="11756821" cy="5697286"/>
             </a:xfrm>
             <a:prstGeom prst="rect">
               <a:avLst/>
@@ -4829,7 +4873,7 @@
     </p:spTree>
     <p:extLst>
       <p:ext uri="{BB962C8B-B14F-4D97-AF65-F5344CB8AC3E}">
-        <p14:creationId xmlns:p14="http://schemas.microsoft.com/office/powerpoint/2010/main" val="2830423783"/>
+        <p14:creationId xmlns:p14="http://schemas.microsoft.com/office/powerpoint/2010/main" val="3750861245"/>
       </p:ext>
     </p:extLst>
   </p:cSld>
@@ -4858,10 +4902,10 @@
       </p:grpSpPr>
       <p:grpSp>
         <p:nvGrpSpPr>
-          <p:cNvPr id="15" name="Group 14">
-            <a:extLst>
-              <a:ext uri="{FF2B5EF4-FFF2-40B4-BE49-F238E27FC236}">
-                <a16:creationId xmlns:a16="http://schemas.microsoft.com/office/drawing/2014/main" id="{FD6A2E26-2E21-9DB8-D0FB-591A5605D15A}"/>
+          <p:cNvPr id="18" name="Group 17">
+            <a:extLst>
+              <a:ext uri="{FF2B5EF4-FFF2-40B4-BE49-F238E27FC236}">
+                <a16:creationId xmlns:a16="http://schemas.microsoft.com/office/drawing/2014/main" id="{4360D933-3006-9CD4-905F-8A17916FF21C}"/>
               </a:ext>
             </a:extLst>
           </p:cNvPr>
@@ -4870,368 +4914,259 @@
         </p:nvGrpSpPr>
         <p:grpSpPr>
           <a:xfrm>
-            <a:off x="370389" y="164258"/>
-            <a:ext cx="11821611" cy="3477854"/>
-            <a:chOff x="370389" y="164258"/>
-            <a:chExt cx="11821611" cy="3477854"/>
+            <a:off x="370389" y="207814"/>
+            <a:ext cx="6063068" cy="5055990"/>
+            <a:chOff x="370389" y="207814"/>
+            <a:chExt cx="6063068" cy="5055990"/>
           </a:xfrm>
         </p:grpSpPr>
-        <p:grpSp>
-          <p:nvGrpSpPr>
-            <p:cNvPr id="20" name="Group 19">
+        <p:pic>
+          <p:nvPicPr>
+            <p:cNvPr id="7" name="Picture 6" descr="A graph of a function&#10;&#10;AI-generated content may be incorrect.">
               <a:extLst>
                 <a:ext uri="{FF2B5EF4-FFF2-40B4-BE49-F238E27FC236}">
-                  <a16:creationId xmlns:a16="http://schemas.microsoft.com/office/drawing/2014/main" id="{43BEE5C5-EC88-031C-7171-149399CEF928}"/>
+                  <a16:creationId xmlns:a16="http://schemas.microsoft.com/office/drawing/2014/main" id="{A4CEB8E1-45D7-7219-06D5-F83A6BD6EE85}"/>
                 </a:ext>
               </a:extLst>
             </p:cNvPr>
-            <p:cNvGrpSpPr/>
+            <p:cNvPicPr>
+              <a:picLocks noChangeAspect="1"/>
+            </p:cNvPicPr>
             <p:nvPr/>
-          </p:nvGrpSpPr>
-          <p:grpSpPr>
+          </p:nvPicPr>
+          <p:blipFill>
+            <a:blip r:embed="rId2">
+              <a:extLst>
+                <a:ext uri="{28A0092B-C50C-407E-A947-70E740481C1C}">
+                  <a14:useLocalDpi xmlns:a14="http://schemas.microsoft.com/office/drawing/2010/main" val="0"/>
+                </a:ext>
+              </a:extLst>
+            </a:blip>
+            <a:stretch>
+              <a:fillRect/>
+            </a:stretch>
+          </p:blipFill>
+          <p:spPr>
             <a:xfrm>
               <a:off x="370389" y="207814"/>
-              <a:ext cx="5468292" cy="3434298"/>
-              <a:chOff x="3321933" y="-74406"/>
-              <a:chExt cx="5468292" cy="3434298"/>
+              <a:ext cx="6063068" cy="5055990"/>
             </a:xfrm>
-          </p:grpSpPr>
-          <p:pic>
-            <p:nvPicPr>
-              <p:cNvPr id="19" name="Picture 18" descr="A graph of a function&#10;&#10;AI-generated content may be incorrect.">
-                <a:extLst>
-                  <a:ext uri="{FF2B5EF4-FFF2-40B4-BE49-F238E27FC236}">
-                    <a16:creationId xmlns:a16="http://schemas.microsoft.com/office/drawing/2014/main" id="{FEA61C3B-4816-25CE-FC2F-984AA99D3ABA}"/>
-                  </a:ext>
-                </a:extLst>
-              </p:cNvPr>
-              <p:cNvPicPr>
-                <a:picLocks noChangeAspect="1"/>
-              </p:cNvPicPr>
-              <p:nvPr/>
-            </p:nvPicPr>
-            <p:blipFill>
-              <a:blip r:embed="rId2">
-                <a:extLst>
-                  <a:ext uri="{28A0092B-C50C-407E-A947-70E740481C1C}">
-                    <a14:useLocalDpi xmlns:a14="http://schemas.microsoft.com/office/drawing/2010/main" val="0"/>
-                  </a:ext>
-                </a:extLst>
-              </a:blip>
-              <a:stretch>
-                <a:fillRect/>
-              </a:stretch>
-            </p:blipFill>
-            <p:spPr>
-              <a:xfrm>
-                <a:off x="3657598" y="66704"/>
-                <a:ext cx="5132627" cy="3293188"/>
-              </a:xfrm>
-              <a:prstGeom prst="rect">
-                <a:avLst/>
-              </a:prstGeom>
-            </p:spPr>
-          </p:pic>
-          <p:grpSp>
-            <p:nvGrpSpPr>
-              <p:cNvPr id="13" name="Group 12">
-                <a:extLst>
-                  <a:ext uri="{FF2B5EF4-FFF2-40B4-BE49-F238E27FC236}">
-                    <a16:creationId xmlns:a16="http://schemas.microsoft.com/office/drawing/2014/main" id="{A6120170-CA4C-63BE-7372-3070ED21747D}"/>
-                  </a:ext>
-                </a:extLst>
-              </p:cNvPr>
-              <p:cNvGrpSpPr/>
-              <p:nvPr/>
-            </p:nvGrpSpPr>
-            <p:grpSpPr>
-              <a:xfrm>
-                <a:off x="3321933" y="-74406"/>
-                <a:ext cx="2799142" cy="981468"/>
-                <a:chOff x="3321933" y="-74406"/>
-                <a:chExt cx="2799142" cy="981468"/>
-              </a:xfrm>
-            </p:grpSpPr>
-            <p:sp>
-              <p:nvSpPr>
-                <p:cNvPr id="6" name="TextBox 5">
-                  <a:extLst>
-                    <a:ext uri="{FF2B5EF4-FFF2-40B4-BE49-F238E27FC236}">
-                      <a16:creationId xmlns:a16="http://schemas.microsoft.com/office/drawing/2014/main" id="{687D9B0E-AC76-43F7-0857-3BE53FFFDBAC}"/>
-                    </a:ext>
-                  </a:extLst>
-                </p:cNvPr>
-                <p:cNvSpPr txBox="1"/>
-                <p:nvPr/>
-              </p:nvSpPr>
-              <p:spPr>
-                <a:xfrm>
-                  <a:off x="4411880" y="260731"/>
-                  <a:ext cx="1709195" cy="646331"/>
-                </a:xfrm>
-                <a:prstGeom prst="rect">
-                  <a:avLst/>
-                </a:prstGeom>
-                <a:noFill/>
-              </p:spPr>
-              <p:txBody>
-                <a:bodyPr wrap="square" rtlCol="0">
-                  <a:spAutoFit/>
-                </a:bodyPr>
-                <a:lstStyle/>
-                <a:p>
-                  <a:r>
-                    <a:rPr lang="en-CA" sz="1200" dirty="0">
-                      <a:latin typeface="Arial" panose="020B0604020202020204" pitchFamily="34" charset="0"/>
-                      <a:cs typeface="Arial" panose="020B0604020202020204" pitchFamily="34" charset="0"/>
-                    </a:rPr>
-                    <a:t>Mean = 0.729412</a:t>
-                  </a:r>
-                </a:p>
-                <a:p>
-                  <a:r>
-                    <a:rPr lang="en-CA" sz="1200" dirty="0">
-                      <a:solidFill>
-                        <a:srgbClr val="0000FF"/>
-                      </a:solidFill>
-                      <a:latin typeface="Arial" panose="020B0604020202020204" pitchFamily="34" charset="0"/>
-                      <a:cs typeface="Arial" panose="020B0604020202020204" pitchFamily="34" charset="0"/>
-                    </a:rPr>
-                    <a:t>OPB = 0.7567851</a:t>
-                  </a:r>
-                </a:p>
-                <a:p>
-                  <a:r>
-                    <a:rPr lang="en-CA" sz="1200" dirty="0">
-                      <a:solidFill>
-                        <a:srgbClr val="0000FF"/>
-                      </a:solidFill>
-                      <a:latin typeface="Arial" panose="020B0604020202020204" pitchFamily="34" charset="0"/>
-                      <a:cs typeface="Arial" panose="020B0604020202020204" pitchFamily="34" charset="0"/>
-                    </a:rPr>
-                    <a:t>SES = 0.6312469 </a:t>
-                  </a:r>
-                </a:p>
-              </p:txBody>
-            </p:sp>
-            <p:sp>
-              <p:nvSpPr>
-                <p:cNvPr id="10" name="TextBox 9">
-                  <a:extLst>
-                    <a:ext uri="{FF2B5EF4-FFF2-40B4-BE49-F238E27FC236}">
-                      <a16:creationId xmlns:a16="http://schemas.microsoft.com/office/drawing/2014/main" id="{3F0D060B-3D42-DC8C-7C86-23F40725FDE2}"/>
-                    </a:ext>
-                  </a:extLst>
-                </p:cNvPr>
-                <p:cNvSpPr txBox="1"/>
-                <p:nvPr/>
-              </p:nvSpPr>
-              <p:spPr>
-                <a:xfrm>
-                  <a:off x="3321933" y="-74406"/>
-                  <a:ext cx="335666" cy="461665"/>
-                </a:xfrm>
-                <a:prstGeom prst="rect">
-                  <a:avLst/>
-                </a:prstGeom>
-                <a:noFill/>
-              </p:spPr>
-              <p:txBody>
-                <a:bodyPr wrap="square" rtlCol="0">
-                  <a:spAutoFit/>
-                </a:bodyPr>
-                <a:lstStyle/>
-                <a:p>
-                  <a:r>
-                    <a:rPr lang="en-CA" sz="2400" dirty="0">
-                      <a:latin typeface="Arial" panose="020B0604020202020204" pitchFamily="34" charset="0"/>
-                      <a:cs typeface="Arial" panose="020B0604020202020204" pitchFamily="34" charset="0"/>
-                    </a:rPr>
-                    <a:t>b</a:t>
-                  </a:r>
-                </a:p>
-              </p:txBody>
-            </p:sp>
-          </p:grpSp>
-        </p:grpSp>
-        <p:grpSp>
-          <p:nvGrpSpPr>
-            <p:cNvPr id="2" name="Group 1">
+            <a:prstGeom prst="rect">
+              <a:avLst/>
+            </a:prstGeom>
+          </p:spPr>
+        </p:pic>
+        <p:sp>
+          <p:nvSpPr>
+            <p:cNvPr id="6" name="TextBox 5">
               <a:extLst>
                 <a:ext uri="{FF2B5EF4-FFF2-40B4-BE49-F238E27FC236}">
-                  <a16:creationId xmlns:a16="http://schemas.microsoft.com/office/drawing/2014/main" id="{57014079-8C6B-DF5B-5220-C97EFEF39B88}"/>
+                  <a16:creationId xmlns:a16="http://schemas.microsoft.com/office/drawing/2014/main" id="{687D9B0E-AC76-43F7-0857-3BE53FFFDBAC}"/>
                 </a:ext>
               </a:extLst>
             </p:cNvPr>
-            <p:cNvGrpSpPr/>
+            <p:cNvSpPr txBox="1"/>
             <p:nvPr/>
-          </p:nvGrpSpPr>
-          <p:grpSpPr>
+          </p:nvSpPr>
+          <p:spPr>
             <a:xfrm>
-              <a:off x="6353321" y="164258"/>
-              <a:ext cx="5838679" cy="3477854"/>
-              <a:chOff x="3321933" y="3359892"/>
-              <a:chExt cx="5838679" cy="3477854"/>
+              <a:off x="1146647" y="542951"/>
+              <a:ext cx="1709195" cy="738664"/>
             </a:xfrm>
-          </p:grpSpPr>
-          <p:pic>
-            <p:nvPicPr>
-              <p:cNvPr id="3" name="Picture 2" descr="A graph of a function&#10;&#10;AI-generated content may be incorrect.">
-                <a:extLst>
-                  <a:ext uri="{FF2B5EF4-FFF2-40B4-BE49-F238E27FC236}">
-                    <a16:creationId xmlns:a16="http://schemas.microsoft.com/office/drawing/2014/main" id="{10C6EFCA-B1BB-F921-31E8-A1D27DF1095F}"/>
-                  </a:ext>
-                </a:extLst>
-              </p:cNvPr>
-              <p:cNvPicPr>
-                <a:picLocks noChangeAspect="1"/>
-              </p:cNvPicPr>
-              <p:nvPr/>
-            </p:nvPicPr>
-            <p:blipFill>
-              <a:blip r:embed="rId3">
-                <a:extLst>
-                  <a:ext uri="{28A0092B-C50C-407E-A947-70E740481C1C}">
-                    <a14:useLocalDpi xmlns:a14="http://schemas.microsoft.com/office/drawing/2010/main" val="0"/>
-                  </a:ext>
-                </a:extLst>
-              </a:blip>
-              <a:stretch>
-                <a:fillRect/>
-              </a:stretch>
-            </p:blipFill>
-            <p:spPr>
-              <a:xfrm>
-                <a:off x="3657599" y="3544558"/>
-                <a:ext cx="5132626" cy="3293188"/>
-              </a:xfrm>
-              <a:prstGeom prst="rect">
-                <a:avLst/>
-              </a:prstGeom>
-            </p:spPr>
-          </p:pic>
-          <p:grpSp>
-            <p:nvGrpSpPr>
-              <p:cNvPr id="5" name="Group 4">
-                <a:extLst>
-                  <a:ext uri="{FF2B5EF4-FFF2-40B4-BE49-F238E27FC236}">
-                    <a16:creationId xmlns:a16="http://schemas.microsoft.com/office/drawing/2014/main" id="{34CD3BE2-3011-DD5C-4629-7A013C532416}"/>
-                  </a:ext>
-                </a:extLst>
-              </p:cNvPr>
-              <p:cNvGrpSpPr/>
-              <p:nvPr/>
-            </p:nvGrpSpPr>
-            <p:grpSpPr>
-              <a:xfrm>
-                <a:off x="3321933" y="3359892"/>
-                <a:ext cx="5838679" cy="1025024"/>
-                <a:chOff x="3321933" y="3359892"/>
-                <a:chExt cx="5838679" cy="1025024"/>
-              </a:xfrm>
-            </p:grpSpPr>
-            <p:sp>
-              <p:nvSpPr>
-                <p:cNvPr id="8" name="TextBox 7">
-                  <a:extLst>
-                    <a:ext uri="{FF2B5EF4-FFF2-40B4-BE49-F238E27FC236}">
-                      <a16:creationId xmlns:a16="http://schemas.microsoft.com/office/drawing/2014/main" id="{869983BB-BB3D-4E23-6071-C20E2D0FC985}"/>
-                    </a:ext>
-                  </a:extLst>
-                </p:cNvPr>
-                <p:cNvSpPr txBox="1"/>
-                <p:nvPr/>
-              </p:nvSpPr>
-              <p:spPr>
-                <a:xfrm>
-                  <a:off x="7155078" y="3738585"/>
-                  <a:ext cx="2005534" cy="646331"/>
-                </a:xfrm>
-                <a:prstGeom prst="rect">
-                  <a:avLst/>
-                </a:prstGeom>
-                <a:noFill/>
-              </p:spPr>
-              <p:txBody>
-                <a:bodyPr wrap="square" rtlCol="0">
-                  <a:spAutoFit/>
-                </a:bodyPr>
-                <a:lstStyle/>
-                <a:p>
-                  <a:r>
-                    <a:rPr lang="en-CA" sz="1200" dirty="0">
-                      <a:latin typeface="Arial" panose="020B0604020202020204" pitchFamily="34" charset="0"/>
-                      <a:cs typeface="Arial" panose="020B0604020202020204" pitchFamily="34" charset="0"/>
-                    </a:rPr>
-                    <a:t>Mean = 1.23351</a:t>
-                  </a:r>
-                </a:p>
-                <a:p>
-                  <a:r>
-                    <a:rPr lang="en-CA" sz="1200" dirty="0">
-                      <a:solidFill>
-                        <a:srgbClr val="0000FF"/>
-                      </a:solidFill>
-                      <a:latin typeface="Arial" panose="020B0604020202020204" pitchFamily="34" charset="0"/>
-                      <a:cs typeface="Arial" panose="020B0604020202020204" pitchFamily="34" charset="0"/>
-                    </a:rPr>
-                    <a:t>OPB = 1.190476</a:t>
-                  </a:r>
-                </a:p>
-                <a:p>
-                  <a:r>
-                    <a:rPr lang="en-CA" sz="1200" dirty="0">
-                      <a:solidFill>
-                        <a:srgbClr val="0000FF"/>
-                      </a:solidFill>
-                      <a:latin typeface="Arial" panose="020B0604020202020204" pitchFamily="34" charset="0"/>
-                      <a:cs typeface="Arial" panose="020B0604020202020204" pitchFamily="34" charset="0"/>
-                    </a:rPr>
-                    <a:t>SES = -0.3916008 </a:t>
-                  </a:r>
-                </a:p>
-              </p:txBody>
-            </p:sp>
-            <p:sp>
-              <p:nvSpPr>
-                <p:cNvPr id="14" name="TextBox 13">
-                  <a:extLst>
-                    <a:ext uri="{FF2B5EF4-FFF2-40B4-BE49-F238E27FC236}">
-                      <a16:creationId xmlns:a16="http://schemas.microsoft.com/office/drawing/2014/main" id="{73E64907-2A63-100C-A7DC-4DABC17B8AF4}"/>
-                    </a:ext>
-                  </a:extLst>
-                </p:cNvPr>
-                <p:cNvSpPr txBox="1"/>
-                <p:nvPr/>
-              </p:nvSpPr>
-              <p:spPr>
-                <a:xfrm>
-                  <a:off x="3321933" y="3359892"/>
-                  <a:ext cx="335666" cy="461665"/>
-                </a:xfrm>
-                <a:prstGeom prst="rect">
-                  <a:avLst/>
-                </a:prstGeom>
-                <a:noFill/>
-              </p:spPr>
-              <p:txBody>
-                <a:bodyPr wrap="square" rtlCol="0">
-                  <a:spAutoFit/>
-                </a:bodyPr>
-                <a:lstStyle/>
-                <a:p>
-                  <a:r>
-                    <a:rPr lang="en-CA" sz="2400" dirty="0">
-                      <a:latin typeface="Arial" panose="020B0604020202020204" pitchFamily="34" charset="0"/>
-                      <a:cs typeface="Arial" panose="020B0604020202020204" pitchFamily="34" charset="0"/>
-                    </a:rPr>
-                    <a:t>c</a:t>
-                  </a:r>
-                </a:p>
-              </p:txBody>
-            </p:sp>
-          </p:grpSp>
-        </p:grpSp>
+            <a:prstGeom prst="rect">
+              <a:avLst/>
+            </a:prstGeom>
+            <a:noFill/>
+          </p:spPr>
+          <p:txBody>
+            <a:bodyPr wrap="square" rtlCol="0">
+              <a:spAutoFit/>
+            </a:bodyPr>
+            <a:lstStyle/>
+            <a:p>
+              <a:r>
+                <a:rPr lang="en-CA" sz="1400" dirty="0">
+                  <a:latin typeface="Arial" panose="020B0604020202020204" pitchFamily="34" charset="0"/>
+                  <a:cs typeface="Arial" panose="020B0604020202020204" pitchFamily="34" charset="0"/>
+                </a:rPr>
+                <a:t>Mean = 0.73</a:t>
+              </a:r>
+            </a:p>
+            <a:p>
+              <a:r>
+                <a:rPr lang="en-CA" sz="1400" dirty="0">
+                  <a:solidFill>
+                    <a:srgbClr val="0000FF"/>
+                  </a:solidFill>
+                  <a:latin typeface="Arial" panose="020B0604020202020204" pitchFamily="34" charset="0"/>
+                  <a:cs typeface="Arial" panose="020B0604020202020204" pitchFamily="34" charset="0"/>
+                </a:rPr>
+                <a:t>OPB = 0.76</a:t>
+              </a:r>
+            </a:p>
+            <a:p>
+              <a:r>
+                <a:rPr lang="en-CA" sz="1400" dirty="0">
+                  <a:solidFill>
+                    <a:srgbClr val="0000FF"/>
+                  </a:solidFill>
+                  <a:latin typeface="Arial" panose="020B0604020202020204" pitchFamily="34" charset="0"/>
+                  <a:cs typeface="Arial" panose="020B0604020202020204" pitchFamily="34" charset="0"/>
+                </a:rPr>
+                <a:t>SES = 0.58 </a:t>
+              </a:r>
+            </a:p>
+          </p:txBody>
+        </p:sp>
+      </p:grpSp>
+      <p:grpSp>
+        <p:nvGrpSpPr>
+          <p:cNvPr id="21" name="Group 20">
+            <a:extLst>
+              <a:ext uri="{FF2B5EF4-FFF2-40B4-BE49-F238E27FC236}">
+                <a16:creationId xmlns:a16="http://schemas.microsoft.com/office/drawing/2014/main" id="{4A424CCA-4AB7-E505-B29A-1C780C38A1F1}"/>
+              </a:ext>
+            </a:extLst>
+          </p:cNvPr>
+          <p:cNvGrpSpPr/>
+          <p:nvPr/>
+        </p:nvGrpSpPr>
+        <p:grpSpPr>
+          <a:xfrm>
+            <a:off x="6433457" y="207814"/>
+            <a:ext cx="6346371" cy="5055990"/>
+            <a:chOff x="6521154" y="207813"/>
+            <a:chExt cx="6238462" cy="5055991"/>
+          </a:xfrm>
+        </p:grpSpPr>
+        <p:pic>
+          <p:nvPicPr>
+            <p:cNvPr id="16" name="Picture 15" descr="A graph of a function&#10;&#10;AI-generated content may be incorrect.">
+              <a:extLst>
+                <a:ext uri="{FF2B5EF4-FFF2-40B4-BE49-F238E27FC236}">
+                  <a16:creationId xmlns:a16="http://schemas.microsoft.com/office/drawing/2014/main" id="{35E80455-37C9-50C2-7041-FDF1CFB9F3C6}"/>
+                </a:ext>
+              </a:extLst>
+            </p:cNvPr>
+            <p:cNvPicPr>
+              <a:picLocks noChangeAspect="1"/>
+            </p:cNvPicPr>
+            <p:nvPr/>
+          </p:nvPicPr>
+          <p:blipFill>
+            <a:blip r:embed="rId3">
+              <a:extLst>
+                <a:ext uri="{28A0092B-C50C-407E-A947-70E740481C1C}">
+                  <a14:useLocalDpi xmlns:a14="http://schemas.microsoft.com/office/drawing/2010/main" val="0"/>
+                </a:ext>
+              </a:extLst>
+            </a:blip>
+            <a:stretch>
+              <a:fillRect/>
+            </a:stretch>
+          </p:blipFill>
+          <p:spPr>
+            <a:xfrm>
+              <a:off x="6521154" y="207813"/>
+              <a:ext cx="6150765" cy="5055991"/>
+            </a:xfrm>
+            <a:prstGeom prst="rect">
+              <a:avLst/>
+            </a:prstGeom>
+          </p:spPr>
+        </p:pic>
+        <p:sp>
+          <p:nvSpPr>
+            <p:cNvPr id="8" name="TextBox 7">
+              <a:extLst>
+                <a:ext uri="{FF2B5EF4-FFF2-40B4-BE49-F238E27FC236}">
+                  <a16:creationId xmlns:a16="http://schemas.microsoft.com/office/drawing/2014/main" id="{869983BB-BB3D-4E23-6071-C20E2D0FC985}"/>
+                </a:ext>
+              </a:extLst>
+            </p:cNvPr>
+            <p:cNvSpPr txBox="1"/>
+            <p:nvPr/>
+          </p:nvSpPr>
+          <p:spPr>
+            <a:xfrm>
+              <a:off x="10754082" y="512174"/>
+              <a:ext cx="2005534" cy="769441"/>
+            </a:xfrm>
+            <a:prstGeom prst="rect">
+              <a:avLst/>
+            </a:prstGeom>
+            <a:noFill/>
+          </p:spPr>
+          <p:txBody>
+            <a:bodyPr wrap="square" rtlCol="0">
+              <a:spAutoFit/>
+            </a:bodyPr>
+            <a:lstStyle/>
+            <a:p>
+              <a:r>
+                <a:rPr lang="en-CA" sz="1400" dirty="0">
+                  <a:latin typeface="Arial" panose="020B0604020202020204" pitchFamily="34" charset="0"/>
+                  <a:cs typeface="Arial" panose="020B0604020202020204" pitchFamily="34" charset="0"/>
+                </a:rPr>
+                <a:t>Mean = 1.23</a:t>
+              </a:r>
+            </a:p>
+            <a:p>
+              <a:r>
+                <a:rPr lang="en-CA" sz="1400" dirty="0">
+                  <a:solidFill>
+                    <a:srgbClr val="0000FF"/>
+                  </a:solidFill>
+                  <a:latin typeface="Arial" panose="020B0604020202020204" pitchFamily="34" charset="0"/>
+                  <a:cs typeface="Arial" panose="020B0604020202020204" pitchFamily="34" charset="0"/>
+                </a:rPr>
+                <a:t>OPB = 1.19</a:t>
+              </a:r>
+            </a:p>
+            <a:p>
+              <a:r>
+                <a:rPr lang="en-CA" sz="1400" dirty="0">
+                  <a:solidFill>
+                    <a:srgbClr val="0000FF"/>
+                  </a:solidFill>
+                  <a:latin typeface="Arial" panose="020B0604020202020204" pitchFamily="34" charset="0"/>
+                  <a:cs typeface="Arial" panose="020B0604020202020204" pitchFamily="34" charset="0"/>
+                </a:rPr>
+                <a:t>SES = </a:t>
+              </a:r>
+              <a:r>
+                <a:rPr lang="en-CA" sz="1600" dirty="0">
+                  <a:solidFill>
+                    <a:srgbClr val="0000FF"/>
+                  </a:solidFill>
+                  <a:latin typeface="Arial" panose="020B0604020202020204" pitchFamily="34" charset="0"/>
+                  <a:cs typeface="Arial" panose="020B0604020202020204" pitchFamily="34" charset="0"/>
+                </a:rPr>
+                <a:t>-</a:t>
+              </a:r>
+              <a:r>
+                <a:rPr lang="en-CA" sz="1400" dirty="0">
+                  <a:solidFill>
+                    <a:srgbClr val="0000FF"/>
+                  </a:solidFill>
+                  <a:latin typeface="Arial" panose="020B0604020202020204" pitchFamily="34" charset="0"/>
+                  <a:cs typeface="Arial" panose="020B0604020202020204" pitchFamily="34" charset="0"/>
+                </a:rPr>
+                <a:t>0.40</a:t>
+              </a:r>
+              <a:r>
+                <a:rPr lang="en-CA" sz="1200" dirty="0">
+                  <a:solidFill>
+                    <a:srgbClr val="0000FF"/>
+                  </a:solidFill>
+                  <a:latin typeface="Arial" panose="020B0604020202020204" pitchFamily="34" charset="0"/>
+                  <a:cs typeface="Arial" panose="020B0604020202020204" pitchFamily="34" charset="0"/>
+                </a:rPr>
+                <a:t> </a:t>
+              </a:r>
+            </a:p>
+          </p:txBody>
+        </p:sp>
       </p:grpSp>
     </p:spTree>
     <p:extLst>
@@ -5265,10 +5200,10 @@
       </p:grpSpPr>
       <p:grpSp>
         <p:nvGrpSpPr>
-          <p:cNvPr id="10" name="Group 9">
-            <a:extLst>
-              <a:ext uri="{FF2B5EF4-FFF2-40B4-BE49-F238E27FC236}">
-                <a16:creationId xmlns:a16="http://schemas.microsoft.com/office/drawing/2014/main" id="{33CC3CEF-79EE-33D6-DD7A-0D4B9B779CC5}"/>
+          <p:cNvPr id="11" name="Group 10">
+            <a:extLst>
+              <a:ext uri="{FF2B5EF4-FFF2-40B4-BE49-F238E27FC236}">
+                <a16:creationId xmlns:a16="http://schemas.microsoft.com/office/drawing/2014/main" id="{D5CB7D9A-D73B-D8A8-5595-181DB38D8815}"/>
               </a:ext>
             </a:extLst>
           </p:cNvPr>
@@ -5277,18 +5212,291 @@
         </p:nvGrpSpPr>
         <p:grpSpPr>
           <a:xfrm>
-            <a:off x="2789499" y="185856"/>
-            <a:ext cx="7092406" cy="6458013"/>
-            <a:chOff x="2789499" y="185856"/>
-            <a:chExt cx="7092406" cy="6458013"/>
+            <a:off x="4381500" y="0"/>
+            <a:ext cx="3429000" cy="6858000"/>
+            <a:chOff x="4381500" y="0"/>
+            <a:chExt cx="3429000" cy="6858000"/>
+          </a:xfrm>
+        </p:grpSpPr>
+        <p:pic>
+          <p:nvPicPr>
+            <p:cNvPr id="5" name="Picture 4" descr="A graph of a number of different sizes&#10;&#10;AI-generated content may be incorrect.">
+              <a:extLst>
+                <a:ext uri="{FF2B5EF4-FFF2-40B4-BE49-F238E27FC236}">
+                  <a16:creationId xmlns:a16="http://schemas.microsoft.com/office/drawing/2014/main" id="{056BC902-BD00-7CDF-E710-2DCE0C1F0D89}"/>
+                </a:ext>
+              </a:extLst>
+            </p:cNvPr>
+            <p:cNvPicPr>
+              <a:picLocks noChangeAspect="1"/>
+            </p:cNvPicPr>
+            <p:nvPr/>
+          </p:nvPicPr>
+          <p:blipFill>
+            <a:blip r:embed="rId2">
+              <a:extLst>
+                <a:ext uri="{28A0092B-C50C-407E-A947-70E740481C1C}">
+                  <a14:useLocalDpi xmlns:a14="http://schemas.microsoft.com/office/drawing/2010/main" val="0"/>
+                </a:ext>
+              </a:extLst>
+            </a:blip>
+            <a:stretch>
+              <a:fillRect/>
+            </a:stretch>
+          </p:blipFill>
+          <p:spPr>
+            <a:xfrm>
+              <a:off x="4381500" y="0"/>
+              <a:ext cx="3429000" cy="6858000"/>
+            </a:xfrm>
+            <a:prstGeom prst="rect">
+              <a:avLst/>
+            </a:prstGeom>
+          </p:spPr>
+        </p:pic>
+        <p:sp>
+          <p:nvSpPr>
+            <p:cNvPr id="6" name="TextBox 5">
+              <a:extLst>
+                <a:ext uri="{FF2B5EF4-FFF2-40B4-BE49-F238E27FC236}">
+                  <a16:creationId xmlns:a16="http://schemas.microsoft.com/office/drawing/2014/main" id="{EA2D299F-FD3B-5E1C-5ECC-FDF2EE59FEA2}"/>
+                </a:ext>
+              </a:extLst>
+            </p:cNvPr>
+            <p:cNvSpPr txBox="1"/>
+            <p:nvPr/>
+          </p:nvSpPr>
+          <p:spPr>
+            <a:xfrm>
+              <a:off x="4724399" y="130629"/>
+              <a:ext cx="1153887" cy="553998"/>
+            </a:xfrm>
+            <a:prstGeom prst="rect">
+              <a:avLst/>
+            </a:prstGeom>
+            <a:noFill/>
+          </p:spPr>
+          <p:txBody>
+            <a:bodyPr wrap="square" rtlCol="0">
+              <a:spAutoFit/>
+            </a:bodyPr>
+            <a:lstStyle/>
+            <a:p>
+              <a:r>
+                <a:rPr lang="en-CA" sz="1000" dirty="0">
+                  <a:latin typeface="Arial" panose="020B0604020202020204" pitchFamily="34" charset="0"/>
+                  <a:cs typeface="Arial" panose="020B0604020202020204" pitchFamily="34" charset="0"/>
+                </a:rPr>
+                <a:t>Mean = 6.27 m</a:t>
+              </a:r>
+            </a:p>
+            <a:p>
+              <a:r>
+                <a:rPr lang="en-CA" sz="1000" dirty="0">
+                  <a:solidFill>
+                    <a:srgbClr val="0000FF"/>
+                  </a:solidFill>
+                  <a:latin typeface="Arial" panose="020B0604020202020204" pitchFamily="34" charset="0"/>
+                  <a:cs typeface="Arial" panose="020B0604020202020204" pitchFamily="34" charset="0"/>
+                </a:rPr>
+                <a:t>OPB = 9.50 m </a:t>
+              </a:r>
+            </a:p>
+            <a:p>
+              <a:r>
+                <a:rPr lang="en-CA" sz="1000" dirty="0">
+                  <a:solidFill>
+                    <a:srgbClr val="0000FF"/>
+                  </a:solidFill>
+                  <a:latin typeface="Arial" panose="020B0604020202020204" pitchFamily="34" charset="0"/>
+                  <a:cs typeface="Arial" panose="020B0604020202020204" pitchFamily="34" charset="0"/>
+                </a:rPr>
+                <a:t>SES = 3.23</a:t>
+              </a:r>
+            </a:p>
+          </p:txBody>
+        </p:sp>
+        <p:sp>
+          <p:nvSpPr>
+            <p:cNvPr id="7" name="TextBox 6">
+              <a:extLst>
+                <a:ext uri="{FF2B5EF4-FFF2-40B4-BE49-F238E27FC236}">
+                  <a16:creationId xmlns:a16="http://schemas.microsoft.com/office/drawing/2014/main" id="{3082F1ED-7617-5208-DD28-40871F92E2D4}"/>
+                </a:ext>
+              </a:extLst>
+            </p:cNvPr>
+            <p:cNvSpPr txBox="1"/>
+            <p:nvPr/>
+          </p:nvSpPr>
+          <p:spPr>
+            <a:xfrm>
+              <a:off x="4724399" y="2427515"/>
+              <a:ext cx="1295401" cy="553998"/>
+            </a:xfrm>
+            <a:prstGeom prst="rect">
+              <a:avLst/>
+            </a:prstGeom>
+            <a:noFill/>
+          </p:spPr>
+          <p:txBody>
+            <a:bodyPr wrap="square" rtlCol="0">
+              <a:spAutoFit/>
+            </a:bodyPr>
+            <a:lstStyle/>
+            <a:p>
+              <a:r>
+                <a:rPr lang="en-CA" sz="1000" dirty="0">
+                  <a:latin typeface="Arial" panose="020B0604020202020204" pitchFamily="34" charset="0"/>
+                  <a:cs typeface="Arial" panose="020B0604020202020204" pitchFamily="34" charset="0"/>
+                </a:rPr>
+                <a:t>Mean = 11746 kg </a:t>
+              </a:r>
+            </a:p>
+            <a:p>
+              <a:r>
+                <a:rPr lang="en-CA" sz="1000" dirty="0">
+                  <a:solidFill>
+                    <a:srgbClr val="0000FF"/>
+                  </a:solidFill>
+                  <a:latin typeface="Arial" panose="020B0604020202020204" pitchFamily="34" charset="0"/>
+                  <a:cs typeface="Arial" panose="020B0604020202020204" pitchFamily="34" charset="0"/>
+                </a:rPr>
+                <a:t>OPB =  24254 kg</a:t>
+              </a:r>
+            </a:p>
+            <a:p>
+              <a:r>
+                <a:rPr lang="en-CA" sz="1000" dirty="0">
+                  <a:solidFill>
+                    <a:srgbClr val="0000FF"/>
+                  </a:solidFill>
+                  <a:latin typeface="Arial" panose="020B0604020202020204" pitchFamily="34" charset="0"/>
+                  <a:cs typeface="Arial" panose="020B0604020202020204" pitchFamily="34" charset="0"/>
+                </a:rPr>
+                <a:t>SES = 2.48</a:t>
+              </a:r>
+            </a:p>
+          </p:txBody>
+        </p:sp>
+        <p:sp>
+          <p:nvSpPr>
+            <p:cNvPr id="8" name="TextBox 7">
+              <a:extLst>
+                <a:ext uri="{FF2B5EF4-FFF2-40B4-BE49-F238E27FC236}">
+                  <a16:creationId xmlns:a16="http://schemas.microsoft.com/office/drawing/2014/main" id="{92B2D775-A4B0-378E-CD4B-B38A84D83AFC}"/>
+                </a:ext>
+              </a:extLst>
+            </p:cNvPr>
+            <p:cNvSpPr txBox="1"/>
+            <p:nvPr/>
+          </p:nvSpPr>
+          <p:spPr>
+            <a:xfrm>
+              <a:off x="4724399" y="4724401"/>
+              <a:ext cx="1621971" cy="553998"/>
+            </a:xfrm>
+            <a:prstGeom prst="rect">
+              <a:avLst/>
+            </a:prstGeom>
+            <a:noFill/>
+          </p:spPr>
+          <p:txBody>
+            <a:bodyPr wrap="square" rtlCol="0">
+              <a:spAutoFit/>
+            </a:bodyPr>
+            <a:lstStyle/>
+            <a:p>
+              <a:r>
+                <a:rPr lang="en-CA" sz="1000" dirty="0">
+                  <a:latin typeface="Arial" panose="020B0604020202020204" pitchFamily="34" charset="0"/>
+                  <a:cs typeface="Arial" panose="020B0604020202020204" pitchFamily="34" charset="0"/>
+                </a:rPr>
+                <a:t>Mean = 734 kg/m</a:t>
+              </a:r>
+            </a:p>
+            <a:p>
+              <a:r>
+                <a:rPr lang="en-CA" sz="1000" dirty="0">
+                  <a:solidFill>
+                    <a:srgbClr val="0000FF"/>
+                  </a:solidFill>
+                  <a:latin typeface="Arial" panose="020B0604020202020204" pitchFamily="34" charset="0"/>
+                  <a:cs typeface="Arial" panose="020B0604020202020204" pitchFamily="34" charset="0"/>
+                </a:rPr>
+                <a:t>OPB = 1227 kg/m</a:t>
+              </a:r>
+            </a:p>
+            <a:p>
+              <a:r>
+                <a:rPr lang="en-CA" sz="1000" dirty="0">
+                  <a:solidFill>
+                    <a:srgbClr val="0000FF"/>
+                  </a:solidFill>
+                  <a:latin typeface="Arial" panose="020B0604020202020204" pitchFamily="34" charset="0"/>
+                  <a:cs typeface="Arial" panose="020B0604020202020204" pitchFamily="34" charset="0"/>
+                </a:rPr>
+                <a:t>SES = 2.24</a:t>
+              </a:r>
+            </a:p>
+          </p:txBody>
+        </p:sp>
+      </p:grpSp>
+    </p:spTree>
+    <p:extLst>
+      <p:ext uri="{BB962C8B-B14F-4D97-AF65-F5344CB8AC3E}">
+        <p14:creationId xmlns:p14="http://schemas.microsoft.com/office/powerpoint/2010/main" val="776127107"/>
+      </p:ext>
+    </p:extLst>
+  </p:cSld>
+  <p:clrMapOvr>
+    <a:masterClrMapping/>
+  </p:clrMapOvr>
+</p:sld>
+</file>
+
+<file path=ppt/slides/slide9.xml><?xml version="1.0" encoding="utf-8"?>
+<p:sld xmlns:a="http://schemas.openxmlformats.org/drawingml/2006/main" xmlns:r="http://schemas.openxmlformats.org/officeDocument/2006/relationships" xmlns:p="http://schemas.openxmlformats.org/presentationml/2006/main">
+  <p:cSld>
+    <p:spTree>
+      <p:nvGrpSpPr>
+        <p:cNvPr id="1" name=""/>
+        <p:cNvGrpSpPr/>
+        <p:nvPr/>
+      </p:nvGrpSpPr>
+      <p:grpSpPr>
+        <a:xfrm>
+          <a:off x="0" y="0"/>
+          <a:ext cx="0" cy="0"/>
+          <a:chOff x="0" y="0"/>
+          <a:chExt cx="0" cy="0"/>
+        </a:xfrm>
+      </p:grpSpPr>
+      <p:grpSp>
+        <p:nvGrpSpPr>
+          <p:cNvPr id="14" name="Group 13">
+            <a:extLst>
+              <a:ext uri="{FF2B5EF4-FFF2-40B4-BE49-F238E27FC236}">
+                <a16:creationId xmlns:a16="http://schemas.microsoft.com/office/drawing/2014/main" id="{644EEAB0-FD62-F29B-E989-5E3AF00A02CD}"/>
+              </a:ext>
+            </a:extLst>
+          </p:cNvPr>
+          <p:cNvGrpSpPr/>
+          <p:nvPr/>
+        </p:nvGrpSpPr>
+        <p:grpSpPr>
+          <a:xfrm>
+            <a:off x="925288" y="103416"/>
+            <a:ext cx="6048000" cy="3888000"/>
+            <a:chOff x="925286" y="103414"/>
+            <a:chExt cx="10341428" cy="6651171"/>
           </a:xfrm>
         </p:grpSpPr>
         <p:grpSp>
           <p:nvGrpSpPr>
-            <p:cNvPr id="8" name="Group 7">
+            <p:cNvPr id="11" name="Group 10">
               <a:extLst>
                 <a:ext uri="{FF2B5EF4-FFF2-40B4-BE49-F238E27FC236}">
-                  <a16:creationId xmlns:a16="http://schemas.microsoft.com/office/drawing/2014/main" id="{4B096DDE-6996-3CF8-F55C-03A8708B9AF8}"/>
+                  <a16:creationId xmlns:a16="http://schemas.microsoft.com/office/drawing/2014/main" id="{569C9B2A-5888-18C4-4110-35F506F17DD5}"/>
                 </a:ext>
               </a:extLst>
             </p:cNvPr>
@@ -5297,18 +5505,18 @@
           </p:nvGrpSpPr>
           <p:grpSpPr>
             <a:xfrm>
-              <a:off x="2858947" y="289367"/>
-              <a:ext cx="7022958" cy="6354502"/>
-              <a:chOff x="2310095" y="0"/>
-              <a:chExt cx="7571810" cy="6858000"/>
+              <a:off x="925286" y="103414"/>
+              <a:ext cx="10341428" cy="6651171"/>
+              <a:chOff x="952500" y="0"/>
+              <a:chExt cx="10814957" cy="6858000"/>
             </a:xfrm>
           </p:grpSpPr>
           <p:pic>
             <p:nvPicPr>
-              <p:cNvPr id="3" name="Picture 2" descr="A chart with blue and orange dots&#10;&#10;AI-generated content may be incorrect.">
+              <p:cNvPr id="9" name="Picture 8" descr="A group of different colored columns&#10;&#10;AI-generated content may be incorrect.">
                 <a:extLst>
                   <a:ext uri="{FF2B5EF4-FFF2-40B4-BE49-F238E27FC236}">
-                    <a16:creationId xmlns:a16="http://schemas.microsoft.com/office/drawing/2014/main" id="{A347563D-9FC3-4054-7D5F-6AD821AF5F06}"/>
+                    <a16:creationId xmlns:a16="http://schemas.microsoft.com/office/drawing/2014/main" id="{19A74E5F-9A75-E3F9-4C32-1D309EBEBE47}"/>
                   </a:ext>
                 </a:extLst>
               </p:cNvPr>
@@ -5325,493 +5533,160 @@
                   </a:ext>
                 </a:extLst>
               </a:blip>
-              <a:stretch>
-                <a:fillRect/>
-              </a:stretch>
+              <a:srcRect r="50000"/>
+              <a:stretch/>
             </p:blipFill>
             <p:spPr>
               <a:xfrm>
-                <a:off x="2310095" y="0"/>
-                <a:ext cx="7571810" cy="6858000"/>
+                <a:off x="952500" y="0"/>
+                <a:ext cx="5143500" cy="6858000"/>
               </a:xfrm>
               <a:prstGeom prst="rect">
                 <a:avLst/>
               </a:prstGeom>
             </p:spPr>
           </p:pic>
-          <p:sp>
-            <p:nvSpPr>
-              <p:cNvPr id="7" name="Freeform: Shape 6">
+          <p:pic>
+            <p:nvPicPr>
+              <p:cNvPr id="10" name="Picture 9" descr="A group of different colored columns&#10;&#10;AI-generated content may be incorrect.">
                 <a:extLst>
                   <a:ext uri="{FF2B5EF4-FFF2-40B4-BE49-F238E27FC236}">
-                    <a16:creationId xmlns:a16="http://schemas.microsoft.com/office/drawing/2014/main" id="{E0E921C2-3B6C-059D-30B7-532E2C5D1A4B}"/>
+                    <a16:creationId xmlns:a16="http://schemas.microsoft.com/office/drawing/2014/main" id="{70838E99-00D4-D272-0E54-46E6E3570A5E}"/>
                   </a:ext>
                 </a:extLst>
               </p:cNvPr>
-              <p:cNvSpPr/>
+              <p:cNvPicPr>
+                <a:picLocks noChangeAspect="1"/>
+              </p:cNvPicPr>
               <p:nvPr/>
-            </p:nvSpPr>
+            </p:nvPicPr>
+            <p:blipFill>
+              <a:blip r:embed="rId2">
+                <a:extLst>
+                  <a:ext uri="{28A0092B-C50C-407E-A947-70E740481C1C}">
+                    <a14:useLocalDpi xmlns:a14="http://schemas.microsoft.com/office/drawing/2010/main" val="0"/>
+                  </a:ext>
+                </a:extLst>
+              </a:blip>
+              <a:srcRect l="49471" r="-900"/>
+              <a:stretch/>
+            </p:blipFill>
             <p:spPr>
               <a:xfrm>
-                <a:off x="3657600" y="1134319"/>
-                <a:ext cx="4838218" cy="3680749"/>
+                <a:off x="6477000" y="0"/>
+                <a:ext cx="5290457" cy="6858000"/>
               </a:xfrm>
-              <a:custGeom>
+              <a:prstGeom prst="rect">
                 <a:avLst/>
-                <a:gdLst>
-                  <a:gd name="connsiteX0" fmla="*/ 694481 w 5000263"/>
-                  <a:gd name="connsiteY0" fmla="*/ 3970117 h 3970117"/>
-                  <a:gd name="connsiteX1" fmla="*/ 1689904 w 5000263"/>
-                  <a:gd name="connsiteY1" fmla="*/ 3055717 h 3970117"/>
-                  <a:gd name="connsiteX2" fmla="*/ 3078866 w 5000263"/>
-                  <a:gd name="connsiteY2" fmla="*/ 2095018 h 3970117"/>
-                  <a:gd name="connsiteX3" fmla="*/ 4629873 w 5000263"/>
-                  <a:gd name="connsiteY3" fmla="*/ 2025570 h 3970117"/>
-                  <a:gd name="connsiteX4" fmla="*/ 5000263 w 5000263"/>
-                  <a:gd name="connsiteY4" fmla="*/ 1585732 h 3970117"/>
-                  <a:gd name="connsiteX5" fmla="*/ 4653023 w 5000263"/>
-                  <a:gd name="connsiteY5" fmla="*/ 902825 h 3970117"/>
-                  <a:gd name="connsiteX6" fmla="*/ 4282633 w 5000263"/>
-                  <a:gd name="connsiteY6" fmla="*/ 150471 h 3970117"/>
-                  <a:gd name="connsiteX7" fmla="*/ 3356658 w 5000263"/>
-                  <a:gd name="connsiteY7" fmla="*/ 0 h 3970117"/>
-                  <a:gd name="connsiteX8" fmla="*/ 104172 w 5000263"/>
-                  <a:gd name="connsiteY8" fmla="*/ 185195 h 3970117"/>
-                  <a:gd name="connsiteX9" fmla="*/ 0 w 5000263"/>
-                  <a:gd name="connsiteY9" fmla="*/ 3368233 h 3970117"/>
-                  <a:gd name="connsiteX10" fmla="*/ 694481 w 5000263"/>
-                  <a:gd name="connsiteY10" fmla="*/ 3970117 h 3970117"/>
-                  <a:gd name="connsiteX0" fmla="*/ 659757 w 5000263"/>
-                  <a:gd name="connsiteY0" fmla="*/ 3831220 h 3831220"/>
-                  <a:gd name="connsiteX1" fmla="*/ 1689904 w 5000263"/>
-                  <a:gd name="connsiteY1" fmla="*/ 3055717 h 3831220"/>
-                  <a:gd name="connsiteX2" fmla="*/ 3078866 w 5000263"/>
-                  <a:gd name="connsiteY2" fmla="*/ 2095018 h 3831220"/>
-                  <a:gd name="connsiteX3" fmla="*/ 4629873 w 5000263"/>
-                  <a:gd name="connsiteY3" fmla="*/ 2025570 h 3831220"/>
-                  <a:gd name="connsiteX4" fmla="*/ 5000263 w 5000263"/>
-                  <a:gd name="connsiteY4" fmla="*/ 1585732 h 3831220"/>
-                  <a:gd name="connsiteX5" fmla="*/ 4653023 w 5000263"/>
-                  <a:gd name="connsiteY5" fmla="*/ 902825 h 3831220"/>
-                  <a:gd name="connsiteX6" fmla="*/ 4282633 w 5000263"/>
-                  <a:gd name="connsiteY6" fmla="*/ 150471 h 3831220"/>
-                  <a:gd name="connsiteX7" fmla="*/ 3356658 w 5000263"/>
-                  <a:gd name="connsiteY7" fmla="*/ 0 h 3831220"/>
-                  <a:gd name="connsiteX8" fmla="*/ 104172 w 5000263"/>
-                  <a:gd name="connsiteY8" fmla="*/ 185195 h 3831220"/>
-                  <a:gd name="connsiteX9" fmla="*/ 0 w 5000263"/>
-                  <a:gd name="connsiteY9" fmla="*/ 3368233 h 3831220"/>
-                  <a:gd name="connsiteX10" fmla="*/ 659757 w 5000263"/>
-                  <a:gd name="connsiteY10" fmla="*/ 3831220 h 3831220"/>
-                  <a:gd name="connsiteX0" fmla="*/ 659757 w 5000263"/>
-                  <a:gd name="connsiteY0" fmla="*/ 3831220 h 3831220"/>
-                  <a:gd name="connsiteX1" fmla="*/ 1551008 w 5000263"/>
-                  <a:gd name="connsiteY1" fmla="*/ 2974694 h 3831220"/>
-                  <a:gd name="connsiteX2" fmla="*/ 3078866 w 5000263"/>
-                  <a:gd name="connsiteY2" fmla="*/ 2095018 h 3831220"/>
-                  <a:gd name="connsiteX3" fmla="*/ 4629873 w 5000263"/>
-                  <a:gd name="connsiteY3" fmla="*/ 2025570 h 3831220"/>
-                  <a:gd name="connsiteX4" fmla="*/ 5000263 w 5000263"/>
-                  <a:gd name="connsiteY4" fmla="*/ 1585732 h 3831220"/>
-                  <a:gd name="connsiteX5" fmla="*/ 4653023 w 5000263"/>
-                  <a:gd name="connsiteY5" fmla="*/ 902825 h 3831220"/>
-                  <a:gd name="connsiteX6" fmla="*/ 4282633 w 5000263"/>
-                  <a:gd name="connsiteY6" fmla="*/ 150471 h 3831220"/>
-                  <a:gd name="connsiteX7" fmla="*/ 3356658 w 5000263"/>
-                  <a:gd name="connsiteY7" fmla="*/ 0 h 3831220"/>
-                  <a:gd name="connsiteX8" fmla="*/ 104172 w 5000263"/>
-                  <a:gd name="connsiteY8" fmla="*/ 185195 h 3831220"/>
-                  <a:gd name="connsiteX9" fmla="*/ 0 w 5000263"/>
-                  <a:gd name="connsiteY9" fmla="*/ 3368233 h 3831220"/>
-                  <a:gd name="connsiteX10" fmla="*/ 659757 w 5000263"/>
-                  <a:gd name="connsiteY10" fmla="*/ 3831220 h 3831220"/>
-                  <a:gd name="connsiteX0" fmla="*/ 659757 w 5000263"/>
-                  <a:gd name="connsiteY0" fmla="*/ 3831220 h 3831220"/>
-                  <a:gd name="connsiteX1" fmla="*/ 1551008 w 5000263"/>
-                  <a:gd name="connsiteY1" fmla="*/ 2974694 h 3831220"/>
-                  <a:gd name="connsiteX2" fmla="*/ 2997843 w 5000263"/>
-                  <a:gd name="connsiteY2" fmla="*/ 1979271 h 3831220"/>
-                  <a:gd name="connsiteX3" fmla="*/ 4629873 w 5000263"/>
-                  <a:gd name="connsiteY3" fmla="*/ 2025570 h 3831220"/>
-                  <a:gd name="connsiteX4" fmla="*/ 5000263 w 5000263"/>
-                  <a:gd name="connsiteY4" fmla="*/ 1585732 h 3831220"/>
-                  <a:gd name="connsiteX5" fmla="*/ 4653023 w 5000263"/>
-                  <a:gd name="connsiteY5" fmla="*/ 902825 h 3831220"/>
-                  <a:gd name="connsiteX6" fmla="*/ 4282633 w 5000263"/>
-                  <a:gd name="connsiteY6" fmla="*/ 150471 h 3831220"/>
-                  <a:gd name="connsiteX7" fmla="*/ 3356658 w 5000263"/>
-                  <a:gd name="connsiteY7" fmla="*/ 0 h 3831220"/>
-                  <a:gd name="connsiteX8" fmla="*/ 104172 w 5000263"/>
-                  <a:gd name="connsiteY8" fmla="*/ 185195 h 3831220"/>
-                  <a:gd name="connsiteX9" fmla="*/ 0 w 5000263"/>
-                  <a:gd name="connsiteY9" fmla="*/ 3368233 h 3831220"/>
-                  <a:gd name="connsiteX10" fmla="*/ 659757 w 5000263"/>
-                  <a:gd name="connsiteY10" fmla="*/ 3831220 h 3831220"/>
-                  <a:gd name="connsiteX0" fmla="*/ 659757 w 5000263"/>
-                  <a:gd name="connsiteY0" fmla="*/ 3831220 h 3831220"/>
-                  <a:gd name="connsiteX1" fmla="*/ 1551008 w 5000263"/>
-                  <a:gd name="connsiteY1" fmla="*/ 2974694 h 3831220"/>
-                  <a:gd name="connsiteX2" fmla="*/ 2997843 w 5000263"/>
-                  <a:gd name="connsiteY2" fmla="*/ 1979271 h 3831220"/>
-                  <a:gd name="connsiteX3" fmla="*/ 4595149 w 5000263"/>
-                  <a:gd name="connsiteY3" fmla="*/ 1909823 h 3831220"/>
-                  <a:gd name="connsiteX4" fmla="*/ 5000263 w 5000263"/>
-                  <a:gd name="connsiteY4" fmla="*/ 1585732 h 3831220"/>
-                  <a:gd name="connsiteX5" fmla="*/ 4653023 w 5000263"/>
-                  <a:gd name="connsiteY5" fmla="*/ 902825 h 3831220"/>
-                  <a:gd name="connsiteX6" fmla="*/ 4282633 w 5000263"/>
-                  <a:gd name="connsiteY6" fmla="*/ 150471 h 3831220"/>
-                  <a:gd name="connsiteX7" fmla="*/ 3356658 w 5000263"/>
-                  <a:gd name="connsiteY7" fmla="*/ 0 h 3831220"/>
-                  <a:gd name="connsiteX8" fmla="*/ 104172 w 5000263"/>
-                  <a:gd name="connsiteY8" fmla="*/ 185195 h 3831220"/>
-                  <a:gd name="connsiteX9" fmla="*/ 0 w 5000263"/>
-                  <a:gd name="connsiteY9" fmla="*/ 3368233 h 3831220"/>
-                  <a:gd name="connsiteX10" fmla="*/ 659757 w 5000263"/>
-                  <a:gd name="connsiteY10" fmla="*/ 3831220 h 3831220"/>
-                  <a:gd name="connsiteX0" fmla="*/ 659757 w 5000263"/>
-                  <a:gd name="connsiteY0" fmla="*/ 3831220 h 3831220"/>
-                  <a:gd name="connsiteX1" fmla="*/ 1551008 w 5000263"/>
-                  <a:gd name="connsiteY1" fmla="*/ 2974694 h 3831220"/>
-                  <a:gd name="connsiteX2" fmla="*/ 2997843 w 5000263"/>
-                  <a:gd name="connsiteY2" fmla="*/ 1979271 h 3831220"/>
-                  <a:gd name="connsiteX3" fmla="*/ 4537275 w 5000263"/>
-                  <a:gd name="connsiteY3" fmla="*/ 1909823 h 3831220"/>
-                  <a:gd name="connsiteX4" fmla="*/ 5000263 w 5000263"/>
-                  <a:gd name="connsiteY4" fmla="*/ 1585732 h 3831220"/>
-                  <a:gd name="connsiteX5" fmla="*/ 4653023 w 5000263"/>
-                  <a:gd name="connsiteY5" fmla="*/ 902825 h 3831220"/>
-                  <a:gd name="connsiteX6" fmla="*/ 4282633 w 5000263"/>
-                  <a:gd name="connsiteY6" fmla="*/ 150471 h 3831220"/>
-                  <a:gd name="connsiteX7" fmla="*/ 3356658 w 5000263"/>
-                  <a:gd name="connsiteY7" fmla="*/ 0 h 3831220"/>
-                  <a:gd name="connsiteX8" fmla="*/ 104172 w 5000263"/>
-                  <a:gd name="connsiteY8" fmla="*/ 185195 h 3831220"/>
-                  <a:gd name="connsiteX9" fmla="*/ 0 w 5000263"/>
-                  <a:gd name="connsiteY9" fmla="*/ 3368233 h 3831220"/>
-                  <a:gd name="connsiteX10" fmla="*/ 659757 w 5000263"/>
-                  <a:gd name="connsiteY10" fmla="*/ 3831220 h 3831220"/>
-                  <a:gd name="connsiteX0" fmla="*/ 659757 w 5000263"/>
-                  <a:gd name="connsiteY0" fmla="*/ 3831220 h 3831220"/>
-                  <a:gd name="connsiteX1" fmla="*/ 1551008 w 5000263"/>
-                  <a:gd name="connsiteY1" fmla="*/ 2974694 h 3831220"/>
-                  <a:gd name="connsiteX2" fmla="*/ 2997843 w 5000263"/>
-                  <a:gd name="connsiteY2" fmla="*/ 1979271 h 3831220"/>
-                  <a:gd name="connsiteX3" fmla="*/ 4560424 w 5000263"/>
-                  <a:gd name="connsiteY3" fmla="*/ 1875099 h 3831220"/>
-                  <a:gd name="connsiteX4" fmla="*/ 5000263 w 5000263"/>
-                  <a:gd name="connsiteY4" fmla="*/ 1585732 h 3831220"/>
-                  <a:gd name="connsiteX5" fmla="*/ 4653023 w 5000263"/>
-                  <a:gd name="connsiteY5" fmla="*/ 902825 h 3831220"/>
-                  <a:gd name="connsiteX6" fmla="*/ 4282633 w 5000263"/>
-                  <a:gd name="connsiteY6" fmla="*/ 150471 h 3831220"/>
-                  <a:gd name="connsiteX7" fmla="*/ 3356658 w 5000263"/>
-                  <a:gd name="connsiteY7" fmla="*/ 0 h 3831220"/>
-                  <a:gd name="connsiteX8" fmla="*/ 104172 w 5000263"/>
-                  <a:gd name="connsiteY8" fmla="*/ 185195 h 3831220"/>
-                  <a:gd name="connsiteX9" fmla="*/ 0 w 5000263"/>
-                  <a:gd name="connsiteY9" fmla="*/ 3368233 h 3831220"/>
-                  <a:gd name="connsiteX10" fmla="*/ 659757 w 5000263"/>
-                  <a:gd name="connsiteY10" fmla="*/ 3831220 h 3831220"/>
-                  <a:gd name="connsiteX0" fmla="*/ 659757 w 4838218"/>
-                  <a:gd name="connsiteY0" fmla="*/ 3831220 h 3831220"/>
-                  <a:gd name="connsiteX1" fmla="*/ 1551008 w 4838218"/>
-                  <a:gd name="connsiteY1" fmla="*/ 2974694 h 3831220"/>
-                  <a:gd name="connsiteX2" fmla="*/ 2997843 w 4838218"/>
-                  <a:gd name="connsiteY2" fmla="*/ 1979271 h 3831220"/>
-                  <a:gd name="connsiteX3" fmla="*/ 4560424 w 4838218"/>
-                  <a:gd name="connsiteY3" fmla="*/ 1875099 h 3831220"/>
-                  <a:gd name="connsiteX4" fmla="*/ 4838218 w 4838218"/>
-                  <a:gd name="connsiteY4" fmla="*/ 1574158 h 3831220"/>
-                  <a:gd name="connsiteX5" fmla="*/ 4653023 w 4838218"/>
-                  <a:gd name="connsiteY5" fmla="*/ 902825 h 3831220"/>
-                  <a:gd name="connsiteX6" fmla="*/ 4282633 w 4838218"/>
-                  <a:gd name="connsiteY6" fmla="*/ 150471 h 3831220"/>
-                  <a:gd name="connsiteX7" fmla="*/ 3356658 w 4838218"/>
-                  <a:gd name="connsiteY7" fmla="*/ 0 h 3831220"/>
-                  <a:gd name="connsiteX8" fmla="*/ 104172 w 4838218"/>
-                  <a:gd name="connsiteY8" fmla="*/ 185195 h 3831220"/>
-                  <a:gd name="connsiteX9" fmla="*/ 0 w 4838218"/>
-                  <a:gd name="connsiteY9" fmla="*/ 3368233 h 3831220"/>
-                  <a:gd name="connsiteX10" fmla="*/ 659757 w 4838218"/>
-                  <a:gd name="connsiteY10" fmla="*/ 3831220 h 3831220"/>
-                  <a:gd name="connsiteX0" fmla="*/ 659757 w 4838218"/>
-                  <a:gd name="connsiteY0" fmla="*/ 3831220 h 3831220"/>
-                  <a:gd name="connsiteX1" fmla="*/ 1551008 w 4838218"/>
-                  <a:gd name="connsiteY1" fmla="*/ 2974694 h 3831220"/>
-                  <a:gd name="connsiteX2" fmla="*/ 2997843 w 4838218"/>
-                  <a:gd name="connsiteY2" fmla="*/ 1979271 h 3831220"/>
-                  <a:gd name="connsiteX3" fmla="*/ 4560424 w 4838218"/>
-                  <a:gd name="connsiteY3" fmla="*/ 1875099 h 3831220"/>
-                  <a:gd name="connsiteX4" fmla="*/ 4838218 w 4838218"/>
-                  <a:gd name="connsiteY4" fmla="*/ 1585732 h 3831220"/>
-                  <a:gd name="connsiteX5" fmla="*/ 4653023 w 4838218"/>
-                  <a:gd name="connsiteY5" fmla="*/ 902825 h 3831220"/>
-                  <a:gd name="connsiteX6" fmla="*/ 4282633 w 4838218"/>
-                  <a:gd name="connsiteY6" fmla="*/ 150471 h 3831220"/>
-                  <a:gd name="connsiteX7" fmla="*/ 3356658 w 4838218"/>
-                  <a:gd name="connsiteY7" fmla="*/ 0 h 3831220"/>
-                  <a:gd name="connsiteX8" fmla="*/ 104172 w 4838218"/>
-                  <a:gd name="connsiteY8" fmla="*/ 185195 h 3831220"/>
-                  <a:gd name="connsiteX9" fmla="*/ 0 w 4838218"/>
-                  <a:gd name="connsiteY9" fmla="*/ 3368233 h 3831220"/>
-                  <a:gd name="connsiteX10" fmla="*/ 659757 w 4838218"/>
-                  <a:gd name="connsiteY10" fmla="*/ 3831220 h 3831220"/>
-                  <a:gd name="connsiteX0" fmla="*/ 659757 w 4838218"/>
-                  <a:gd name="connsiteY0" fmla="*/ 3831220 h 3831220"/>
-                  <a:gd name="connsiteX1" fmla="*/ 1551008 w 4838218"/>
-                  <a:gd name="connsiteY1" fmla="*/ 2974694 h 3831220"/>
-                  <a:gd name="connsiteX2" fmla="*/ 2997843 w 4838218"/>
-                  <a:gd name="connsiteY2" fmla="*/ 1979271 h 3831220"/>
-                  <a:gd name="connsiteX3" fmla="*/ 4560424 w 4838218"/>
-                  <a:gd name="connsiteY3" fmla="*/ 1875099 h 3831220"/>
-                  <a:gd name="connsiteX4" fmla="*/ 4838218 w 4838218"/>
-                  <a:gd name="connsiteY4" fmla="*/ 1585732 h 3831220"/>
-                  <a:gd name="connsiteX5" fmla="*/ 4537276 w 4838218"/>
-                  <a:gd name="connsiteY5" fmla="*/ 1053296 h 3831220"/>
-                  <a:gd name="connsiteX6" fmla="*/ 4282633 w 4838218"/>
-                  <a:gd name="connsiteY6" fmla="*/ 150471 h 3831220"/>
-                  <a:gd name="connsiteX7" fmla="*/ 3356658 w 4838218"/>
-                  <a:gd name="connsiteY7" fmla="*/ 0 h 3831220"/>
-                  <a:gd name="connsiteX8" fmla="*/ 104172 w 4838218"/>
-                  <a:gd name="connsiteY8" fmla="*/ 185195 h 3831220"/>
-                  <a:gd name="connsiteX9" fmla="*/ 0 w 4838218"/>
-                  <a:gd name="connsiteY9" fmla="*/ 3368233 h 3831220"/>
-                  <a:gd name="connsiteX10" fmla="*/ 659757 w 4838218"/>
-                  <a:gd name="connsiteY10" fmla="*/ 3831220 h 3831220"/>
-                  <a:gd name="connsiteX0" fmla="*/ 659757 w 4838218"/>
-                  <a:gd name="connsiteY0" fmla="*/ 3831220 h 3831220"/>
-                  <a:gd name="connsiteX1" fmla="*/ 1551008 w 4838218"/>
-                  <a:gd name="connsiteY1" fmla="*/ 2974694 h 3831220"/>
-                  <a:gd name="connsiteX2" fmla="*/ 2997843 w 4838218"/>
-                  <a:gd name="connsiteY2" fmla="*/ 1979271 h 3831220"/>
-                  <a:gd name="connsiteX3" fmla="*/ 4560424 w 4838218"/>
-                  <a:gd name="connsiteY3" fmla="*/ 1875099 h 3831220"/>
-                  <a:gd name="connsiteX4" fmla="*/ 4838218 w 4838218"/>
-                  <a:gd name="connsiteY4" fmla="*/ 1585732 h 3831220"/>
-                  <a:gd name="connsiteX5" fmla="*/ 4560425 w 4838218"/>
-                  <a:gd name="connsiteY5" fmla="*/ 1030147 h 3831220"/>
-                  <a:gd name="connsiteX6" fmla="*/ 4282633 w 4838218"/>
-                  <a:gd name="connsiteY6" fmla="*/ 150471 h 3831220"/>
-                  <a:gd name="connsiteX7" fmla="*/ 3356658 w 4838218"/>
-                  <a:gd name="connsiteY7" fmla="*/ 0 h 3831220"/>
-                  <a:gd name="connsiteX8" fmla="*/ 104172 w 4838218"/>
-                  <a:gd name="connsiteY8" fmla="*/ 185195 h 3831220"/>
-                  <a:gd name="connsiteX9" fmla="*/ 0 w 4838218"/>
-                  <a:gd name="connsiteY9" fmla="*/ 3368233 h 3831220"/>
-                  <a:gd name="connsiteX10" fmla="*/ 659757 w 4838218"/>
-                  <a:gd name="connsiteY10" fmla="*/ 3831220 h 3831220"/>
-                  <a:gd name="connsiteX0" fmla="*/ 659757 w 4838218"/>
-                  <a:gd name="connsiteY0" fmla="*/ 3831220 h 3831220"/>
-                  <a:gd name="connsiteX1" fmla="*/ 1551008 w 4838218"/>
-                  <a:gd name="connsiteY1" fmla="*/ 2974694 h 3831220"/>
-                  <a:gd name="connsiteX2" fmla="*/ 2997843 w 4838218"/>
-                  <a:gd name="connsiteY2" fmla="*/ 1979271 h 3831220"/>
-                  <a:gd name="connsiteX3" fmla="*/ 4560424 w 4838218"/>
-                  <a:gd name="connsiteY3" fmla="*/ 1875099 h 3831220"/>
-                  <a:gd name="connsiteX4" fmla="*/ 4838218 w 4838218"/>
-                  <a:gd name="connsiteY4" fmla="*/ 1585732 h 3831220"/>
-                  <a:gd name="connsiteX5" fmla="*/ 4560425 w 4838218"/>
-                  <a:gd name="connsiteY5" fmla="*/ 1030147 h 3831220"/>
-                  <a:gd name="connsiteX6" fmla="*/ 4213184 w 4838218"/>
-                  <a:gd name="connsiteY6" fmla="*/ 277792 h 3831220"/>
-                  <a:gd name="connsiteX7" fmla="*/ 3356658 w 4838218"/>
-                  <a:gd name="connsiteY7" fmla="*/ 0 h 3831220"/>
-                  <a:gd name="connsiteX8" fmla="*/ 104172 w 4838218"/>
-                  <a:gd name="connsiteY8" fmla="*/ 185195 h 3831220"/>
-                  <a:gd name="connsiteX9" fmla="*/ 0 w 4838218"/>
-                  <a:gd name="connsiteY9" fmla="*/ 3368233 h 3831220"/>
-                  <a:gd name="connsiteX10" fmla="*/ 659757 w 4838218"/>
-                  <a:gd name="connsiteY10" fmla="*/ 3831220 h 3831220"/>
-                  <a:gd name="connsiteX0" fmla="*/ 659757 w 4838218"/>
-                  <a:gd name="connsiteY0" fmla="*/ 3680749 h 3680749"/>
-                  <a:gd name="connsiteX1" fmla="*/ 1551008 w 4838218"/>
-                  <a:gd name="connsiteY1" fmla="*/ 2824223 h 3680749"/>
-                  <a:gd name="connsiteX2" fmla="*/ 2997843 w 4838218"/>
-                  <a:gd name="connsiteY2" fmla="*/ 1828800 h 3680749"/>
-                  <a:gd name="connsiteX3" fmla="*/ 4560424 w 4838218"/>
-                  <a:gd name="connsiteY3" fmla="*/ 1724628 h 3680749"/>
-                  <a:gd name="connsiteX4" fmla="*/ 4838218 w 4838218"/>
-                  <a:gd name="connsiteY4" fmla="*/ 1435261 h 3680749"/>
-                  <a:gd name="connsiteX5" fmla="*/ 4560425 w 4838218"/>
-                  <a:gd name="connsiteY5" fmla="*/ 879676 h 3680749"/>
-                  <a:gd name="connsiteX6" fmla="*/ 4213184 w 4838218"/>
-                  <a:gd name="connsiteY6" fmla="*/ 127321 h 3680749"/>
-                  <a:gd name="connsiteX7" fmla="*/ 3391382 w 4838218"/>
-                  <a:gd name="connsiteY7" fmla="*/ 0 h 3680749"/>
-                  <a:gd name="connsiteX8" fmla="*/ 104172 w 4838218"/>
-                  <a:gd name="connsiteY8" fmla="*/ 34724 h 3680749"/>
-                  <a:gd name="connsiteX9" fmla="*/ 0 w 4838218"/>
-                  <a:gd name="connsiteY9" fmla="*/ 3217762 h 3680749"/>
-                  <a:gd name="connsiteX10" fmla="*/ 659757 w 4838218"/>
-                  <a:gd name="connsiteY10" fmla="*/ 3680749 h 3680749"/>
-                  <a:gd name="connsiteX0" fmla="*/ 659757 w 4838218"/>
-                  <a:gd name="connsiteY0" fmla="*/ 3680749 h 3680749"/>
-                  <a:gd name="connsiteX1" fmla="*/ 1551008 w 4838218"/>
-                  <a:gd name="connsiteY1" fmla="*/ 2824223 h 3680749"/>
-                  <a:gd name="connsiteX2" fmla="*/ 2997843 w 4838218"/>
-                  <a:gd name="connsiteY2" fmla="*/ 1828800 h 3680749"/>
-                  <a:gd name="connsiteX3" fmla="*/ 4560424 w 4838218"/>
-                  <a:gd name="connsiteY3" fmla="*/ 1724628 h 3680749"/>
-                  <a:gd name="connsiteX4" fmla="*/ 4838218 w 4838218"/>
-                  <a:gd name="connsiteY4" fmla="*/ 1435261 h 3680749"/>
-                  <a:gd name="connsiteX5" fmla="*/ 4560425 w 4838218"/>
-                  <a:gd name="connsiteY5" fmla="*/ 879676 h 3680749"/>
-                  <a:gd name="connsiteX6" fmla="*/ 4213184 w 4838218"/>
-                  <a:gd name="connsiteY6" fmla="*/ 127321 h 3680749"/>
-                  <a:gd name="connsiteX7" fmla="*/ 3391382 w 4838218"/>
-                  <a:gd name="connsiteY7" fmla="*/ 0 h 3680749"/>
-                  <a:gd name="connsiteX8" fmla="*/ 150471 w 4838218"/>
-                  <a:gd name="connsiteY8" fmla="*/ 138896 h 3680749"/>
-                  <a:gd name="connsiteX9" fmla="*/ 0 w 4838218"/>
-                  <a:gd name="connsiteY9" fmla="*/ 3217762 h 3680749"/>
-                  <a:gd name="connsiteX10" fmla="*/ 659757 w 4838218"/>
-                  <a:gd name="connsiteY10" fmla="*/ 3680749 h 3680749"/>
-                </a:gdLst>
-                <a:ahLst/>
-                <a:cxnLst>
-                  <a:cxn ang="0">
-                    <a:pos x="connsiteX0" y="connsiteY0"/>
-                  </a:cxn>
-                  <a:cxn ang="0">
-                    <a:pos x="connsiteX1" y="connsiteY1"/>
-                  </a:cxn>
-                  <a:cxn ang="0">
-                    <a:pos x="connsiteX2" y="connsiteY2"/>
-                  </a:cxn>
-                  <a:cxn ang="0">
-                    <a:pos x="connsiteX3" y="connsiteY3"/>
-                  </a:cxn>
-                  <a:cxn ang="0">
-                    <a:pos x="connsiteX4" y="connsiteY4"/>
-                  </a:cxn>
-                  <a:cxn ang="0">
-                    <a:pos x="connsiteX5" y="connsiteY5"/>
-                  </a:cxn>
-                  <a:cxn ang="0">
-                    <a:pos x="connsiteX6" y="connsiteY6"/>
-                  </a:cxn>
-                  <a:cxn ang="0">
-                    <a:pos x="connsiteX7" y="connsiteY7"/>
-                  </a:cxn>
-                  <a:cxn ang="0">
-                    <a:pos x="connsiteX8" y="connsiteY8"/>
-                  </a:cxn>
-                  <a:cxn ang="0">
-                    <a:pos x="connsiteX9" y="connsiteY9"/>
-                  </a:cxn>
-                  <a:cxn ang="0">
-                    <a:pos x="connsiteX10" y="connsiteY10"/>
-                  </a:cxn>
-                </a:cxnLst>
-                <a:rect l="l" t="t" r="r" b="b"/>
-                <a:pathLst>
-                  <a:path w="4838218" h="3680749">
-                    <a:moveTo>
-                      <a:pt x="659757" y="3680749"/>
-                    </a:moveTo>
-                    <a:lnTo>
-                      <a:pt x="1551008" y="2824223"/>
-                    </a:lnTo>
-                    <a:lnTo>
-                      <a:pt x="2997843" y="1828800"/>
-                    </a:lnTo>
-                    <a:lnTo>
-                      <a:pt x="4560424" y="1724628"/>
-                    </a:lnTo>
-                    <a:lnTo>
-                      <a:pt x="4838218" y="1435261"/>
-                    </a:lnTo>
-                    <a:lnTo>
-                      <a:pt x="4560425" y="879676"/>
-                    </a:lnTo>
-                    <a:lnTo>
-                      <a:pt x="4213184" y="127321"/>
-                    </a:lnTo>
-                    <a:lnTo>
-                      <a:pt x="3391382" y="0"/>
-                    </a:lnTo>
-                    <a:lnTo>
-                      <a:pt x="150471" y="138896"/>
-                    </a:lnTo>
-                    <a:lnTo>
-                      <a:pt x="0" y="3217762"/>
-                    </a:lnTo>
-                    <a:lnTo>
-                      <a:pt x="659757" y="3680749"/>
-                    </a:lnTo>
-                    <a:close/>
-                  </a:path>
-                </a:pathLst>
-              </a:custGeom>
-              <a:noFill/>
-              <a:ln>
-                <a:solidFill>
-                  <a:srgbClr val="0000FF"/>
-                </a:solidFill>
-              </a:ln>
+              </a:prstGeom>
             </p:spPr>
-            <p:style>
-              <a:lnRef idx="2">
-                <a:schemeClr val="accent1">
-                  <a:shade val="15000"/>
-                </a:schemeClr>
-              </a:lnRef>
-              <a:fillRef idx="1">
-                <a:schemeClr val="accent1"/>
-              </a:fillRef>
-              <a:effectRef idx="0">
-                <a:schemeClr val="accent1"/>
-              </a:effectRef>
-              <a:fontRef idx="minor">
-                <a:schemeClr val="lt1"/>
-              </a:fontRef>
-            </p:style>
-            <p:txBody>
-              <a:bodyPr rtlCol="0" anchor="ctr"/>
-              <a:lstStyle/>
-              <a:p>
-                <a:pPr algn="ctr"/>
-                <a:endParaRPr lang="en-CA"/>
-              </a:p>
-            </p:txBody>
-          </p:sp>
+          </p:pic>
         </p:grpSp>
         <p:sp>
           <p:nvSpPr>
-            <p:cNvPr id="9" name="TextBox 8">
+            <p:cNvPr id="12" name="Rectangle 11">
               <a:extLst>
                 <a:ext uri="{FF2B5EF4-FFF2-40B4-BE49-F238E27FC236}">
-                  <a16:creationId xmlns:a16="http://schemas.microsoft.com/office/drawing/2014/main" id="{9EDC704A-4B74-1D52-2C35-B3C188B23E2B}"/>
+                  <a16:creationId xmlns:a16="http://schemas.microsoft.com/office/drawing/2014/main" id="{534EFD49-6A21-15B3-853A-BB6FC3B2EA6D}"/>
                 </a:ext>
               </a:extLst>
             </p:cNvPr>
-            <p:cNvSpPr txBox="1"/>
+            <p:cNvSpPr/>
             <p:nvPr/>
           </p:nvSpPr>
           <p:spPr>
             <a:xfrm>
-              <a:off x="2789499" y="185856"/>
-              <a:ext cx="393539" cy="461665"/>
+              <a:off x="2002973" y="3234253"/>
+              <a:ext cx="1137304" cy="194747"/>
             </a:xfrm>
             <a:prstGeom prst="rect">
               <a:avLst/>
             </a:prstGeom>
-            <a:noFill/>
+            <a:solidFill>
+              <a:schemeClr val="bg1"/>
+            </a:solidFill>
+            <a:ln>
+              <a:solidFill>
+                <a:schemeClr val="bg1"/>
+              </a:solidFill>
+            </a:ln>
           </p:spPr>
+          <p:style>
+            <a:lnRef idx="2">
+              <a:schemeClr val="accent1">
+                <a:shade val="15000"/>
+              </a:schemeClr>
+            </a:lnRef>
+            <a:fillRef idx="1">
+              <a:schemeClr val="accent1"/>
+            </a:fillRef>
+            <a:effectRef idx="0">
+              <a:schemeClr val="accent1"/>
+            </a:effectRef>
+            <a:fontRef idx="minor">
+              <a:schemeClr val="lt1"/>
+            </a:fontRef>
+          </p:style>
           <p:txBody>
-            <a:bodyPr wrap="square" rtlCol="0">
-              <a:spAutoFit/>
-            </a:bodyPr>
+            <a:bodyPr rtlCol="0" anchor="ctr"/>
             <a:lstStyle/>
             <a:p>
-              <a:r>
-                <a:rPr lang="en-CA" sz="2400" dirty="0">
-                  <a:latin typeface="Arial" panose="020B0604020202020204" pitchFamily="34" charset="0"/>
-                  <a:cs typeface="Arial" panose="020B0604020202020204" pitchFamily="34" charset="0"/>
-                </a:rPr>
-                <a:t>a</a:t>
-              </a:r>
+              <a:pPr algn="ctr"/>
+              <a:endParaRPr lang="en-CA"/>
+            </a:p>
+          </p:txBody>
+        </p:sp>
+        <p:sp>
+          <p:nvSpPr>
+            <p:cNvPr id="13" name="Rectangle 12">
+              <a:extLst>
+                <a:ext uri="{FF2B5EF4-FFF2-40B4-BE49-F238E27FC236}">
+                  <a16:creationId xmlns:a16="http://schemas.microsoft.com/office/drawing/2014/main" id="{DC71BD2D-35AF-B859-07C5-9F408BC8EA4E}"/>
+                </a:ext>
+              </a:extLst>
+            </p:cNvPr>
+            <p:cNvSpPr/>
+            <p:nvPr/>
+          </p:nvSpPr>
+          <p:spPr>
+            <a:xfrm>
+              <a:off x="7385525" y="3234253"/>
+              <a:ext cx="974702" cy="194747"/>
+            </a:xfrm>
+            <a:prstGeom prst="rect">
+              <a:avLst/>
+            </a:prstGeom>
+            <a:solidFill>
+              <a:schemeClr val="bg1"/>
+            </a:solidFill>
+            <a:ln>
+              <a:solidFill>
+                <a:schemeClr val="bg1"/>
+              </a:solidFill>
+            </a:ln>
+          </p:spPr>
+          <p:style>
+            <a:lnRef idx="2">
+              <a:schemeClr val="accent1">
+                <a:shade val="15000"/>
+              </a:schemeClr>
+            </a:lnRef>
+            <a:fillRef idx="1">
+              <a:schemeClr val="accent1"/>
+            </a:fillRef>
+            <a:effectRef idx="0">
+              <a:schemeClr val="accent1"/>
+            </a:effectRef>
+            <a:fontRef idx="minor">
+              <a:schemeClr val="lt1"/>
+            </a:fontRef>
+          </p:style>
+          <p:txBody>
+            <a:bodyPr rtlCol="0" anchor="ctr"/>
+            <a:lstStyle/>
+            <a:p>
+              <a:pPr algn="ctr"/>
+              <a:endParaRPr lang="en-CA"/>
             </a:p>
           </p:txBody>
         </p:sp>
@@ -5819,7 +5694,7 @@
     </p:spTree>
     <p:extLst>
       <p:ext uri="{BB962C8B-B14F-4D97-AF65-F5344CB8AC3E}">
-        <p14:creationId xmlns:p14="http://schemas.microsoft.com/office/powerpoint/2010/main" val="708817653"/>
+        <p14:creationId xmlns:p14="http://schemas.microsoft.com/office/powerpoint/2010/main" val="2830423783"/>
       </p:ext>
     </p:extLst>
   </p:cSld>

</xml_diff>

<commit_message>
Update alongside thesis submission
</commit_message>
<xml_diff>
--- a/MatthewTuck_Honours/plots/image preparation for honours.pptx
+++ b/MatthewTuck_Honours/plots/image preparation for honours.pptx
@@ -2,7 +2,7 @@
 <file path=ppt/presentation.xml><?xml version="1.0" encoding="utf-8"?>
 <p:presentation xmlns:a="http://schemas.openxmlformats.org/drawingml/2006/main" xmlns:r="http://schemas.openxmlformats.org/officeDocument/2006/relationships" xmlns:p="http://schemas.openxmlformats.org/presentationml/2006/main" saveSubsetFonts="1">
   <p:sldMasterIdLst>
-    <p:sldMasterId id="2147483648" r:id="rId1"/>
+    <p:sldMasterId id="2147483660" r:id="rId1"/>
   </p:sldMasterIdLst>
   <p:sldIdLst>
     <p:sldId id="256" r:id="rId2"/>
@@ -14,14 +14,15 @@
     <p:sldId id="262" r:id="rId8"/>
     <p:sldId id="260" r:id="rId9"/>
     <p:sldId id="261" r:id="rId10"/>
+    <p:sldId id="266" r:id="rId11"/>
   </p:sldIdLst>
-  <p:sldSz cx="12192000" cy="6858000"/>
+  <p:sldSz cx="12192000" cy="10223500"/>
   <p:notesSz cx="6858000" cy="9144000"/>
   <p:defaultTextStyle>
     <a:defPPr>
       <a:defRPr lang="en-US"/>
     </a:defPPr>
-    <a:lvl1pPr marL="0" algn="l" defTabSz="914400" rtl="0" eaLnBrk="1" latinLnBrk="0" hangingPunct="1">
+    <a:lvl1pPr marL="0" algn="l" defTabSz="457200" rtl="0" eaLnBrk="1" latinLnBrk="0" hangingPunct="1">
       <a:defRPr sz="1800" kern="1200">
         <a:solidFill>
           <a:schemeClr val="tx1"/>
@@ -31,7 +32,7 @@
         <a:cs typeface="+mn-cs"/>
       </a:defRPr>
     </a:lvl1pPr>
-    <a:lvl2pPr marL="457200" algn="l" defTabSz="914400" rtl="0" eaLnBrk="1" latinLnBrk="0" hangingPunct="1">
+    <a:lvl2pPr marL="457200" algn="l" defTabSz="457200" rtl="0" eaLnBrk="1" latinLnBrk="0" hangingPunct="1">
       <a:defRPr sz="1800" kern="1200">
         <a:solidFill>
           <a:schemeClr val="tx1"/>
@@ -41,7 +42,7 @@
         <a:cs typeface="+mn-cs"/>
       </a:defRPr>
     </a:lvl2pPr>
-    <a:lvl3pPr marL="914400" algn="l" defTabSz="914400" rtl="0" eaLnBrk="1" latinLnBrk="0" hangingPunct="1">
+    <a:lvl3pPr marL="914400" algn="l" defTabSz="457200" rtl="0" eaLnBrk="1" latinLnBrk="0" hangingPunct="1">
       <a:defRPr sz="1800" kern="1200">
         <a:solidFill>
           <a:schemeClr val="tx1"/>
@@ -51,7 +52,7 @@
         <a:cs typeface="+mn-cs"/>
       </a:defRPr>
     </a:lvl3pPr>
-    <a:lvl4pPr marL="1371600" algn="l" defTabSz="914400" rtl="0" eaLnBrk="1" latinLnBrk="0" hangingPunct="1">
+    <a:lvl4pPr marL="1371600" algn="l" defTabSz="457200" rtl="0" eaLnBrk="1" latinLnBrk="0" hangingPunct="1">
       <a:defRPr sz="1800" kern="1200">
         <a:solidFill>
           <a:schemeClr val="tx1"/>
@@ -61,7 +62,7 @@
         <a:cs typeface="+mn-cs"/>
       </a:defRPr>
     </a:lvl4pPr>
-    <a:lvl5pPr marL="1828800" algn="l" defTabSz="914400" rtl="0" eaLnBrk="1" latinLnBrk="0" hangingPunct="1">
+    <a:lvl5pPr marL="1828800" algn="l" defTabSz="457200" rtl="0" eaLnBrk="1" latinLnBrk="0" hangingPunct="1">
       <a:defRPr sz="1800" kern="1200">
         <a:solidFill>
           <a:schemeClr val="tx1"/>
@@ -71,7 +72,7 @@
         <a:cs typeface="+mn-cs"/>
       </a:defRPr>
     </a:lvl5pPr>
-    <a:lvl6pPr marL="2286000" algn="l" defTabSz="914400" rtl="0" eaLnBrk="1" latinLnBrk="0" hangingPunct="1">
+    <a:lvl6pPr marL="2286000" algn="l" defTabSz="457200" rtl="0" eaLnBrk="1" latinLnBrk="0" hangingPunct="1">
       <a:defRPr sz="1800" kern="1200">
         <a:solidFill>
           <a:schemeClr val="tx1"/>
@@ -81,7 +82,7 @@
         <a:cs typeface="+mn-cs"/>
       </a:defRPr>
     </a:lvl6pPr>
-    <a:lvl7pPr marL="2743200" algn="l" defTabSz="914400" rtl="0" eaLnBrk="1" latinLnBrk="0" hangingPunct="1">
+    <a:lvl7pPr marL="2743200" algn="l" defTabSz="457200" rtl="0" eaLnBrk="1" latinLnBrk="0" hangingPunct="1">
       <a:defRPr sz="1800" kern="1200">
         <a:solidFill>
           <a:schemeClr val="tx1"/>
@@ -91,7 +92,7 @@
         <a:cs typeface="+mn-cs"/>
       </a:defRPr>
     </a:lvl7pPr>
-    <a:lvl8pPr marL="3200400" algn="l" defTabSz="914400" rtl="0" eaLnBrk="1" latinLnBrk="0" hangingPunct="1">
+    <a:lvl8pPr marL="3200400" algn="l" defTabSz="457200" rtl="0" eaLnBrk="1" latinLnBrk="0" hangingPunct="1">
       <a:defRPr sz="1800" kern="1200">
         <a:solidFill>
           <a:schemeClr val="tx1"/>
@@ -101,7 +102,7 @@
         <a:cs typeface="+mn-cs"/>
       </a:defRPr>
     </a:lvl8pPr>
-    <a:lvl9pPr marL="3657600" algn="l" defTabSz="914400" rtl="0" eaLnBrk="1" latinLnBrk="0" hangingPunct="1">
+    <a:lvl9pPr marL="3657600" algn="l" defTabSz="457200" rtl="0" eaLnBrk="1" latinLnBrk="0" hangingPunct="1">
       <a:defRPr sz="1800" kern="1200">
         <a:solidFill>
           <a:schemeClr val="tx1"/>
@@ -123,7 +124,7 @@
 <file path=ppt/revisionInfo.xml><?xml version="1.0" encoding="utf-8"?>
 <p1510:revInfo xmlns:a="http://schemas.openxmlformats.org/drawingml/2006/main" xmlns:r="http://schemas.openxmlformats.org/officeDocument/2006/relationships" xmlns:p1510="http://schemas.microsoft.com/office/powerpoint/2015/10/main">
   <p1510:revLst>
-    <p1510:client id="{E167AA45-092C-45FF-8040-58DA1B5E40F4}" v="38" dt="2025-03-18T19:45:11.005"/>
+    <p1510:client id="{769C4DA5-D432-4B98-BA66-C3923B562E8D}" v="35" dt="2025-04-04T21:24:36.898"/>
   </p1510:revLst>
 </p1510:revInfo>
 </file>
@@ -159,14 +160,6 @@
             <ac:spMk id="3" creationId="{51E7DBA6-F2E3-2B10-D591-44D447113820}"/>
           </ac:spMkLst>
         </pc:spChg>
-        <pc:grpChg chg="mod">
-          <ac:chgData name="Matthew Tuck" userId="292c67f149de0640" providerId="LiveId" clId="{E167AA45-092C-45FF-8040-58DA1B5E40F4}" dt="2025-03-22T21:55:53.677" v="465" actId="14100"/>
-          <ac:grpSpMkLst>
-            <pc:docMk/>
-            <pc:sldMk cId="2389168500" sldId="256"/>
-            <ac:grpSpMk id="22" creationId="{9B788C06-E1AA-B0EB-35C3-D87419595569}"/>
-          </ac:grpSpMkLst>
-        </pc:grpChg>
       </pc:sldChg>
       <pc:sldChg chg="addSp delSp modSp mod">
         <pc:chgData name="Matthew Tuck" userId="292c67f149de0640" providerId="LiveId" clId="{E167AA45-092C-45FF-8040-58DA1B5E40F4}" dt="2025-03-17T04:20:17.264" v="58" actId="1076"/>
@@ -174,38 +167,6 @@
           <pc:docMk/>
           <pc:sldMk cId="1425793214" sldId="257"/>
         </pc:sldMkLst>
-        <pc:grpChg chg="add mod">
-          <ac:chgData name="Matthew Tuck" userId="292c67f149de0640" providerId="LiveId" clId="{E167AA45-092C-45FF-8040-58DA1B5E40F4}" dt="2025-03-17T04:20:17.264" v="58" actId="1076"/>
-          <ac:grpSpMkLst>
-            <pc:docMk/>
-            <pc:sldMk cId="1425793214" sldId="257"/>
-            <ac:grpSpMk id="12" creationId="{FD8A2F96-DE04-3ABB-1F2D-678C993328B3}"/>
-          </ac:grpSpMkLst>
-        </pc:grpChg>
-        <pc:picChg chg="add mod modCrop">
-          <ac:chgData name="Matthew Tuck" userId="292c67f149de0640" providerId="LiveId" clId="{E167AA45-092C-45FF-8040-58DA1B5E40F4}" dt="2025-03-17T04:20:06.648" v="56" actId="164"/>
-          <ac:picMkLst>
-            <pc:docMk/>
-            <pc:sldMk cId="1425793214" sldId="257"/>
-            <ac:picMk id="5" creationId="{47130567-AE6B-2F90-553D-F6A39C881D2E}"/>
-          </ac:picMkLst>
-        </pc:picChg>
-        <pc:picChg chg="add mod modCrop">
-          <ac:chgData name="Matthew Tuck" userId="292c67f149de0640" providerId="LiveId" clId="{E167AA45-092C-45FF-8040-58DA1B5E40F4}" dt="2025-03-17T04:20:06.648" v="56" actId="164"/>
-          <ac:picMkLst>
-            <pc:docMk/>
-            <pc:sldMk cId="1425793214" sldId="257"/>
-            <ac:picMk id="9" creationId="{1844B638-8D99-ADBF-C775-CBCE83BCFA0D}"/>
-          </ac:picMkLst>
-        </pc:picChg>
-        <pc:picChg chg="add mod modCrop">
-          <ac:chgData name="Matthew Tuck" userId="292c67f149de0640" providerId="LiveId" clId="{E167AA45-092C-45FF-8040-58DA1B5E40F4}" dt="2025-03-17T04:20:06.648" v="56" actId="164"/>
-          <ac:picMkLst>
-            <pc:docMk/>
-            <pc:sldMk cId="1425793214" sldId="257"/>
-            <ac:picMk id="10" creationId="{011F2306-33E6-8C9C-8F88-47A957AB5341}"/>
-          </ac:picMkLst>
-        </pc:picChg>
       </pc:sldChg>
       <pc:sldChg chg="addSp delSp modSp mod">
         <pc:chgData name="Matthew Tuck" userId="292c67f149de0640" providerId="LiveId" clId="{E167AA45-092C-45FF-8040-58DA1B5E40F4}" dt="2025-03-17T04:27:13.183" v="62" actId="962"/>
@@ -502,14 +463,6 @@
             <ac:spMk id="3" creationId="{51E7DBA6-F2E3-2B10-D591-44D447113820}"/>
           </ac:spMkLst>
         </pc:spChg>
-        <pc:spChg chg="add mod ord topLvl">
-          <ac:chgData name="Matthew Tuck" userId="292c67f149de0640" providerId="LiveId" clId="{AB2E6281-4804-4057-99C2-E96F36FD68F9}" dt="2025-02-21T21:05:38.276" v="556" actId="164"/>
-          <ac:spMkLst>
-            <pc:docMk/>
-            <pc:sldMk cId="2389168500" sldId="256"/>
-            <ac:spMk id="16" creationId="{C0A6CDF0-0E0D-40C5-A3BB-95AF09B8D3EF}"/>
-          </ac:spMkLst>
-        </pc:spChg>
         <pc:grpChg chg="add mod topLvl">
           <ac:chgData name="Matthew Tuck" userId="292c67f149de0640" providerId="LiveId" clId="{AB2E6281-4804-4057-99C2-E96F36FD68F9}" dt="2025-02-21T21:05:16.203" v="553" actId="164"/>
           <ac:grpSpMkLst>
@@ -524,22 +477,6 @@
             <pc:docMk/>
             <pc:sldMk cId="2389168500" sldId="256"/>
             <ac:grpSpMk id="15" creationId="{E2936D85-599B-6B7F-D41E-F1A30859FDD2}"/>
-          </ac:grpSpMkLst>
-        </pc:grpChg>
-        <pc:grpChg chg="add mod">
-          <ac:chgData name="Matthew Tuck" userId="292c67f149de0640" providerId="LiveId" clId="{AB2E6281-4804-4057-99C2-E96F36FD68F9}" dt="2025-02-21T21:05:38.276" v="556" actId="164"/>
-          <ac:grpSpMkLst>
-            <pc:docMk/>
-            <pc:sldMk cId="2389168500" sldId="256"/>
-            <ac:grpSpMk id="21" creationId="{DF511537-577C-5710-7B2A-26BC9D7C52E3}"/>
-          </ac:grpSpMkLst>
-        </pc:grpChg>
-        <pc:grpChg chg="add mod">
-          <ac:chgData name="Matthew Tuck" userId="292c67f149de0640" providerId="LiveId" clId="{AB2E6281-4804-4057-99C2-E96F36FD68F9}" dt="2025-02-21T21:05:46.831" v="557" actId="1076"/>
-          <ac:grpSpMkLst>
-            <pc:docMk/>
-            <pc:sldMk cId="2389168500" sldId="256"/>
-            <ac:grpSpMk id="22" creationId="{9B788C06-E1AA-B0EB-35C3-D87419595569}"/>
           </ac:grpSpMkLst>
         </pc:grpChg>
         <pc:picChg chg="mod">
@@ -634,6 +571,396 @@
       </pc:sldChg>
     </pc:docChg>
   </pc:docChgLst>
+  <pc:docChgLst>
+    <pc:chgData name="Matthew Tuck" userId="292c67f149de0640" providerId="LiveId" clId="{769C4DA5-D432-4B98-BA66-C3923B562E8D}"/>
+    <pc:docChg chg="undo custSel addSld modSld">
+      <pc:chgData name="Matthew Tuck" userId="292c67f149de0640" providerId="LiveId" clId="{769C4DA5-D432-4B98-BA66-C3923B562E8D}" dt="2025-04-04T21:26:16.649" v="1331" actId="732"/>
+      <pc:docMkLst>
+        <pc:docMk/>
+      </pc:docMkLst>
+      <pc:sldChg chg="addSp delSp modSp mod">
+        <pc:chgData name="Matthew Tuck" userId="292c67f149de0640" providerId="LiveId" clId="{769C4DA5-D432-4B98-BA66-C3923B562E8D}" dt="2025-04-04T16:43:58.611" v="23" actId="1038"/>
+        <pc:sldMkLst>
+          <pc:docMk/>
+          <pc:sldMk cId="2389168500" sldId="256"/>
+        </pc:sldMkLst>
+        <pc:spChg chg="mod">
+          <ac:chgData name="Matthew Tuck" userId="292c67f149de0640" providerId="LiveId" clId="{769C4DA5-D432-4B98-BA66-C3923B562E8D}" dt="2025-04-04T16:38:23.438" v="11" actId="165"/>
+          <ac:spMkLst>
+            <pc:docMk/>
+            <pc:sldMk cId="2389168500" sldId="256"/>
+            <ac:spMk id="2" creationId="{53588E85-51C2-BC0D-6933-D5629282428B}"/>
+          </ac:spMkLst>
+        </pc:spChg>
+        <pc:spChg chg="mod">
+          <ac:chgData name="Matthew Tuck" userId="292c67f149de0640" providerId="LiveId" clId="{769C4DA5-D432-4B98-BA66-C3923B562E8D}" dt="2025-04-04T16:38:23.438" v="11" actId="165"/>
+          <ac:spMkLst>
+            <pc:docMk/>
+            <pc:sldMk cId="2389168500" sldId="256"/>
+            <ac:spMk id="3" creationId="{51E7DBA6-F2E3-2B10-D591-44D447113820}"/>
+          </ac:spMkLst>
+        </pc:spChg>
+        <pc:spChg chg="del mod topLvl">
+          <ac:chgData name="Matthew Tuck" userId="292c67f149de0640" providerId="LiveId" clId="{769C4DA5-D432-4B98-BA66-C3923B562E8D}" dt="2025-04-04T16:38:34.321" v="12" actId="478"/>
+          <ac:spMkLst>
+            <pc:docMk/>
+            <pc:sldMk cId="2389168500" sldId="256"/>
+            <ac:spMk id="16" creationId="{C0A6CDF0-0E0D-40C5-A3BB-95AF09B8D3EF}"/>
+          </ac:spMkLst>
+        </pc:spChg>
+        <pc:grpChg chg="add mod">
+          <ac:chgData name="Matthew Tuck" userId="292c67f149de0640" providerId="LiveId" clId="{769C4DA5-D432-4B98-BA66-C3923B562E8D}" dt="2025-04-04T16:42:02.136" v="13" actId="164"/>
+          <ac:grpSpMkLst>
+            <pc:docMk/>
+            <pc:sldMk cId="2389168500" sldId="256"/>
+            <ac:grpSpMk id="4" creationId="{1447DD06-CAA1-FB71-1034-388709911FA6}"/>
+          </ac:grpSpMkLst>
+        </pc:grpChg>
+        <pc:grpChg chg="mod">
+          <ac:chgData name="Matthew Tuck" userId="292c67f149de0640" providerId="LiveId" clId="{769C4DA5-D432-4B98-BA66-C3923B562E8D}" dt="2025-04-04T16:38:23.438" v="11" actId="165"/>
+          <ac:grpSpMkLst>
+            <pc:docMk/>
+            <pc:sldMk cId="2389168500" sldId="256"/>
+            <ac:grpSpMk id="6" creationId="{784A3045-DD24-4D0B-E53D-87BAECD7EB6C}"/>
+          </ac:grpSpMkLst>
+        </pc:grpChg>
+        <pc:grpChg chg="mod topLvl">
+          <ac:chgData name="Matthew Tuck" userId="292c67f149de0640" providerId="LiveId" clId="{769C4DA5-D432-4B98-BA66-C3923B562E8D}" dt="2025-04-04T16:42:02.136" v="13" actId="164"/>
+          <ac:grpSpMkLst>
+            <pc:docMk/>
+            <pc:sldMk cId="2389168500" sldId="256"/>
+            <ac:grpSpMk id="15" creationId="{E2936D85-599B-6B7F-D41E-F1A30859FDD2}"/>
+          </ac:grpSpMkLst>
+        </pc:grpChg>
+        <pc:grpChg chg="del mod topLvl">
+          <ac:chgData name="Matthew Tuck" userId="292c67f149de0640" providerId="LiveId" clId="{769C4DA5-D432-4B98-BA66-C3923B562E8D}" dt="2025-04-04T16:38:23.438" v="11" actId="165"/>
+          <ac:grpSpMkLst>
+            <pc:docMk/>
+            <pc:sldMk cId="2389168500" sldId="256"/>
+            <ac:grpSpMk id="21" creationId="{DF511537-577C-5710-7B2A-26BC9D7C52E3}"/>
+          </ac:grpSpMkLst>
+        </pc:grpChg>
+        <pc:grpChg chg="del">
+          <ac:chgData name="Matthew Tuck" userId="292c67f149de0640" providerId="LiveId" clId="{769C4DA5-D432-4B98-BA66-C3923B562E8D}" dt="2025-04-04T16:37:53.721" v="4" actId="165"/>
+          <ac:grpSpMkLst>
+            <pc:docMk/>
+            <pc:sldMk cId="2389168500" sldId="256"/>
+            <ac:grpSpMk id="22" creationId="{9B788C06-E1AA-B0EB-35C3-D87419595569}"/>
+          </ac:grpSpMkLst>
+        </pc:grpChg>
+        <pc:picChg chg="mod">
+          <ac:chgData name="Matthew Tuck" userId="292c67f149de0640" providerId="LiveId" clId="{769C4DA5-D432-4B98-BA66-C3923B562E8D}" dt="2025-04-04T16:38:23.438" v="11" actId="165"/>
+          <ac:picMkLst>
+            <pc:docMk/>
+            <pc:sldMk cId="2389168500" sldId="256"/>
+            <ac:picMk id="7" creationId="{024D7657-1386-3BF1-9E27-C379D592751A}"/>
+          </ac:picMkLst>
+        </pc:picChg>
+        <pc:picChg chg="mod">
+          <ac:chgData name="Matthew Tuck" userId="292c67f149de0640" providerId="LiveId" clId="{769C4DA5-D432-4B98-BA66-C3923B562E8D}" dt="2025-04-04T16:43:58.611" v="23" actId="1038"/>
+          <ac:picMkLst>
+            <pc:docMk/>
+            <pc:sldMk cId="2389168500" sldId="256"/>
+            <ac:picMk id="12" creationId="{A421572D-D995-4990-4FDA-5B53D073AAE5}"/>
+          </ac:picMkLst>
+        </pc:picChg>
+        <pc:picChg chg="mod topLvl">
+          <ac:chgData name="Matthew Tuck" userId="292c67f149de0640" providerId="LiveId" clId="{769C4DA5-D432-4B98-BA66-C3923B562E8D}" dt="2025-04-04T16:42:02.136" v="13" actId="164"/>
+          <ac:picMkLst>
+            <pc:docMk/>
+            <pc:sldMk cId="2389168500" sldId="256"/>
+            <ac:picMk id="19" creationId="{3D6978F0-5245-E9F0-25F4-6FFE028F01D0}"/>
+          </ac:picMkLst>
+        </pc:picChg>
+      </pc:sldChg>
+      <pc:sldChg chg="addSp delSp modSp mod">
+        <pc:chgData name="Matthew Tuck" userId="292c67f149de0640" providerId="LiveId" clId="{769C4DA5-D432-4B98-BA66-C3923B562E8D}" dt="2025-04-04T16:47:58.660" v="42" actId="164"/>
+        <pc:sldMkLst>
+          <pc:docMk/>
+          <pc:sldMk cId="1425793214" sldId="257"/>
+        </pc:sldMkLst>
+        <pc:grpChg chg="add mod">
+          <ac:chgData name="Matthew Tuck" userId="292c67f149de0640" providerId="LiveId" clId="{769C4DA5-D432-4B98-BA66-C3923B562E8D}" dt="2025-04-04T16:47:58.660" v="42" actId="164"/>
+          <ac:grpSpMkLst>
+            <pc:docMk/>
+            <pc:sldMk cId="1425793214" sldId="257"/>
+            <ac:grpSpMk id="6" creationId="{BB5AD7D4-57B5-513D-BEC1-A914A1E01258}"/>
+          </ac:grpSpMkLst>
+        </pc:grpChg>
+        <pc:grpChg chg="del">
+          <ac:chgData name="Matthew Tuck" userId="292c67f149de0640" providerId="LiveId" clId="{769C4DA5-D432-4B98-BA66-C3923B562E8D}" dt="2025-04-04T16:45:28.840" v="24" actId="165"/>
+          <ac:grpSpMkLst>
+            <pc:docMk/>
+            <pc:sldMk cId="1425793214" sldId="257"/>
+            <ac:grpSpMk id="12" creationId="{FD8A2F96-DE04-3ABB-1F2D-678C993328B3}"/>
+          </ac:grpSpMkLst>
+        </pc:grpChg>
+        <pc:picChg chg="add mod modCrop">
+          <ac:chgData name="Matthew Tuck" userId="292c67f149de0640" providerId="LiveId" clId="{769C4DA5-D432-4B98-BA66-C3923B562E8D}" dt="2025-04-04T16:47:58.660" v="42" actId="164"/>
+          <ac:picMkLst>
+            <pc:docMk/>
+            <pc:sldMk cId="1425793214" sldId="257"/>
+            <ac:picMk id="3" creationId="{7F04A926-2A75-BD46-19B2-A133AC4668A3}"/>
+          </ac:picMkLst>
+        </pc:picChg>
+        <pc:picChg chg="add mod modCrop">
+          <ac:chgData name="Matthew Tuck" userId="292c67f149de0640" providerId="LiveId" clId="{769C4DA5-D432-4B98-BA66-C3923B562E8D}" dt="2025-04-04T16:47:58.660" v="42" actId="164"/>
+          <ac:picMkLst>
+            <pc:docMk/>
+            <pc:sldMk cId="1425793214" sldId="257"/>
+            <ac:picMk id="4" creationId="{2C420DDC-D28D-9F10-9622-18794A6F8A11}"/>
+          </ac:picMkLst>
+        </pc:picChg>
+        <pc:picChg chg="add del mod topLvl">
+          <ac:chgData name="Matthew Tuck" userId="292c67f149de0640" providerId="LiveId" clId="{769C4DA5-D432-4B98-BA66-C3923B562E8D}" dt="2025-04-04T16:46:10.500" v="32" actId="478"/>
+          <ac:picMkLst>
+            <pc:docMk/>
+            <pc:sldMk cId="1425793214" sldId="257"/>
+            <ac:picMk id="5" creationId="{47130567-AE6B-2F90-553D-F6A39C881D2E}"/>
+          </ac:picMkLst>
+        </pc:picChg>
+        <pc:picChg chg="add del mod topLvl">
+          <ac:chgData name="Matthew Tuck" userId="292c67f149de0640" providerId="LiveId" clId="{769C4DA5-D432-4B98-BA66-C3923B562E8D}" dt="2025-04-04T16:45:34.740" v="27" actId="478"/>
+          <ac:picMkLst>
+            <pc:docMk/>
+            <pc:sldMk cId="1425793214" sldId="257"/>
+            <ac:picMk id="9" creationId="{1844B638-8D99-ADBF-C775-CBCE83BCFA0D}"/>
+          </ac:picMkLst>
+        </pc:picChg>
+        <pc:picChg chg="add del mod topLvl">
+          <ac:chgData name="Matthew Tuck" userId="292c67f149de0640" providerId="LiveId" clId="{769C4DA5-D432-4B98-BA66-C3923B562E8D}" dt="2025-04-04T16:46:41.079" v="38" actId="478"/>
+          <ac:picMkLst>
+            <pc:docMk/>
+            <pc:sldMk cId="1425793214" sldId="257"/>
+            <ac:picMk id="10" creationId="{011F2306-33E6-8C9C-8F88-47A957AB5341}"/>
+          </ac:picMkLst>
+        </pc:picChg>
+      </pc:sldChg>
+      <pc:sldChg chg="addSp delSp modSp new mod setBg">
+        <pc:chgData name="Matthew Tuck" userId="292c67f149de0640" providerId="LiveId" clId="{769C4DA5-D432-4B98-BA66-C3923B562E8D}" dt="2025-04-04T21:26:16.649" v="1331" actId="732"/>
+        <pc:sldMkLst>
+          <pc:docMk/>
+          <pc:sldMk cId="69368688" sldId="266"/>
+        </pc:sldMkLst>
+        <pc:spChg chg="add mod">
+          <ac:chgData name="Matthew Tuck" userId="292c67f149de0640" providerId="LiveId" clId="{769C4DA5-D432-4B98-BA66-C3923B562E8D}" dt="2025-04-04T21:09:40.028" v="1163" actId="164"/>
+          <ac:spMkLst>
+            <pc:docMk/>
+            <pc:sldMk cId="69368688" sldId="266"/>
+            <ac:spMk id="13" creationId="{7A544A8A-5C21-0C5B-09F1-04A50BD9D387}"/>
+          </ac:spMkLst>
+        </pc:spChg>
+        <pc:spChg chg="add del mod">
+          <ac:chgData name="Matthew Tuck" userId="292c67f149de0640" providerId="LiveId" clId="{769C4DA5-D432-4B98-BA66-C3923B562E8D}" dt="2025-04-04T21:09:50.134" v="1165" actId="20577"/>
+          <ac:spMkLst>
+            <pc:docMk/>
+            <pc:sldMk cId="69368688" sldId="266"/>
+            <ac:spMk id="17" creationId="{6E69176F-DBE5-3194-C900-CCE02B88B86B}"/>
+          </ac:spMkLst>
+        </pc:spChg>
+        <pc:spChg chg="add del">
+          <ac:chgData name="Matthew Tuck" userId="292c67f149de0640" providerId="LiveId" clId="{769C4DA5-D432-4B98-BA66-C3923B562E8D}" dt="2025-04-04T20:21:46.718" v="200" actId="26606"/>
+          <ac:spMkLst>
+            <pc:docMk/>
+            <pc:sldMk cId="69368688" sldId="266"/>
+            <ac:spMk id="18" creationId="{04812C46-200A-4DEB-A05E-3ED6C68C2387}"/>
+          </ac:spMkLst>
+        </pc:spChg>
+        <pc:spChg chg="add mod">
+          <ac:chgData name="Matthew Tuck" userId="292c67f149de0640" providerId="LiveId" clId="{769C4DA5-D432-4B98-BA66-C3923B562E8D}" dt="2025-04-04T21:09:40.028" v="1163" actId="164"/>
+          <ac:spMkLst>
+            <pc:docMk/>
+            <pc:sldMk cId="69368688" sldId="266"/>
+            <ac:spMk id="19" creationId="{89D02EF5-7941-C1AE-CAB4-C9AFB7E52C9C}"/>
+          </ac:spMkLst>
+        </pc:spChg>
+        <pc:spChg chg="add del">
+          <ac:chgData name="Matthew Tuck" userId="292c67f149de0640" providerId="LiveId" clId="{769C4DA5-D432-4B98-BA66-C3923B562E8D}" dt="2025-04-04T20:21:46.718" v="200" actId="26606"/>
+          <ac:spMkLst>
+            <pc:docMk/>
+            <pc:sldMk cId="69368688" sldId="266"/>
+            <ac:spMk id="20" creationId="{D1EA859B-E555-4109-94F3-6700E046E008}"/>
+          </ac:spMkLst>
+        </pc:spChg>
+        <pc:spChg chg="add mod">
+          <ac:chgData name="Matthew Tuck" userId="292c67f149de0640" providerId="LiveId" clId="{769C4DA5-D432-4B98-BA66-C3923B562E8D}" dt="2025-04-04T21:09:40.028" v="1163" actId="164"/>
+          <ac:spMkLst>
+            <pc:docMk/>
+            <pc:sldMk cId="69368688" sldId="266"/>
+            <ac:spMk id="21" creationId="{0CFAED37-7883-76B3-92BD-D25084BAA56A}"/>
+          </ac:spMkLst>
+        </pc:spChg>
+        <pc:spChg chg="add mod">
+          <ac:chgData name="Matthew Tuck" userId="292c67f149de0640" providerId="LiveId" clId="{769C4DA5-D432-4B98-BA66-C3923B562E8D}" dt="2025-04-04T21:09:40.028" v="1163" actId="164"/>
+          <ac:spMkLst>
+            <pc:docMk/>
+            <pc:sldMk cId="69368688" sldId="266"/>
+            <ac:spMk id="22" creationId="{05C7D243-1E63-0753-075A-077ACC6EAE4C}"/>
+          </ac:spMkLst>
+        </pc:spChg>
+        <pc:spChg chg="add del mod">
+          <ac:chgData name="Matthew Tuck" userId="292c67f149de0640" providerId="LiveId" clId="{769C4DA5-D432-4B98-BA66-C3923B562E8D}" dt="2025-04-04T20:33:30.949" v="598" actId="478"/>
+          <ac:spMkLst>
+            <pc:docMk/>
+            <pc:sldMk cId="69368688" sldId="266"/>
+            <ac:spMk id="23" creationId="{5DD13D64-8C5D-FE00-A40B-7515A9E06347}"/>
+          </ac:spMkLst>
+        </pc:spChg>
+        <pc:spChg chg="add mod">
+          <ac:chgData name="Matthew Tuck" userId="292c67f149de0640" providerId="LiveId" clId="{769C4DA5-D432-4B98-BA66-C3923B562E8D}" dt="2025-04-04T20:35:46.366" v="644" actId="1076"/>
+          <ac:spMkLst>
+            <pc:docMk/>
+            <pc:sldMk cId="69368688" sldId="266"/>
+            <ac:spMk id="24" creationId="{6E69176F-DBE5-3194-C900-CCE02B88B86B}"/>
+          </ac:spMkLst>
+        </pc:spChg>
+        <pc:spChg chg="add mod">
+          <ac:chgData name="Matthew Tuck" userId="292c67f149de0640" providerId="LiveId" clId="{769C4DA5-D432-4B98-BA66-C3923B562E8D}" dt="2025-04-04T21:09:40.028" v="1163" actId="164"/>
+          <ac:spMkLst>
+            <pc:docMk/>
+            <pc:sldMk cId="69368688" sldId="266"/>
+            <ac:spMk id="25" creationId="{CD83AC2A-C8A1-9F95-ED48-88D6EC3C0A73}"/>
+          </ac:spMkLst>
+        </pc:spChg>
+        <pc:spChg chg="add mod">
+          <ac:chgData name="Matthew Tuck" userId="292c67f149de0640" providerId="LiveId" clId="{769C4DA5-D432-4B98-BA66-C3923B562E8D}" dt="2025-04-04T21:09:40.028" v="1163" actId="164"/>
+          <ac:spMkLst>
+            <pc:docMk/>
+            <pc:sldMk cId="69368688" sldId="266"/>
+            <ac:spMk id="26" creationId="{A8CD4B28-5205-AB54-8758-4E2874C27194}"/>
+          </ac:spMkLst>
+        </pc:spChg>
+        <pc:spChg chg="add mod">
+          <ac:chgData name="Matthew Tuck" userId="292c67f149de0640" providerId="LiveId" clId="{769C4DA5-D432-4B98-BA66-C3923B562E8D}" dt="2025-04-04T21:09:40.028" v="1163" actId="164"/>
+          <ac:spMkLst>
+            <pc:docMk/>
+            <pc:sldMk cId="69368688" sldId="266"/>
+            <ac:spMk id="27" creationId="{8CE1A099-C3D7-F895-89CE-A4F480817253}"/>
+          </ac:spMkLst>
+        </pc:spChg>
+        <pc:spChg chg="add mod">
+          <ac:chgData name="Matthew Tuck" userId="292c67f149de0640" providerId="LiveId" clId="{769C4DA5-D432-4B98-BA66-C3923B562E8D}" dt="2025-04-04T21:09:40.028" v="1163" actId="164"/>
+          <ac:spMkLst>
+            <pc:docMk/>
+            <pc:sldMk cId="69368688" sldId="266"/>
+            <ac:spMk id="28" creationId="{60562E0A-A041-A005-7FDE-44F3FAE0BF59}"/>
+          </ac:spMkLst>
+        </pc:spChg>
+        <pc:spChg chg="add del mod">
+          <ac:chgData name="Matthew Tuck" userId="292c67f149de0640" providerId="LiveId" clId="{769C4DA5-D432-4B98-BA66-C3923B562E8D}" dt="2025-04-04T21:11:04.717" v="1320" actId="478"/>
+          <ac:spMkLst>
+            <pc:docMk/>
+            <pc:sldMk cId="69368688" sldId="266"/>
+            <ac:spMk id="30" creationId="{3D375ACB-3EDA-CB17-FE0F-6E5D4A9E2EFE}"/>
+          </ac:spMkLst>
+        </pc:spChg>
+        <pc:grpChg chg="add mod">
+          <ac:chgData name="Matthew Tuck" userId="292c67f149de0640" providerId="LiveId" clId="{769C4DA5-D432-4B98-BA66-C3923B562E8D}" dt="2025-04-04T20:32:29.202" v="568" actId="14100"/>
+          <ac:grpSpMkLst>
+            <pc:docMk/>
+            <pc:sldMk cId="69368688" sldId="266"/>
+            <ac:grpSpMk id="16" creationId="{FF310C6C-39B8-C735-89E2-F273A835052E}"/>
+          </ac:grpSpMkLst>
+        </pc:grpChg>
+        <pc:picChg chg="add del mod modCrop">
+          <ac:chgData name="Matthew Tuck" userId="292c67f149de0640" providerId="LiveId" clId="{769C4DA5-D432-4B98-BA66-C3923B562E8D}" dt="2025-04-04T20:19:38.750" v="91" actId="478"/>
+          <ac:picMkLst>
+            <pc:docMk/>
+            <pc:sldMk cId="69368688" sldId="266"/>
+            <ac:picMk id="3" creationId="{561ED725-93EB-1C34-F1F6-AEEDF4B837B6}"/>
+          </ac:picMkLst>
+        </pc:picChg>
+        <pc:picChg chg="add del mod">
+          <ac:chgData name="Matthew Tuck" userId="292c67f149de0640" providerId="LiveId" clId="{769C4DA5-D432-4B98-BA66-C3923B562E8D}" dt="2025-04-04T20:02:59.371" v="81" actId="478"/>
+          <ac:picMkLst>
+            <pc:docMk/>
+            <pc:sldMk cId="69368688" sldId="266"/>
+            <ac:picMk id="4" creationId="{22C80AE4-D432-ABBA-05D7-EE8895A996B6}"/>
+          </ac:picMkLst>
+        </pc:picChg>
+        <pc:picChg chg="add del mod modCrop">
+          <ac:chgData name="Matthew Tuck" userId="292c67f149de0640" providerId="LiveId" clId="{769C4DA5-D432-4B98-BA66-C3923B562E8D}" dt="2025-04-04T20:19:33.969" v="90" actId="478"/>
+          <ac:picMkLst>
+            <pc:docMk/>
+            <pc:sldMk cId="69368688" sldId="266"/>
+            <ac:picMk id="5" creationId="{50BEB552-5425-4BF6-465A-E244C5CC0DA9}"/>
+          </ac:picMkLst>
+        </pc:picChg>
+        <pc:picChg chg="add del mod modCrop">
+          <ac:chgData name="Matthew Tuck" userId="292c67f149de0640" providerId="LiveId" clId="{769C4DA5-D432-4B98-BA66-C3923B562E8D}" dt="2025-04-04T20:19:45.831" v="92" actId="478"/>
+          <ac:picMkLst>
+            <pc:docMk/>
+            <pc:sldMk cId="69368688" sldId="266"/>
+            <ac:picMk id="6" creationId="{F33918C0-8F6A-6B10-DCEB-5854120E234D}"/>
+          </ac:picMkLst>
+        </pc:picChg>
+        <pc:picChg chg="add del mod modCrop">
+          <ac:chgData name="Matthew Tuck" userId="292c67f149de0640" providerId="LiveId" clId="{769C4DA5-D432-4B98-BA66-C3923B562E8D}" dt="2025-04-04T20:19:45.831" v="92" actId="478"/>
+          <ac:picMkLst>
+            <pc:docMk/>
+            <pc:sldMk cId="69368688" sldId="266"/>
+            <ac:picMk id="7" creationId="{4DE25373-8B96-3437-3D88-952C2F838E6A}"/>
+          </ac:picMkLst>
+        </pc:picChg>
+        <pc:picChg chg="add del mod modCrop">
+          <ac:chgData name="Matthew Tuck" userId="292c67f149de0640" providerId="LiveId" clId="{769C4DA5-D432-4B98-BA66-C3923B562E8D}" dt="2025-04-04T20:19:45.831" v="92" actId="478"/>
+          <ac:picMkLst>
+            <pc:docMk/>
+            <pc:sldMk cId="69368688" sldId="266"/>
+            <ac:picMk id="8" creationId="{0185DDC5-481C-2E34-F8A9-D9EEF9F3C5DE}"/>
+          </ac:picMkLst>
+        </pc:picChg>
+        <pc:picChg chg="add del mod modCrop">
+          <ac:chgData name="Matthew Tuck" userId="292c67f149de0640" providerId="LiveId" clId="{769C4DA5-D432-4B98-BA66-C3923B562E8D}" dt="2025-04-04T20:19:45.831" v="92" actId="478"/>
+          <ac:picMkLst>
+            <pc:docMk/>
+            <pc:sldMk cId="69368688" sldId="266"/>
+            <ac:picMk id="9" creationId="{218A6CBF-A0C0-3D36-96C6-DA7A90AFB255}"/>
+          </ac:picMkLst>
+        </pc:picChg>
+        <pc:picChg chg="add del mod modCrop">
+          <ac:chgData name="Matthew Tuck" userId="292c67f149de0640" providerId="LiveId" clId="{769C4DA5-D432-4B98-BA66-C3923B562E8D}" dt="2025-04-04T20:19:45.831" v="92" actId="478"/>
+          <ac:picMkLst>
+            <pc:docMk/>
+            <pc:sldMk cId="69368688" sldId="266"/>
+            <ac:picMk id="10" creationId="{A405ADE0-FEA5-3259-A45F-9F8064612C6D}"/>
+          </ac:picMkLst>
+        </pc:picChg>
+        <pc:picChg chg="add mod modCrop">
+          <ac:chgData name="Matthew Tuck" userId="292c67f149de0640" providerId="LiveId" clId="{769C4DA5-D432-4B98-BA66-C3923B562E8D}" dt="2025-04-04T21:09:40.028" v="1163" actId="164"/>
+          <ac:picMkLst>
+            <pc:docMk/>
+            <pc:sldMk cId="69368688" sldId="266"/>
+            <ac:picMk id="12" creationId="{F3EAB6E8-6BD1-1738-1CCC-B1915C673E35}"/>
+          </ac:picMkLst>
+        </pc:picChg>
+        <pc:picChg chg="add mod modCrop">
+          <ac:chgData name="Matthew Tuck" userId="292c67f149de0640" providerId="LiveId" clId="{769C4DA5-D432-4B98-BA66-C3923B562E8D}" dt="2025-04-04T20:27:58.392" v="409" actId="732"/>
+          <ac:picMkLst>
+            <pc:docMk/>
+            <pc:sldMk cId="69368688" sldId="266"/>
+            <ac:picMk id="14" creationId="{74D03635-6907-358A-4B21-EAAAC3CD161D}"/>
+          </ac:picMkLst>
+        </pc:picChg>
+        <pc:picChg chg="add mod ord modCrop">
+          <ac:chgData name="Matthew Tuck" userId="292c67f149de0640" providerId="LiveId" clId="{769C4DA5-D432-4B98-BA66-C3923B562E8D}" dt="2025-04-04T21:26:16.649" v="1331" actId="732"/>
+          <ac:picMkLst>
+            <pc:docMk/>
+            <pc:sldMk cId="69368688" sldId="266"/>
+            <ac:picMk id="15" creationId="{BCDA9591-785D-FE78-25AA-0F4FDBFE8F06}"/>
+          </ac:picMkLst>
+        </pc:picChg>
+        <pc:picChg chg="add del mod modCrop">
+          <ac:chgData name="Matthew Tuck" userId="292c67f149de0640" providerId="LiveId" clId="{769C4DA5-D432-4B98-BA66-C3923B562E8D}" dt="2025-04-04T21:25:25.170" v="1328" actId="21"/>
+          <ac:picMkLst>
+            <pc:docMk/>
+            <pc:sldMk cId="69368688" sldId="266"/>
+            <ac:picMk id="31" creationId="{5445E7EC-B3FD-3CDB-408C-83571F2A4C38}"/>
+          </ac:picMkLst>
+        </pc:picChg>
+      </pc:sldChg>
+    </pc:docChg>
+  </pc:docChgLst>
 </pc:chgInfo>
 </file>
 
@@ -656,13 +983,7 @@
       </p:grpSpPr>
       <p:sp>
         <p:nvSpPr>
-          <p:cNvPr id="2" name="Title 1">
-            <a:extLst>
-              <a:ext uri="{FF2B5EF4-FFF2-40B4-BE49-F238E27FC236}">
-                <a16:creationId xmlns:a16="http://schemas.microsoft.com/office/drawing/2014/main" id="{0EE20BF0-F05E-06EB-61BD-56F4E5EAA1F4}"/>
-              </a:ext>
-            </a:extLst>
-          </p:cNvPr>
+          <p:cNvPr id="2" name="Title 1"/>
           <p:cNvSpPr>
             <a:spLocks noGrp="1"/>
           </p:cNvSpPr>
@@ -672,15 +993,15 @@
         </p:nvSpPr>
         <p:spPr>
           <a:xfrm>
-            <a:off x="1524000" y="1122363"/>
-            <a:ext cx="9144000" cy="2387600"/>
+            <a:off x="914400" y="1673152"/>
+            <a:ext cx="10363200" cy="3559293"/>
           </a:xfrm>
         </p:spPr>
         <p:txBody>
           <a:bodyPr anchor="b"/>
           <a:lstStyle>
             <a:lvl1pPr algn="ctr">
-              <a:defRPr sz="6000"/>
+              <a:defRPr sz="8000"/>
             </a:lvl1pPr>
           </a:lstStyle>
           <a:p>
@@ -688,19 +1009,13 @@
               <a:rPr lang="en-US"/>
               <a:t>Click to edit Master title style</a:t>
             </a:r>
-            <a:endParaRPr lang="en-CA"/>
+            <a:endParaRPr lang="en-US" dirty="0"/>
           </a:p>
         </p:txBody>
       </p:sp>
       <p:sp>
         <p:nvSpPr>
-          <p:cNvPr id="3" name="Subtitle 2">
-            <a:extLst>
-              <a:ext uri="{FF2B5EF4-FFF2-40B4-BE49-F238E27FC236}">
-                <a16:creationId xmlns:a16="http://schemas.microsoft.com/office/drawing/2014/main" id="{6D91E2BA-E4E0-26FA-8CE8-A2BA028A30A6}"/>
-              </a:ext>
-            </a:extLst>
-          </p:cNvPr>
+          <p:cNvPr id="3" name="Subtitle 2"/>
           <p:cNvSpPr>
             <a:spLocks noGrp="1"/>
           </p:cNvSpPr>
@@ -710,8 +1025,8 @@
         </p:nvSpPr>
         <p:spPr>
           <a:xfrm>
-            <a:off x="1524000" y="3602038"/>
-            <a:ext cx="9144000" cy="1655762"/>
+            <a:off x="1524000" y="5369705"/>
+            <a:ext cx="9144000" cy="2468312"/>
           </a:xfrm>
         </p:spPr>
         <p:txBody>
@@ -719,39 +1034,39 @@
           <a:lstStyle>
             <a:lvl1pPr marL="0" indent="0" algn="ctr">
               <a:buNone/>
+              <a:defRPr sz="3200"/>
+            </a:lvl1pPr>
+            <a:lvl2pPr marL="609585" indent="0" algn="ctr">
+              <a:buNone/>
+              <a:defRPr sz="2667"/>
+            </a:lvl2pPr>
+            <a:lvl3pPr marL="1219170" indent="0" algn="ctr">
+              <a:buNone/>
               <a:defRPr sz="2400"/>
-            </a:lvl1pPr>
-            <a:lvl2pPr marL="457200" indent="0" algn="ctr">
+            </a:lvl3pPr>
+            <a:lvl4pPr marL="1828754" indent="0" algn="ctr">
               <a:buNone/>
-              <a:defRPr sz="2000"/>
-            </a:lvl2pPr>
-            <a:lvl3pPr marL="914400" indent="0" algn="ctr">
+              <a:defRPr sz="2133"/>
+            </a:lvl4pPr>
+            <a:lvl5pPr marL="2438339" indent="0" algn="ctr">
               <a:buNone/>
-              <a:defRPr sz="1800"/>
-            </a:lvl3pPr>
-            <a:lvl4pPr marL="1371600" indent="0" algn="ctr">
+              <a:defRPr sz="2133"/>
+            </a:lvl5pPr>
+            <a:lvl6pPr marL="3047924" indent="0" algn="ctr">
               <a:buNone/>
-              <a:defRPr sz="1600"/>
-            </a:lvl4pPr>
-            <a:lvl5pPr marL="1828800" indent="0" algn="ctr">
+              <a:defRPr sz="2133"/>
+            </a:lvl6pPr>
+            <a:lvl7pPr marL="3657509" indent="0" algn="ctr">
               <a:buNone/>
-              <a:defRPr sz="1600"/>
-            </a:lvl5pPr>
-            <a:lvl6pPr marL="2286000" indent="0" algn="ctr">
+              <a:defRPr sz="2133"/>
+            </a:lvl7pPr>
+            <a:lvl8pPr marL="4267093" indent="0" algn="ctr">
               <a:buNone/>
-              <a:defRPr sz="1600"/>
-            </a:lvl6pPr>
-            <a:lvl7pPr marL="2743200" indent="0" algn="ctr">
+              <a:defRPr sz="2133"/>
+            </a:lvl8pPr>
+            <a:lvl9pPr marL="4876678" indent="0" algn="ctr">
               <a:buNone/>
-              <a:defRPr sz="1600"/>
-            </a:lvl7pPr>
-            <a:lvl8pPr marL="3200400" indent="0" algn="ctr">
-              <a:buNone/>
-              <a:defRPr sz="1600"/>
-            </a:lvl8pPr>
-            <a:lvl9pPr marL="3657600" indent="0" algn="ctr">
-              <a:buNone/>
-              <a:defRPr sz="1600"/>
+              <a:defRPr sz="2133"/>
             </a:lvl9pPr>
           </a:lstStyle>
           <a:p>
@@ -759,19 +1074,13 @@
               <a:rPr lang="en-US"/>
               <a:t>Click to edit Master subtitle style</a:t>
             </a:r>
-            <a:endParaRPr lang="en-CA"/>
+            <a:endParaRPr lang="en-US" dirty="0"/>
           </a:p>
         </p:txBody>
       </p:sp>
       <p:sp>
         <p:nvSpPr>
-          <p:cNvPr id="4" name="Date Placeholder 3">
-            <a:extLst>
-              <a:ext uri="{FF2B5EF4-FFF2-40B4-BE49-F238E27FC236}">
-                <a16:creationId xmlns:a16="http://schemas.microsoft.com/office/drawing/2014/main" id="{893C2E5F-3629-7260-D670-8B8FD7D905D0}"/>
-              </a:ext>
-            </a:extLst>
-          </p:cNvPr>
+          <p:cNvPr id="4" name="Date Placeholder 3"/>
           <p:cNvSpPr>
             <a:spLocks noGrp="1"/>
           </p:cNvSpPr>
@@ -786,7 +1095,7 @@
           <a:p>
             <a:fld id="{636EB128-D63D-478F-A8AE-19C70145D55B}" type="datetimeFigureOut">
               <a:rPr lang="en-CA" smtClean="0"/>
-              <a:t>2025-03-14</a:t>
+              <a:t>2025-04-04</a:t>
             </a:fld>
             <a:endParaRPr lang="en-CA"/>
           </a:p>
@@ -794,13 +1103,7 @@
       </p:sp>
       <p:sp>
         <p:nvSpPr>
-          <p:cNvPr id="5" name="Footer Placeholder 4">
-            <a:extLst>
-              <a:ext uri="{FF2B5EF4-FFF2-40B4-BE49-F238E27FC236}">
-                <a16:creationId xmlns:a16="http://schemas.microsoft.com/office/drawing/2014/main" id="{F3E121F4-B00F-B13B-8F9A-9F3CA85522B1}"/>
-              </a:ext>
-            </a:extLst>
-          </p:cNvPr>
+          <p:cNvPr id="5" name="Footer Placeholder 4"/>
           <p:cNvSpPr>
             <a:spLocks noGrp="1"/>
           </p:cNvSpPr>
@@ -819,13 +1122,7 @@
       </p:sp>
       <p:sp>
         <p:nvSpPr>
-          <p:cNvPr id="6" name="Slide Number Placeholder 5">
-            <a:extLst>
-              <a:ext uri="{FF2B5EF4-FFF2-40B4-BE49-F238E27FC236}">
-                <a16:creationId xmlns:a16="http://schemas.microsoft.com/office/drawing/2014/main" id="{1E3EB185-6A5B-A58E-D3EF-12A2FD21CEE1}"/>
-              </a:ext>
-            </a:extLst>
-          </p:cNvPr>
+          <p:cNvPr id="6" name="Slide Number Placeholder 5"/>
           <p:cNvSpPr>
             <a:spLocks noGrp="1"/>
           </p:cNvSpPr>
@@ -849,7 +1146,7 @@
     </p:spTree>
     <p:extLst>
       <p:ext uri="{BB962C8B-B14F-4D97-AF65-F5344CB8AC3E}">
-        <p14:creationId xmlns:p14="http://schemas.microsoft.com/office/powerpoint/2010/main" val="3794257389"/>
+        <p14:creationId xmlns:p14="http://schemas.microsoft.com/office/powerpoint/2010/main" val="4038205320"/>
       </p:ext>
     </p:extLst>
   </p:cSld>
@@ -878,13 +1175,7 @@
       </p:grpSpPr>
       <p:sp>
         <p:nvSpPr>
-          <p:cNvPr id="2" name="Title 1">
-            <a:extLst>
-              <a:ext uri="{FF2B5EF4-FFF2-40B4-BE49-F238E27FC236}">
-                <a16:creationId xmlns:a16="http://schemas.microsoft.com/office/drawing/2014/main" id="{FFF1900E-8D87-5CA5-208C-C75244EE01C8}"/>
-              </a:ext>
-            </a:extLst>
-          </p:cNvPr>
+          <p:cNvPr id="2" name="Title 1"/>
           <p:cNvSpPr>
             <a:spLocks noGrp="1"/>
           </p:cNvSpPr>
@@ -901,19 +1192,13 @@
               <a:rPr lang="en-US"/>
               <a:t>Click to edit Master title style</a:t>
             </a:r>
-            <a:endParaRPr lang="en-CA"/>
+            <a:endParaRPr lang="en-US" dirty="0"/>
           </a:p>
         </p:txBody>
       </p:sp>
       <p:sp>
         <p:nvSpPr>
-          <p:cNvPr id="3" name="Vertical Text Placeholder 2">
-            <a:extLst>
-              <a:ext uri="{FF2B5EF4-FFF2-40B4-BE49-F238E27FC236}">
-                <a16:creationId xmlns:a16="http://schemas.microsoft.com/office/drawing/2014/main" id="{EACF2ABB-FA15-8C70-97BE-542CFDF99121}"/>
-              </a:ext>
-            </a:extLst>
-          </p:cNvPr>
+          <p:cNvPr id="3" name="Vertical Text Placeholder 2"/>
           <p:cNvSpPr>
             <a:spLocks noGrp="1"/>
           </p:cNvSpPr>
@@ -959,19 +1244,13 @@
               <a:rPr lang="en-US"/>
               <a:t>Fifth level</a:t>
             </a:r>
-            <a:endParaRPr lang="en-CA"/>
+            <a:endParaRPr lang="en-US" dirty="0"/>
           </a:p>
         </p:txBody>
       </p:sp>
       <p:sp>
         <p:nvSpPr>
-          <p:cNvPr id="4" name="Date Placeholder 3">
-            <a:extLst>
-              <a:ext uri="{FF2B5EF4-FFF2-40B4-BE49-F238E27FC236}">
-                <a16:creationId xmlns:a16="http://schemas.microsoft.com/office/drawing/2014/main" id="{1361E64E-BE27-AF56-764B-A4AD7B568805}"/>
-              </a:ext>
-            </a:extLst>
-          </p:cNvPr>
+          <p:cNvPr id="4" name="Date Placeholder 3"/>
           <p:cNvSpPr>
             <a:spLocks noGrp="1"/>
           </p:cNvSpPr>
@@ -986,7 +1265,7 @@
           <a:p>
             <a:fld id="{636EB128-D63D-478F-A8AE-19C70145D55B}" type="datetimeFigureOut">
               <a:rPr lang="en-CA" smtClean="0"/>
-              <a:t>2025-03-14</a:t>
+              <a:t>2025-04-04</a:t>
             </a:fld>
             <a:endParaRPr lang="en-CA"/>
           </a:p>
@@ -994,13 +1273,7 @@
       </p:sp>
       <p:sp>
         <p:nvSpPr>
-          <p:cNvPr id="5" name="Footer Placeholder 4">
-            <a:extLst>
-              <a:ext uri="{FF2B5EF4-FFF2-40B4-BE49-F238E27FC236}">
-                <a16:creationId xmlns:a16="http://schemas.microsoft.com/office/drawing/2014/main" id="{2562386E-D15B-6EDA-2BD2-D25EF771FB5C}"/>
-              </a:ext>
-            </a:extLst>
-          </p:cNvPr>
+          <p:cNvPr id="5" name="Footer Placeholder 4"/>
           <p:cNvSpPr>
             <a:spLocks noGrp="1"/>
           </p:cNvSpPr>
@@ -1019,13 +1292,7 @@
       </p:sp>
       <p:sp>
         <p:nvSpPr>
-          <p:cNvPr id="6" name="Slide Number Placeholder 5">
-            <a:extLst>
-              <a:ext uri="{FF2B5EF4-FFF2-40B4-BE49-F238E27FC236}">
-                <a16:creationId xmlns:a16="http://schemas.microsoft.com/office/drawing/2014/main" id="{201B9CCC-A025-6499-C475-58F00652B89C}"/>
-              </a:ext>
-            </a:extLst>
-          </p:cNvPr>
+          <p:cNvPr id="6" name="Slide Number Placeholder 5"/>
           <p:cNvSpPr>
             <a:spLocks noGrp="1"/>
           </p:cNvSpPr>
@@ -1049,7 +1316,7 @@
     </p:spTree>
     <p:extLst>
       <p:ext uri="{BB962C8B-B14F-4D97-AF65-F5344CB8AC3E}">
-        <p14:creationId xmlns:p14="http://schemas.microsoft.com/office/powerpoint/2010/main" val="2598642494"/>
+        <p14:creationId xmlns:p14="http://schemas.microsoft.com/office/powerpoint/2010/main" val="2011604969"/>
       </p:ext>
     </p:extLst>
   </p:cSld>
@@ -1078,13 +1345,7 @@
       </p:grpSpPr>
       <p:sp>
         <p:nvSpPr>
-          <p:cNvPr id="2" name="Vertical Title 1">
-            <a:extLst>
-              <a:ext uri="{FF2B5EF4-FFF2-40B4-BE49-F238E27FC236}">
-                <a16:creationId xmlns:a16="http://schemas.microsoft.com/office/drawing/2014/main" id="{6AD2A4E5-A191-B8EC-B837-B1744AA7F134}"/>
-              </a:ext>
-            </a:extLst>
-          </p:cNvPr>
+          <p:cNvPr id="2" name="Vertical Title 1"/>
           <p:cNvSpPr>
             <a:spLocks noGrp="1"/>
           </p:cNvSpPr>
@@ -1094,8 +1355,8 @@
         </p:nvSpPr>
         <p:spPr>
           <a:xfrm>
-            <a:off x="8724900" y="365125"/>
-            <a:ext cx="2628900" cy="5811838"/>
+            <a:off x="8724901" y="544307"/>
+            <a:ext cx="2628900" cy="8663944"/>
           </a:xfrm>
         </p:spPr>
         <p:txBody>
@@ -1106,19 +1367,13 @@
               <a:rPr lang="en-US"/>
               <a:t>Click to edit Master title style</a:t>
             </a:r>
-            <a:endParaRPr lang="en-CA"/>
+            <a:endParaRPr lang="en-US" dirty="0"/>
           </a:p>
         </p:txBody>
       </p:sp>
       <p:sp>
         <p:nvSpPr>
-          <p:cNvPr id="3" name="Vertical Text Placeholder 2">
-            <a:extLst>
-              <a:ext uri="{FF2B5EF4-FFF2-40B4-BE49-F238E27FC236}">
-                <a16:creationId xmlns:a16="http://schemas.microsoft.com/office/drawing/2014/main" id="{168DE441-B1EB-B6FB-A05F-64C3E55DD772}"/>
-              </a:ext>
-            </a:extLst>
-          </p:cNvPr>
+          <p:cNvPr id="3" name="Vertical Text Placeholder 2"/>
           <p:cNvSpPr>
             <a:spLocks noGrp="1"/>
           </p:cNvSpPr>
@@ -1128,8 +1383,8 @@
         </p:nvSpPr>
         <p:spPr>
           <a:xfrm>
-            <a:off x="838200" y="365125"/>
-            <a:ext cx="7734300" cy="5811838"/>
+            <a:off x="838201" y="544307"/>
+            <a:ext cx="7734300" cy="8663944"/>
           </a:xfrm>
         </p:spPr>
         <p:txBody>
@@ -1169,19 +1424,13 @@
               <a:rPr lang="en-US"/>
               <a:t>Fifth level</a:t>
             </a:r>
-            <a:endParaRPr lang="en-CA"/>
+            <a:endParaRPr lang="en-US" dirty="0"/>
           </a:p>
         </p:txBody>
       </p:sp>
       <p:sp>
         <p:nvSpPr>
-          <p:cNvPr id="4" name="Date Placeholder 3">
-            <a:extLst>
-              <a:ext uri="{FF2B5EF4-FFF2-40B4-BE49-F238E27FC236}">
-                <a16:creationId xmlns:a16="http://schemas.microsoft.com/office/drawing/2014/main" id="{20619801-E32F-0DE4-2131-D46D4073D98C}"/>
-              </a:ext>
-            </a:extLst>
-          </p:cNvPr>
+          <p:cNvPr id="4" name="Date Placeholder 3"/>
           <p:cNvSpPr>
             <a:spLocks noGrp="1"/>
           </p:cNvSpPr>
@@ -1196,7 +1445,7 @@
           <a:p>
             <a:fld id="{636EB128-D63D-478F-A8AE-19C70145D55B}" type="datetimeFigureOut">
               <a:rPr lang="en-CA" smtClean="0"/>
-              <a:t>2025-03-14</a:t>
+              <a:t>2025-04-04</a:t>
             </a:fld>
             <a:endParaRPr lang="en-CA"/>
           </a:p>
@@ -1204,13 +1453,7 @@
       </p:sp>
       <p:sp>
         <p:nvSpPr>
-          <p:cNvPr id="5" name="Footer Placeholder 4">
-            <a:extLst>
-              <a:ext uri="{FF2B5EF4-FFF2-40B4-BE49-F238E27FC236}">
-                <a16:creationId xmlns:a16="http://schemas.microsoft.com/office/drawing/2014/main" id="{BF9E40FE-D30D-E095-0171-CAE65D80E03D}"/>
-              </a:ext>
-            </a:extLst>
-          </p:cNvPr>
+          <p:cNvPr id="5" name="Footer Placeholder 4"/>
           <p:cNvSpPr>
             <a:spLocks noGrp="1"/>
           </p:cNvSpPr>
@@ -1229,13 +1472,7 @@
       </p:sp>
       <p:sp>
         <p:nvSpPr>
-          <p:cNvPr id="6" name="Slide Number Placeholder 5">
-            <a:extLst>
-              <a:ext uri="{FF2B5EF4-FFF2-40B4-BE49-F238E27FC236}">
-                <a16:creationId xmlns:a16="http://schemas.microsoft.com/office/drawing/2014/main" id="{658C8D13-E414-AEC4-FDD8-DC76D0E61B59}"/>
-              </a:ext>
-            </a:extLst>
-          </p:cNvPr>
+          <p:cNvPr id="6" name="Slide Number Placeholder 5"/>
           <p:cNvSpPr>
             <a:spLocks noGrp="1"/>
           </p:cNvSpPr>
@@ -1259,7 +1496,7 @@
     </p:spTree>
     <p:extLst>
       <p:ext uri="{BB962C8B-B14F-4D97-AF65-F5344CB8AC3E}">
-        <p14:creationId xmlns:p14="http://schemas.microsoft.com/office/powerpoint/2010/main" val="807032539"/>
+        <p14:creationId xmlns:p14="http://schemas.microsoft.com/office/powerpoint/2010/main" val="1175610576"/>
       </p:ext>
     </p:extLst>
   </p:cSld>
@@ -1288,13 +1525,7 @@
       </p:grpSpPr>
       <p:sp>
         <p:nvSpPr>
-          <p:cNvPr id="2" name="Title 1">
-            <a:extLst>
-              <a:ext uri="{FF2B5EF4-FFF2-40B4-BE49-F238E27FC236}">
-                <a16:creationId xmlns:a16="http://schemas.microsoft.com/office/drawing/2014/main" id="{00D2F284-E98F-FFB1-7A6E-13DD1442E5CE}"/>
-              </a:ext>
-            </a:extLst>
-          </p:cNvPr>
+          <p:cNvPr id="2" name="Title 1"/>
           <p:cNvSpPr>
             <a:spLocks noGrp="1"/>
           </p:cNvSpPr>
@@ -1311,19 +1542,13 @@
               <a:rPr lang="en-US"/>
               <a:t>Click to edit Master title style</a:t>
             </a:r>
-            <a:endParaRPr lang="en-CA"/>
+            <a:endParaRPr lang="en-US" dirty="0"/>
           </a:p>
         </p:txBody>
       </p:sp>
       <p:sp>
         <p:nvSpPr>
-          <p:cNvPr id="3" name="Content Placeholder 2">
-            <a:extLst>
-              <a:ext uri="{FF2B5EF4-FFF2-40B4-BE49-F238E27FC236}">
-                <a16:creationId xmlns:a16="http://schemas.microsoft.com/office/drawing/2014/main" id="{399DFB28-E919-388A-348D-A8194107F099}"/>
-              </a:ext>
-            </a:extLst>
-          </p:cNvPr>
+          <p:cNvPr id="3" name="Content Placeholder 2"/>
           <p:cNvSpPr>
             <a:spLocks noGrp="1"/>
           </p:cNvSpPr>
@@ -1369,19 +1594,13 @@
               <a:rPr lang="en-US"/>
               <a:t>Fifth level</a:t>
             </a:r>
-            <a:endParaRPr lang="en-CA"/>
+            <a:endParaRPr lang="en-US" dirty="0"/>
           </a:p>
         </p:txBody>
       </p:sp>
       <p:sp>
         <p:nvSpPr>
-          <p:cNvPr id="4" name="Date Placeholder 3">
-            <a:extLst>
-              <a:ext uri="{FF2B5EF4-FFF2-40B4-BE49-F238E27FC236}">
-                <a16:creationId xmlns:a16="http://schemas.microsoft.com/office/drawing/2014/main" id="{A4AA9249-7ABB-4377-B9D2-54E0CFB2CAB7}"/>
-              </a:ext>
-            </a:extLst>
-          </p:cNvPr>
+          <p:cNvPr id="4" name="Date Placeholder 3"/>
           <p:cNvSpPr>
             <a:spLocks noGrp="1"/>
           </p:cNvSpPr>
@@ -1396,7 +1615,7 @@
           <a:p>
             <a:fld id="{636EB128-D63D-478F-A8AE-19C70145D55B}" type="datetimeFigureOut">
               <a:rPr lang="en-CA" smtClean="0"/>
-              <a:t>2025-03-14</a:t>
+              <a:t>2025-04-04</a:t>
             </a:fld>
             <a:endParaRPr lang="en-CA"/>
           </a:p>
@@ -1404,13 +1623,7 @@
       </p:sp>
       <p:sp>
         <p:nvSpPr>
-          <p:cNvPr id="5" name="Footer Placeholder 4">
-            <a:extLst>
-              <a:ext uri="{FF2B5EF4-FFF2-40B4-BE49-F238E27FC236}">
-                <a16:creationId xmlns:a16="http://schemas.microsoft.com/office/drawing/2014/main" id="{90C2E8F1-A30C-59F0-8D1D-7BF1580EB67E}"/>
-              </a:ext>
-            </a:extLst>
-          </p:cNvPr>
+          <p:cNvPr id="5" name="Footer Placeholder 4"/>
           <p:cNvSpPr>
             <a:spLocks noGrp="1"/>
           </p:cNvSpPr>
@@ -1429,13 +1642,7 @@
       </p:sp>
       <p:sp>
         <p:nvSpPr>
-          <p:cNvPr id="6" name="Slide Number Placeholder 5">
-            <a:extLst>
-              <a:ext uri="{FF2B5EF4-FFF2-40B4-BE49-F238E27FC236}">
-                <a16:creationId xmlns:a16="http://schemas.microsoft.com/office/drawing/2014/main" id="{7F91D2D1-5401-952B-4D80-500B1729CD1D}"/>
-              </a:ext>
-            </a:extLst>
-          </p:cNvPr>
+          <p:cNvPr id="6" name="Slide Number Placeholder 5"/>
           <p:cNvSpPr>
             <a:spLocks noGrp="1"/>
           </p:cNvSpPr>
@@ -1459,7 +1666,7 @@
     </p:spTree>
     <p:extLst>
       <p:ext uri="{BB962C8B-B14F-4D97-AF65-F5344CB8AC3E}">
-        <p14:creationId xmlns:p14="http://schemas.microsoft.com/office/powerpoint/2010/main" val="1987710770"/>
+        <p14:creationId xmlns:p14="http://schemas.microsoft.com/office/powerpoint/2010/main" val="1056889553"/>
       </p:ext>
     </p:extLst>
   </p:cSld>
@@ -1488,13 +1695,7 @@
       </p:grpSpPr>
       <p:sp>
         <p:nvSpPr>
-          <p:cNvPr id="2" name="Title 1">
-            <a:extLst>
-              <a:ext uri="{FF2B5EF4-FFF2-40B4-BE49-F238E27FC236}">
-                <a16:creationId xmlns:a16="http://schemas.microsoft.com/office/drawing/2014/main" id="{2B38AA2C-9EDD-C503-7020-26F0F22708E8}"/>
-              </a:ext>
-            </a:extLst>
-          </p:cNvPr>
+          <p:cNvPr id="2" name="Title 1"/>
           <p:cNvSpPr>
             <a:spLocks noGrp="1"/>
           </p:cNvSpPr>
@@ -1504,15 +1705,15 @@
         </p:nvSpPr>
         <p:spPr>
           <a:xfrm>
-            <a:off x="831850" y="1709738"/>
-            <a:ext cx="10515600" cy="2852737"/>
+            <a:off x="831851" y="2548778"/>
+            <a:ext cx="10515600" cy="4252691"/>
           </a:xfrm>
         </p:spPr>
         <p:txBody>
           <a:bodyPr anchor="b"/>
           <a:lstStyle>
             <a:lvl1pPr>
-              <a:defRPr sz="6000"/>
+              <a:defRPr sz="8000"/>
             </a:lvl1pPr>
           </a:lstStyle>
           <a:p>
@@ -1520,19 +1721,13 @@
               <a:rPr lang="en-US"/>
               <a:t>Click to edit Master title style</a:t>
             </a:r>
-            <a:endParaRPr lang="en-CA"/>
+            <a:endParaRPr lang="en-US" dirty="0"/>
           </a:p>
         </p:txBody>
       </p:sp>
       <p:sp>
         <p:nvSpPr>
-          <p:cNvPr id="3" name="Text Placeholder 2">
-            <a:extLst>
-              <a:ext uri="{FF2B5EF4-FFF2-40B4-BE49-F238E27FC236}">
-                <a16:creationId xmlns:a16="http://schemas.microsoft.com/office/drawing/2014/main" id="{88C2E2CE-F9EE-25D2-BD99-CC1E54BA8DAA}"/>
-              </a:ext>
-            </a:extLst>
-          </p:cNvPr>
+          <p:cNvPr id="3" name="Text Placeholder 2"/>
           <p:cNvSpPr>
             <a:spLocks noGrp="1"/>
           </p:cNvSpPr>
@@ -1542,14 +1737,34 @@
         </p:nvSpPr>
         <p:spPr>
           <a:xfrm>
-            <a:off x="831850" y="4589463"/>
-            <a:ext cx="10515600" cy="1500187"/>
+            <a:off x="831851" y="6841702"/>
+            <a:ext cx="10515600" cy="2236390"/>
           </a:xfrm>
         </p:spPr>
         <p:txBody>
           <a:bodyPr/>
           <a:lstStyle>
             <a:lvl1pPr marL="0" indent="0">
+              <a:buNone/>
+              <a:defRPr sz="3200">
+                <a:solidFill>
+                  <a:schemeClr val="tx1">
+                    <a:tint val="82000"/>
+                  </a:schemeClr>
+                </a:solidFill>
+              </a:defRPr>
+            </a:lvl1pPr>
+            <a:lvl2pPr marL="609585" indent="0">
+              <a:buNone/>
+              <a:defRPr sz="2667">
+                <a:solidFill>
+                  <a:schemeClr val="tx1">
+                    <a:tint val="82000"/>
+                  </a:schemeClr>
+                </a:solidFill>
+              </a:defRPr>
+            </a:lvl2pPr>
+            <a:lvl3pPr marL="1219170" indent="0">
               <a:buNone/>
               <a:defRPr sz="2400">
                 <a:solidFill>
@@ -1558,30 +1773,10 @@
                   </a:schemeClr>
                 </a:solidFill>
               </a:defRPr>
-            </a:lvl1pPr>
-            <a:lvl2pPr marL="457200" indent="0">
+            </a:lvl3pPr>
+            <a:lvl4pPr marL="1828754" indent="0">
               <a:buNone/>
-              <a:defRPr sz="2000">
-                <a:solidFill>
-                  <a:schemeClr val="tx1">
-                    <a:tint val="82000"/>
-                  </a:schemeClr>
-                </a:solidFill>
-              </a:defRPr>
-            </a:lvl2pPr>
-            <a:lvl3pPr marL="914400" indent="0">
-              <a:buNone/>
-              <a:defRPr sz="1800">
-                <a:solidFill>
-                  <a:schemeClr val="tx1">
-                    <a:tint val="82000"/>
-                  </a:schemeClr>
-                </a:solidFill>
-              </a:defRPr>
-            </a:lvl3pPr>
-            <a:lvl4pPr marL="1371600" indent="0">
-              <a:buNone/>
-              <a:defRPr sz="1600">
+              <a:defRPr sz="2133">
                 <a:solidFill>
                   <a:schemeClr val="tx1">
                     <a:tint val="82000"/>
@@ -1589,9 +1784,9 @@
                 </a:solidFill>
               </a:defRPr>
             </a:lvl4pPr>
-            <a:lvl5pPr marL="1828800" indent="0">
+            <a:lvl5pPr marL="2438339" indent="0">
               <a:buNone/>
-              <a:defRPr sz="1600">
+              <a:defRPr sz="2133">
                 <a:solidFill>
                   <a:schemeClr val="tx1">
                     <a:tint val="82000"/>
@@ -1599,9 +1794,9 @@
                 </a:solidFill>
               </a:defRPr>
             </a:lvl5pPr>
-            <a:lvl6pPr marL="2286000" indent="0">
+            <a:lvl6pPr marL="3047924" indent="0">
               <a:buNone/>
-              <a:defRPr sz="1600">
+              <a:defRPr sz="2133">
                 <a:solidFill>
                   <a:schemeClr val="tx1">
                     <a:tint val="82000"/>
@@ -1609,9 +1804,9 @@
                 </a:solidFill>
               </a:defRPr>
             </a:lvl6pPr>
-            <a:lvl7pPr marL="2743200" indent="0">
+            <a:lvl7pPr marL="3657509" indent="0">
               <a:buNone/>
-              <a:defRPr sz="1600">
+              <a:defRPr sz="2133">
                 <a:solidFill>
                   <a:schemeClr val="tx1">
                     <a:tint val="82000"/>
@@ -1619,9 +1814,9 @@
                 </a:solidFill>
               </a:defRPr>
             </a:lvl7pPr>
-            <a:lvl8pPr marL="3200400" indent="0">
+            <a:lvl8pPr marL="4267093" indent="0">
               <a:buNone/>
-              <a:defRPr sz="1600">
+              <a:defRPr sz="2133">
                 <a:solidFill>
                   <a:schemeClr val="tx1">
                     <a:tint val="82000"/>
@@ -1629,9 +1824,9 @@
                 </a:solidFill>
               </a:defRPr>
             </a:lvl8pPr>
-            <a:lvl9pPr marL="3657600" indent="0">
+            <a:lvl9pPr marL="4876678" indent="0">
               <a:buNone/>
-              <a:defRPr sz="1600">
+              <a:defRPr sz="2133">
                 <a:solidFill>
                   <a:schemeClr val="tx1">
                     <a:tint val="82000"/>
@@ -1651,13 +1846,7 @@
       </p:sp>
       <p:sp>
         <p:nvSpPr>
-          <p:cNvPr id="4" name="Date Placeholder 3">
-            <a:extLst>
-              <a:ext uri="{FF2B5EF4-FFF2-40B4-BE49-F238E27FC236}">
-                <a16:creationId xmlns:a16="http://schemas.microsoft.com/office/drawing/2014/main" id="{9DC5C5B7-C851-0194-E554-A776EC4B7D3F}"/>
-              </a:ext>
-            </a:extLst>
-          </p:cNvPr>
+          <p:cNvPr id="4" name="Date Placeholder 3"/>
           <p:cNvSpPr>
             <a:spLocks noGrp="1"/>
           </p:cNvSpPr>
@@ -1672,7 +1861,7 @@
           <a:p>
             <a:fld id="{636EB128-D63D-478F-A8AE-19C70145D55B}" type="datetimeFigureOut">
               <a:rPr lang="en-CA" smtClean="0"/>
-              <a:t>2025-03-14</a:t>
+              <a:t>2025-04-04</a:t>
             </a:fld>
             <a:endParaRPr lang="en-CA"/>
           </a:p>
@@ -1680,13 +1869,7 @@
       </p:sp>
       <p:sp>
         <p:nvSpPr>
-          <p:cNvPr id="5" name="Footer Placeholder 4">
-            <a:extLst>
-              <a:ext uri="{FF2B5EF4-FFF2-40B4-BE49-F238E27FC236}">
-                <a16:creationId xmlns:a16="http://schemas.microsoft.com/office/drawing/2014/main" id="{89256A5E-DDBD-049F-88BB-B3D4FEB932F9}"/>
-              </a:ext>
-            </a:extLst>
-          </p:cNvPr>
+          <p:cNvPr id="5" name="Footer Placeholder 4"/>
           <p:cNvSpPr>
             <a:spLocks noGrp="1"/>
           </p:cNvSpPr>
@@ -1705,13 +1888,7 @@
       </p:sp>
       <p:sp>
         <p:nvSpPr>
-          <p:cNvPr id="6" name="Slide Number Placeholder 5">
-            <a:extLst>
-              <a:ext uri="{FF2B5EF4-FFF2-40B4-BE49-F238E27FC236}">
-                <a16:creationId xmlns:a16="http://schemas.microsoft.com/office/drawing/2014/main" id="{87B24873-4A96-892A-AEB3-4491C67248E2}"/>
-              </a:ext>
-            </a:extLst>
-          </p:cNvPr>
+          <p:cNvPr id="6" name="Slide Number Placeholder 5"/>
           <p:cNvSpPr>
             <a:spLocks noGrp="1"/>
           </p:cNvSpPr>
@@ -1735,7 +1912,7 @@
     </p:spTree>
     <p:extLst>
       <p:ext uri="{BB962C8B-B14F-4D97-AF65-F5344CB8AC3E}">
-        <p14:creationId xmlns:p14="http://schemas.microsoft.com/office/powerpoint/2010/main" val="1394642017"/>
+        <p14:creationId xmlns:p14="http://schemas.microsoft.com/office/powerpoint/2010/main" val="3596454436"/>
       </p:ext>
     </p:extLst>
   </p:cSld>
@@ -1764,13 +1941,7 @@
       </p:grpSpPr>
       <p:sp>
         <p:nvSpPr>
-          <p:cNvPr id="2" name="Title 1">
-            <a:extLst>
-              <a:ext uri="{FF2B5EF4-FFF2-40B4-BE49-F238E27FC236}">
-                <a16:creationId xmlns:a16="http://schemas.microsoft.com/office/drawing/2014/main" id="{D8B2A5FB-B496-91F2-394C-9554503A265C}"/>
-              </a:ext>
-            </a:extLst>
-          </p:cNvPr>
+          <p:cNvPr id="2" name="Title 1"/>
           <p:cNvSpPr>
             <a:spLocks noGrp="1"/>
           </p:cNvSpPr>
@@ -1787,19 +1958,13 @@
               <a:rPr lang="en-US"/>
               <a:t>Click to edit Master title style</a:t>
             </a:r>
-            <a:endParaRPr lang="en-CA"/>
+            <a:endParaRPr lang="en-US" dirty="0"/>
           </a:p>
         </p:txBody>
       </p:sp>
       <p:sp>
         <p:nvSpPr>
-          <p:cNvPr id="3" name="Content Placeholder 2">
-            <a:extLst>
-              <a:ext uri="{FF2B5EF4-FFF2-40B4-BE49-F238E27FC236}">
-                <a16:creationId xmlns:a16="http://schemas.microsoft.com/office/drawing/2014/main" id="{0AEA3775-C783-2547-2827-19473B437AB8}"/>
-              </a:ext>
-            </a:extLst>
-          </p:cNvPr>
+          <p:cNvPr id="3" name="Content Placeholder 2"/>
           <p:cNvSpPr>
             <a:spLocks noGrp="1"/>
           </p:cNvSpPr>
@@ -1809,8 +1974,8 @@
         </p:nvSpPr>
         <p:spPr>
           <a:xfrm>
-            <a:off x="838200" y="1825625"/>
-            <a:ext cx="5181600" cy="4351338"/>
+            <a:off x="838200" y="2721533"/>
+            <a:ext cx="5181600" cy="6486717"/>
           </a:xfrm>
         </p:spPr>
         <p:txBody>
@@ -1850,19 +2015,13 @@
               <a:rPr lang="en-US"/>
               <a:t>Fifth level</a:t>
             </a:r>
-            <a:endParaRPr lang="en-CA"/>
+            <a:endParaRPr lang="en-US" dirty="0"/>
           </a:p>
         </p:txBody>
       </p:sp>
       <p:sp>
         <p:nvSpPr>
-          <p:cNvPr id="4" name="Content Placeholder 3">
-            <a:extLst>
-              <a:ext uri="{FF2B5EF4-FFF2-40B4-BE49-F238E27FC236}">
-                <a16:creationId xmlns:a16="http://schemas.microsoft.com/office/drawing/2014/main" id="{C976EB09-683F-B99D-55C4-AB6F6A9A4C46}"/>
-              </a:ext>
-            </a:extLst>
-          </p:cNvPr>
+          <p:cNvPr id="4" name="Content Placeholder 3"/>
           <p:cNvSpPr>
             <a:spLocks noGrp="1"/>
           </p:cNvSpPr>
@@ -1872,8 +2031,8 @@
         </p:nvSpPr>
         <p:spPr>
           <a:xfrm>
-            <a:off x="6172200" y="1825625"/>
-            <a:ext cx="5181600" cy="4351338"/>
+            <a:off x="6172200" y="2721533"/>
+            <a:ext cx="5181600" cy="6486717"/>
           </a:xfrm>
         </p:spPr>
         <p:txBody>
@@ -1913,19 +2072,13 @@
               <a:rPr lang="en-US"/>
               <a:t>Fifth level</a:t>
             </a:r>
-            <a:endParaRPr lang="en-CA"/>
+            <a:endParaRPr lang="en-US" dirty="0"/>
           </a:p>
         </p:txBody>
       </p:sp>
       <p:sp>
         <p:nvSpPr>
-          <p:cNvPr id="5" name="Date Placeholder 4">
-            <a:extLst>
-              <a:ext uri="{FF2B5EF4-FFF2-40B4-BE49-F238E27FC236}">
-                <a16:creationId xmlns:a16="http://schemas.microsoft.com/office/drawing/2014/main" id="{54D2FEE4-4D25-2A53-098F-FA0ABEAB3BD9}"/>
-              </a:ext>
-            </a:extLst>
-          </p:cNvPr>
+          <p:cNvPr id="5" name="Date Placeholder 4"/>
           <p:cNvSpPr>
             <a:spLocks noGrp="1"/>
           </p:cNvSpPr>
@@ -1940,7 +2093,7 @@
           <a:p>
             <a:fld id="{636EB128-D63D-478F-A8AE-19C70145D55B}" type="datetimeFigureOut">
               <a:rPr lang="en-CA" smtClean="0"/>
-              <a:t>2025-03-14</a:t>
+              <a:t>2025-04-04</a:t>
             </a:fld>
             <a:endParaRPr lang="en-CA"/>
           </a:p>
@@ -1948,13 +2101,7 @@
       </p:sp>
       <p:sp>
         <p:nvSpPr>
-          <p:cNvPr id="6" name="Footer Placeholder 5">
-            <a:extLst>
-              <a:ext uri="{FF2B5EF4-FFF2-40B4-BE49-F238E27FC236}">
-                <a16:creationId xmlns:a16="http://schemas.microsoft.com/office/drawing/2014/main" id="{6E7994EC-A34B-3D0A-BFF0-097CBFD5F50E}"/>
-              </a:ext>
-            </a:extLst>
-          </p:cNvPr>
+          <p:cNvPr id="6" name="Footer Placeholder 5"/>
           <p:cNvSpPr>
             <a:spLocks noGrp="1"/>
           </p:cNvSpPr>
@@ -1973,13 +2120,7 @@
       </p:sp>
       <p:sp>
         <p:nvSpPr>
-          <p:cNvPr id="7" name="Slide Number Placeholder 6">
-            <a:extLst>
-              <a:ext uri="{FF2B5EF4-FFF2-40B4-BE49-F238E27FC236}">
-                <a16:creationId xmlns:a16="http://schemas.microsoft.com/office/drawing/2014/main" id="{E8E0A776-3079-D44D-CE47-7F7B72ACDD63}"/>
-              </a:ext>
-            </a:extLst>
-          </p:cNvPr>
+          <p:cNvPr id="7" name="Slide Number Placeholder 6"/>
           <p:cNvSpPr>
             <a:spLocks noGrp="1"/>
           </p:cNvSpPr>
@@ -2003,7 +2144,7 @@
     </p:spTree>
     <p:extLst>
       <p:ext uri="{BB962C8B-B14F-4D97-AF65-F5344CB8AC3E}">
-        <p14:creationId xmlns:p14="http://schemas.microsoft.com/office/powerpoint/2010/main" val="2682050215"/>
+        <p14:creationId xmlns:p14="http://schemas.microsoft.com/office/powerpoint/2010/main" val="655286853"/>
       </p:ext>
     </p:extLst>
   </p:cSld>
@@ -2032,13 +2173,7 @@
       </p:grpSpPr>
       <p:sp>
         <p:nvSpPr>
-          <p:cNvPr id="2" name="Title 1">
-            <a:extLst>
-              <a:ext uri="{FF2B5EF4-FFF2-40B4-BE49-F238E27FC236}">
-                <a16:creationId xmlns:a16="http://schemas.microsoft.com/office/drawing/2014/main" id="{27967503-D0C4-4873-B6D9-3951226CD3B7}"/>
-              </a:ext>
-            </a:extLst>
-          </p:cNvPr>
+          <p:cNvPr id="2" name="Title 1"/>
           <p:cNvSpPr>
             <a:spLocks noGrp="1"/>
           </p:cNvSpPr>
@@ -2048,8 +2183,8 @@
         </p:nvSpPr>
         <p:spPr>
           <a:xfrm>
-            <a:off x="839788" y="365125"/>
-            <a:ext cx="10515600" cy="1325563"/>
+            <a:off x="839788" y="544309"/>
+            <a:ext cx="10515600" cy="1976071"/>
           </a:xfrm>
         </p:spPr>
         <p:txBody>
@@ -2060,19 +2195,13 @@
               <a:rPr lang="en-US"/>
               <a:t>Click to edit Master title style</a:t>
             </a:r>
-            <a:endParaRPr lang="en-CA"/>
+            <a:endParaRPr lang="en-US" dirty="0"/>
           </a:p>
         </p:txBody>
       </p:sp>
       <p:sp>
         <p:nvSpPr>
-          <p:cNvPr id="3" name="Text Placeholder 2">
-            <a:extLst>
-              <a:ext uri="{FF2B5EF4-FFF2-40B4-BE49-F238E27FC236}">
-                <a16:creationId xmlns:a16="http://schemas.microsoft.com/office/drawing/2014/main" id="{A9DB4DA4-E918-9200-A21E-315BD3EC7F40}"/>
-              </a:ext>
-            </a:extLst>
-          </p:cNvPr>
+          <p:cNvPr id="3" name="Text Placeholder 2"/>
           <p:cNvSpPr>
             <a:spLocks noGrp="1"/>
           </p:cNvSpPr>
@@ -2082,8 +2211,8 @@
         </p:nvSpPr>
         <p:spPr>
           <a:xfrm>
-            <a:off x="839788" y="1681163"/>
-            <a:ext cx="5157787" cy="823912"/>
+            <a:off x="839789" y="2506178"/>
+            <a:ext cx="5157787" cy="1228239"/>
           </a:xfrm>
         </p:spPr>
         <p:txBody>
@@ -2091,39 +2220,39 @@
           <a:lstStyle>
             <a:lvl1pPr marL="0" indent="0">
               <a:buNone/>
+              <a:defRPr sz="3200" b="1"/>
+            </a:lvl1pPr>
+            <a:lvl2pPr marL="609585" indent="0">
+              <a:buNone/>
+              <a:defRPr sz="2667" b="1"/>
+            </a:lvl2pPr>
+            <a:lvl3pPr marL="1219170" indent="0">
+              <a:buNone/>
               <a:defRPr sz="2400" b="1"/>
-            </a:lvl1pPr>
-            <a:lvl2pPr marL="457200" indent="0">
+            </a:lvl3pPr>
+            <a:lvl4pPr marL="1828754" indent="0">
               <a:buNone/>
-              <a:defRPr sz="2000" b="1"/>
-            </a:lvl2pPr>
-            <a:lvl3pPr marL="914400" indent="0">
+              <a:defRPr sz="2133" b="1"/>
+            </a:lvl4pPr>
+            <a:lvl5pPr marL="2438339" indent="0">
               <a:buNone/>
-              <a:defRPr sz="1800" b="1"/>
-            </a:lvl3pPr>
-            <a:lvl4pPr marL="1371600" indent="0">
+              <a:defRPr sz="2133" b="1"/>
+            </a:lvl5pPr>
+            <a:lvl6pPr marL="3047924" indent="0">
               <a:buNone/>
-              <a:defRPr sz="1600" b="1"/>
-            </a:lvl4pPr>
-            <a:lvl5pPr marL="1828800" indent="0">
+              <a:defRPr sz="2133" b="1"/>
+            </a:lvl6pPr>
+            <a:lvl7pPr marL="3657509" indent="0">
               <a:buNone/>
-              <a:defRPr sz="1600" b="1"/>
-            </a:lvl5pPr>
-            <a:lvl6pPr marL="2286000" indent="0">
+              <a:defRPr sz="2133" b="1"/>
+            </a:lvl7pPr>
+            <a:lvl8pPr marL="4267093" indent="0">
               <a:buNone/>
-              <a:defRPr sz="1600" b="1"/>
-            </a:lvl6pPr>
-            <a:lvl7pPr marL="2743200" indent="0">
+              <a:defRPr sz="2133" b="1"/>
+            </a:lvl8pPr>
+            <a:lvl9pPr marL="4876678" indent="0">
               <a:buNone/>
-              <a:defRPr sz="1600" b="1"/>
-            </a:lvl7pPr>
-            <a:lvl8pPr marL="3200400" indent="0">
-              <a:buNone/>
-              <a:defRPr sz="1600" b="1"/>
-            </a:lvl8pPr>
-            <a:lvl9pPr marL="3657600" indent="0">
-              <a:buNone/>
-              <a:defRPr sz="1600" b="1"/>
+              <a:defRPr sz="2133" b="1"/>
             </a:lvl9pPr>
           </a:lstStyle>
           <a:p>
@@ -2137,13 +2266,7 @@
       </p:sp>
       <p:sp>
         <p:nvSpPr>
-          <p:cNvPr id="4" name="Content Placeholder 3">
-            <a:extLst>
-              <a:ext uri="{FF2B5EF4-FFF2-40B4-BE49-F238E27FC236}">
-                <a16:creationId xmlns:a16="http://schemas.microsoft.com/office/drawing/2014/main" id="{40AD3F51-0A16-9324-F775-549387F6D47A}"/>
-              </a:ext>
-            </a:extLst>
-          </p:cNvPr>
+          <p:cNvPr id="4" name="Content Placeholder 3"/>
           <p:cNvSpPr>
             <a:spLocks noGrp="1"/>
           </p:cNvSpPr>
@@ -2153,8 +2276,8 @@
         </p:nvSpPr>
         <p:spPr>
           <a:xfrm>
-            <a:off x="839788" y="2505075"/>
-            <a:ext cx="5157787" cy="3684588"/>
+            <a:off x="839789" y="3734418"/>
+            <a:ext cx="5157787" cy="5492765"/>
           </a:xfrm>
         </p:spPr>
         <p:txBody>
@@ -2194,19 +2317,13 @@
               <a:rPr lang="en-US"/>
               <a:t>Fifth level</a:t>
             </a:r>
-            <a:endParaRPr lang="en-CA"/>
+            <a:endParaRPr lang="en-US" dirty="0"/>
           </a:p>
         </p:txBody>
       </p:sp>
       <p:sp>
         <p:nvSpPr>
-          <p:cNvPr id="5" name="Text Placeholder 4">
-            <a:extLst>
-              <a:ext uri="{FF2B5EF4-FFF2-40B4-BE49-F238E27FC236}">
-                <a16:creationId xmlns:a16="http://schemas.microsoft.com/office/drawing/2014/main" id="{84320E59-C41C-CAA1-83CA-5C4A273E3446}"/>
-              </a:ext>
-            </a:extLst>
-          </p:cNvPr>
+          <p:cNvPr id="5" name="Text Placeholder 4"/>
           <p:cNvSpPr>
             <a:spLocks noGrp="1"/>
           </p:cNvSpPr>
@@ -2216,8 +2333,8 @@
         </p:nvSpPr>
         <p:spPr>
           <a:xfrm>
-            <a:off x="6172200" y="1681163"/>
-            <a:ext cx="5183188" cy="823912"/>
+            <a:off x="6172201" y="2506178"/>
+            <a:ext cx="5183188" cy="1228239"/>
           </a:xfrm>
         </p:spPr>
         <p:txBody>
@@ -2225,39 +2342,39 @@
           <a:lstStyle>
             <a:lvl1pPr marL="0" indent="0">
               <a:buNone/>
+              <a:defRPr sz="3200" b="1"/>
+            </a:lvl1pPr>
+            <a:lvl2pPr marL="609585" indent="0">
+              <a:buNone/>
+              <a:defRPr sz="2667" b="1"/>
+            </a:lvl2pPr>
+            <a:lvl3pPr marL="1219170" indent="0">
+              <a:buNone/>
               <a:defRPr sz="2400" b="1"/>
-            </a:lvl1pPr>
-            <a:lvl2pPr marL="457200" indent="0">
+            </a:lvl3pPr>
+            <a:lvl4pPr marL="1828754" indent="0">
               <a:buNone/>
-              <a:defRPr sz="2000" b="1"/>
-            </a:lvl2pPr>
-            <a:lvl3pPr marL="914400" indent="0">
+              <a:defRPr sz="2133" b="1"/>
+            </a:lvl4pPr>
+            <a:lvl5pPr marL="2438339" indent="0">
               <a:buNone/>
-              <a:defRPr sz="1800" b="1"/>
-            </a:lvl3pPr>
-            <a:lvl4pPr marL="1371600" indent="0">
+              <a:defRPr sz="2133" b="1"/>
+            </a:lvl5pPr>
+            <a:lvl6pPr marL="3047924" indent="0">
               <a:buNone/>
-              <a:defRPr sz="1600" b="1"/>
-            </a:lvl4pPr>
-            <a:lvl5pPr marL="1828800" indent="0">
+              <a:defRPr sz="2133" b="1"/>
+            </a:lvl6pPr>
+            <a:lvl7pPr marL="3657509" indent="0">
               <a:buNone/>
-              <a:defRPr sz="1600" b="1"/>
-            </a:lvl5pPr>
-            <a:lvl6pPr marL="2286000" indent="0">
+              <a:defRPr sz="2133" b="1"/>
+            </a:lvl7pPr>
+            <a:lvl8pPr marL="4267093" indent="0">
               <a:buNone/>
-              <a:defRPr sz="1600" b="1"/>
-            </a:lvl6pPr>
-            <a:lvl7pPr marL="2743200" indent="0">
+              <a:defRPr sz="2133" b="1"/>
+            </a:lvl8pPr>
+            <a:lvl9pPr marL="4876678" indent="0">
               <a:buNone/>
-              <a:defRPr sz="1600" b="1"/>
-            </a:lvl7pPr>
-            <a:lvl8pPr marL="3200400" indent="0">
-              <a:buNone/>
-              <a:defRPr sz="1600" b="1"/>
-            </a:lvl8pPr>
-            <a:lvl9pPr marL="3657600" indent="0">
-              <a:buNone/>
-              <a:defRPr sz="1600" b="1"/>
+              <a:defRPr sz="2133" b="1"/>
             </a:lvl9pPr>
           </a:lstStyle>
           <a:p>
@@ -2271,13 +2388,7 @@
       </p:sp>
       <p:sp>
         <p:nvSpPr>
-          <p:cNvPr id="6" name="Content Placeholder 5">
-            <a:extLst>
-              <a:ext uri="{FF2B5EF4-FFF2-40B4-BE49-F238E27FC236}">
-                <a16:creationId xmlns:a16="http://schemas.microsoft.com/office/drawing/2014/main" id="{005E82B7-A84D-24F4-AA66-34D4BEA85DA2}"/>
-              </a:ext>
-            </a:extLst>
-          </p:cNvPr>
+          <p:cNvPr id="6" name="Content Placeholder 5"/>
           <p:cNvSpPr>
             <a:spLocks noGrp="1"/>
           </p:cNvSpPr>
@@ -2287,8 +2398,8 @@
         </p:nvSpPr>
         <p:spPr>
           <a:xfrm>
-            <a:off x="6172200" y="2505075"/>
-            <a:ext cx="5183188" cy="3684588"/>
+            <a:off x="6172201" y="3734418"/>
+            <a:ext cx="5183188" cy="5492765"/>
           </a:xfrm>
         </p:spPr>
         <p:txBody>
@@ -2328,19 +2439,13 @@
               <a:rPr lang="en-US"/>
               <a:t>Fifth level</a:t>
             </a:r>
-            <a:endParaRPr lang="en-CA"/>
+            <a:endParaRPr lang="en-US" dirty="0"/>
           </a:p>
         </p:txBody>
       </p:sp>
       <p:sp>
         <p:nvSpPr>
-          <p:cNvPr id="7" name="Date Placeholder 6">
-            <a:extLst>
-              <a:ext uri="{FF2B5EF4-FFF2-40B4-BE49-F238E27FC236}">
-                <a16:creationId xmlns:a16="http://schemas.microsoft.com/office/drawing/2014/main" id="{375B8523-B69D-FCE6-EC58-2A65A72B2BE1}"/>
-              </a:ext>
-            </a:extLst>
-          </p:cNvPr>
+          <p:cNvPr id="7" name="Date Placeholder 6"/>
           <p:cNvSpPr>
             <a:spLocks noGrp="1"/>
           </p:cNvSpPr>
@@ -2355,7 +2460,7 @@
           <a:p>
             <a:fld id="{636EB128-D63D-478F-A8AE-19C70145D55B}" type="datetimeFigureOut">
               <a:rPr lang="en-CA" smtClean="0"/>
-              <a:t>2025-03-14</a:t>
+              <a:t>2025-04-04</a:t>
             </a:fld>
             <a:endParaRPr lang="en-CA"/>
           </a:p>
@@ -2363,13 +2468,7 @@
       </p:sp>
       <p:sp>
         <p:nvSpPr>
-          <p:cNvPr id="8" name="Footer Placeholder 7">
-            <a:extLst>
-              <a:ext uri="{FF2B5EF4-FFF2-40B4-BE49-F238E27FC236}">
-                <a16:creationId xmlns:a16="http://schemas.microsoft.com/office/drawing/2014/main" id="{A73D385F-CF44-99A1-B561-F028B37B594F}"/>
-              </a:ext>
-            </a:extLst>
-          </p:cNvPr>
+          <p:cNvPr id="8" name="Footer Placeholder 7"/>
           <p:cNvSpPr>
             <a:spLocks noGrp="1"/>
           </p:cNvSpPr>
@@ -2388,13 +2487,7 @@
       </p:sp>
       <p:sp>
         <p:nvSpPr>
-          <p:cNvPr id="9" name="Slide Number Placeholder 8">
-            <a:extLst>
-              <a:ext uri="{FF2B5EF4-FFF2-40B4-BE49-F238E27FC236}">
-                <a16:creationId xmlns:a16="http://schemas.microsoft.com/office/drawing/2014/main" id="{96D659F3-9111-9811-3E47-7B41F4DC14A9}"/>
-              </a:ext>
-            </a:extLst>
-          </p:cNvPr>
+          <p:cNvPr id="9" name="Slide Number Placeholder 8"/>
           <p:cNvSpPr>
             <a:spLocks noGrp="1"/>
           </p:cNvSpPr>
@@ -2418,7 +2511,7 @@
     </p:spTree>
     <p:extLst>
       <p:ext uri="{BB962C8B-B14F-4D97-AF65-F5344CB8AC3E}">
-        <p14:creationId xmlns:p14="http://schemas.microsoft.com/office/powerpoint/2010/main" val="177597508"/>
+        <p14:creationId xmlns:p14="http://schemas.microsoft.com/office/powerpoint/2010/main" val="15254709"/>
       </p:ext>
     </p:extLst>
   </p:cSld>
@@ -2447,13 +2540,7 @@
       </p:grpSpPr>
       <p:sp>
         <p:nvSpPr>
-          <p:cNvPr id="2" name="Title 1">
-            <a:extLst>
-              <a:ext uri="{FF2B5EF4-FFF2-40B4-BE49-F238E27FC236}">
-                <a16:creationId xmlns:a16="http://schemas.microsoft.com/office/drawing/2014/main" id="{7DD01591-8204-C8DF-592F-9CFD55AE7E32}"/>
-              </a:ext>
-            </a:extLst>
-          </p:cNvPr>
+          <p:cNvPr id="2" name="Title 1"/>
           <p:cNvSpPr>
             <a:spLocks noGrp="1"/>
           </p:cNvSpPr>
@@ -2470,19 +2557,13 @@
               <a:rPr lang="en-US"/>
               <a:t>Click to edit Master title style</a:t>
             </a:r>
-            <a:endParaRPr lang="en-CA"/>
+            <a:endParaRPr lang="en-US" dirty="0"/>
           </a:p>
         </p:txBody>
       </p:sp>
       <p:sp>
         <p:nvSpPr>
-          <p:cNvPr id="3" name="Date Placeholder 2">
-            <a:extLst>
-              <a:ext uri="{FF2B5EF4-FFF2-40B4-BE49-F238E27FC236}">
-                <a16:creationId xmlns:a16="http://schemas.microsoft.com/office/drawing/2014/main" id="{7019279C-8478-8C23-E1F8-0079188789D8}"/>
-              </a:ext>
-            </a:extLst>
-          </p:cNvPr>
+          <p:cNvPr id="3" name="Date Placeholder 2"/>
           <p:cNvSpPr>
             <a:spLocks noGrp="1"/>
           </p:cNvSpPr>
@@ -2497,7 +2578,7 @@
           <a:p>
             <a:fld id="{636EB128-D63D-478F-A8AE-19C70145D55B}" type="datetimeFigureOut">
               <a:rPr lang="en-CA" smtClean="0"/>
-              <a:t>2025-03-14</a:t>
+              <a:t>2025-04-04</a:t>
             </a:fld>
             <a:endParaRPr lang="en-CA"/>
           </a:p>
@@ -2505,13 +2586,7 @@
       </p:sp>
       <p:sp>
         <p:nvSpPr>
-          <p:cNvPr id="4" name="Footer Placeholder 3">
-            <a:extLst>
-              <a:ext uri="{FF2B5EF4-FFF2-40B4-BE49-F238E27FC236}">
-                <a16:creationId xmlns:a16="http://schemas.microsoft.com/office/drawing/2014/main" id="{17D51DA4-EAF2-83A7-A09D-0EA66B5775AA}"/>
-              </a:ext>
-            </a:extLst>
-          </p:cNvPr>
+          <p:cNvPr id="4" name="Footer Placeholder 3"/>
           <p:cNvSpPr>
             <a:spLocks noGrp="1"/>
           </p:cNvSpPr>
@@ -2530,13 +2605,7 @@
       </p:sp>
       <p:sp>
         <p:nvSpPr>
-          <p:cNvPr id="5" name="Slide Number Placeholder 4">
-            <a:extLst>
-              <a:ext uri="{FF2B5EF4-FFF2-40B4-BE49-F238E27FC236}">
-                <a16:creationId xmlns:a16="http://schemas.microsoft.com/office/drawing/2014/main" id="{6ABF3CF3-1C66-C98F-442B-BCA25ED44DF7}"/>
-              </a:ext>
-            </a:extLst>
-          </p:cNvPr>
+          <p:cNvPr id="5" name="Slide Number Placeholder 4"/>
           <p:cNvSpPr>
             <a:spLocks noGrp="1"/>
           </p:cNvSpPr>
@@ -2560,7 +2629,7 @@
     </p:spTree>
     <p:extLst>
       <p:ext uri="{BB962C8B-B14F-4D97-AF65-F5344CB8AC3E}">
-        <p14:creationId xmlns:p14="http://schemas.microsoft.com/office/powerpoint/2010/main" val="2903557867"/>
+        <p14:creationId xmlns:p14="http://schemas.microsoft.com/office/powerpoint/2010/main" val="3884564164"/>
       </p:ext>
     </p:extLst>
   </p:cSld>
@@ -2589,13 +2658,7 @@
       </p:grpSpPr>
       <p:sp>
         <p:nvSpPr>
-          <p:cNvPr id="2" name="Date Placeholder 1">
-            <a:extLst>
-              <a:ext uri="{FF2B5EF4-FFF2-40B4-BE49-F238E27FC236}">
-                <a16:creationId xmlns:a16="http://schemas.microsoft.com/office/drawing/2014/main" id="{418DF584-C5FC-3A5B-CBA0-2F55F48F2FF9}"/>
-              </a:ext>
-            </a:extLst>
-          </p:cNvPr>
+          <p:cNvPr id="2" name="Date Placeholder 1"/>
           <p:cNvSpPr>
             <a:spLocks noGrp="1"/>
           </p:cNvSpPr>
@@ -2610,7 +2673,7 @@
           <a:p>
             <a:fld id="{636EB128-D63D-478F-A8AE-19C70145D55B}" type="datetimeFigureOut">
               <a:rPr lang="en-CA" smtClean="0"/>
-              <a:t>2025-03-14</a:t>
+              <a:t>2025-04-04</a:t>
             </a:fld>
             <a:endParaRPr lang="en-CA"/>
           </a:p>
@@ -2618,13 +2681,7 @@
       </p:sp>
       <p:sp>
         <p:nvSpPr>
-          <p:cNvPr id="3" name="Footer Placeholder 2">
-            <a:extLst>
-              <a:ext uri="{FF2B5EF4-FFF2-40B4-BE49-F238E27FC236}">
-                <a16:creationId xmlns:a16="http://schemas.microsoft.com/office/drawing/2014/main" id="{77FBA150-E27C-0F14-2B36-3CB3A585A2D3}"/>
-              </a:ext>
-            </a:extLst>
-          </p:cNvPr>
+          <p:cNvPr id="3" name="Footer Placeholder 2"/>
           <p:cNvSpPr>
             <a:spLocks noGrp="1"/>
           </p:cNvSpPr>
@@ -2643,13 +2700,7 @@
       </p:sp>
       <p:sp>
         <p:nvSpPr>
-          <p:cNvPr id="4" name="Slide Number Placeholder 3">
-            <a:extLst>
-              <a:ext uri="{FF2B5EF4-FFF2-40B4-BE49-F238E27FC236}">
-                <a16:creationId xmlns:a16="http://schemas.microsoft.com/office/drawing/2014/main" id="{002B053E-B2D4-C165-A6F5-119DC6EE0D22}"/>
-              </a:ext>
-            </a:extLst>
-          </p:cNvPr>
+          <p:cNvPr id="4" name="Slide Number Placeholder 3"/>
           <p:cNvSpPr>
             <a:spLocks noGrp="1"/>
           </p:cNvSpPr>
@@ -2673,7 +2724,7 @@
     </p:spTree>
     <p:extLst>
       <p:ext uri="{BB962C8B-B14F-4D97-AF65-F5344CB8AC3E}">
-        <p14:creationId xmlns:p14="http://schemas.microsoft.com/office/powerpoint/2010/main" val="2088060559"/>
+        <p14:creationId xmlns:p14="http://schemas.microsoft.com/office/powerpoint/2010/main" val="1532877187"/>
       </p:ext>
     </p:extLst>
   </p:cSld>
@@ -2702,13 +2753,7 @@
       </p:grpSpPr>
       <p:sp>
         <p:nvSpPr>
-          <p:cNvPr id="2" name="Title 1">
-            <a:extLst>
-              <a:ext uri="{FF2B5EF4-FFF2-40B4-BE49-F238E27FC236}">
-                <a16:creationId xmlns:a16="http://schemas.microsoft.com/office/drawing/2014/main" id="{83356F0D-C5F5-CA9C-C21B-80D69A78F862}"/>
-              </a:ext>
-            </a:extLst>
-          </p:cNvPr>
+          <p:cNvPr id="2" name="Title 1"/>
           <p:cNvSpPr>
             <a:spLocks noGrp="1"/>
           </p:cNvSpPr>
@@ -2718,15 +2763,15 @@
         </p:nvSpPr>
         <p:spPr>
           <a:xfrm>
-            <a:off x="839788" y="457200"/>
-            <a:ext cx="3932237" cy="1600200"/>
+            <a:off x="839788" y="681567"/>
+            <a:ext cx="3932237" cy="2385483"/>
           </a:xfrm>
         </p:spPr>
         <p:txBody>
           <a:bodyPr anchor="b"/>
           <a:lstStyle>
             <a:lvl1pPr>
-              <a:defRPr sz="3200"/>
+              <a:defRPr sz="4267"/>
             </a:lvl1pPr>
           </a:lstStyle>
           <a:p>
@@ -2734,19 +2779,13 @@
               <a:rPr lang="en-US"/>
               <a:t>Click to edit Master title style</a:t>
             </a:r>
-            <a:endParaRPr lang="en-CA"/>
+            <a:endParaRPr lang="en-US" dirty="0"/>
           </a:p>
         </p:txBody>
       </p:sp>
       <p:sp>
         <p:nvSpPr>
-          <p:cNvPr id="3" name="Content Placeholder 2">
-            <a:extLst>
-              <a:ext uri="{FF2B5EF4-FFF2-40B4-BE49-F238E27FC236}">
-                <a16:creationId xmlns:a16="http://schemas.microsoft.com/office/drawing/2014/main" id="{154FC371-13EA-490F-1622-0206308801DF}"/>
-              </a:ext>
-            </a:extLst>
-          </p:cNvPr>
+          <p:cNvPr id="3" name="Content Placeholder 2"/>
           <p:cNvSpPr>
             <a:spLocks noGrp="1"/>
           </p:cNvSpPr>
@@ -2756,39 +2795,39 @@
         </p:nvSpPr>
         <p:spPr>
           <a:xfrm>
-            <a:off x="5183188" y="987425"/>
-            <a:ext cx="6172200" cy="4873625"/>
+            <a:off x="5183188" y="1471997"/>
+            <a:ext cx="6172200" cy="7265311"/>
           </a:xfrm>
         </p:spPr>
         <p:txBody>
           <a:bodyPr/>
           <a:lstStyle>
             <a:lvl1pPr>
-              <a:defRPr sz="3200"/>
+              <a:defRPr sz="4267"/>
             </a:lvl1pPr>
             <a:lvl2pPr>
-              <a:defRPr sz="2800"/>
+              <a:defRPr sz="3733"/>
             </a:lvl2pPr>
             <a:lvl3pPr>
-              <a:defRPr sz="2400"/>
+              <a:defRPr sz="3200"/>
             </a:lvl3pPr>
             <a:lvl4pPr>
-              <a:defRPr sz="2000"/>
+              <a:defRPr sz="2667"/>
             </a:lvl4pPr>
             <a:lvl5pPr>
-              <a:defRPr sz="2000"/>
+              <a:defRPr sz="2667"/>
             </a:lvl5pPr>
             <a:lvl6pPr>
-              <a:defRPr sz="2000"/>
+              <a:defRPr sz="2667"/>
             </a:lvl6pPr>
             <a:lvl7pPr>
-              <a:defRPr sz="2000"/>
+              <a:defRPr sz="2667"/>
             </a:lvl7pPr>
             <a:lvl8pPr>
-              <a:defRPr sz="2000"/>
+              <a:defRPr sz="2667"/>
             </a:lvl8pPr>
             <a:lvl9pPr>
-              <a:defRPr sz="2000"/>
+              <a:defRPr sz="2667"/>
             </a:lvl9pPr>
           </a:lstStyle>
           <a:p>
@@ -2825,19 +2864,13 @@
               <a:rPr lang="en-US"/>
               <a:t>Fifth level</a:t>
             </a:r>
-            <a:endParaRPr lang="en-CA"/>
+            <a:endParaRPr lang="en-US" dirty="0"/>
           </a:p>
         </p:txBody>
       </p:sp>
       <p:sp>
         <p:nvSpPr>
-          <p:cNvPr id="4" name="Text Placeholder 3">
-            <a:extLst>
-              <a:ext uri="{FF2B5EF4-FFF2-40B4-BE49-F238E27FC236}">
-                <a16:creationId xmlns:a16="http://schemas.microsoft.com/office/drawing/2014/main" id="{9D394CB9-7018-8B15-EF2D-85DE8EAF56DD}"/>
-              </a:ext>
-            </a:extLst>
-          </p:cNvPr>
+          <p:cNvPr id="4" name="Text Placeholder 3"/>
           <p:cNvSpPr>
             <a:spLocks noGrp="1"/>
           </p:cNvSpPr>
@@ -2847,8 +2880,8 @@
         </p:nvSpPr>
         <p:spPr>
           <a:xfrm>
-            <a:off x="839788" y="2057400"/>
-            <a:ext cx="3932237" cy="3811588"/>
+            <a:off x="839788" y="3067050"/>
+            <a:ext cx="3932237" cy="5682090"/>
           </a:xfrm>
         </p:spPr>
         <p:txBody>
@@ -2856,39 +2889,39 @@
           <a:lstStyle>
             <a:lvl1pPr marL="0" indent="0">
               <a:buNone/>
+              <a:defRPr sz="2133"/>
+            </a:lvl1pPr>
+            <a:lvl2pPr marL="609585" indent="0">
+              <a:buNone/>
+              <a:defRPr sz="1867"/>
+            </a:lvl2pPr>
+            <a:lvl3pPr marL="1219170" indent="0">
+              <a:buNone/>
               <a:defRPr sz="1600"/>
-            </a:lvl1pPr>
-            <a:lvl2pPr marL="457200" indent="0">
+            </a:lvl3pPr>
+            <a:lvl4pPr marL="1828754" indent="0">
               <a:buNone/>
-              <a:defRPr sz="1400"/>
-            </a:lvl2pPr>
-            <a:lvl3pPr marL="914400" indent="0">
+              <a:defRPr sz="1333"/>
+            </a:lvl4pPr>
+            <a:lvl5pPr marL="2438339" indent="0">
               <a:buNone/>
-              <a:defRPr sz="1200"/>
-            </a:lvl3pPr>
-            <a:lvl4pPr marL="1371600" indent="0">
+              <a:defRPr sz="1333"/>
+            </a:lvl5pPr>
+            <a:lvl6pPr marL="3047924" indent="0">
               <a:buNone/>
-              <a:defRPr sz="1000"/>
-            </a:lvl4pPr>
-            <a:lvl5pPr marL="1828800" indent="0">
+              <a:defRPr sz="1333"/>
+            </a:lvl6pPr>
+            <a:lvl7pPr marL="3657509" indent="0">
               <a:buNone/>
-              <a:defRPr sz="1000"/>
-            </a:lvl5pPr>
-            <a:lvl6pPr marL="2286000" indent="0">
+              <a:defRPr sz="1333"/>
+            </a:lvl7pPr>
+            <a:lvl8pPr marL="4267093" indent="0">
               <a:buNone/>
-              <a:defRPr sz="1000"/>
-            </a:lvl6pPr>
-            <a:lvl7pPr marL="2743200" indent="0">
+              <a:defRPr sz="1333"/>
+            </a:lvl8pPr>
+            <a:lvl9pPr marL="4876678" indent="0">
               <a:buNone/>
-              <a:defRPr sz="1000"/>
-            </a:lvl7pPr>
-            <a:lvl8pPr marL="3200400" indent="0">
-              <a:buNone/>
-              <a:defRPr sz="1000"/>
-            </a:lvl8pPr>
-            <a:lvl9pPr marL="3657600" indent="0">
-              <a:buNone/>
-              <a:defRPr sz="1000"/>
+              <a:defRPr sz="1333"/>
             </a:lvl9pPr>
           </a:lstStyle>
           <a:p>
@@ -2902,13 +2935,7 @@
       </p:sp>
       <p:sp>
         <p:nvSpPr>
-          <p:cNvPr id="5" name="Date Placeholder 4">
-            <a:extLst>
-              <a:ext uri="{FF2B5EF4-FFF2-40B4-BE49-F238E27FC236}">
-                <a16:creationId xmlns:a16="http://schemas.microsoft.com/office/drawing/2014/main" id="{5D21BFCD-3A6D-09E7-2324-4CF0347D0178}"/>
-              </a:ext>
-            </a:extLst>
-          </p:cNvPr>
+          <p:cNvPr id="5" name="Date Placeholder 4"/>
           <p:cNvSpPr>
             <a:spLocks noGrp="1"/>
           </p:cNvSpPr>
@@ -2923,7 +2950,7 @@
           <a:p>
             <a:fld id="{636EB128-D63D-478F-A8AE-19C70145D55B}" type="datetimeFigureOut">
               <a:rPr lang="en-CA" smtClean="0"/>
-              <a:t>2025-03-14</a:t>
+              <a:t>2025-04-04</a:t>
             </a:fld>
             <a:endParaRPr lang="en-CA"/>
           </a:p>
@@ -2931,13 +2958,7 @@
       </p:sp>
       <p:sp>
         <p:nvSpPr>
-          <p:cNvPr id="6" name="Footer Placeholder 5">
-            <a:extLst>
-              <a:ext uri="{FF2B5EF4-FFF2-40B4-BE49-F238E27FC236}">
-                <a16:creationId xmlns:a16="http://schemas.microsoft.com/office/drawing/2014/main" id="{4116E65B-06D6-39C4-41E3-722F147B92B5}"/>
-              </a:ext>
-            </a:extLst>
-          </p:cNvPr>
+          <p:cNvPr id="6" name="Footer Placeholder 5"/>
           <p:cNvSpPr>
             <a:spLocks noGrp="1"/>
           </p:cNvSpPr>
@@ -2956,13 +2977,7 @@
       </p:sp>
       <p:sp>
         <p:nvSpPr>
-          <p:cNvPr id="7" name="Slide Number Placeholder 6">
-            <a:extLst>
-              <a:ext uri="{FF2B5EF4-FFF2-40B4-BE49-F238E27FC236}">
-                <a16:creationId xmlns:a16="http://schemas.microsoft.com/office/drawing/2014/main" id="{5A013752-A2CD-50F2-E827-A4FEE3E2D054}"/>
-              </a:ext>
-            </a:extLst>
-          </p:cNvPr>
+          <p:cNvPr id="7" name="Slide Number Placeholder 6"/>
           <p:cNvSpPr>
             <a:spLocks noGrp="1"/>
           </p:cNvSpPr>
@@ -2986,7 +3001,7 @@
     </p:spTree>
     <p:extLst>
       <p:ext uri="{BB962C8B-B14F-4D97-AF65-F5344CB8AC3E}">
-        <p14:creationId xmlns:p14="http://schemas.microsoft.com/office/powerpoint/2010/main" val="2138837675"/>
+        <p14:creationId xmlns:p14="http://schemas.microsoft.com/office/powerpoint/2010/main" val="3314070450"/>
       </p:ext>
     </p:extLst>
   </p:cSld>
@@ -3015,13 +3030,7 @@
       </p:grpSpPr>
       <p:sp>
         <p:nvSpPr>
-          <p:cNvPr id="2" name="Title 1">
-            <a:extLst>
-              <a:ext uri="{FF2B5EF4-FFF2-40B4-BE49-F238E27FC236}">
-                <a16:creationId xmlns:a16="http://schemas.microsoft.com/office/drawing/2014/main" id="{448AFCDD-70BA-A4C1-FB3F-4044946540D7}"/>
-              </a:ext>
-            </a:extLst>
-          </p:cNvPr>
+          <p:cNvPr id="2" name="Title 1"/>
           <p:cNvSpPr>
             <a:spLocks noGrp="1"/>
           </p:cNvSpPr>
@@ -3031,15 +3040,15 @@
         </p:nvSpPr>
         <p:spPr>
           <a:xfrm>
-            <a:off x="839788" y="457200"/>
-            <a:ext cx="3932237" cy="1600200"/>
+            <a:off x="839788" y="681567"/>
+            <a:ext cx="3932237" cy="2385483"/>
           </a:xfrm>
         </p:spPr>
         <p:txBody>
           <a:bodyPr anchor="b"/>
           <a:lstStyle>
             <a:lvl1pPr>
-              <a:defRPr sz="3200"/>
+              <a:defRPr sz="4267"/>
             </a:lvl1pPr>
           </a:lstStyle>
           <a:p>
@@ -3047,21 +3056,15 @@
               <a:rPr lang="en-US"/>
               <a:t>Click to edit Master title style</a:t>
             </a:r>
-            <a:endParaRPr lang="en-CA"/>
+            <a:endParaRPr lang="en-US" dirty="0"/>
           </a:p>
         </p:txBody>
       </p:sp>
       <p:sp>
         <p:nvSpPr>
-          <p:cNvPr id="3" name="Picture Placeholder 2">
-            <a:extLst>
-              <a:ext uri="{FF2B5EF4-FFF2-40B4-BE49-F238E27FC236}">
-                <a16:creationId xmlns:a16="http://schemas.microsoft.com/office/drawing/2014/main" id="{17750E34-AB5F-802F-9E83-557F295E8322}"/>
-              </a:ext>
-            </a:extLst>
-          </p:cNvPr>
+          <p:cNvPr id="3" name="Picture Placeholder 2"/>
           <p:cNvSpPr>
-            <a:spLocks noGrp="1"/>
+            <a:spLocks noGrp="1" noChangeAspect="1"/>
           </p:cNvSpPr>
           <p:nvPr>
             <p:ph type="pic" idx="1"/>
@@ -3069,64 +3072,62 @@
         </p:nvSpPr>
         <p:spPr>
           <a:xfrm>
-            <a:off x="5183188" y="987425"/>
-            <a:ext cx="6172200" cy="4873625"/>
+            <a:off x="5183188" y="1471997"/>
+            <a:ext cx="6172200" cy="7265311"/>
           </a:xfrm>
         </p:spPr>
         <p:txBody>
-          <a:bodyPr/>
+          <a:bodyPr anchor="t"/>
           <a:lstStyle>
             <a:lvl1pPr marL="0" indent="0">
               <a:buNone/>
+              <a:defRPr sz="4267"/>
+            </a:lvl1pPr>
+            <a:lvl2pPr marL="609585" indent="0">
+              <a:buNone/>
+              <a:defRPr sz="3733"/>
+            </a:lvl2pPr>
+            <a:lvl3pPr marL="1219170" indent="0">
+              <a:buNone/>
               <a:defRPr sz="3200"/>
-            </a:lvl1pPr>
-            <a:lvl2pPr marL="457200" indent="0">
+            </a:lvl3pPr>
+            <a:lvl4pPr marL="1828754" indent="0">
               <a:buNone/>
-              <a:defRPr sz="2800"/>
-            </a:lvl2pPr>
-            <a:lvl3pPr marL="914400" indent="0">
+              <a:defRPr sz="2667"/>
+            </a:lvl4pPr>
+            <a:lvl5pPr marL="2438339" indent="0">
               <a:buNone/>
-              <a:defRPr sz="2400"/>
-            </a:lvl3pPr>
-            <a:lvl4pPr marL="1371600" indent="0">
+              <a:defRPr sz="2667"/>
+            </a:lvl5pPr>
+            <a:lvl6pPr marL="3047924" indent="0">
               <a:buNone/>
-              <a:defRPr sz="2000"/>
-            </a:lvl4pPr>
-            <a:lvl5pPr marL="1828800" indent="0">
+              <a:defRPr sz="2667"/>
+            </a:lvl6pPr>
+            <a:lvl7pPr marL="3657509" indent="0">
               <a:buNone/>
-              <a:defRPr sz="2000"/>
-            </a:lvl5pPr>
-            <a:lvl6pPr marL="2286000" indent="0">
+              <a:defRPr sz="2667"/>
+            </a:lvl7pPr>
+            <a:lvl8pPr marL="4267093" indent="0">
               <a:buNone/>
-              <a:defRPr sz="2000"/>
-            </a:lvl6pPr>
-            <a:lvl7pPr marL="2743200" indent="0">
+              <a:defRPr sz="2667"/>
+            </a:lvl8pPr>
+            <a:lvl9pPr marL="4876678" indent="0">
               <a:buNone/>
-              <a:defRPr sz="2000"/>
-            </a:lvl7pPr>
-            <a:lvl8pPr marL="3200400" indent="0">
-              <a:buNone/>
-              <a:defRPr sz="2000"/>
-            </a:lvl8pPr>
-            <a:lvl9pPr marL="3657600" indent="0">
-              <a:buNone/>
-              <a:defRPr sz="2000"/>
+              <a:defRPr sz="2667"/>
             </a:lvl9pPr>
           </a:lstStyle>
           <a:p>
-            <a:endParaRPr lang="en-CA"/>
+            <a:r>
+              <a:rPr lang="en-US"/>
+              <a:t>Click icon to add picture</a:t>
+            </a:r>
+            <a:endParaRPr lang="en-US" dirty="0"/>
           </a:p>
         </p:txBody>
       </p:sp>
       <p:sp>
         <p:nvSpPr>
-          <p:cNvPr id="4" name="Text Placeholder 3">
-            <a:extLst>
-              <a:ext uri="{FF2B5EF4-FFF2-40B4-BE49-F238E27FC236}">
-                <a16:creationId xmlns:a16="http://schemas.microsoft.com/office/drawing/2014/main" id="{27E8C8FC-1908-C08F-9F13-4A6710E2250B}"/>
-              </a:ext>
-            </a:extLst>
-          </p:cNvPr>
+          <p:cNvPr id="4" name="Text Placeholder 3"/>
           <p:cNvSpPr>
             <a:spLocks noGrp="1"/>
           </p:cNvSpPr>
@@ -3136,8 +3137,8 @@
         </p:nvSpPr>
         <p:spPr>
           <a:xfrm>
-            <a:off x="839788" y="2057400"/>
-            <a:ext cx="3932237" cy="3811588"/>
+            <a:off x="839788" y="3067050"/>
+            <a:ext cx="3932237" cy="5682090"/>
           </a:xfrm>
         </p:spPr>
         <p:txBody>
@@ -3145,39 +3146,39 @@
           <a:lstStyle>
             <a:lvl1pPr marL="0" indent="0">
               <a:buNone/>
+              <a:defRPr sz="2133"/>
+            </a:lvl1pPr>
+            <a:lvl2pPr marL="609585" indent="0">
+              <a:buNone/>
+              <a:defRPr sz="1867"/>
+            </a:lvl2pPr>
+            <a:lvl3pPr marL="1219170" indent="0">
+              <a:buNone/>
               <a:defRPr sz="1600"/>
-            </a:lvl1pPr>
-            <a:lvl2pPr marL="457200" indent="0">
+            </a:lvl3pPr>
+            <a:lvl4pPr marL="1828754" indent="0">
               <a:buNone/>
-              <a:defRPr sz="1400"/>
-            </a:lvl2pPr>
-            <a:lvl3pPr marL="914400" indent="0">
+              <a:defRPr sz="1333"/>
+            </a:lvl4pPr>
+            <a:lvl5pPr marL="2438339" indent="0">
               <a:buNone/>
-              <a:defRPr sz="1200"/>
-            </a:lvl3pPr>
-            <a:lvl4pPr marL="1371600" indent="0">
+              <a:defRPr sz="1333"/>
+            </a:lvl5pPr>
+            <a:lvl6pPr marL="3047924" indent="0">
               <a:buNone/>
-              <a:defRPr sz="1000"/>
-            </a:lvl4pPr>
-            <a:lvl5pPr marL="1828800" indent="0">
+              <a:defRPr sz="1333"/>
+            </a:lvl6pPr>
+            <a:lvl7pPr marL="3657509" indent="0">
               <a:buNone/>
-              <a:defRPr sz="1000"/>
-            </a:lvl5pPr>
-            <a:lvl6pPr marL="2286000" indent="0">
+              <a:defRPr sz="1333"/>
+            </a:lvl7pPr>
+            <a:lvl8pPr marL="4267093" indent="0">
               <a:buNone/>
-              <a:defRPr sz="1000"/>
-            </a:lvl6pPr>
-            <a:lvl7pPr marL="2743200" indent="0">
+              <a:defRPr sz="1333"/>
+            </a:lvl8pPr>
+            <a:lvl9pPr marL="4876678" indent="0">
               <a:buNone/>
-              <a:defRPr sz="1000"/>
-            </a:lvl7pPr>
-            <a:lvl8pPr marL="3200400" indent="0">
-              <a:buNone/>
-              <a:defRPr sz="1000"/>
-            </a:lvl8pPr>
-            <a:lvl9pPr marL="3657600" indent="0">
-              <a:buNone/>
-              <a:defRPr sz="1000"/>
+              <a:defRPr sz="1333"/>
             </a:lvl9pPr>
           </a:lstStyle>
           <a:p>
@@ -3191,13 +3192,7 @@
       </p:sp>
       <p:sp>
         <p:nvSpPr>
-          <p:cNvPr id="5" name="Date Placeholder 4">
-            <a:extLst>
-              <a:ext uri="{FF2B5EF4-FFF2-40B4-BE49-F238E27FC236}">
-                <a16:creationId xmlns:a16="http://schemas.microsoft.com/office/drawing/2014/main" id="{7DB9B5EE-E34A-1B31-B0B7-C4C9E504AB3C}"/>
-              </a:ext>
-            </a:extLst>
-          </p:cNvPr>
+          <p:cNvPr id="5" name="Date Placeholder 4"/>
           <p:cNvSpPr>
             <a:spLocks noGrp="1"/>
           </p:cNvSpPr>
@@ -3212,7 +3207,7 @@
           <a:p>
             <a:fld id="{636EB128-D63D-478F-A8AE-19C70145D55B}" type="datetimeFigureOut">
               <a:rPr lang="en-CA" smtClean="0"/>
-              <a:t>2025-03-14</a:t>
+              <a:t>2025-04-04</a:t>
             </a:fld>
             <a:endParaRPr lang="en-CA"/>
           </a:p>
@@ -3220,13 +3215,7 @@
       </p:sp>
       <p:sp>
         <p:nvSpPr>
-          <p:cNvPr id="6" name="Footer Placeholder 5">
-            <a:extLst>
-              <a:ext uri="{FF2B5EF4-FFF2-40B4-BE49-F238E27FC236}">
-                <a16:creationId xmlns:a16="http://schemas.microsoft.com/office/drawing/2014/main" id="{B798ACB9-F003-6365-C559-89AF746A6C85}"/>
-              </a:ext>
-            </a:extLst>
-          </p:cNvPr>
+          <p:cNvPr id="6" name="Footer Placeholder 5"/>
           <p:cNvSpPr>
             <a:spLocks noGrp="1"/>
           </p:cNvSpPr>
@@ -3245,13 +3234,7 @@
       </p:sp>
       <p:sp>
         <p:nvSpPr>
-          <p:cNvPr id="7" name="Slide Number Placeholder 6">
-            <a:extLst>
-              <a:ext uri="{FF2B5EF4-FFF2-40B4-BE49-F238E27FC236}">
-                <a16:creationId xmlns:a16="http://schemas.microsoft.com/office/drawing/2014/main" id="{17037342-A90C-1516-9916-4AD90DFA0010}"/>
-              </a:ext>
-            </a:extLst>
-          </p:cNvPr>
+          <p:cNvPr id="7" name="Slide Number Placeholder 6"/>
           <p:cNvSpPr>
             <a:spLocks noGrp="1"/>
           </p:cNvSpPr>
@@ -3275,7 +3258,7 @@
     </p:spTree>
     <p:extLst>
       <p:ext uri="{BB962C8B-B14F-4D97-AF65-F5344CB8AC3E}">
-        <p14:creationId xmlns:p14="http://schemas.microsoft.com/office/powerpoint/2010/main" val="1452741213"/>
+        <p14:creationId xmlns:p14="http://schemas.microsoft.com/office/powerpoint/2010/main" val="2020942669"/>
       </p:ext>
     </p:extLst>
   </p:cSld>
@@ -3309,13 +3292,7 @@
       </p:grpSpPr>
       <p:sp>
         <p:nvSpPr>
-          <p:cNvPr id="2" name="Title Placeholder 1">
-            <a:extLst>
-              <a:ext uri="{FF2B5EF4-FFF2-40B4-BE49-F238E27FC236}">
-                <a16:creationId xmlns:a16="http://schemas.microsoft.com/office/drawing/2014/main" id="{CF7DE7D5-7C6D-6171-4225-93AA70FBF877}"/>
-              </a:ext>
-            </a:extLst>
-          </p:cNvPr>
+          <p:cNvPr id="2" name="Title Placeholder 1"/>
           <p:cNvSpPr>
             <a:spLocks noGrp="1"/>
           </p:cNvSpPr>
@@ -3325,8 +3302,8 @@
         </p:nvSpPr>
         <p:spPr>
           <a:xfrm>
-            <a:off x="838200" y="365125"/>
-            <a:ext cx="10515600" cy="1325563"/>
+            <a:off x="838200" y="544309"/>
+            <a:ext cx="10515600" cy="1976071"/>
           </a:xfrm>
           <a:prstGeom prst="rect">
             <a:avLst/>
@@ -3342,19 +3319,13 @@
               <a:rPr lang="en-US"/>
               <a:t>Click to edit Master title style</a:t>
             </a:r>
-            <a:endParaRPr lang="en-CA"/>
+            <a:endParaRPr lang="en-US" dirty="0"/>
           </a:p>
         </p:txBody>
       </p:sp>
       <p:sp>
         <p:nvSpPr>
-          <p:cNvPr id="3" name="Text Placeholder 2">
-            <a:extLst>
-              <a:ext uri="{FF2B5EF4-FFF2-40B4-BE49-F238E27FC236}">
-                <a16:creationId xmlns:a16="http://schemas.microsoft.com/office/drawing/2014/main" id="{CA760E43-E0D7-22C2-B096-A4BC353F6E40}"/>
-              </a:ext>
-            </a:extLst>
-          </p:cNvPr>
+          <p:cNvPr id="3" name="Text Placeholder 2"/>
           <p:cNvSpPr>
             <a:spLocks noGrp="1"/>
           </p:cNvSpPr>
@@ -3364,8 +3335,8 @@
         </p:nvSpPr>
         <p:spPr>
           <a:xfrm>
-            <a:off x="838200" y="1825625"/>
-            <a:ext cx="10515600" cy="4351338"/>
+            <a:off x="838200" y="2721533"/>
+            <a:ext cx="10515600" cy="6486717"/>
           </a:xfrm>
           <a:prstGeom prst="rect">
             <a:avLst/>
@@ -3410,19 +3381,13 @@
               <a:rPr lang="en-US"/>
               <a:t>Fifth level</a:t>
             </a:r>
-            <a:endParaRPr lang="en-CA"/>
+            <a:endParaRPr lang="en-US" dirty="0"/>
           </a:p>
         </p:txBody>
       </p:sp>
       <p:sp>
         <p:nvSpPr>
-          <p:cNvPr id="4" name="Date Placeholder 3">
-            <a:extLst>
-              <a:ext uri="{FF2B5EF4-FFF2-40B4-BE49-F238E27FC236}">
-                <a16:creationId xmlns:a16="http://schemas.microsoft.com/office/drawing/2014/main" id="{95BCFD15-7E96-21D5-FFE1-C685512D4110}"/>
-              </a:ext>
-            </a:extLst>
-          </p:cNvPr>
+          <p:cNvPr id="4" name="Date Placeholder 3"/>
           <p:cNvSpPr>
             <a:spLocks noGrp="1"/>
           </p:cNvSpPr>
@@ -3432,8 +3397,8 @@
         </p:nvSpPr>
         <p:spPr>
           <a:xfrm>
-            <a:off x="838200" y="6356350"/>
-            <a:ext cx="2743200" cy="365125"/>
+            <a:off x="838200" y="9475672"/>
+            <a:ext cx="2743200" cy="544307"/>
           </a:xfrm>
           <a:prstGeom prst="rect">
             <a:avLst/>
@@ -3443,7 +3408,7 @@
           <a:bodyPr vert="horz" lIns="91440" tIns="45720" rIns="91440" bIns="45720" rtlCol="0" anchor="ctr"/>
           <a:lstStyle>
             <a:lvl1pPr algn="l">
-              <a:defRPr sz="1200">
+              <a:defRPr sz="1600">
                 <a:solidFill>
                   <a:schemeClr val="tx1">
                     <a:tint val="82000"/>
@@ -3455,7 +3420,7 @@
           <a:p>
             <a:fld id="{636EB128-D63D-478F-A8AE-19C70145D55B}" type="datetimeFigureOut">
               <a:rPr lang="en-CA" smtClean="0"/>
-              <a:t>2025-03-14</a:t>
+              <a:t>2025-04-04</a:t>
             </a:fld>
             <a:endParaRPr lang="en-CA"/>
           </a:p>
@@ -3463,13 +3428,7 @@
       </p:sp>
       <p:sp>
         <p:nvSpPr>
-          <p:cNvPr id="5" name="Footer Placeholder 4">
-            <a:extLst>
-              <a:ext uri="{FF2B5EF4-FFF2-40B4-BE49-F238E27FC236}">
-                <a16:creationId xmlns:a16="http://schemas.microsoft.com/office/drawing/2014/main" id="{B9E4E1B0-FB22-7465-AA2D-D5073B9CE6EA}"/>
-              </a:ext>
-            </a:extLst>
-          </p:cNvPr>
+          <p:cNvPr id="5" name="Footer Placeholder 4"/>
           <p:cNvSpPr>
             <a:spLocks noGrp="1"/>
           </p:cNvSpPr>
@@ -3479,8 +3438,8 @@
         </p:nvSpPr>
         <p:spPr>
           <a:xfrm>
-            <a:off x="4038600" y="6356350"/>
-            <a:ext cx="4114800" cy="365125"/>
+            <a:off x="4038600" y="9475672"/>
+            <a:ext cx="4114800" cy="544307"/>
           </a:xfrm>
           <a:prstGeom prst="rect">
             <a:avLst/>
@@ -3490,7 +3449,7 @@
           <a:bodyPr vert="horz" lIns="91440" tIns="45720" rIns="91440" bIns="45720" rtlCol="0" anchor="ctr"/>
           <a:lstStyle>
             <a:lvl1pPr algn="ctr">
-              <a:defRPr sz="1200">
+              <a:defRPr sz="1600">
                 <a:solidFill>
                   <a:schemeClr val="tx1">
                     <a:tint val="82000"/>
@@ -3506,13 +3465,7 @@
       </p:sp>
       <p:sp>
         <p:nvSpPr>
-          <p:cNvPr id="6" name="Slide Number Placeholder 5">
-            <a:extLst>
-              <a:ext uri="{FF2B5EF4-FFF2-40B4-BE49-F238E27FC236}">
-                <a16:creationId xmlns:a16="http://schemas.microsoft.com/office/drawing/2014/main" id="{5067F871-44EA-DF31-5655-E8B8C87C0951}"/>
-              </a:ext>
-            </a:extLst>
-          </p:cNvPr>
+          <p:cNvPr id="6" name="Slide Number Placeholder 5"/>
           <p:cNvSpPr>
             <a:spLocks noGrp="1"/>
           </p:cNvSpPr>
@@ -3522,8 +3475,8 @@
         </p:nvSpPr>
         <p:spPr>
           <a:xfrm>
-            <a:off x="8610600" y="6356350"/>
-            <a:ext cx="2743200" cy="365125"/>
+            <a:off x="8610600" y="9475672"/>
+            <a:ext cx="2743200" cy="544307"/>
           </a:xfrm>
           <a:prstGeom prst="rect">
             <a:avLst/>
@@ -3533,7 +3486,7 @@
           <a:bodyPr vert="horz" lIns="91440" tIns="45720" rIns="91440" bIns="45720" rtlCol="0" anchor="ctr"/>
           <a:lstStyle>
             <a:lvl1pPr algn="r">
-              <a:defRPr sz="1200">
+              <a:defRPr sz="1600">
                 <a:solidFill>
                   <a:schemeClr val="tx1">
                     <a:tint val="82000"/>
@@ -3554,27 +3507,27 @@
     </p:spTree>
     <p:extLst>
       <p:ext uri="{BB962C8B-B14F-4D97-AF65-F5344CB8AC3E}">
-        <p14:creationId xmlns:p14="http://schemas.microsoft.com/office/powerpoint/2010/main" val="3849284499"/>
+        <p14:creationId xmlns:p14="http://schemas.microsoft.com/office/powerpoint/2010/main" val="3033806173"/>
       </p:ext>
     </p:extLst>
   </p:cSld>
   <p:clrMap bg1="lt1" tx1="dk1" bg2="lt2" tx2="dk2" accent1="accent1" accent2="accent2" accent3="accent3" accent4="accent4" accent5="accent5" accent6="accent6" hlink="hlink" folHlink="folHlink"/>
   <p:sldLayoutIdLst>
-    <p:sldLayoutId id="2147483649" r:id="rId1"/>
-    <p:sldLayoutId id="2147483650" r:id="rId2"/>
-    <p:sldLayoutId id="2147483651" r:id="rId3"/>
-    <p:sldLayoutId id="2147483652" r:id="rId4"/>
-    <p:sldLayoutId id="2147483653" r:id="rId5"/>
-    <p:sldLayoutId id="2147483654" r:id="rId6"/>
-    <p:sldLayoutId id="2147483655" r:id="rId7"/>
-    <p:sldLayoutId id="2147483656" r:id="rId8"/>
-    <p:sldLayoutId id="2147483657" r:id="rId9"/>
-    <p:sldLayoutId id="2147483658" r:id="rId10"/>
-    <p:sldLayoutId id="2147483659" r:id="rId11"/>
+    <p:sldLayoutId id="2147483661" r:id="rId1"/>
+    <p:sldLayoutId id="2147483662" r:id="rId2"/>
+    <p:sldLayoutId id="2147483663" r:id="rId3"/>
+    <p:sldLayoutId id="2147483664" r:id="rId4"/>
+    <p:sldLayoutId id="2147483665" r:id="rId5"/>
+    <p:sldLayoutId id="2147483666" r:id="rId6"/>
+    <p:sldLayoutId id="2147483667" r:id="rId7"/>
+    <p:sldLayoutId id="2147483668" r:id="rId8"/>
+    <p:sldLayoutId id="2147483669" r:id="rId9"/>
+    <p:sldLayoutId id="2147483670" r:id="rId10"/>
+    <p:sldLayoutId id="2147483671" r:id="rId11"/>
   </p:sldLayoutIdLst>
   <p:txStyles>
     <p:titleStyle>
-      <a:lvl1pPr algn="l" defTabSz="914400" rtl="0" eaLnBrk="1" latinLnBrk="0" hangingPunct="1">
+      <a:lvl1pPr algn="l" defTabSz="1219170" rtl="0" eaLnBrk="1" latinLnBrk="0" hangingPunct="1">
         <a:lnSpc>
           <a:spcPct val="90000"/>
         </a:lnSpc>
@@ -3582,7 +3535,7 @@
           <a:spcPct val="0"/>
         </a:spcBef>
         <a:buNone/>
-        <a:defRPr sz="4400" kern="1200">
+        <a:defRPr sz="5867" kern="1200">
           <a:solidFill>
             <a:schemeClr val="tx1"/>
           </a:solidFill>
@@ -3593,16 +3546,16 @@
       </a:lvl1pPr>
     </p:titleStyle>
     <p:bodyStyle>
-      <a:lvl1pPr marL="228600" indent="-228600" algn="l" defTabSz="914400" rtl="0" eaLnBrk="1" latinLnBrk="0" hangingPunct="1">
+      <a:lvl1pPr marL="304792" indent="-304792" algn="l" defTabSz="1219170" rtl="0" eaLnBrk="1" latinLnBrk="0" hangingPunct="1">
         <a:lnSpc>
           <a:spcPct val="90000"/>
         </a:lnSpc>
         <a:spcBef>
-          <a:spcPts val="1000"/>
+          <a:spcPts val="1333"/>
         </a:spcBef>
         <a:buFont typeface="Arial" panose="020B0604020202020204" pitchFamily="34" charset="0"/>
         <a:buChar char="•"/>
-        <a:defRPr sz="2800" kern="1200">
+        <a:defRPr sz="3733" kern="1200">
           <a:solidFill>
             <a:schemeClr val="tx1"/>
           </a:solidFill>
@@ -3611,12 +3564,48 @@
           <a:cs typeface="+mn-cs"/>
         </a:defRPr>
       </a:lvl1pPr>
-      <a:lvl2pPr marL="685800" indent="-228600" algn="l" defTabSz="914400" rtl="0" eaLnBrk="1" latinLnBrk="0" hangingPunct="1">
+      <a:lvl2pPr marL="914377" indent="-304792" algn="l" defTabSz="1219170" rtl="0" eaLnBrk="1" latinLnBrk="0" hangingPunct="1">
         <a:lnSpc>
           <a:spcPct val="90000"/>
         </a:lnSpc>
         <a:spcBef>
-          <a:spcPts val="500"/>
+          <a:spcPts val="667"/>
+        </a:spcBef>
+        <a:buFont typeface="Arial" panose="020B0604020202020204" pitchFamily="34" charset="0"/>
+        <a:buChar char="•"/>
+        <a:defRPr sz="3200" kern="1200">
+          <a:solidFill>
+            <a:schemeClr val="tx1"/>
+          </a:solidFill>
+          <a:latin typeface="+mn-lt"/>
+          <a:ea typeface="+mn-ea"/>
+          <a:cs typeface="+mn-cs"/>
+        </a:defRPr>
+      </a:lvl2pPr>
+      <a:lvl3pPr marL="1523962" indent="-304792" algn="l" defTabSz="1219170" rtl="0" eaLnBrk="1" latinLnBrk="0" hangingPunct="1">
+        <a:lnSpc>
+          <a:spcPct val="90000"/>
+        </a:lnSpc>
+        <a:spcBef>
+          <a:spcPts val="667"/>
+        </a:spcBef>
+        <a:buFont typeface="Arial" panose="020B0604020202020204" pitchFamily="34" charset="0"/>
+        <a:buChar char="•"/>
+        <a:defRPr sz="2667" kern="1200">
+          <a:solidFill>
+            <a:schemeClr val="tx1"/>
+          </a:solidFill>
+          <a:latin typeface="+mn-lt"/>
+          <a:ea typeface="+mn-ea"/>
+          <a:cs typeface="+mn-cs"/>
+        </a:defRPr>
+      </a:lvl3pPr>
+      <a:lvl4pPr marL="2133547" indent="-304792" algn="l" defTabSz="1219170" rtl="0" eaLnBrk="1" latinLnBrk="0" hangingPunct="1">
+        <a:lnSpc>
+          <a:spcPct val="90000"/>
+        </a:lnSpc>
+        <a:spcBef>
+          <a:spcPts val="667"/>
         </a:spcBef>
         <a:buFont typeface="Arial" panose="020B0604020202020204" pitchFamily="34" charset="0"/>
         <a:buChar char="•"/>
@@ -3628,53 +3617,17 @@
           <a:ea typeface="+mn-ea"/>
           <a:cs typeface="+mn-cs"/>
         </a:defRPr>
-      </a:lvl2pPr>
-      <a:lvl3pPr marL="1143000" indent="-228600" algn="l" defTabSz="914400" rtl="0" eaLnBrk="1" latinLnBrk="0" hangingPunct="1">
+      </a:lvl4pPr>
+      <a:lvl5pPr marL="2743131" indent="-304792" algn="l" defTabSz="1219170" rtl="0" eaLnBrk="1" latinLnBrk="0" hangingPunct="1">
         <a:lnSpc>
           <a:spcPct val="90000"/>
         </a:lnSpc>
         <a:spcBef>
-          <a:spcPts val="500"/>
+          <a:spcPts val="667"/>
         </a:spcBef>
         <a:buFont typeface="Arial" panose="020B0604020202020204" pitchFamily="34" charset="0"/>
         <a:buChar char="•"/>
-        <a:defRPr sz="2000" kern="1200">
-          <a:solidFill>
-            <a:schemeClr val="tx1"/>
-          </a:solidFill>
-          <a:latin typeface="+mn-lt"/>
-          <a:ea typeface="+mn-ea"/>
-          <a:cs typeface="+mn-cs"/>
-        </a:defRPr>
-      </a:lvl3pPr>
-      <a:lvl4pPr marL="1600200" indent="-228600" algn="l" defTabSz="914400" rtl="0" eaLnBrk="1" latinLnBrk="0" hangingPunct="1">
-        <a:lnSpc>
-          <a:spcPct val="90000"/>
-        </a:lnSpc>
-        <a:spcBef>
-          <a:spcPts val="500"/>
-        </a:spcBef>
-        <a:buFont typeface="Arial" panose="020B0604020202020204" pitchFamily="34" charset="0"/>
-        <a:buChar char="•"/>
-        <a:defRPr sz="1800" kern="1200">
-          <a:solidFill>
-            <a:schemeClr val="tx1"/>
-          </a:solidFill>
-          <a:latin typeface="+mn-lt"/>
-          <a:ea typeface="+mn-ea"/>
-          <a:cs typeface="+mn-cs"/>
-        </a:defRPr>
-      </a:lvl4pPr>
-      <a:lvl5pPr marL="2057400" indent="-228600" algn="l" defTabSz="914400" rtl="0" eaLnBrk="1" latinLnBrk="0" hangingPunct="1">
-        <a:lnSpc>
-          <a:spcPct val="90000"/>
-        </a:lnSpc>
-        <a:spcBef>
-          <a:spcPts val="500"/>
-        </a:spcBef>
-        <a:buFont typeface="Arial" panose="020B0604020202020204" pitchFamily="34" charset="0"/>
-        <a:buChar char="•"/>
-        <a:defRPr sz="1800" kern="1200">
+        <a:defRPr sz="2400" kern="1200">
           <a:solidFill>
             <a:schemeClr val="tx1"/>
           </a:solidFill>
@@ -3683,16 +3636,16 @@
           <a:cs typeface="+mn-cs"/>
         </a:defRPr>
       </a:lvl5pPr>
-      <a:lvl6pPr marL="2514600" indent="-228600" algn="l" defTabSz="914400" rtl="0" eaLnBrk="1" latinLnBrk="0" hangingPunct="1">
+      <a:lvl6pPr marL="3352716" indent="-304792" algn="l" defTabSz="1219170" rtl="0" eaLnBrk="1" latinLnBrk="0" hangingPunct="1">
         <a:lnSpc>
           <a:spcPct val="90000"/>
         </a:lnSpc>
         <a:spcBef>
-          <a:spcPts val="500"/>
+          <a:spcPts val="667"/>
         </a:spcBef>
         <a:buFont typeface="Arial" panose="020B0604020202020204" pitchFamily="34" charset="0"/>
         <a:buChar char="•"/>
-        <a:defRPr sz="1800" kern="1200">
+        <a:defRPr sz="2400" kern="1200">
           <a:solidFill>
             <a:schemeClr val="tx1"/>
           </a:solidFill>
@@ -3701,16 +3654,16 @@
           <a:cs typeface="+mn-cs"/>
         </a:defRPr>
       </a:lvl6pPr>
-      <a:lvl7pPr marL="2971800" indent="-228600" algn="l" defTabSz="914400" rtl="0" eaLnBrk="1" latinLnBrk="0" hangingPunct="1">
+      <a:lvl7pPr marL="3962301" indent="-304792" algn="l" defTabSz="1219170" rtl="0" eaLnBrk="1" latinLnBrk="0" hangingPunct="1">
         <a:lnSpc>
           <a:spcPct val="90000"/>
         </a:lnSpc>
         <a:spcBef>
-          <a:spcPts val="500"/>
+          <a:spcPts val="667"/>
         </a:spcBef>
         <a:buFont typeface="Arial" panose="020B0604020202020204" pitchFamily="34" charset="0"/>
         <a:buChar char="•"/>
-        <a:defRPr sz="1800" kern="1200">
+        <a:defRPr sz="2400" kern="1200">
           <a:solidFill>
             <a:schemeClr val="tx1"/>
           </a:solidFill>
@@ -3719,16 +3672,16 @@
           <a:cs typeface="+mn-cs"/>
         </a:defRPr>
       </a:lvl7pPr>
-      <a:lvl8pPr marL="3429000" indent="-228600" algn="l" defTabSz="914400" rtl="0" eaLnBrk="1" latinLnBrk="0" hangingPunct="1">
+      <a:lvl8pPr marL="4571886" indent="-304792" algn="l" defTabSz="1219170" rtl="0" eaLnBrk="1" latinLnBrk="0" hangingPunct="1">
         <a:lnSpc>
           <a:spcPct val="90000"/>
         </a:lnSpc>
         <a:spcBef>
-          <a:spcPts val="500"/>
+          <a:spcPts val="667"/>
         </a:spcBef>
         <a:buFont typeface="Arial" panose="020B0604020202020204" pitchFamily="34" charset="0"/>
         <a:buChar char="•"/>
-        <a:defRPr sz="1800" kern="1200">
+        <a:defRPr sz="2400" kern="1200">
           <a:solidFill>
             <a:schemeClr val="tx1"/>
           </a:solidFill>
@@ -3737,16 +3690,16 @@
           <a:cs typeface="+mn-cs"/>
         </a:defRPr>
       </a:lvl8pPr>
-      <a:lvl9pPr marL="3886200" indent="-228600" algn="l" defTabSz="914400" rtl="0" eaLnBrk="1" latinLnBrk="0" hangingPunct="1">
+      <a:lvl9pPr marL="5181470" indent="-304792" algn="l" defTabSz="1219170" rtl="0" eaLnBrk="1" latinLnBrk="0" hangingPunct="1">
         <a:lnSpc>
           <a:spcPct val="90000"/>
         </a:lnSpc>
         <a:spcBef>
-          <a:spcPts val="500"/>
+          <a:spcPts val="667"/>
         </a:spcBef>
         <a:buFont typeface="Arial" panose="020B0604020202020204" pitchFamily="34" charset="0"/>
         <a:buChar char="•"/>
-        <a:defRPr sz="1800" kern="1200">
+        <a:defRPr sz="2400" kern="1200">
           <a:solidFill>
             <a:schemeClr val="tx1"/>
           </a:solidFill>
@@ -3760,8 +3713,8 @@
       <a:defPPr>
         <a:defRPr lang="en-US"/>
       </a:defPPr>
-      <a:lvl1pPr marL="0" algn="l" defTabSz="914400" rtl="0" eaLnBrk="1" latinLnBrk="0" hangingPunct="1">
-        <a:defRPr sz="1800" kern="1200">
+      <a:lvl1pPr marL="0" algn="l" defTabSz="1219170" rtl="0" eaLnBrk="1" latinLnBrk="0" hangingPunct="1">
+        <a:defRPr sz="2400" kern="1200">
           <a:solidFill>
             <a:schemeClr val="tx1"/>
           </a:solidFill>
@@ -3770,8 +3723,8 @@
           <a:cs typeface="+mn-cs"/>
         </a:defRPr>
       </a:lvl1pPr>
-      <a:lvl2pPr marL="457200" algn="l" defTabSz="914400" rtl="0" eaLnBrk="1" latinLnBrk="0" hangingPunct="1">
-        <a:defRPr sz="1800" kern="1200">
+      <a:lvl2pPr marL="609585" algn="l" defTabSz="1219170" rtl="0" eaLnBrk="1" latinLnBrk="0" hangingPunct="1">
+        <a:defRPr sz="2400" kern="1200">
           <a:solidFill>
             <a:schemeClr val="tx1"/>
           </a:solidFill>
@@ -3780,8 +3733,8 @@
           <a:cs typeface="+mn-cs"/>
         </a:defRPr>
       </a:lvl2pPr>
-      <a:lvl3pPr marL="914400" algn="l" defTabSz="914400" rtl="0" eaLnBrk="1" latinLnBrk="0" hangingPunct="1">
-        <a:defRPr sz="1800" kern="1200">
+      <a:lvl3pPr marL="1219170" algn="l" defTabSz="1219170" rtl="0" eaLnBrk="1" latinLnBrk="0" hangingPunct="1">
+        <a:defRPr sz="2400" kern="1200">
           <a:solidFill>
             <a:schemeClr val="tx1"/>
           </a:solidFill>
@@ -3790,8 +3743,8 @@
           <a:cs typeface="+mn-cs"/>
         </a:defRPr>
       </a:lvl3pPr>
-      <a:lvl4pPr marL="1371600" algn="l" defTabSz="914400" rtl="0" eaLnBrk="1" latinLnBrk="0" hangingPunct="1">
-        <a:defRPr sz="1800" kern="1200">
+      <a:lvl4pPr marL="1828754" algn="l" defTabSz="1219170" rtl="0" eaLnBrk="1" latinLnBrk="0" hangingPunct="1">
+        <a:defRPr sz="2400" kern="1200">
           <a:solidFill>
             <a:schemeClr val="tx1"/>
           </a:solidFill>
@@ -3800,8 +3753,8 @@
           <a:cs typeface="+mn-cs"/>
         </a:defRPr>
       </a:lvl4pPr>
-      <a:lvl5pPr marL="1828800" algn="l" defTabSz="914400" rtl="0" eaLnBrk="1" latinLnBrk="0" hangingPunct="1">
-        <a:defRPr sz="1800" kern="1200">
+      <a:lvl5pPr marL="2438339" algn="l" defTabSz="1219170" rtl="0" eaLnBrk="1" latinLnBrk="0" hangingPunct="1">
+        <a:defRPr sz="2400" kern="1200">
           <a:solidFill>
             <a:schemeClr val="tx1"/>
           </a:solidFill>
@@ -3810,8 +3763,8 @@
           <a:cs typeface="+mn-cs"/>
         </a:defRPr>
       </a:lvl5pPr>
-      <a:lvl6pPr marL="2286000" algn="l" defTabSz="914400" rtl="0" eaLnBrk="1" latinLnBrk="0" hangingPunct="1">
-        <a:defRPr sz="1800" kern="1200">
+      <a:lvl6pPr marL="3047924" algn="l" defTabSz="1219170" rtl="0" eaLnBrk="1" latinLnBrk="0" hangingPunct="1">
+        <a:defRPr sz="2400" kern="1200">
           <a:solidFill>
             <a:schemeClr val="tx1"/>
           </a:solidFill>
@@ -3820,8 +3773,8 @@
           <a:cs typeface="+mn-cs"/>
         </a:defRPr>
       </a:lvl6pPr>
-      <a:lvl7pPr marL="2743200" algn="l" defTabSz="914400" rtl="0" eaLnBrk="1" latinLnBrk="0" hangingPunct="1">
-        <a:defRPr sz="1800" kern="1200">
+      <a:lvl7pPr marL="3657509" algn="l" defTabSz="1219170" rtl="0" eaLnBrk="1" latinLnBrk="0" hangingPunct="1">
+        <a:defRPr sz="2400" kern="1200">
           <a:solidFill>
             <a:schemeClr val="tx1"/>
           </a:solidFill>
@@ -3830,8 +3783,8 @@
           <a:cs typeface="+mn-cs"/>
         </a:defRPr>
       </a:lvl7pPr>
-      <a:lvl8pPr marL="3200400" algn="l" defTabSz="914400" rtl="0" eaLnBrk="1" latinLnBrk="0" hangingPunct="1">
-        <a:defRPr sz="1800" kern="1200">
+      <a:lvl8pPr marL="4267093" algn="l" defTabSz="1219170" rtl="0" eaLnBrk="1" latinLnBrk="0" hangingPunct="1">
+        <a:defRPr sz="2400" kern="1200">
           <a:solidFill>
             <a:schemeClr val="tx1"/>
           </a:solidFill>
@@ -3840,8 +3793,8 @@
           <a:cs typeface="+mn-cs"/>
         </a:defRPr>
       </a:lvl8pPr>
-      <a:lvl9pPr marL="3657600" algn="l" defTabSz="914400" rtl="0" eaLnBrk="1" latinLnBrk="0" hangingPunct="1">
-        <a:defRPr sz="1800" kern="1200">
+      <a:lvl9pPr marL="4876678" algn="l" defTabSz="1219170" rtl="0" eaLnBrk="1" latinLnBrk="0" hangingPunct="1">
+        <a:defRPr sz="2400" kern="1200">
           <a:solidFill>
             <a:schemeClr val="tx1"/>
           </a:solidFill>
@@ -3874,10 +3827,10 @@
       </p:grpSpPr>
       <p:grpSp>
         <p:nvGrpSpPr>
-          <p:cNvPr id="22" name="Group 21">
+          <p:cNvPr id="4" name="Group 3">
             <a:extLst>
               <a:ext uri="{FF2B5EF4-FFF2-40B4-BE49-F238E27FC236}">
-                <a16:creationId xmlns:a16="http://schemas.microsoft.com/office/drawing/2014/main" id="{9B788C06-E1AA-B0EB-35C3-D87419595569}"/>
+                <a16:creationId xmlns:a16="http://schemas.microsoft.com/office/drawing/2014/main" id="{1447DD06-CAA1-FB71-1034-388709911FA6}"/>
               </a:ext>
             </a:extLst>
           </p:cNvPr>
@@ -3886,72 +3839,53 @@
         </p:nvGrpSpPr>
         <p:grpSpPr>
           <a:xfrm>
-            <a:off x="5471160" y="2987040"/>
-            <a:ext cx="4587240" cy="3391860"/>
-            <a:chOff x="2511706" y="578734"/>
-            <a:chExt cx="7639292" cy="5884900"/>
+            <a:off x="5238907" y="4560925"/>
+            <a:ext cx="6715319" cy="4854302"/>
+            <a:chOff x="5521056" y="3059502"/>
+            <a:chExt cx="4504686" cy="3256302"/>
           </a:xfrm>
         </p:grpSpPr>
-        <p:sp>
-          <p:nvSpPr>
-            <p:cNvPr id="16" name="Rectangle 15">
+        <p:pic>
+          <p:nvPicPr>
+            <p:cNvPr id="19" name="Picture 18" descr="A map of the united states&#10;&#10;AI-generated content may be incorrect.">
               <a:extLst>
                 <a:ext uri="{FF2B5EF4-FFF2-40B4-BE49-F238E27FC236}">
-                  <a16:creationId xmlns:a16="http://schemas.microsoft.com/office/drawing/2014/main" id="{C0A6CDF0-0E0D-40C5-A3BB-95AF09B8D3EF}"/>
+                  <a16:creationId xmlns:a16="http://schemas.microsoft.com/office/drawing/2014/main" id="{3D6978F0-5245-E9F0-25F4-6FFE028F01D0}"/>
                 </a:ext>
               </a:extLst>
             </p:cNvPr>
-            <p:cNvSpPr/>
+            <p:cNvPicPr>
+              <a:picLocks noChangeAspect="1"/>
+            </p:cNvPicPr>
             <p:nvPr/>
-          </p:nvSpPr>
+          </p:nvPicPr>
+          <p:blipFill>
+            <a:blip r:embed="rId2">
+              <a:extLst>
+                <a:ext uri="{28A0092B-C50C-407E-A947-70E740481C1C}">
+                  <a14:useLocalDpi xmlns:a14="http://schemas.microsoft.com/office/drawing/2010/main" val="0"/>
+                </a:ext>
+              </a:extLst>
+            </a:blip>
+            <a:srcRect l="10808" r="10808"/>
+            <a:stretch/>
+          </p:blipFill>
           <p:spPr>
             <a:xfrm>
-              <a:off x="2511706" y="578734"/>
-              <a:ext cx="7329724" cy="5787341"/>
+              <a:off x="5693573" y="3139374"/>
+              <a:ext cx="4096081" cy="2912700"/>
             </a:xfrm>
             <a:prstGeom prst="rect">
               <a:avLst/>
             </a:prstGeom>
-            <a:solidFill>
-              <a:schemeClr val="bg1"/>
-            </a:solidFill>
-            <a:ln>
-              <a:solidFill>
-                <a:schemeClr val="tx1"/>
-              </a:solidFill>
-            </a:ln>
           </p:spPr>
-          <p:style>
-            <a:lnRef idx="2">
-              <a:schemeClr val="accent1">
-                <a:shade val="15000"/>
-              </a:schemeClr>
-            </a:lnRef>
-            <a:fillRef idx="1">
-              <a:schemeClr val="accent1"/>
-            </a:fillRef>
-            <a:effectRef idx="0">
-              <a:schemeClr val="accent1"/>
-            </a:effectRef>
-            <a:fontRef idx="minor">
-              <a:schemeClr val="lt1"/>
-            </a:fontRef>
-          </p:style>
-          <p:txBody>
-            <a:bodyPr rtlCol="0" anchor="ctr"/>
-            <a:lstStyle/>
-            <a:p>
-              <a:pPr algn="ctr"/>
-              <a:endParaRPr lang="en-CA"/>
-            </a:p>
-          </p:txBody>
-        </p:sp>
+        </p:pic>
         <p:grpSp>
           <p:nvGrpSpPr>
-            <p:cNvPr id="21" name="Group 20">
+            <p:cNvPr id="15" name="Group 14">
               <a:extLst>
                 <a:ext uri="{FF2B5EF4-FFF2-40B4-BE49-F238E27FC236}">
-                  <a16:creationId xmlns:a16="http://schemas.microsoft.com/office/drawing/2014/main" id="{DF511537-577C-5710-7B2A-26BC9D7C52E3}"/>
+                  <a16:creationId xmlns:a16="http://schemas.microsoft.com/office/drawing/2014/main" id="{E2936D85-599B-6B7F-D41E-F1A30859FDD2}"/>
                 </a:ext>
               </a:extLst>
             </p:cNvPr>
@@ -3960,18 +3894,360 @@
           </p:nvGrpSpPr>
           <p:grpSpPr>
             <a:xfrm>
-              <a:off x="2549366" y="704457"/>
-              <a:ext cx="7601632" cy="5759177"/>
-              <a:chOff x="2526216" y="723050"/>
-              <a:chExt cx="7601632" cy="5759177"/>
+              <a:off x="5521056" y="3059502"/>
+              <a:ext cx="4504686" cy="3256302"/>
+              <a:chOff x="2564999" y="706887"/>
+              <a:chExt cx="6669543" cy="5016940"/>
+            </a:xfrm>
+          </p:grpSpPr>
+          <p:grpSp>
+            <p:nvGrpSpPr>
+              <p:cNvPr id="6" name="Group 5">
+                <a:extLst>
+                  <a:ext uri="{FF2B5EF4-FFF2-40B4-BE49-F238E27FC236}">
+                    <a16:creationId xmlns:a16="http://schemas.microsoft.com/office/drawing/2014/main" id="{784A3045-DD24-4D0B-E53D-87BAECD7EB6C}"/>
+                  </a:ext>
+                </a:extLst>
+              </p:cNvPr>
+              <p:cNvGrpSpPr/>
+              <p:nvPr/>
+            </p:nvGrpSpPr>
+            <p:grpSpPr>
+              <a:xfrm>
+                <a:off x="2564999" y="706887"/>
+                <a:ext cx="6669543" cy="5016940"/>
+                <a:chOff x="2564999" y="706887"/>
+                <a:chExt cx="6669543" cy="5016940"/>
+              </a:xfrm>
+            </p:grpSpPr>
+            <p:pic>
+              <p:nvPicPr>
+                <p:cNvPr id="7" name="Picture 6" descr="A map with a red square&#10;&#10;Description automatically generated">
+                  <a:extLst>
+                    <a:ext uri="{FF2B5EF4-FFF2-40B4-BE49-F238E27FC236}">
+                      <a16:creationId xmlns:a16="http://schemas.microsoft.com/office/drawing/2014/main" id="{024D7657-1386-3BF1-9E27-C379D592751A}"/>
+                    </a:ext>
+                  </a:extLst>
+                </p:cNvPr>
+                <p:cNvPicPr>
+                  <a:picLocks noChangeAspect="1"/>
+                </p:cNvPicPr>
+                <p:nvPr/>
+              </p:nvPicPr>
+              <p:blipFill>
+                <a:blip r:embed="rId3">
+                  <a:extLst>
+                    <a:ext uri="{28A0092B-C50C-407E-A947-70E740481C1C}">
+                      <a14:useLocalDpi xmlns:a14="http://schemas.microsoft.com/office/drawing/2010/main" val="0"/>
+                    </a:ext>
+                  </a:extLst>
+                </a:blip>
+                <a:srcRect l="28083" t="1356" r="27431" b="1494"/>
+                <a:stretch/>
+              </p:blipFill>
+              <p:spPr>
+                <a:xfrm>
+                  <a:off x="6836229" y="925285"/>
+                  <a:ext cx="1643743" cy="1741215"/>
+                </a:xfrm>
+                <a:prstGeom prst="rect">
+                  <a:avLst/>
+                </a:prstGeom>
+                <a:ln>
+                  <a:noFill/>
+                </a:ln>
+              </p:spPr>
+            </p:pic>
+            <p:sp>
+              <p:nvSpPr>
+                <p:cNvPr id="2" name="TextBox 1">
+                  <a:extLst>
+                    <a:ext uri="{FF2B5EF4-FFF2-40B4-BE49-F238E27FC236}">
+                      <a16:creationId xmlns:a16="http://schemas.microsoft.com/office/drawing/2014/main" id="{53588E85-51C2-BC0D-6933-D5629282428B}"/>
+                    </a:ext>
+                  </a:extLst>
+                </p:cNvPr>
+                <p:cNvSpPr txBox="1"/>
+                <p:nvPr/>
+              </p:nvSpPr>
+              <p:spPr>
+                <a:xfrm>
+                  <a:off x="2564999" y="5201698"/>
+                  <a:ext cx="6669543" cy="522129"/>
+                </a:xfrm>
+                <a:prstGeom prst="rect">
+                  <a:avLst/>
+                </a:prstGeom>
+                <a:noFill/>
+                <a:ln>
+                  <a:noFill/>
+                </a:ln>
+              </p:spPr>
+              <p:txBody>
+                <a:bodyPr wrap="square" rtlCol="0">
+                  <a:spAutoFit/>
+                </a:bodyPr>
+                <a:lstStyle/>
+                <a:p>
+                  <a:pPr algn="ctr"/>
+                  <a:r>
+                    <a:rPr lang="en-CA" sz="2683" dirty="0"/>
+                    <a:t>   </a:t>
+                  </a:r>
+                  <a:r>
+                    <a:rPr lang="en-CA" sz="1789" dirty="0"/>
+                    <a:t>Longitude</a:t>
+                  </a:r>
+                </a:p>
+              </p:txBody>
+            </p:sp>
+            <p:sp>
+              <p:nvSpPr>
+                <p:cNvPr id="3" name="TextBox 2">
+                  <a:extLst>
+                    <a:ext uri="{FF2B5EF4-FFF2-40B4-BE49-F238E27FC236}">
+                      <a16:creationId xmlns:a16="http://schemas.microsoft.com/office/drawing/2014/main" id="{51E7DBA6-F2E3-2B10-D591-44D447113820}"/>
+                    </a:ext>
+                  </a:extLst>
+                </p:cNvPr>
+                <p:cNvSpPr txBox="1"/>
+                <p:nvPr/>
+              </p:nvSpPr>
+              <p:spPr>
+                <a:xfrm rot="16200000">
+                  <a:off x="420941" y="2901384"/>
+                  <a:ext cx="4754153" cy="365159"/>
+                </a:xfrm>
+                <a:prstGeom prst="rect">
+                  <a:avLst/>
+                </a:prstGeom>
+                <a:noFill/>
+                <a:ln>
+                  <a:noFill/>
+                </a:ln>
+              </p:spPr>
+              <p:txBody>
+                <a:bodyPr wrap="square" rtlCol="0">
+                  <a:spAutoFit/>
+                </a:bodyPr>
+                <a:lstStyle/>
+                <a:p>
+                  <a:pPr algn="ctr"/>
+                  <a:r>
+                    <a:rPr lang="en-CA" sz="1789" dirty="0"/>
+                    <a:t>Latitude</a:t>
+                  </a:r>
+                </a:p>
+              </p:txBody>
+            </p:sp>
+          </p:grpSp>
+          <p:pic>
+            <p:nvPicPr>
+              <p:cNvPr id="12" name="Picture 11" descr="A blue and white map&#10;&#10;AI-generated content may be incorrect.">
+                <a:extLst>
+                  <a:ext uri="{FF2B5EF4-FFF2-40B4-BE49-F238E27FC236}">
+                    <a16:creationId xmlns:a16="http://schemas.microsoft.com/office/drawing/2014/main" id="{A421572D-D995-4990-4FDA-5B53D073AAE5}"/>
+                  </a:ext>
+                </a:extLst>
+              </p:cNvPr>
+              <p:cNvPicPr>
+                <a:picLocks noChangeAspect="1"/>
+              </p:cNvPicPr>
+              <p:nvPr/>
+            </p:nvPicPr>
+            <p:blipFill>
+              <a:blip r:embed="rId4">
+                <a:extLst>
+                  <a:ext uri="{BEBA8EAE-BF5A-486C-A8C5-ECC9F3942E4B}">
+                    <a14:imgProps xmlns:a14="http://schemas.microsoft.com/office/drawing/2010/main">
+                      <a14:imgLayer r:embed="rId5">
+                        <a14:imgEffect>
+                          <a14:backgroundRemoval t="7946" b="85757" l="38425" r="65632">
+                            <a14:foregroundMark x1="39021" y1="5697" x2="57041" y2="13493"/>
+                            <a14:foregroundMark x1="57041" y1="13493" x2="63126" y2="90255"/>
+                            <a14:foregroundMark x1="63126" y1="90255" x2="51432" y2="89955"/>
+                            <a14:foregroundMark x1="51432" y1="89955" x2="60382" y2="86357"/>
+                            <a14:foregroundMark x1="60382" y1="86357" x2="65155" y2="71064"/>
+                            <a14:foregroundMark x1="65155" y1="71064" x2="61456" y2="83358"/>
+                            <a14:foregroundMark x1="61456" y1="83358" x2="52506" y2="87256"/>
+                            <a14:foregroundMark x1="52506" y1="87256" x2="45227" y2="75412"/>
+                            <a14:foregroundMark x1="45227" y1="75412" x2="36158" y2="33133"/>
+                            <a14:foregroundMark x1="36158" y1="33133" x2="38425" y2="7946"/>
+                            <a14:foregroundMark x1="38425" y1="7946" x2="39141" y2="8696"/>
+                          </a14:backgroundRemoval>
+                        </a14:imgEffect>
+                      </a14:imgLayer>
+                    </a14:imgProps>
+                  </a:ext>
+                  <a:ext uri="{28A0092B-C50C-407E-A947-70E740481C1C}">
+                    <a14:useLocalDpi xmlns:a14="http://schemas.microsoft.com/office/drawing/2010/main" val="0"/>
+                  </a:ext>
+                </a:extLst>
+              </a:blip>
+              <a:srcRect l="35410" t="5217" r="30929" b="5285"/>
+              <a:stretch/>
+            </p:blipFill>
+            <p:spPr>
+              <a:xfrm rot="19653429">
+                <a:off x="4610833" y="1643934"/>
+                <a:ext cx="1755999" cy="3565193"/>
+              </a:xfrm>
+              <a:prstGeom prst="rect">
+                <a:avLst/>
+              </a:prstGeom>
+              <a:ln>
+                <a:noFill/>
+              </a:ln>
+            </p:spPr>
+          </p:pic>
+        </p:grpSp>
+      </p:grpSp>
+    </p:spTree>
+    <p:extLst>
+      <p:ext uri="{BB962C8B-B14F-4D97-AF65-F5344CB8AC3E}">
+        <p14:creationId xmlns:p14="http://schemas.microsoft.com/office/powerpoint/2010/main" val="2389168500"/>
+      </p:ext>
+    </p:extLst>
+  </p:cSld>
+  <p:clrMapOvr>
+    <a:masterClrMapping/>
+  </p:clrMapOvr>
+</p:sld>
+</file>
+
+<file path=ppt/slides/slide10.xml><?xml version="1.0" encoding="utf-8"?>
+<p:sld xmlns:a="http://schemas.openxmlformats.org/drawingml/2006/main" xmlns:r="http://schemas.openxmlformats.org/officeDocument/2006/relationships" xmlns:p="http://schemas.openxmlformats.org/presentationml/2006/main">
+  <p:cSld>
+    <p:spTree>
+      <p:nvGrpSpPr>
+        <p:cNvPr id="1" name=""/>
+        <p:cNvGrpSpPr/>
+        <p:nvPr/>
+      </p:nvGrpSpPr>
+      <p:grpSpPr>
+        <a:xfrm>
+          <a:off x="0" y="0"/>
+          <a:ext cx="0" cy="0"/>
+          <a:chOff x="0" y="0"/>
+          <a:chExt cx="0" cy="0"/>
+        </a:xfrm>
+      </p:grpSpPr>
+      <p:grpSp>
+        <p:nvGrpSpPr>
+          <p:cNvPr id="29" name="Group 28">
+            <a:extLst>
+              <a:ext uri="{FF2B5EF4-FFF2-40B4-BE49-F238E27FC236}">
+                <a16:creationId xmlns:a16="http://schemas.microsoft.com/office/drawing/2014/main" id="{1AF79883-4EA4-6ADC-6538-8311043046CF}"/>
+              </a:ext>
+            </a:extLst>
+          </p:cNvPr>
+          <p:cNvGrpSpPr/>
+          <p:nvPr/>
+        </p:nvGrpSpPr>
+        <p:grpSpPr>
+          <a:xfrm>
+            <a:off x="1701901" y="0"/>
+            <a:ext cx="9287228" cy="9934816"/>
+            <a:chOff x="1701901" y="0"/>
+            <a:chExt cx="9287228" cy="9934816"/>
+          </a:xfrm>
+        </p:grpSpPr>
+        <p:pic>
+          <p:nvPicPr>
+            <p:cNvPr id="12" name="Picture 11" descr="A blue and black lines&#10;&#10;AI-generated content may be incorrect.">
+              <a:extLst>
+                <a:ext uri="{FF2B5EF4-FFF2-40B4-BE49-F238E27FC236}">
+                  <a16:creationId xmlns:a16="http://schemas.microsoft.com/office/drawing/2014/main" id="{F3EAB6E8-6BD1-1738-1CCC-B1915C673E35}"/>
+                </a:ext>
+              </a:extLst>
+            </p:cNvPr>
+            <p:cNvPicPr>
+              <a:picLocks noChangeAspect="1"/>
+            </p:cNvPicPr>
+            <p:nvPr/>
+          </p:nvPicPr>
+          <p:blipFill>
+            <a:blip r:embed="rId2">
+              <a:extLst>
+                <a:ext uri="{28A0092B-C50C-407E-A947-70E740481C1C}">
+                  <a14:useLocalDpi xmlns:a14="http://schemas.microsoft.com/office/drawing/2010/main" val="0"/>
+                </a:ext>
+              </a:extLst>
+            </a:blip>
+            <a:srcRect t="56190" r="61385" b="11270"/>
+            <a:stretch/>
+          </p:blipFill>
+          <p:spPr>
+            <a:xfrm>
+              <a:off x="1701901" y="0"/>
+              <a:ext cx="9287228" cy="5146914"/>
+            </a:xfrm>
+            <a:prstGeom prst="rect">
+              <a:avLst/>
+            </a:prstGeom>
+          </p:spPr>
+        </p:pic>
+        <p:sp>
+          <p:nvSpPr>
+            <p:cNvPr id="13" name="TextBox 12">
+              <a:extLst>
+                <a:ext uri="{FF2B5EF4-FFF2-40B4-BE49-F238E27FC236}">
+                  <a16:creationId xmlns:a16="http://schemas.microsoft.com/office/drawing/2014/main" id="{7A544A8A-5C21-0C5B-09F1-04A50BD9D387}"/>
+                </a:ext>
+              </a:extLst>
+            </p:cNvPr>
+            <p:cNvSpPr txBox="1"/>
+            <p:nvPr/>
+          </p:nvSpPr>
+          <p:spPr>
+            <a:xfrm>
+              <a:off x="1965960" y="4536601"/>
+              <a:ext cx="2316480" cy="246221"/>
+            </a:xfrm>
+            <a:prstGeom prst="rect">
+              <a:avLst/>
+            </a:prstGeom>
+            <a:noFill/>
+          </p:spPr>
+          <p:txBody>
+            <a:bodyPr wrap="square" rtlCol="0">
+              <a:spAutoFit/>
+            </a:bodyPr>
+            <a:lstStyle/>
+            <a:p>
+              <a:r>
+                <a:rPr lang="en-CA" sz="1000" dirty="0"/>
+                <a:t>            Small  Medium  Large  Very Large</a:t>
+              </a:r>
+            </a:p>
+          </p:txBody>
+        </p:sp>
+        <p:grpSp>
+          <p:nvGrpSpPr>
+            <p:cNvPr id="16" name="Group 15">
+              <a:extLst>
+                <a:ext uri="{FF2B5EF4-FFF2-40B4-BE49-F238E27FC236}">
+                  <a16:creationId xmlns:a16="http://schemas.microsoft.com/office/drawing/2014/main" id="{FF310C6C-39B8-C735-89E2-F273A835052E}"/>
+                </a:ext>
+              </a:extLst>
+            </p:cNvPr>
+            <p:cNvGrpSpPr/>
+            <p:nvPr/>
+          </p:nvGrpSpPr>
+          <p:grpSpPr>
+            <a:xfrm>
+              <a:off x="1701901" y="4904018"/>
+              <a:ext cx="7408978" cy="5030798"/>
+              <a:chOff x="1701902" y="4789715"/>
+              <a:chExt cx="6600773" cy="5030798"/>
             </a:xfrm>
           </p:grpSpPr>
           <p:pic>
             <p:nvPicPr>
-              <p:cNvPr id="19" name="Picture 18" descr="A map of the united states&#10;&#10;AI-generated content may be incorrect.">
+              <p:cNvPr id="14" name="Picture 13" descr="A blue and black lines&#10;&#10;AI-generated content may be incorrect.">
                 <a:extLst>
                   <a:ext uri="{FF2B5EF4-FFF2-40B4-BE49-F238E27FC236}">
-                    <a16:creationId xmlns:a16="http://schemas.microsoft.com/office/drawing/2014/main" id="{3D6978F0-5245-E9F0-25F4-6FFE028F01D0}"/>
+                    <a16:creationId xmlns:a16="http://schemas.microsoft.com/office/drawing/2014/main" id="{74D03635-6907-358A-4B21-EAAAC3CD161D}"/>
                   </a:ext>
                 </a:extLst>
               </p:cNvPr>
@@ -3988,260 +4264,340 @@
                   </a:ext>
                 </a:extLst>
               </a:blip>
-              <a:srcRect l="10808" r="10808"/>
+              <a:srcRect l="38138" t="59194" r="31570" b="11270"/>
               <a:stretch/>
             </p:blipFill>
             <p:spPr>
               <a:xfrm>
-                <a:off x="2858947" y="861627"/>
-                <a:ext cx="6821347" cy="5053555"/>
+                <a:off x="1799875" y="5148728"/>
+                <a:ext cx="6502800" cy="4671785"/>
               </a:xfrm>
               <a:prstGeom prst="rect">
                 <a:avLst/>
               </a:prstGeom>
             </p:spPr>
           </p:pic>
-          <p:grpSp>
-            <p:nvGrpSpPr>
-              <p:cNvPr id="15" name="Group 14">
+          <p:pic>
+            <p:nvPicPr>
+              <p:cNvPr id="15" name="Picture 14" descr="A blue and black lines&#10;&#10;AI-generated content may be incorrect.">
                 <a:extLst>
                   <a:ext uri="{FF2B5EF4-FFF2-40B4-BE49-F238E27FC236}">
-                    <a16:creationId xmlns:a16="http://schemas.microsoft.com/office/drawing/2014/main" id="{E2936D85-599B-6B7F-D41E-F1A30859FDD2}"/>
+                    <a16:creationId xmlns:a16="http://schemas.microsoft.com/office/drawing/2014/main" id="{BCDA9591-785D-FE78-25AA-0F4FDBFE8F06}"/>
                   </a:ext>
                 </a:extLst>
               </p:cNvPr>
-              <p:cNvGrpSpPr/>
+              <p:cNvPicPr>
+                <a:picLocks noChangeAspect="1"/>
+              </p:cNvPicPr>
               <p:nvPr/>
-            </p:nvGrpSpPr>
-            <p:grpSpPr>
+            </p:nvPicPr>
+            <p:blipFill>
+              <a:blip r:embed="rId2">
+                <a:extLst>
+                  <a:ext uri="{28A0092B-C50C-407E-A947-70E740481C1C}">
+                    <a14:useLocalDpi xmlns:a14="http://schemas.microsoft.com/office/drawing/2010/main" val="0"/>
+                  </a:ext>
+                </a:extLst>
+              </a:blip>
+              <a:srcRect t="56190" r="98904" b="27615"/>
+              <a:stretch/>
+            </p:blipFill>
+            <p:spPr>
               <a:xfrm>
-                <a:off x="2526216" y="723050"/>
-                <a:ext cx="7601632" cy="5759177"/>
-                <a:chOff x="2524606" y="706888"/>
-                <a:chExt cx="6758289" cy="5114151"/>
+                <a:off x="1701902" y="4789715"/>
+                <a:ext cx="235255" cy="2561653"/>
               </a:xfrm>
-            </p:grpSpPr>
-            <p:grpSp>
-              <p:nvGrpSpPr>
-                <p:cNvPr id="6" name="Group 5">
-                  <a:extLst>
-                    <a:ext uri="{FF2B5EF4-FFF2-40B4-BE49-F238E27FC236}">
-                      <a16:creationId xmlns:a16="http://schemas.microsoft.com/office/drawing/2014/main" id="{784A3045-DD24-4D0B-E53D-87BAECD7EB6C}"/>
-                    </a:ext>
-                  </a:extLst>
-                </p:cNvPr>
-                <p:cNvGrpSpPr/>
-                <p:nvPr/>
-              </p:nvGrpSpPr>
-              <p:grpSpPr>
-                <a:xfrm>
-                  <a:off x="2524606" y="706888"/>
-                  <a:ext cx="6758289" cy="5114151"/>
-                  <a:chOff x="2524606" y="706888"/>
-                  <a:chExt cx="6758289" cy="5114151"/>
-                </a:xfrm>
-              </p:grpSpPr>
-              <p:pic>
-                <p:nvPicPr>
-                  <p:cNvPr id="7" name="Picture 6" descr="A map with a red square&#10;&#10;Description automatically generated">
-                    <a:extLst>
-                      <a:ext uri="{FF2B5EF4-FFF2-40B4-BE49-F238E27FC236}">
-                        <a16:creationId xmlns:a16="http://schemas.microsoft.com/office/drawing/2014/main" id="{024D7657-1386-3BF1-9E27-C379D592751A}"/>
-                      </a:ext>
-                    </a:extLst>
-                  </p:cNvPr>
-                  <p:cNvPicPr>
-                    <a:picLocks noChangeAspect="1"/>
-                  </p:cNvPicPr>
-                  <p:nvPr/>
-                </p:nvPicPr>
-                <p:blipFill>
-                  <a:blip r:embed="rId3">
-                    <a:extLst>
-                      <a:ext uri="{28A0092B-C50C-407E-A947-70E740481C1C}">
-                        <a14:useLocalDpi xmlns:a14="http://schemas.microsoft.com/office/drawing/2010/main" val="0"/>
-                      </a:ext>
-                    </a:extLst>
-                  </a:blip>
-                  <a:srcRect l="28083" t="1356" r="27431" b="1494"/>
-                  <a:stretch/>
-                </p:blipFill>
-                <p:spPr>
-                  <a:xfrm>
-                    <a:off x="6836229" y="925285"/>
-                    <a:ext cx="1643743" cy="1741215"/>
-                  </a:xfrm>
-                  <a:prstGeom prst="rect">
-                    <a:avLst/>
-                  </a:prstGeom>
-                  <a:ln>
-                    <a:noFill/>
-                  </a:ln>
-                </p:spPr>
-              </p:pic>
-              <p:sp>
-                <p:nvSpPr>
-                  <p:cNvPr id="2" name="TextBox 1">
-                    <a:extLst>
-                      <a:ext uri="{FF2B5EF4-FFF2-40B4-BE49-F238E27FC236}">
-                        <a16:creationId xmlns:a16="http://schemas.microsoft.com/office/drawing/2014/main" id="{53588E85-51C2-BC0D-6933-D5629282428B}"/>
-                      </a:ext>
-                    </a:extLst>
-                  </p:cNvPr>
-                  <p:cNvSpPr txBox="1"/>
-                  <p:nvPr/>
-                </p:nvSpPr>
-                <p:spPr>
-                  <a:xfrm>
-                    <a:off x="2613352" y="5252014"/>
-                    <a:ext cx="6669543" cy="569025"/>
-                  </a:xfrm>
-                  <a:prstGeom prst="rect">
-                    <a:avLst/>
-                  </a:prstGeom>
-                  <a:noFill/>
-                  <a:ln>
-                    <a:noFill/>
-                  </a:ln>
-                </p:spPr>
-                <p:txBody>
-                  <a:bodyPr wrap="square" rtlCol="0">
-                    <a:spAutoFit/>
-                  </a:bodyPr>
-                  <a:lstStyle/>
-                  <a:p>
-                    <a:pPr algn="ctr"/>
-                    <a:r>
-                      <a:rPr lang="en-CA" dirty="0"/>
-                      <a:t>   </a:t>
-                    </a:r>
-                    <a:r>
-                      <a:rPr lang="en-CA" dirty="0">
-                        <a:solidFill>
-                          <a:schemeClr val="tx1">
-                            <a:lumMod val="50000"/>
-                            <a:lumOff val="50000"/>
-                          </a:schemeClr>
-                        </a:solidFill>
-                      </a:rPr>
-                      <a:t>Longitude</a:t>
-                    </a:r>
-                  </a:p>
-                </p:txBody>
-              </p:sp>
-              <p:sp>
-                <p:nvSpPr>
-                  <p:cNvPr id="3" name="TextBox 2">
-                    <a:extLst>
-                      <a:ext uri="{FF2B5EF4-FFF2-40B4-BE49-F238E27FC236}">
-                        <a16:creationId xmlns:a16="http://schemas.microsoft.com/office/drawing/2014/main" id="{51E7DBA6-F2E3-2B10-D591-44D447113820}"/>
-                      </a:ext>
-                    </a:extLst>
-                  </p:cNvPr>
-                  <p:cNvSpPr txBox="1"/>
-                  <p:nvPr/>
-                </p:nvSpPr>
-                <p:spPr>
-                  <a:xfrm rot="16200000">
-                    <a:off x="420942" y="2810552"/>
-                    <a:ext cx="4754153" cy="546825"/>
-                  </a:xfrm>
-                  <a:prstGeom prst="rect">
-                    <a:avLst/>
-                  </a:prstGeom>
-                  <a:noFill/>
-                  <a:ln>
-                    <a:noFill/>
-                  </a:ln>
-                </p:spPr>
-                <p:txBody>
-                  <a:bodyPr wrap="square" rtlCol="0">
-                    <a:spAutoFit/>
-                  </a:bodyPr>
-                  <a:lstStyle/>
-                  <a:p>
-                    <a:pPr algn="ctr"/>
-                    <a:r>
-                      <a:rPr lang="en-CA" dirty="0">
-                        <a:solidFill>
-                          <a:schemeClr val="tx1">
-                            <a:lumMod val="50000"/>
-                            <a:lumOff val="50000"/>
-                          </a:schemeClr>
-                        </a:solidFill>
-                      </a:rPr>
-                      <a:t>Latitude</a:t>
-                    </a:r>
-                  </a:p>
-                </p:txBody>
-              </p:sp>
-            </p:grpSp>
-            <p:pic>
-              <p:nvPicPr>
-                <p:cNvPr id="12" name="Picture 11" descr="A blue and white map&#10;&#10;AI-generated content may be incorrect.">
-                  <a:extLst>
-                    <a:ext uri="{FF2B5EF4-FFF2-40B4-BE49-F238E27FC236}">
-                      <a16:creationId xmlns:a16="http://schemas.microsoft.com/office/drawing/2014/main" id="{A421572D-D995-4990-4FDA-5B53D073AAE5}"/>
-                    </a:ext>
-                  </a:extLst>
-                </p:cNvPr>
-                <p:cNvPicPr>
-                  <a:picLocks noChangeAspect="1"/>
-                </p:cNvPicPr>
-                <p:nvPr/>
-              </p:nvPicPr>
-              <p:blipFill>
-                <a:blip r:embed="rId4">
-                  <a:extLst>
-                    <a:ext uri="{BEBA8EAE-BF5A-486C-A8C5-ECC9F3942E4B}">
-                      <a14:imgProps xmlns:a14="http://schemas.microsoft.com/office/drawing/2010/main">
-                        <a14:imgLayer r:embed="rId5">
-                          <a14:imgEffect>
-                            <a14:backgroundRemoval t="7946" b="85757" l="38425" r="65632">
-                              <a14:foregroundMark x1="39021" y1="5697" x2="57041" y2="13493"/>
-                              <a14:foregroundMark x1="57041" y1="13493" x2="63126" y2="90255"/>
-                              <a14:foregroundMark x1="63126" y1="90255" x2="51432" y2="89955"/>
-                              <a14:foregroundMark x1="51432" y1="89955" x2="60382" y2="86357"/>
-                              <a14:foregroundMark x1="60382" y1="86357" x2="65155" y2="71064"/>
-                              <a14:foregroundMark x1="65155" y1="71064" x2="61456" y2="83358"/>
-                              <a14:foregroundMark x1="61456" y1="83358" x2="52506" y2="87256"/>
-                              <a14:foregroundMark x1="52506" y1="87256" x2="45227" y2="75412"/>
-                              <a14:foregroundMark x1="45227" y1="75412" x2="36158" y2="33133"/>
-                              <a14:foregroundMark x1="36158" y1="33133" x2="38425" y2="7946"/>
-                              <a14:foregroundMark x1="38425" y1="7946" x2="39141" y2="8696"/>
-                            </a14:backgroundRemoval>
-                          </a14:imgEffect>
-                        </a14:imgLayer>
-                      </a14:imgProps>
-                    </a:ext>
-                    <a:ext uri="{28A0092B-C50C-407E-A947-70E740481C1C}">
-                      <a14:useLocalDpi xmlns:a14="http://schemas.microsoft.com/office/drawing/2010/main" val="0"/>
-                    </a:ext>
-                  </a:extLst>
-                </a:blip>
-                <a:srcRect l="35410" t="5217" r="30929" b="5285"/>
-                <a:stretch/>
-              </p:blipFill>
-              <p:spPr>
-                <a:xfrm rot="19653429">
-                  <a:off x="4594715" y="1560074"/>
-                  <a:ext cx="1755999" cy="3565194"/>
-                </a:xfrm>
-                <a:prstGeom prst="rect">
-                  <a:avLst/>
-                </a:prstGeom>
-                <a:ln>
-                  <a:noFill/>
-                </a:ln>
-              </p:spPr>
-            </p:pic>
-          </p:grpSp>
+              <a:prstGeom prst="rect">
+                <a:avLst/>
+              </a:prstGeom>
+            </p:spPr>
+          </p:pic>
         </p:grpSp>
+        <p:sp>
+          <p:nvSpPr>
+            <p:cNvPr id="17" name="TextBox 16">
+              <a:extLst>
+                <a:ext uri="{FF2B5EF4-FFF2-40B4-BE49-F238E27FC236}">
+                  <a16:creationId xmlns:a16="http://schemas.microsoft.com/office/drawing/2014/main" id="{6E69176F-DBE5-3194-C900-CCE02B88B86B}"/>
+                </a:ext>
+              </a:extLst>
+            </p:cNvPr>
+            <p:cNvSpPr txBox="1"/>
+            <p:nvPr/>
+          </p:nvSpPr>
+          <p:spPr>
+            <a:xfrm>
+              <a:off x="2200472" y="288684"/>
+              <a:ext cx="7943456" cy="338554"/>
+            </a:xfrm>
+            <a:prstGeom prst="rect">
+              <a:avLst/>
+            </a:prstGeom>
+            <a:noFill/>
+          </p:spPr>
+          <p:txBody>
+            <a:bodyPr wrap="square" rtlCol="0">
+              <a:spAutoFit/>
+            </a:bodyPr>
+            <a:lstStyle/>
+            <a:p>
+              <a:r>
+                <a:rPr lang="en-CA" sz="1600" dirty="0"/>
+                <a:t>  Max. Length                             Max. Mass                                Mass/Length                           Dentition</a:t>
+              </a:r>
+            </a:p>
+          </p:txBody>
+        </p:sp>
+        <p:sp>
+          <p:nvSpPr>
+            <p:cNvPr id="19" name="TextBox 18">
+              <a:extLst>
+                <a:ext uri="{FF2B5EF4-FFF2-40B4-BE49-F238E27FC236}">
+                  <a16:creationId xmlns:a16="http://schemas.microsoft.com/office/drawing/2014/main" id="{89D02EF5-7941-C1AE-CAB4-C9AFB7E52C9C}"/>
+                </a:ext>
+              </a:extLst>
+            </p:cNvPr>
+            <p:cNvSpPr txBox="1"/>
+            <p:nvPr/>
+          </p:nvSpPr>
+          <p:spPr>
+            <a:xfrm>
+              <a:off x="4221480" y="4536600"/>
+              <a:ext cx="2316480" cy="246221"/>
+            </a:xfrm>
+            <a:prstGeom prst="rect">
+              <a:avLst/>
+            </a:prstGeom>
+            <a:noFill/>
+          </p:spPr>
+          <p:txBody>
+            <a:bodyPr wrap="square" rtlCol="0">
+              <a:spAutoFit/>
+            </a:bodyPr>
+            <a:lstStyle/>
+            <a:p>
+              <a:r>
+                <a:rPr lang="en-CA" sz="1000" dirty="0"/>
+                <a:t>            Small  Medium  Large  Very Large</a:t>
+              </a:r>
+            </a:p>
+          </p:txBody>
+        </p:sp>
+        <p:sp>
+          <p:nvSpPr>
+            <p:cNvPr id="21" name="TextBox 20">
+              <a:extLst>
+                <a:ext uri="{FF2B5EF4-FFF2-40B4-BE49-F238E27FC236}">
+                  <a16:creationId xmlns:a16="http://schemas.microsoft.com/office/drawing/2014/main" id="{0CFAED37-7883-76B3-92BD-D25084BAA56A}"/>
+                </a:ext>
+              </a:extLst>
+            </p:cNvPr>
+            <p:cNvSpPr txBox="1"/>
+            <p:nvPr/>
+          </p:nvSpPr>
+          <p:spPr>
+            <a:xfrm>
+              <a:off x="6953794" y="4546760"/>
+              <a:ext cx="1638300" cy="246221"/>
+            </a:xfrm>
+            <a:prstGeom prst="rect">
+              <a:avLst/>
+            </a:prstGeom>
+            <a:noFill/>
+          </p:spPr>
+          <p:txBody>
+            <a:bodyPr wrap="square" rtlCol="0">
+              <a:spAutoFit/>
+            </a:bodyPr>
+            <a:lstStyle/>
+            <a:p>
+              <a:r>
+                <a:rPr lang="en-CA" sz="1000" dirty="0"/>
+                <a:t> Low       Medium       High </a:t>
+              </a:r>
+            </a:p>
+          </p:txBody>
+        </p:sp>
+        <p:sp>
+          <p:nvSpPr>
+            <p:cNvPr id="22" name="TextBox 21">
+              <a:extLst>
+                <a:ext uri="{FF2B5EF4-FFF2-40B4-BE49-F238E27FC236}">
+                  <a16:creationId xmlns:a16="http://schemas.microsoft.com/office/drawing/2014/main" id="{05C7D243-1E63-0753-075A-077ACC6EAE4C}"/>
+                </a:ext>
+              </a:extLst>
+            </p:cNvPr>
+            <p:cNvSpPr txBox="1"/>
+            <p:nvPr/>
+          </p:nvSpPr>
+          <p:spPr>
+            <a:xfrm>
+              <a:off x="9110879" y="4567081"/>
+              <a:ext cx="1878250" cy="246221"/>
+            </a:xfrm>
+            <a:prstGeom prst="rect">
+              <a:avLst/>
+            </a:prstGeom>
+            <a:noFill/>
+          </p:spPr>
+          <p:txBody>
+            <a:bodyPr wrap="square" rtlCol="0">
+              <a:spAutoFit/>
+            </a:bodyPr>
+            <a:lstStyle/>
+            <a:p>
+              <a:r>
+                <a:rPr lang="en-CA" sz="1000" dirty="0"/>
+                <a:t>   FCT         LB      NFCT      SB</a:t>
+              </a:r>
+            </a:p>
+          </p:txBody>
+        </p:sp>
+        <p:sp>
+          <p:nvSpPr>
+            <p:cNvPr id="25" name="TextBox 24">
+              <a:extLst>
+                <a:ext uri="{FF2B5EF4-FFF2-40B4-BE49-F238E27FC236}">
+                  <a16:creationId xmlns:a16="http://schemas.microsoft.com/office/drawing/2014/main" id="{CD83AC2A-C8A1-9F95-ED48-88D6EC3C0A73}"/>
+                </a:ext>
+              </a:extLst>
+            </p:cNvPr>
+            <p:cNvSpPr txBox="1"/>
+            <p:nvPr/>
+          </p:nvSpPr>
+          <p:spPr>
+            <a:xfrm>
+              <a:off x="2124272" y="5031564"/>
+              <a:ext cx="7943456" cy="338554"/>
+            </a:xfrm>
+            <a:prstGeom prst="rect">
+              <a:avLst/>
+            </a:prstGeom>
+            <a:noFill/>
+          </p:spPr>
+          <p:txBody>
+            <a:bodyPr wrap="square" rtlCol="0">
+              <a:spAutoFit/>
+            </a:bodyPr>
+            <a:lstStyle/>
+            <a:p>
+              <a:r>
+                <a:rPr lang="en-CA" sz="1600" dirty="0"/>
+                <a:t>  Max. Diving Depth                 Average Group Size               Prey Choice</a:t>
+              </a:r>
+            </a:p>
+          </p:txBody>
+        </p:sp>
+        <p:sp>
+          <p:nvSpPr>
+            <p:cNvPr id="26" name="TextBox 25">
+              <a:extLst>
+                <a:ext uri="{FF2B5EF4-FFF2-40B4-BE49-F238E27FC236}">
+                  <a16:creationId xmlns:a16="http://schemas.microsoft.com/office/drawing/2014/main" id="{A8CD4B28-5205-AB54-8758-4E2874C27194}"/>
+                </a:ext>
+              </a:extLst>
+            </p:cNvPr>
+            <p:cNvSpPr txBox="1"/>
+            <p:nvPr/>
+          </p:nvSpPr>
+          <p:spPr>
+            <a:xfrm>
+              <a:off x="2399936" y="9339743"/>
+              <a:ext cx="1633583" cy="246221"/>
+            </a:xfrm>
+            <a:prstGeom prst="rect">
+              <a:avLst/>
+            </a:prstGeom>
+            <a:noFill/>
+          </p:spPr>
+          <p:txBody>
+            <a:bodyPr wrap="square" rtlCol="0">
+              <a:spAutoFit/>
+            </a:bodyPr>
+            <a:lstStyle/>
+            <a:p>
+              <a:r>
+                <a:rPr lang="en-CA" sz="1000" dirty="0"/>
+                <a:t>EP         UM         LM         BP     </a:t>
+              </a:r>
+            </a:p>
+          </p:txBody>
+        </p:sp>
+        <p:sp>
+          <p:nvSpPr>
+            <p:cNvPr id="27" name="TextBox 26">
+              <a:extLst>
+                <a:ext uri="{FF2B5EF4-FFF2-40B4-BE49-F238E27FC236}">
+                  <a16:creationId xmlns:a16="http://schemas.microsoft.com/office/drawing/2014/main" id="{8CE1A099-C3D7-F895-89CE-A4F480817253}"/>
+                </a:ext>
+              </a:extLst>
+            </p:cNvPr>
+            <p:cNvSpPr txBox="1"/>
+            <p:nvPr/>
+          </p:nvSpPr>
+          <p:spPr>
+            <a:xfrm>
+              <a:off x="4521200" y="9339743"/>
+              <a:ext cx="1717040" cy="246221"/>
+            </a:xfrm>
+            <a:prstGeom prst="rect">
+              <a:avLst/>
+            </a:prstGeom>
+            <a:noFill/>
+          </p:spPr>
+          <p:txBody>
+            <a:bodyPr wrap="square" rtlCol="0">
+              <a:spAutoFit/>
+            </a:bodyPr>
+            <a:lstStyle/>
+            <a:p>
+              <a:r>
+                <a:rPr lang="en-CA" sz="1000" dirty="0"/>
+                <a:t>Sol.      S     S-M    M    M-L      L</a:t>
+              </a:r>
+            </a:p>
+          </p:txBody>
+        </p:sp>
+        <p:sp>
+          <p:nvSpPr>
+            <p:cNvPr id="28" name="TextBox 27">
+              <a:extLst>
+                <a:ext uri="{FF2B5EF4-FFF2-40B4-BE49-F238E27FC236}">
+                  <a16:creationId xmlns:a16="http://schemas.microsoft.com/office/drawing/2014/main" id="{60562E0A-A041-A005-7FDE-44F3FAE0BF59}"/>
+                </a:ext>
+              </a:extLst>
+            </p:cNvPr>
+            <p:cNvSpPr txBox="1"/>
+            <p:nvPr/>
+          </p:nvSpPr>
+          <p:spPr>
+            <a:xfrm>
+              <a:off x="6868160" y="9340933"/>
+              <a:ext cx="1633583" cy="246221"/>
+            </a:xfrm>
+            <a:prstGeom prst="rect">
+              <a:avLst/>
+            </a:prstGeom>
+            <a:noFill/>
+          </p:spPr>
+          <p:txBody>
+            <a:bodyPr wrap="square" rtlCol="0">
+              <a:spAutoFit/>
+            </a:bodyPr>
+            <a:lstStyle/>
+            <a:p>
+              <a:r>
+                <a:rPr lang="en-CA" sz="1000" dirty="0"/>
+                <a:t>  C          F      NCI      HV        Z</a:t>
+              </a:r>
+            </a:p>
+          </p:txBody>
+        </p:sp>
       </p:grpSp>
     </p:spTree>
     <p:extLst>
       <p:ext uri="{BB962C8B-B14F-4D97-AF65-F5344CB8AC3E}">
-        <p14:creationId xmlns:p14="http://schemas.microsoft.com/office/powerpoint/2010/main" val="2389168500"/>
+        <p14:creationId xmlns:p14="http://schemas.microsoft.com/office/powerpoint/2010/main" val="69368688"/>
       </p:ext>
     </p:extLst>
   </p:cSld>
@@ -4270,10 +4626,10 @@
       </p:grpSpPr>
       <p:grpSp>
         <p:nvGrpSpPr>
-          <p:cNvPr id="12" name="Group 11">
+          <p:cNvPr id="6" name="Group 5">
             <a:extLst>
               <a:ext uri="{FF2B5EF4-FFF2-40B4-BE49-F238E27FC236}">
-                <a16:creationId xmlns:a16="http://schemas.microsoft.com/office/drawing/2014/main" id="{FD8A2F96-DE04-3ABB-1F2D-678C993328B3}"/>
+                <a16:creationId xmlns:a16="http://schemas.microsoft.com/office/drawing/2014/main" id="{BB5AD7D4-57B5-513D-BEC1-A914A1E01258}"/>
               </a:ext>
             </a:extLst>
           </p:cNvPr>
@@ -4282,18 +4638,18 @@
         </p:nvGrpSpPr>
         <p:grpSpPr>
           <a:xfrm>
-            <a:off x="201385" y="381000"/>
-            <a:ext cx="11789229" cy="6096000"/>
-            <a:chOff x="402771" y="381000"/>
-            <a:chExt cx="11789229" cy="6096000"/>
+            <a:off x="-395111" y="681566"/>
+            <a:ext cx="15578667" cy="9087556"/>
+            <a:chOff x="1741714" y="457200"/>
+            <a:chExt cx="10450286" cy="6096000"/>
           </a:xfrm>
         </p:grpSpPr>
         <p:pic>
           <p:nvPicPr>
-            <p:cNvPr id="5" name="Picture 4" descr="A comparison of different colored bars&#10;&#10;AI-generated content may be incorrect.">
+            <p:cNvPr id="3" name="Picture 2" descr="A comparison of different colored bars&#10;&#10;AI-generated content may be incorrect.">
               <a:extLst>
                 <a:ext uri="{FF2B5EF4-FFF2-40B4-BE49-F238E27FC236}">
-                  <a16:creationId xmlns:a16="http://schemas.microsoft.com/office/drawing/2014/main" id="{47130567-AE6B-2F90-553D-F6A39C881D2E}"/>
+                  <a16:creationId xmlns:a16="http://schemas.microsoft.com/office/drawing/2014/main" id="{7F04A926-2A75-BD46-19B2-A133AC4668A3}"/>
                 </a:ext>
               </a:extLst>
             </p:cNvPr>
@@ -4310,13 +4666,13 @@
                 </a:ext>
               </a:extLst>
             </a:blip>
-            <a:srcRect l="48929" r="12322"/>
+            <a:srcRect l="48214"/>
             <a:stretch/>
           </p:blipFill>
           <p:spPr>
             <a:xfrm>
-              <a:off x="5040085" y="381000"/>
-              <a:ext cx="4724401" cy="6096000"/>
+              <a:off x="5878286" y="457200"/>
+              <a:ext cx="6313714" cy="6096000"/>
             </a:xfrm>
             <a:prstGeom prst="rect">
               <a:avLst/>
@@ -4325,10 +4681,10 @@
         </p:pic>
         <p:pic>
           <p:nvPicPr>
-            <p:cNvPr id="9" name="Picture 8" descr="A comparison of different colored bars&#10;&#10;AI-generated content may be incorrect.">
+            <p:cNvPr id="4" name="Picture 3" descr="A comparison of different colored bars&#10;&#10;AI-generated content may be incorrect.">
               <a:extLst>
                 <a:ext uri="{FF2B5EF4-FFF2-40B4-BE49-F238E27FC236}">
-                  <a16:creationId xmlns:a16="http://schemas.microsoft.com/office/drawing/2014/main" id="{1844B638-8D99-ADBF-C775-CBCE83BCFA0D}"/>
+                  <a16:creationId xmlns:a16="http://schemas.microsoft.com/office/drawing/2014/main" id="{2C420DDC-D28D-9F10-9622-18794A6F8A11}"/>
                 </a:ext>
               </a:extLst>
             </p:cNvPr>
@@ -4345,48 +4701,13 @@
                 </a:ext>
               </a:extLst>
             </a:blip>
-            <a:srcRect r="61964"/>
+            <a:srcRect r="64286"/>
             <a:stretch/>
           </p:blipFill>
           <p:spPr>
             <a:xfrm>
-              <a:off x="402771" y="381000"/>
-              <a:ext cx="4637314" cy="6096000"/>
-            </a:xfrm>
-            <a:prstGeom prst="rect">
-              <a:avLst/>
-            </a:prstGeom>
-          </p:spPr>
-        </p:pic>
-        <p:pic>
-          <p:nvPicPr>
-            <p:cNvPr id="10" name="Picture 9" descr="A comparison of different colored bars&#10;&#10;AI-generated content may be incorrect.">
-              <a:extLst>
-                <a:ext uri="{FF2B5EF4-FFF2-40B4-BE49-F238E27FC236}">
-                  <a16:creationId xmlns:a16="http://schemas.microsoft.com/office/drawing/2014/main" id="{011F2306-33E6-8C9C-8F88-47A957AB5341}"/>
-                </a:ext>
-              </a:extLst>
-            </p:cNvPr>
-            <p:cNvPicPr>
-              <a:picLocks noChangeAspect="1"/>
-            </p:cNvPicPr>
-            <p:nvPr/>
-          </p:nvPicPr>
-          <p:blipFill>
-            <a:blip r:embed="rId2">
-              <a:extLst>
-                <a:ext uri="{28A0092B-C50C-407E-A947-70E740481C1C}">
-                  <a14:useLocalDpi xmlns:a14="http://schemas.microsoft.com/office/drawing/2010/main" val="0"/>
-                </a:ext>
-              </a:extLst>
-            </a:blip>
-            <a:srcRect l="87411" t="13215" b="22142"/>
-            <a:stretch/>
-          </p:blipFill>
-          <p:spPr>
-            <a:xfrm>
-              <a:off x="9968309" y="381000"/>
-              <a:ext cx="2223691" cy="5709054"/>
+              <a:off x="1741714" y="457200"/>
+              <a:ext cx="4354286" cy="6096000"/>
             </a:xfrm>
             <a:prstGeom prst="rect">
               <a:avLst/>
@@ -4452,8 +4773,8 @@
         </p:blipFill>
         <p:spPr>
           <a:xfrm>
-            <a:off x="2667000" y="0"/>
-            <a:ext cx="6858000" cy="6858000"/>
+            <a:off x="984250" y="0"/>
+            <a:ext cx="10223500" cy="10223500"/>
           </a:xfrm>
           <a:prstGeom prst="rect">
             <a:avLst/>
@@ -4474,8 +4795,8 @@
         </p:nvSpPr>
         <p:spPr>
           <a:xfrm>
-            <a:off x="3842658" y="555171"/>
-            <a:ext cx="1807028" cy="923330"/>
+            <a:off x="2736851" y="827616"/>
+            <a:ext cx="2693810" cy="1330942"/>
           </a:xfrm>
           <a:prstGeom prst="rect">
             <a:avLst/>
@@ -4489,7 +4810,7 @@
           <a:lstStyle/>
           <a:p>
             <a:r>
-              <a:rPr lang="en-CA" dirty="0">
+              <a:rPr lang="en-CA" sz="2683" dirty="0">
                 <a:latin typeface="Arial" panose="020B0604020202020204" pitchFamily="34" charset="0"/>
                 <a:cs typeface="Arial" panose="020B0604020202020204" pitchFamily="34" charset="0"/>
               </a:rPr>
@@ -4498,7 +4819,7 @@
           </a:p>
           <a:p>
             <a:r>
-              <a:rPr lang="en-CA" dirty="0">
+              <a:rPr lang="en-CA" sz="2683" dirty="0">
                 <a:solidFill>
                   <a:srgbClr val="0000FF"/>
                 </a:solidFill>
@@ -4510,7 +4831,7 @@
           </a:p>
           <a:p>
             <a:r>
-              <a:rPr lang="en-CA" dirty="0">
+              <a:rPr lang="en-CA" sz="2683" dirty="0">
                 <a:solidFill>
                   <a:srgbClr val="0000FF"/>
                 </a:solidFill>
@@ -4580,8 +4901,8 @@
         </p:blipFill>
         <p:spPr>
           <a:xfrm>
-            <a:off x="3524250" y="0"/>
-            <a:ext cx="5143500" cy="6858000"/>
+            <a:off x="2262188" y="0"/>
+            <a:ext cx="7667625" cy="10223500"/>
           </a:xfrm>
           <a:prstGeom prst="rect">
             <a:avLst/>
@@ -4632,8 +4953,8 @@
         </p:nvGrpSpPr>
         <p:grpSpPr>
           <a:xfrm>
-            <a:off x="2721429" y="87086"/>
-            <a:ext cx="6955971" cy="6662057"/>
+            <a:off x="1065390" y="129823"/>
+            <a:ext cx="10369549" cy="9931400"/>
             <a:chOff x="2721429" y="87086"/>
             <a:chExt cx="6955971" cy="6662057"/>
           </a:xfrm>
@@ -4688,7 +5009,7 @@
             <a:lstStyle/>
             <a:p>
               <a:pPr algn="ctr"/>
-              <a:endParaRPr lang="en-CA"/>
+              <a:endParaRPr lang="en-CA" sz="2683"/>
             </a:p>
           </p:txBody>
         </p:sp>
@@ -4773,8 +5094,8 @@
         </p:nvGrpSpPr>
         <p:grpSpPr>
           <a:xfrm>
-            <a:off x="0" y="250371"/>
-            <a:ext cx="12192000" cy="6193972"/>
+            <a:off x="-2991556" y="373238"/>
+            <a:ext cx="18175111" cy="9233606"/>
             <a:chOff x="0" y="250371"/>
             <a:chExt cx="12192000" cy="6193972"/>
           </a:xfrm>
@@ -4829,7 +5150,7 @@
             <a:lstStyle/>
             <a:p>
               <a:pPr algn="ctr"/>
-              <a:endParaRPr lang="en-CA"/>
+              <a:endParaRPr lang="en-CA" sz="2683"/>
             </a:p>
           </p:txBody>
         </p:sp>
@@ -4914,8 +5235,8 @@
         </p:nvGrpSpPr>
         <p:grpSpPr>
           <a:xfrm>
-            <a:off x="370389" y="207814"/>
-            <a:ext cx="6063068" cy="5055990"/>
+            <a:off x="-2439401" y="309797"/>
+            <a:ext cx="9038462" cy="7537170"/>
             <a:chOff x="370389" y="207814"/>
             <a:chExt cx="6063068" cy="5055990"/>
           </a:xfrm>
@@ -4971,7 +5292,7 @@
           <p:spPr>
             <a:xfrm>
               <a:off x="1146647" y="542951"/>
-              <a:ext cx="1709195" cy="738664"/>
+              <a:ext cx="1709195" cy="708283"/>
             </a:xfrm>
             <a:prstGeom prst="rect">
               <a:avLst/>
@@ -4985,7 +5306,7 @@
             <a:lstStyle/>
             <a:p>
               <a:r>
-                <a:rPr lang="en-CA" sz="1400" dirty="0">
+                <a:rPr lang="en-CA" sz="2087" dirty="0">
                   <a:latin typeface="Arial" panose="020B0604020202020204" pitchFamily="34" charset="0"/>
                   <a:cs typeface="Arial" panose="020B0604020202020204" pitchFamily="34" charset="0"/>
                 </a:rPr>
@@ -4994,7 +5315,7 @@
             </a:p>
             <a:p>
               <a:r>
-                <a:rPr lang="en-CA" sz="1400" dirty="0">
+                <a:rPr lang="en-CA" sz="2087" dirty="0">
                   <a:solidFill>
                     <a:srgbClr val="0000FF"/>
                   </a:solidFill>
@@ -5006,7 +5327,7 @@
             </a:p>
             <a:p>
               <a:r>
-                <a:rPr lang="en-CA" sz="1400" dirty="0">
+                <a:rPr lang="en-CA" sz="2087" dirty="0">
                   <a:solidFill>
                     <a:srgbClr val="0000FF"/>
                   </a:solidFill>
@@ -5033,8 +5354,8 @@
         </p:nvGrpSpPr>
         <p:grpSpPr>
           <a:xfrm>
-            <a:off x="6433457" y="207814"/>
-            <a:ext cx="6346371" cy="5055990"/>
+            <a:off x="6599062" y="309797"/>
+            <a:ext cx="9460794" cy="7537170"/>
             <a:chOff x="6521154" y="207813"/>
             <a:chExt cx="6238462" cy="5055991"/>
           </a:xfrm>
@@ -5090,7 +5411,7 @@
           <p:spPr>
             <a:xfrm>
               <a:off x="10754082" y="512174"/>
-              <a:ext cx="2005534" cy="769441"/>
+              <a:ext cx="2005534" cy="739037"/>
             </a:xfrm>
             <a:prstGeom prst="rect">
               <a:avLst/>
@@ -5104,7 +5425,7 @@
             <a:lstStyle/>
             <a:p>
               <a:r>
-                <a:rPr lang="en-CA" sz="1400" dirty="0">
+                <a:rPr lang="en-CA" sz="2087" dirty="0">
                   <a:latin typeface="Arial" panose="020B0604020202020204" pitchFamily="34" charset="0"/>
                   <a:cs typeface="Arial" panose="020B0604020202020204" pitchFamily="34" charset="0"/>
                 </a:rPr>
@@ -5113,7 +5434,7 @@
             </a:p>
             <a:p>
               <a:r>
-                <a:rPr lang="en-CA" sz="1400" dirty="0">
+                <a:rPr lang="en-CA" sz="2087" dirty="0">
                   <a:solidFill>
                     <a:srgbClr val="0000FF"/>
                   </a:solidFill>
@@ -5125,7 +5446,7 @@
             </a:p>
             <a:p>
               <a:r>
-                <a:rPr lang="en-CA" sz="1400" dirty="0">
+                <a:rPr lang="en-CA" sz="2087" dirty="0">
                   <a:solidFill>
                     <a:srgbClr val="0000FF"/>
                   </a:solidFill>
@@ -5135,7 +5456,7 @@
                 <a:t>SES = </a:t>
               </a:r>
               <a:r>
-                <a:rPr lang="en-CA" sz="1600" dirty="0">
+                <a:rPr lang="en-CA" sz="2385" dirty="0">
                   <a:solidFill>
                     <a:srgbClr val="0000FF"/>
                   </a:solidFill>
@@ -5145,7 +5466,7 @@
                 <a:t>-</a:t>
               </a:r>
               <a:r>
-                <a:rPr lang="en-CA" sz="1400" dirty="0">
+                <a:rPr lang="en-CA" sz="2087" dirty="0">
                   <a:solidFill>
                     <a:srgbClr val="0000FF"/>
                   </a:solidFill>
@@ -5155,7 +5476,7 @@
                 <a:t>0.40</a:t>
               </a:r>
               <a:r>
-                <a:rPr lang="en-CA" sz="1200" dirty="0">
+                <a:rPr lang="en-CA" sz="1789" dirty="0">
                   <a:solidFill>
                     <a:srgbClr val="0000FF"/>
                   </a:solidFill>
@@ -5212,8 +5533,8 @@
         </p:nvGrpSpPr>
         <p:grpSpPr>
           <a:xfrm>
-            <a:off x="4381500" y="0"/>
-            <a:ext cx="3429000" cy="6858000"/>
+            <a:off x="3540125" y="0"/>
+            <a:ext cx="5111750" cy="10223500"/>
             <a:chOff x="4381500" y="0"/>
             <a:chExt cx="3429000" cy="6858000"/>
           </a:xfrm>
@@ -5269,7 +5590,7 @@
           <p:spPr>
             <a:xfrm>
               <a:off x="4724399" y="130629"/>
-              <a:ext cx="1153887" cy="553998"/>
+              <a:ext cx="1153887" cy="523631"/>
             </a:xfrm>
             <a:prstGeom prst="rect">
               <a:avLst/>
@@ -5283,7 +5604,7 @@
             <a:lstStyle/>
             <a:p>
               <a:r>
-                <a:rPr lang="en-CA" sz="1000" dirty="0">
+                <a:rPr lang="en-CA" sz="1491" dirty="0">
                   <a:latin typeface="Arial" panose="020B0604020202020204" pitchFamily="34" charset="0"/>
                   <a:cs typeface="Arial" panose="020B0604020202020204" pitchFamily="34" charset="0"/>
                 </a:rPr>
@@ -5292,7 +5613,7 @@
             </a:p>
             <a:p>
               <a:r>
-                <a:rPr lang="en-CA" sz="1000" dirty="0">
+                <a:rPr lang="en-CA" sz="1491" dirty="0">
                   <a:solidFill>
                     <a:srgbClr val="0000FF"/>
                   </a:solidFill>
@@ -5304,7 +5625,7 @@
             </a:p>
             <a:p>
               <a:r>
-                <a:rPr lang="en-CA" sz="1000" dirty="0">
+                <a:rPr lang="en-CA" sz="1491" dirty="0">
                   <a:solidFill>
                     <a:srgbClr val="0000FF"/>
                   </a:solidFill>
@@ -5331,7 +5652,7 @@
           <p:spPr>
             <a:xfrm>
               <a:off x="4724399" y="2427515"/>
-              <a:ext cx="1295401" cy="553998"/>
+              <a:ext cx="1295401" cy="523631"/>
             </a:xfrm>
             <a:prstGeom prst="rect">
               <a:avLst/>
@@ -5345,7 +5666,7 @@
             <a:lstStyle/>
             <a:p>
               <a:r>
-                <a:rPr lang="en-CA" sz="1000" dirty="0">
+                <a:rPr lang="en-CA" sz="1491" dirty="0">
                   <a:latin typeface="Arial" panose="020B0604020202020204" pitchFamily="34" charset="0"/>
                   <a:cs typeface="Arial" panose="020B0604020202020204" pitchFamily="34" charset="0"/>
                 </a:rPr>
@@ -5354,7 +5675,7 @@
             </a:p>
             <a:p>
               <a:r>
-                <a:rPr lang="en-CA" sz="1000" dirty="0">
+                <a:rPr lang="en-CA" sz="1491" dirty="0">
                   <a:solidFill>
                     <a:srgbClr val="0000FF"/>
                   </a:solidFill>
@@ -5366,7 +5687,7 @@
             </a:p>
             <a:p>
               <a:r>
-                <a:rPr lang="en-CA" sz="1000" dirty="0">
+                <a:rPr lang="en-CA" sz="1491" dirty="0">
                   <a:solidFill>
                     <a:srgbClr val="0000FF"/>
                   </a:solidFill>
@@ -5393,7 +5714,7 @@
           <p:spPr>
             <a:xfrm>
               <a:off x="4724399" y="4724401"/>
-              <a:ext cx="1621971" cy="553998"/>
+              <a:ext cx="1621971" cy="523631"/>
             </a:xfrm>
             <a:prstGeom prst="rect">
               <a:avLst/>
@@ -5407,7 +5728,7 @@
             <a:lstStyle/>
             <a:p>
               <a:r>
-                <a:rPr lang="en-CA" sz="1000" dirty="0">
+                <a:rPr lang="en-CA" sz="1491" dirty="0">
                   <a:latin typeface="Arial" panose="020B0604020202020204" pitchFamily="34" charset="0"/>
                   <a:cs typeface="Arial" panose="020B0604020202020204" pitchFamily="34" charset="0"/>
                 </a:rPr>
@@ -5416,7 +5737,7 @@
             </a:p>
             <a:p>
               <a:r>
-                <a:rPr lang="en-CA" sz="1000" dirty="0">
+                <a:rPr lang="en-CA" sz="1491" dirty="0">
                   <a:solidFill>
                     <a:srgbClr val="0000FF"/>
                   </a:solidFill>
@@ -5428,7 +5749,7 @@
             </a:p>
             <a:p>
               <a:r>
-                <a:rPr lang="en-CA" sz="1000" dirty="0">
+                <a:rPr lang="en-CA" sz="1491" dirty="0">
                   <a:solidFill>
                     <a:srgbClr val="0000FF"/>
                   </a:solidFill>
@@ -5485,8 +5806,8 @@
         </p:nvGrpSpPr>
         <p:grpSpPr>
           <a:xfrm>
-            <a:off x="925288" y="103416"/>
-            <a:ext cx="6048000" cy="3888000"/>
+            <a:off x="-1612191" y="154166"/>
+            <a:ext cx="9016000" cy="5796000"/>
             <a:chOff x="925286" y="103414"/>
             <a:chExt cx="10341428" cy="6651171"/>
           </a:xfrm>
@@ -5632,7 +5953,7 @@
             <a:lstStyle/>
             <a:p>
               <a:pPr algn="ctr"/>
-              <a:endParaRPr lang="en-CA"/>
+              <a:endParaRPr lang="en-CA" sz="2683"/>
             </a:p>
           </p:txBody>
         </p:sp>
@@ -5686,7 +6007,7 @@
             <a:lstStyle/>
             <a:p>
               <a:pPr algn="ctr"/>
-              <a:endParaRPr lang="en-CA"/>
+              <a:endParaRPr lang="en-CA" sz="2683"/>
             </a:p>
           </p:txBody>
         </p:sp>
@@ -5707,7 +6028,7 @@
 <file path=ppt/theme/theme1.xml><?xml version="1.0" encoding="utf-8"?>
 <a:theme xmlns:a="http://schemas.openxmlformats.org/drawingml/2006/main" name="Office Theme">
   <a:themeElements>
-    <a:clrScheme name="Office">
+    <a:clrScheme name="Office Theme">
       <a:dk1>
         <a:sysClr val="windowText" lastClr="000000"/>
       </a:dk1>
@@ -5745,7 +6066,7 @@
         <a:srgbClr val="96607D"/>
       </a:folHlink>
     </a:clrScheme>
-    <a:fontScheme name="Office">
+    <a:fontScheme name="Office Theme">
       <a:majorFont>
         <a:latin typeface="Aptos Display" panose="02110004020202020204"/>
         <a:ea typeface=""/>
@@ -5851,7 +6172,7 @@
         <a:font script="Tfng" typeface="Ebrima"/>
       </a:minorFont>
     </a:fontScheme>
-    <a:fmtScheme name="Office">
+    <a:fmtScheme name="Office Theme">
       <a:fillStyleLst>
         <a:solidFill>
           <a:schemeClr val="phClr"/>

</xml_diff>